<commit_message>
Error in computation of qDel fixed. CE marked bitrate added to log RTP packet loop made more efficient. SCReAM BW test can work up to ~500Mbps
</commit_message>
<xml_diff>
--- a/code/bw-test-tool/SCReAM-BW-test-tool.pptx
+++ b/code/bw-test-tool/SCReAM-BW-test-tool.pptx
@@ -2666,7 +2666,7 @@
               </a:rPr>
               <a:t>  |  2020-03-20  |  Public  |  Page </a:t>
             </a:r>
-            <a:fld id="{0BAB0E21-96A1-4B08-A816-E493AFE7DFEF}" type="slidenum">
+            <a:fld id="{63CA94DB-8262-47BD-AAFA-79610572CCBA}" type="slidenum">
               <a:rPr lang="en-US" sz="800" b="0" i="0" u="none" smtClean="0">
                 <a:solidFill>
                   <a:srgbClr val="1A1816"/>
@@ -3171,7 +3171,7 @@
               </a:rPr>
               <a:t>  |  2020-03-20  |  Public  |  Page </a:t>
             </a:r>
-            <a:fld id="{E4918897-A17D-42B1-8A61-454F28430B50}" type="slidenum">
+            <a:fld id="{14024C04-453F-4E15-9891-F00812768E29}" type="slidenum">
               <a:rPr lang="en-US" sz="800" b="0" i="0" u="none" smtClean="0">
                 <a:solidFill>
                   <a:schemeClr val="bg1"/>
@@ -3484,7 +3484,7 @@
               </a:rPr>
               <a:t>  |  2020-03-20  |  Public  |  Page </a:t>
             </a:r>
-            <a:fld id="{1F591AB6-BD59-48EE-9332-3F7077623813}" type="slidenum">
+            <a:fld id="{FA39CD18-C509-457A-BF94-411F910A3005}" type="slidenum">
               <a:rPr lang="en-US" sz="800" b="0" i="0" u="none" smtClean="0">
                 <a:solidFill>
                   <a:srgbClr val="1A1816"/>
@@ -3717,7 +3717,7 @@
               </a:rPr>
               <a:t>  |  2020-03-20  |  Public  |  Page </a:t>
             </a:r>
-            <a:fld id="{21846ED8-6B24-4190-94DE-C4E43FACE7C3}" type="slidenum">
+            <a:fld id="{29CDEC3E-7FE7-4D2A-8347-CF3D7703114F}" type="slidenum">
               <a:rPr lang="en-US" sz="800" b="0" i="0" u="none" smtClean="0">
                 <a:solidFill>
                   <a:srgbClr val="1A1816"/>
@@ -3877,7 +3877,7 @@
               </a:rPr>
               <a:t>  |  2020-03-20  |  Public  |  Page </a:t>
             </a:r>
-            <a:fld id="{D6B2DD57-01F1-41A5-91AE-865292ED45D7}" type="slidenum">
+            <a:fld id="{4373AE6A-A69F-4FD2-805B-D1A06DF6A015}" type="slidenum">
               <a:rPr lang="en-US" sz="800" b="0" i="0" u="none" smtClean="0">
                 <a:solidFill>
                   <a:srgbClr val="1A1816"/>
@@ -4083,7 +4083,7 @@
               </a:rPr>
               <a:t>  |  2020-03-20  |  Public  |  Page </a:t>
             </a:r>
-            <a:fld id="{2EB2E8C5-BFFB-4FD0-8124-37084988954E}" type="slidenum">
+            <a:fld id="{1B5B77D0-F650-449F-B0AE-FA8693087582}" type="slidenum">
               <a:rPr lang="en-US" sz="800" b="0" i="0" u="none" smtClean="0">
                 <a:solidFill>
                   <a:srgbClr val="1A1816"/>
@@ -4381,7 +4381,7 @@
               </a:rPr>
               <a:t>  |  2020-03-20  |  Public  |  Page </a:t>
             </a:r>
-            <a:fld id="{5D14BED2-7F28-4367-9F7A-35294F6D3D86}" type="slidenum">
+            <a:fld id="{9631084D-463E-4A97-94FC-809E32060E48}" type="slidenum">
               <a:rPr lang="en-US" sz="800" b="0" i="0" u="none" smtClean="0">
                 <a:solidFill>
                   <a:schemeClr val="bg1"/>
@@ -4679,7 +4679,7 @@
               </a:rPr>
               <a:t>  |  2020-03-20  |  Public  |  Page </a:t>
             </a:r>
-            <a:fld id="{1FD999E6-8B50-49A6-BB7C-ED7F629EE4BC}" type="slidenum">
+            <a:fld id="{21FDDC51-CC08-4D65-ACCD-13DD9D3E5FFB}" type="slidenum">
               <a:rPr lang="en-US" sz="800" b="0" i="0" u="none" smtClean="0">
                 <a:solidFill>
                   <a:schemeClr val="bg1"/>
@@ -4977,7 +4977,7 @@
               </a:rPr>
               <a:t>  |  2020-03-20  |  Public  |  Page </a:t>
             </a:r>
-            <a:fld id="{DA7F8FCB-E572-4C04-8156-7DF478233844}" type="slidenum">
+            <a:fld id="{6BEE33FA-6B49-41F9-9364-6E9C363D2297}" type="slidenum">
               <a:rPr lang="en-US" sz="800" b="0" i="0" u="none" smtClean="0">
                 <a:solidFill>
                   <a:schemeClr val="bg1"/>
@@ -5275,7 +5275,7 @@
               </a:rPr>
               <a:t>  |  2020-03-20  |  Public  |  Page </a:t>
             </a:r>
-            <a:fld id="{4950EE77-D5A0-4752-945D-487E845AFC2A}" type="slidenum">
+            <a:fld id="{5270677C-57DE-40CA-8242-D99A903BB47F}" type="slidenum">
               <a:rPr lang="en-US" sz="800" b="0" i="0" u="none" smtClean="0">
                 <a:solidFill>
                   <a:schemeClr val="bg1"/>
@@ -5573,7 +5573,7 @@
               </a:rPr>
               <a:t>  |  2020-03-20  |  Public  |  Page </a:t>
             </a:r>
-            <a:fld id="{5E03A236-4856-4BD6-AB3C-4761B41E4B12}" type="slidenum">
+            <a:fld id="{3875EB66-0E2A-4978-B754-A7909C990604}" type="slidenum">
               <a:rPr lang="en-US" sz="800" b="0" i="0" u="none" smtClean="0">
                 <a:solidFill>
                   <a:schemeClr val="bg1"/>
@@ -6087,7 +6087,7 @@
               </a:rPr>
               <a:t>  |  2020-03-20  |  Public  |  Page </a:t>
             </a:r>
-            <a:fld id="{826DF39D-D1E7-484F-A010-26A28C2B7B0A}" type="slidenum">
+            <a:fld id="{B7AFECC3-F131-45A3-8389-8DC2F00147B8}" type="slidenum">
               <a:rPr lang="en-US" sz="800" b="0" i="0" u="none" smtClean="0">
                 <a:solidFill>
                   <a:schemeClr val="bg1"/>
@@ -6391,7 +6391,7 @@
               </a:rPr>
               <a:t>  |  2020-03-20  |  Public  |  Page </a:t>
             </a:r>
-            <a:fld id="{85404EBE-8018-48FD-B23F-74C559B43D20}" type="slidenum">
+            <a:fld id="{9ACC98E2-AE88-4034-9888-2C98E6CA1D49}" type="slidenum">
               <a:rPr lang="en-US" sz="800" b="0" i="0" u="none" smtClean="0">
                 <a:solidFill>
                   <a:schemeClr val="bg1"/>
@@ -6689,7 +6689,7 @@
               </a:rPr>
               <a:t>  |  2020-03-20  |  Public  |  Page </a:t>
             </a:r>
-            <a:fld id="{BFAC10F7-07EE-488A-AB55-B55B89594561}" type="slidenum">
+            <a:fld id="{B8D93581-0BF6-4768-8996-21750764E12D}" type="slidenum">
               <a:rPr lang="en-US" sz="800" b="0" i="0" u="none" smtClean="0">
                 <a:solidFill>
                   <a:schemeClr val="bg1"/>
@@ -6976,7 +6976,7 @@
               </a:rPr>
               <a:t>  |  2020-03-20  |  Public  |  Page </a:t>
             </a:r>
-            <a:fld id="{C291AC80-C7A8-49E6-95E6-0F41691DBEB1}" type="slidenum">
+            <a:fld id="{83D78234-4DB8-4B89-A60B-632EBB3B10E0}" type="slidenum">
               <a:rPr lang="en-US" sz="800" b="0" i="0" u="none" smtClean="0">
                 <a:solidFill>
                   <a:srgbClr val="1A1816"/>
@@ -7263,7 +7263,7 @@
               </a:rPr>
               <a:t>  |  2020-03-20  |  Public  |  Page </a:t>
             </a:r>
-            <a:fld id="{A836B7DB-5055-44B9-85E0-94AAA4254407}" type="slidenum">
+            <a:fld id="{AEE46CD5-8EC1-4EE6-B35D-6F4F568E78D3}" type="slidenum">
               <a:rPr lang="en-US" sz="800" b="0" i="0" u="none" smtClean="0">
                 <a:solidFill>
                   <a:srgbClr val="1A1816"/>
@@ -7556,7 +7556,7 @@
               </a:rPr>
               <a:t>  |  2020-03-20  |  Public  |  Page </a:t>
             </a:r>
-            <a:fld id="{1C2769DE-D08D-4653-886A-ACEB9E18CFDF}" type="slidenum">
+            <a:fld id="{8D8B0C35-133A-46ED-848D-725C0BF72BFB}" type="slidenum">
               <a:rPr lang="en-US" sz="800" b="0" i="0" u="none" smtClean="0">
                 <a:solidFill>
                   <a:srgbClr val="1A1816"/>
@@ -7843,7 +7843,7 @@
               </a:rPr>
               <a:t>  |  2020-03-20  |  Public  |  Page </a:t>
             </a:r>
-            <a:fld id="{B40BB87B-38F1-4BA6-A19F-14058BEB7148}" type="slidenum">
+            <a:fld id="{0B3349E7-3869-4A94-8B78-087E62AA271C}" type="slidenum">
               <a:rPr lang="en-US" sz="800" b="0" i="0" u="none" smtClean="0">
                 <a:solidFill>
                   <a:srgbClr val="1A1816"/>
@@ -8165,7 +8165,7 @@
               </a:rPr>
               <a:t>  |  2020-03-20  |  Public  |  Page </a:t>
             </a:r>
-            <a:fld id="{6E4EEFD9-BEAD-4EA1-9552-62BBF88DFF34}" type="slidenum">
+            <a:fld id="{43379AD3-204E-4621-BDF7-466ACE13200D}" type="slidenum">
               <a:rPr lang="en-US" sz="800" b="0" i="0" u="none" smtClean="0">
                 <a:solidFill>
                   <a:srgbClr val="1A1816"/>
@@ -8452,7 +8452,7 @@
               </a:rPr>
               <a:t>  |  2020-03-20  |  Public  |  Page </a:t>
             </a:r>
-            <a:fld id="{D36E0898-F40D-4110-97BF-BBD1A459D6D8}" type="slidenum">
+            <a:fld id="{B160DAB3-7700-4308-A3BC-5398947D4CE4}" type="slidenum">
               <a:rPr lang="en-US" sz="800" b="0" i="0" u="none" smtClean="0">
                 <a:solidFill>
                   <a:srgbClr val="1A1816"/>
@@ -8774,7 +8774,7 @@
               </a:rPr>
               <a:t>  |  2020-03-20  |  Public  |  Page </a:t>
             </a:r>
-            <a:fld id="{52B51566-2E6F-4141-A8B4-35F2DF2E9EDE}" type="slidenum">
+            <a:fld id="{B5A85A6D-2C27-4E61-889E-0C937E845EAA}" type="slidenum">
               <a:rPr lang="en-US" sz="800" b="0" i="0" u="none" smtClean="0">
                 <a:solidFill>
                   <a:srgbClr val="1A1816"/>
@@ -9136,7 +9136,7 @@
               </a:rPr>
               <a:t>  |  2020-03-20  |  Public  |  Page </a:t>
             </a:r>
-            <a:fld id="{E43DFDB0-9851-48B8-97D1-830ED110BCC3}" type="slidenum">
+            <a:fld id="{D7028755-25F5-4DF4-9F03-5A3543FC8777}" type="slidenum">
               <a:rPr lang="en-US" sz="800" b="0" i="0" u="none" smtClean="0">
                 <a:solidFill>
                   <a:srgbClr val="1A1816"/>
@@ -9478,7 +9478,7 @@
               </a:rPr>
               <a:t>  |  2020-03-20  |  Public  |  Page </a:t>
             </a:r>
-            <a:fld id="{13AF5737-8687-410E-84DC-DCA5F05457BC}" type="slidenum">
+            <a:fld id="{7FC7C50A-9164-46E4-9AD9-A6AE4EB0CC7A}" type="slidenum">
               <a:rPr lang="en-US" sz="800" b="0" i="0" u="none" smtClean="0">
                 <a:solidFill>
                   <a:srgbClr val="1A1816"/>
@@ -9827,7 +9827,7 @@
               </a:rPr>
               <a:t>  |  2020-03-20  |  Public  |  Page </a:t>
             </a:r>
-            <a:fld id="{06D96981-BA9D-45C3-80DD-1A8167270233}" type="slidenum">
+            <a:fld id="{853F0208-4CA1-40DC-8C80-E1645BF93206}" type="slidenum">
               <a:rPr lang="en-US" sz="800" b="0" i="0" u="none" smtClean="0">
                 <a:solidFill>
                   <a:srgbClr val="1A1816"/>
@@ -10189,7 +10189,7 @@
               </a:rPr>
               <a:t>  |  2020-03-20  |  Public  |  Page </a:t>
             </a:r>
-            <a:fld id="{7226165E-BD0A-4611-ADD7-DDA2825B406F}" type="slidenum">
+            <a:fld id="{438DB0ED-52AB-4318-9E52-F5431D9448BE}" type="slidenum">
               <a:rPr lang="en-US" sz="800" b="0" i="0" u="none" smtClean="0">
                 <a:solidFill>
                   <a:srgbClr val="1A1816"/>
@@ -10551,7 +10551,7 @@
               </a:rPr>
               <a:t>  |  2020-03-20  |  Public  |  Page </a:t>
             </a:r>
-            <a:fld id="{A35E78D4-C619-4565-9FF6-BBB7C1C80021}" type="slidenum">
+            <a:fld id="{90C33C8C-CD24-454B-A3B9-DA2A54EBDD48}" type="slidenum">
               <a:rPr lang="en-US" sz="800" b="0" i="0" u="none" smtClean="0">
                 <a:solidFill>
                   <a:srgbClr val="1A1816"/>
@@ -10913,7 +10913,7 @@
               </a:rPr>
               <a:t>  |  2020-03-20  |  Public  |  Page </a:t>
             </a:r>
-            <a:fld id="{10CE3FE1-F765-4512-9C3B-5FE58395241F}" type="slidenum">
+            <a:fld id="{4C431B95-C2ED-400F-9A8D-3F799ED56EA6}" type="slidenum">
               <a:rPr lang="en-US" sz="800" b="0" i="0" u="none" smtClean="0">
                 <a:solidFill>
                   <a:srgbClr val="1A1816"/>
@@ -11275,7 +11275,7 @@
               </a:rPr>
               <a:t>  |  2020-03-20  |  Public  |  Page </a:t>
             </a:r>
-            <a:fld id="{FBA51987-BCD9-43AB-9209-9CAFD02AC8C1}" type="slidenum">
+            <a:fld id="{7DB39B48-A9EA-44EC-AB1D-94CDB2F5EEAC}" type="slidenum">
               <a:rPr lang="en-US" sz="800" b="0" i="0" u="none" smtClean="0">
                 <a:solidFill>
                   <a:srgbClr val="1A1816"/>
@@ -11697,7 +11697,7 @@
               </a:rPr>
               <a:t>  |  2020-03-20  |  Public  |  Page </a:t>
             </a:r>
-            <a:fld id="{E8446FCE-DD90-4678-BAEF-7A3C2F46F60B}" type="slidenum">
+            <a:fld id="{C9D813D3-D082-407C-A2F9-F9F91DCE55B7}" type="slidenum">
               <a:rPr lang="en-US" sz="800" b="0" i="0" u="none" smtClean="0">
                 <a:solidFill>
                   <a:srgbClr val="1A1816"/>
@@ -12113,7 +12113,7 @@
               </a:rPr>
               <a:t>  |  2020-03-20  |  Public  |  Page </a:t>
             </a:r>
-            <a:fld id="{86CA38DF-7EFE-43EC-B116-3F382F9A206B}" type="slidenum">
+            <a:fld id="{D0E3E568-4ADD-41E3-9776-0D16881407F4}" type="slidenum">
               <a:rPr lang="en-US" sz="800" b="0" i="0" u="none" smtClean="0">
                 <a:solidFill>
                   <a:srgbClr val="1A1816"/>
@@ -12588,7 +12588,7 @@
               </a:rPr>
               <a:t>  |  2020-03-20  |  Public  |  Page </a:t>
             </a:r>
-            <a:fld id="{76A2D51C-6780-4143-AA05-896EED8EBFA1}" type="slidenum">
+            <a:fld id="{00924039-CA18-4A6E-8722-AC55C366F1E6}" type="slidenum">
               <a:rPr lang="en-US" sz="800" b="0" i="0" u="none" smtClean="0">
                 <a:solidFill>
                   <a:srgbClr val="1A1816"/>
@@ -13083,7 +13083,7 @@
               </a:rPr>
               <a:t>  |  2020-03-20  |  Public  |  Page </a:t>
             </a:r>
-            <a:fld id="{7A141F7E-F890-4990-B2C1-834227F4E361}" type="slidenum">
+            <a:fld id="{20437BD8-67C0-4ACF-B8C7-75ED05CD139E}" type="slidenum">
               <a:rPr lang="en-US" sz="800" b="0" i="0" u="none" smtClean="0">
                 <a:solidFill>
                   <a:srgbClr val="1A1816"/>
@@ -13539,7 +13539,7 @@
               </a:rPr>
               <a:t>  |  2020-03-20  |  Public  |  Page </a:t>
             </a:r>
-            <a:fld id="{7B10FC51-7DDC-4A00-AF8F-D1A83A3F2205}" type="slidenum">
+            <a:fld id="{34E711AB-1303-487B-BFE0-E688BB941DEB}" type="slidenum">
               <a:rPr lang="en-US" sz="800" b="0" i="0" u="none" smtClean="0">
                 <a:solidFill>
                   <a:srgbClr val="1A1816"/>
@@ -13927,7 +13927,7 @@
               </a:rPr>
               <a:t>  |  2020-03-20  |  Public  |  Page </a:t>
             </a:r>
-            <a:fld id="{86041CA5-3B8E-414C-B47B-665EF6BA9996}" type="slidenum">
+            <a:fld id="{AAA8EB4A-1189-42ED-BAF6-60669B70BDC8}" type="slidenum">
               <a:rPr lang="en-US" sz="800" b="0" i="0" u="none" smtClean="0">
                 <a:solidFill>
                   <a:schemeClr val="bg1"/>
@@ -14446,7 +14446,7 @@
               </a:rPr>
               <a:t>  |  2020-03-20  |  Public  |  Page </a:t>
             </a:r>
-            <a:fld id="{5907E322-1AAA-41EB-AC76-E4FE9BE18EEF}" type="slidenum">
+            <a:fld id="{A05B2520-F4C4-4127-BDF2-4D1FCB4F81A3}" type="slidenum">
               <a:rPr lang="en-US" sz="800" b="0" i="0" u="none" smtClean="0">
                 <a:solidFill>
                   <a:srgbClr val="1A1816"/>
@@ -15155,7 +15155,7 @@
               </a:rPr>
               <a:t>  |  2020-03-20  |  Public  |  Page </a:t>
             </a:r>
-            <a:fld id="{912AC6BC-0664-4CBD-A9A5-4073695F4CC6}" type="slidenum">
+            <a:fld id="{4EE3222A-91C3-4AC6-8475-2A92DA79B69B}" type="slidenum">
               <a:rPr lang="en-US" sz="800" b="0" i="0" u="none" smtClean="0">
                 <a:solidFill>
                   <a:srgbClr val="1A1816"/>
@@ -16634,7 +16634,7 @@
               </a:rPr>
               <a:t>  |  2020-03-20  |  Public  |  Page </a:t>
             </a:r>
-            <a:fld id="{B2847DA6-224D-431F-A938-3CD63A561FA4}" type="slidenum">
+            <a:fld id="{8D54201A-DEC8-43DB-81B2-E63CEBA33AAB}" type="slidenum">
               <a:rPr lang="en-US" sz="800" b="0" i="0" u="none" smtClean="0">
                 <a:solidFill>
                   <a:schemeClr val="bg1"/>
@@ -17146,7 +17146,7 @@
               </a:rPr>
               <a:t>  |  2020-03-20  |  Public  |  Page </a:t>
             </a:r>
-            <a:fld id="{171A26F8-7B7A-468A-AAEC-129452D2998E}" type="slidenum">
+            <a:fld id="{8C948B89-8190-4284-8A47-1E9DC46D8233}" type="slidenum">
               <a:rPr lang="en-US" sz="800" b="0" i="0" u="none" smtClean="0">
                 <a:solidFill>
                   <a:schemeClr val="bg1"/>
@@ -17541,7 +17541,7 @@
               </a:rPr>
               <a:t>  |  2020-03-20  |  Public  |  Page </a:t>
             </a:r>
-            <a:fld id="{67882DCD-DE19-4A7A-ACFF-87E623216A1A}" type="slidenum">
+            <a:fld id="{114B984F-679C-46B1-B125-C435D840A0B8}" type="slidenum">
               <a:rPr lang="en-US" sz="800" b="0" i="0" u="none" smtClean="0">
                 <a:solidFill>
                   <a:schemeClr val="bg1"/>
@@ -18041,7 +18041,7 @@
               </a:rPr>
               <a:t>  |  2020-03-20  |  Public  |  Page </a:t>
             </a:r>
-            <a:fld id="{24AFB7BA-39B0-4A80-B869-AD8B48F2EB17}" type="slidenum">
+            <a:fld id="{BEAFF28B-3B83-45C7-99E9-18A160FF41FB}" type="slidenum">
               <a:rPr lang="en-US" sz="800" b="0" i="0" u="none" smtClean="0">
                 <a:solidFill>
                   <a:schemeClr val="bg1"/>
@@ -18541,7 +18541,7 @@
               </a:rPr>
               <a:t>  |  2020-03-20  |  Public  |  Page </a:t>
             </a:r>
-            <a:fld id="{0C1FBFC6-E1EE-4B7B-8FD0-A895016FDF60}" type="slidenum">
+            <a:fld id="{5262A1BD-DB64-4FA7-B05F-2035F2AD8ACE}" type="slidenum">
               <a:rPr lang="en-US" sz="800" b="0" i="0" u="none" smtClean="0">
                 <a:solidFill>
                   <a:schemeClr val="bg1"/>
@@ -19550,7 +19550,7 @@
             </a:br>
             <a:r>
               <a:rPr lang="en-US" sz="5400" dirty="0"/>
-              <a:t>2020-03-20</a:t>
+              <a:t>2020-05-05</a:t>
             </a:r>
           </a:p>
         </p:txBody>
@@ -19829,6 +19829,16 @@
             </a:r>
           </a:p>
           <a:p>
+            <a:pPr marL="812800" lvl="1" indent="-457200">
+              <a:buFont typeface="+mj-lt"/>
+              <a:buAutoNum type="arabicPeriod"/>
+            </a:pPr>
+            <a:r>
+              <a:rPr lang="en-US" sz="1600" dirty="0"/>
+              <a:t>CE marked bitrate [kbps]</a:t>
+            </a:r>
+          </a:p>
+          <a:p>
             <a:pPr lvl="1"/>
             <a:endParaRPr lang="en-US" dirty="0"/>
           </a:p>
@@ -20114,7 +20124,12 @@
             <p:ph sz="quarter" idx="10"/>
           </p:nvPr>
         </p:nvSpPr>
-        <p:spPr/>
+        <p:spPr>
+          <a:xfrm>
+            <a:off x="479425" y="1378146"/>
+            <a:ext cx="5472113" cy="4392613"/>
+          </a:xfrm>
+        </p:spPr>
         <p:txBody>
           <a:bodyPr/>
           <a:lstStyle/>
@@ -20275,6 +20290,16 @@
             <a:r>
               <a:rPr lang="en-US" sz="1200" dirty="0"/>
               <a:t>Lost bitrate [bps]</a:t>
+            </a:r>
+          </a:p>
+          <a:p>
+            <a:pPr marL="812800" lvl="1" indent="-457200">
+              <a:buFont typeface="+mj-lt"/>
+              <a:buAutoNum type="arabicPeriod"/>
+            </a:pPr>
+            <a:r>
+              <a:rPr lang="en-US" sz="1200" dirty="0"/>
+              <a:t>CE marked bitrate [bps]</a:t>
             </a:r>
           </a:p>
           <a:p>
@@ -22978,7 +23003,7 @@
           <a:graphicData uri="http://schemas.openxmlformats.org/presentationml/2006/ole">
             <mc:AlternateContent xmlns:mc="http://schemas.openxmlformats.org/markup-compatibility/2006">
               <mc:Choice xmlns:v="urn:schemas-microsoft-com:vml" Requires="v">
-                <p:oleObj spid="_x0000_s1036" name="Visio" r:id="rId5" imgW="2533577" imgH="3257685" progId="Visio.Drawing.11">
+                <p:oleObj spid="_x0000_s1038" name="Visio" r:id="rId5" imgW="2533577" imgH="3257685" progId="Visio.Drawing.11">
                   <p:embed/>
                 </p:oleObj>
               </mc:Choice>
@@ -25238,12 +25263,210 @@
           </a:p>
         </p:txBody>
       </p:sp>
+      <p:sp>
+        <p:nvSpPr>
+          <p:cNvPr id="10" name="Title 8">
+            <a:extLst>
+              <a:ext uri="{FF2B5EF4-FFF2-40B4-BE49-F238E27FC236}">
+                <a16:creationId xmlns:a16="http://schemas.microsoft.com/office/drawing/2014/main" id="{C5FD3901-0D0F-4B20-888F-41FC30BB4ED6}"/>
+              </a:ext>
+            </a:extLst>
+          </p:cNvPr>
+          <p:cNvSpPr txBox="1">
+            <a:spLocks/>
+          </p:cNvSpPr>
+          <p:nvPr/>
+        </p:nvSpPr>
+        <p:spPr bwMode="auto">
+          <a:xfrm>
+            <a:off x="479425" y="476250"/>
+            <a:ext cx="8353426" cy="1081088"/>
+          </a:xfrm>
+          <a:prstGeom prst="rect">
+            <a:avLst/>
+          </a:prstGeom>
+          <a:noFill/>
+          <a:ln w="9525">
+            <a:noFill/>
+            <a:miter lim="800000"/>
+            <a:headEnd/>
+            <a:tailEnd/>
+          </a:ln>
+        </p:spPr>
+        <p:txBody>
+          <a:bodyPr vert="horz" wrap="square" lIns="72000" tIns="36000" rIns="73152" bIns="36576" numCol="1" anchor="t" anchorCtr="0" compatLnSpc="1">
+            <a:prstTxWarp prst="textNoShape">
+              <a:avLst/>
+            </a:prstTxWarp>
+            <a:noAutofit/>
+          </a:bodyPr>
+          <a:lstStyle>
+            <a:lvl1pPr algn="l" rtl="0" eaLnBrk="1" fontAlgn="base" hangingPunct="1">
+              <a:lnSpc>
+                <a:spcPct val="85000"/>
+              </a:lnSpc>
+              <a:spcBef>
+                <a:spcPts val="300"/>
+              </a:spcBef>
+              <a:spcAft>
+                <a:spcPct val="0"/>
+              </a:spcAft>
+              <a:defRPr sz="4000" kern="1400" spc="-160">
+                <a:solidFill>
+                  <a:schemeClr val="tx1"/>
+                </a:solidFill>
+                <a:latin typeface="+mj-lt"/>
+                <a:ea typeface="+mj-ea"/>
+                <a:cs typeface="+mj-cs"/>
+              </a:defRPr>
+            </a:lvl1pPr>
+            <a:lvl2pPr algn="l" rtl="0" eaLnBrk="1" fontAlgn="base" hangingPunct="1">
+              <a:lnSpc>
+                <a:spcPct val="85000"/>
+              </a:lnSpc>
+              <a:spcBef>
+                <a:spcPct val="0"/>
+              </a:spcBef>
+              <a:spcAft>
+                <a:spcPct val="0"/>
+              </a:spcAft>
+              <a:defRPr sz="4000">
+                <a:solidFill>
+                  <a:schemeClr val="tx1"/>
+                </a:solidFill>
+                <a:latin typeface="Ericsson Hilda" pitchFamily="2" charset="0"/>
+              </a:defRPr>
+            </a:lvl2pPr>
+            <a:lvl3pPr algn="l" rtl="0" eaLnBrk="1" fontAlgn="base" hangingPunct="1">
+              <a:lnSpc>
+                <a:spcPct val="85000"/>
+              </a:lnSpc>
+              <a:spcBef>
+                <a:spcPct val="0"/>
+              </a:spcBef>
+              <a:spcAft>
+                <a:spcPct val="0"/>
+              </a:spcAft>
+              <a:defRPr sz="4000">
+                <a:solidFill>
+                  <a:schemeClr val="tx1"/>
+                </a:solidFill>
+                <a:latin typeface="Ericsson Hilda" pitchFamily="2" charset="0"/>
+              </a:defRPr>
+            </a:lvl3pPr>
+            <a:lvl4pPr algn="l" rtl="0" eaLnBrk="1" fontAlgn="base" hangingPunct="1">
+              <a:lnSpc>
+                <a:spcPct val="85000"/>
+              </a:lnSpc>
+              <a:spcBef>
+                <a:spcPct val="0"/>
+              </a:spcBef>
+              <a:spcAft>
+                <a:spcPct val="0"/>
+              </a:spcAft>
+              <a:defRPr sz="4000">
+                <a:solidFill>
+                  <a:schemeClr val="tx1"/>
+                </a:solidFill>
+                <a:latin typeface="Ericsson Hilda" pitchFamily="2" charset="0"/>
+              </a:defRPr>
+            </a:lvl4pPr>
+            <a:lvl5pPr algn="l" rtl="0" eaLnBrk="1" fontAlgn="base" hangingPunct="1">
+              <a:lnSpc>
+                <a:spcPct val="85000"/>
+              </a:lnSpc>
+              <a:spcBef>
+                <a:spcPct val="0"/>
+              </a:spcBef>
+              <a:spcAft>
+                <a:spcPct val="0"/>
+              </a:spcAft>
+              <a:defRPr sz="4000">
+                <a:solidFill>
+                  <a:schemeClr val="tx1"/>
+                </a:solidFill>
+                <a:latin typeface="Ericsson Hilda" pitchFamily="2" charset="0"/>
+              </a:defRPr>
+            </a:lvl5pPr>
+            <a:lvl6pPr marL="457200" algn="l" rtl="0" eaLnBrk="1" fontAlgn="base" hangingPunct="1">
+              <a:spcBef>
+                <a:spcPct val="0"/>
+              </a:spcBef>
+              <a:spcAft>
+                <a:spcPct val="0"/>
+              </a:spcAft>
+              <a:defRPr sz="3200">
+                <a:solidFill>
+                  <a:schemeClr val="tx1"/>
+                </a:solidFill>
+                <a:latin typeface="Ericsson Hilda" pitchFamily="2" charset="0"/>
+              </a:defRPr>
+            </a:lvl6pPr>
+            <a:lvl7pPr marL="914400" algn="l" rtl="0" eaLnBrk="1" fontAlgn="base" hangingPunct="1">
+              <a:spcBef>
+                <a:spcPct val="0"/>
+              </a:spcBef>
+              <a:spcAft>
+                <a:spcPct val="0"/>
+              </a:spcAft>
+              <a:defRPr sz="3200">
+                <a:solidFill>
+                  <a:schemeClr val="tx1"/>
+                </a:solidFill>
+                <a:latin typeface="Ericsson Hilda" pitchFamily="2" charset="0"/>
+              </a:defRPr>
+            </a:lvl7pPr>
+            <a:lvl8pPr marL="1371600" algn="l" rtl="0" eaLnBrk="1" fontAlgn="base" hangingPunct="1">
+              <a:spcBef>
+                <a:spcPct val="0"/>
+              </a:spcBef>
+              <a:spcAft>
+                <a:spcPct val="0"/>
+              </a:spcAft>
+              <a:defRPr sz="3200">
+                <a:solidFill>
+                  <a:schemeClr val="tx1"/>
+                </a:solidFill>
+                <a:latin typeface="Ericsson Hilda" pitchFamily="2" charset="0"/>
+              </a:defRPr>
+            </a:lvl8pPr>
+            <a:lvl9pPr marL="1828800" algn="l" rtl="0" eaLnBrk="1" fontAlgn="base" hangingPunct="1">
+              <a:spcBef>
+                <a:spcPct val="0"/>
+              </a:spcBef>
+              <a:spcAft>
+                <a:spcPct val="0"/>
+              </a:spcAft>
+              <a:defRPr sz="3200">
+                <a:solidFill>
+                  <a:schemeClr val="tx1"/>
+                </a:solidFill>
+                <a:latin typeface="Ericsson Hilda" pitchFamily="2" charset="0"/>
+              </a:defRPr>
+            </a:lvl9pPr>
+          </a:lstStyle>
+          <a:p>
+            <a:pPr marL="0" indent="0">
+              <a:buFontTx/>
+              <a:buNone/>
+            </a:pPr>
+            <a:r>
+              <a:rPr lang="en-US" dirty="0"/>
+              <a:t>Sender side</a:t>
+            </a:r>
+            <a:br>
+              <a:rPr lang="en-US" dirty="0"/>
+            </a:br>
+            <a:endParaRPr lang="en-US" dirty="0"/>
+          </a:p>
+        </p:txBody>
+      </p:sp>
       <p:pic>
         <p:nvPicPr>
-          <p:cNvPr id="9" name="Picture 8" descr="A screenshot of a cell phone&#10;&#10;Description automatically generated">
+          <p:cNvPr id="3" name="Picture 2" descr="A screenshot of a cell phone&#10;&#10;Description automatically generated">
             <a:extLst>
               <a:ext uri="{FF2B5EF4-FFF2-40B4-BE49-F238E27FC236}">
-                <a16:creationId xmlns:a16="http://schemas.microsoft.com/office/drawing/2014/main" id="{8614AC5C-B599-4AF5-ACA4-B89CC15BAD07}"/>
+                <a16:creationId xmlns:a16="http://schemas.microsoft.com/office/drawing/2014/main" id="{9FE178A1-7007-4801-894B-5AB74D624AC2}"/>
               </a:ext>
             </a:extLst>
           </p:cNvPr>
@@ -25266,212 +25489,14 @@
         </p:blipFill>
         <p:spPr>
           <a:xfrm>
-            <a:off x="6193368" y="2373816"/>
-            <a:ext cx="5919787" cy="4411613"/>
+            <a:off x="6096000" y="2392723"/>
+            <a:ext cx="6096000" cy="4465277"/>
           </a:xfrm>
           <a:prstGeom prst="rect">
             <a:avLst/>
           </a:prstGeom>
         </p:spPr>
       </p:pic>
-      <p:sp>
-        <p:nvSpPr>
-          <p:cNvPr id="10" name="Title 8">
-            <a:extLst>
-              <a:ext uri="{FF2B5EF4-FFF2-40B4-BE49-F238E27FC236}">
-                <a16:creationId xmlns:a16="http://schemas.microsoft.com/office/drawing/2014/main" id="{C5FD3901-0D0F-4B20-888F-41FC30BB4ED6}"/>
-              </a:ext>
-            </a:extLst>
-          </p:cNvPr>
-          <p:cNvSpPr txBox="1">
-            <a:spLocks/>
-          </p:cNvSpPr>
-          <p:nvPr/>
-        </p:nvSpPr>
-        <p:spPr bwMode="auto">
-          <a:xfrm>
-            <a:off x="479425" y="476250"/>
-            <a:ext cx="8353426" cy="1081088"/>
-          </a:xfrm>
-          <a:prstGeom prst="rect">
-            <a:avLst/>
-          </a:prstGeom>
-          <a:noFill/>
-          <a:ln w="9525">
-            <a:noFill/>
-            <a:miter lim="800000"/>
-            <a:headEnd/>
-            <a:tailEnd/>
-          </a:ln>
-        </p:spPr>
-        <p:txBody>
-          <a:bodyPr vert="horz" wrap="square" lIns="72000" tIns="36000" rIns="73152" bIns="36576" numCol="1" anchor="t" anchorCtr="0" compatLnSpc="1">
-            <a:prstTxWarp prst="textNoShape">
-              <a:avLst/>
-            </a:prstTxWarp>
-            <a:noAutofit/>
-          </a:bodyPr>
-          <a:lstStyle>
-            <a:lvl1pPr algn="l" rtl="0" eaLnBrk="1" fontAlgn="base" hangingPunct="1">
-              <a:lnSpc>
-                <a:spcPct val="85000"/>
-              </a:lnSpc>
-              <a:spcBef>
-                <a:spcPts val="300"/>
-              </a:spcBef>
-              <a:spcAft>
-                <a:spcPct val="0"/>
-              </a:spcAft>
-              <a:defRPr sz="4000" kern="1400" spc="-160">
-                <a:solidFill>
-                  <a:schemeClr val="tx1"/>
-                </a:solidFill>
-                <a:latin typeface="+mj-lt"/>
-                <a:ea typeface="+mj-ea"/>
-                <a:cs typeface="+mj-cs"/>
-              </a:defRPr>
-            </a:lvl1pPr>
-            <a:lvl2pPr algn="l" rtl="0" eaLnBrk="1" fontAlgn="base" hangingPunct="1">
-              <a:lnSpc>
-                <a:spcPct val="85000"/>
-              </a:lnSpc>
-              <a:spcBef>
-                <a:spcPct val="0"/>
-              </a:spcBef>
-              <a:spcAft>
-                <a:spcPct val="0"/>
-              </a:spcAft>
-              <a:defRPr sz="4000">
-                <a:solidFill>
-                  <a:schemeClr val="tx1"/>
-                </a:solidFill>
-                <a:latin typeface="Ericsson Hilda" pitchFamily="2" charset="0"/>
-              </a:defRPr>
-            </a:lvl2pPr>
-            <a:lvl3pPr algn="l" rtl="0" eaLnBrk="1" fontAlgn="base" hangingPunct="1">
-              <a:lnSpc>
-                <a:spcPct val="85000"/>
-              </a:lnSpc>
-              <a:spcBef>
-                <a:spcPct val="0"/>
-              </a:spcBef>
-              <a:spcAft>
-                <a:spcPct val="0"/>
-              </a:spcAft>
-              <a:defRPr sz="4000">
-                <a:solidFill>
-                  <a:schemeClr val="tx1"/>
-                </a:solidFill>
-                <a:latin typeface="Ericsson Hilda" pitchFamily="2" charset="0"/>
-              </a:defRPr>
-            </a:lvl3pPr>
-            <a:lvl4pPr algn="l" rtl="0" eaLnBrk="1" fontAlgn="base" hangingPunct="1">
-              <a:lnSpc>
-                <a:spcPct val="85000"/>
-              </a:lnSpc>
-              <a:spcBef>
-                <a:spcPct val="0"/>
-              </a:spcBef>
-              <a:spcAft>
-                <a:spcPct val="0"/>
-              </a:spcAft>
-              <a:defRPr sz="4000">
-                <a:solidFill>
-                  <a:schemeClr val="tx1"/>
-                </a:solidFill>
-                <a:latin typeface="Ericsson Hilda" pitchFamily="2" charset="0"/>
-              </a:defRPr>
-            </a:lvl4pPr>
-            <a:lvl5pPr algn="l" rtl="0" eaLnBrk="1" fontAlgn="base" hangingPunct="1">
-              <a:lnSpc>
-                <a:spcPct val="85000"/>
-              </a:lnSpc>
-              <a:spcBef>
-                <a:spcPct val="0"/>
-              </a:spcBef>
-              <a:spcAft>
-                <a:spcPct val="0"/>
-              </a:spcAft>
-              <a:defRPr sz="4000">
-                <a:solidFill>
-                  <a:schemeClr val="tx1"/>
-                </a:solidFill>
-                <a:latin typeface="Ericsson Hilda" pitchFamily="2" charset="0"/>
-              </a:defRPr>
-            </a:lvl5pPr>
-            <a:lvl6pPr marL="457200" algn="l" rtl="0" eaLnBrk="1" fontAlgn="base" hangingPunct="1">
-              <a:spcBef>
-                <a:spcPct val="0"/>
-              </a:spcBef>
-              <a:spcAft>
-                <a:spcPct val="0"/>
-              </a:spcAft>
-              <a:defRPr sz="3200">
-                <a:solidFill>
-                  <a:schemeClr val="tx1"/>
-                </a:solidFill>
-                <a:latin typeface="Ericsson Hilda" pitchFamily="2" charset="0"/>
-              </a:defRPr>
-            </a:lvl6pPr>
-            <a:lvl7pPr marL="914400" algn="l" rtl="0" eaLnBrk="1" fontAlgn="base" hangingPunct="1">
-              <a:spcBef>
-                <a:spcPct val="0"/>
-              </a:spcBef>
-              <a:spcAft>
-                <a:spcPct val="0"/>
-              </a:spcAft>
-              <a:defRPr sz="3200">
-                <a:solidFill>
-                  <a:schemeClr val="tx1"/>
-                </a:solidFill>
-                <a:latin typeface="Ericsson Hilda" pitchFamily="2" charset="0"/>
-              </a:defRPr>
-            </a:lvl7pPr>
-            <a:lvl8pPr marL="1371600" algn="l" rtl="0" eaLnBrk="1" fontAlgn="base" hangingPunct="1">
-              <a:spcBef>
-                <a:spcPct val="0"/>
-              </a:spcBef>
-              <a:spcAft>
-                <a:spcPct val="0"/>
-              </a:spcAft>
-              <a:defRPr sz="3200">
-                <a:solidFill>
-                  <a:schemeClr val="tx1"/>
-                </a:solidFill>
-                <a:latin typeface="Ericsson Hilda" pitchFamily="2" charset="0"/>
-              </a:defRPr>
-            </a:lvl8pPr>
-            <a:lvl9pPr marL="1828800" algn="l" rtl="0" eaLnBrk="1" fontAlgn="base" hangingPunct="1">
-              <a:spcBef>
-                <a:spcPct val="0"/>
-              </a:spcBef>
-              <a:spcAft>
-                <a:spcPct val="0"/>
-              </a:spcAft>
-              <a:defRPr sz="3200">
-                <a:solidFill>
-                  <a:schemeClr val="tx1"/>
-                </a:solidFill>
-                <a:latin typeface="Ericsson Hilda" pitchFamily="2" charset="0"/>
-              </a:defRPr>
-            </a:lvl9pPr>
-          </a:lstStyle>
-          <a:p>
-            <a:pPr marL="0" indent="0">
-              <a:buFontTx/>
-              <a:buNone/>
-            </a:pPr>
-            <a:r>
-              <a:rPr lang="en-US" dirty="0"/>
-              <a:t>Sender side</a:t>
-            </a:r>
-            <a:br>
-              <a:rPr lang="en-US" dirty="0"/>
-            </a:br>
-            <a:endParaRPr lang="en-US" dirty="0"/>
-          </a:p>
-        </p:txBody>
-      </p:sp>
     </p:spTree>
     <p:extLst>
       <p:ext uri="{BB962C8B-B14F-4D97-AF65-F5344CB8AC3E}">
@@ -27299,18 +27324,55 @@
 </file>
 
 <file path=customXml/item1.xml><?xml version="1.0" encoding="utf-8"?>
-<TemplafySlideTemplateConfiguration><![CDATA[{"documentContentValidatorConfiguration":{"enableDocumentContentValidator":false,"documentContentValidatorVersion":0},"elementsMetadata":[],"slideId":"637050925554934895","enableDocumentContentUpdater":true,"version":"1.9"}]]></TemplafySlideTemplateConfiguration>
+<TemplafySlideTemplateConfiguration><![CDATA[{"documentContentValidatorConfiguration":{"enableDocumentContentValidator":false,"documentContentValidatorVersion":0},"elementsMetadata":[],"slideId":"637037983905221557","enableDocumentContentUpdater":true,"version":"1.9"}]]></TemplafySlideTemplateConfiguration>
 </file>
 
 <file path=customXml/item10.xml><?xml version="1.0" encoding="utf-8"?>
+<TemplafyFormConfiguration><![CDATA[{"formFields":[{"required":true,"placeholder":"","lines":0,"type":"textBox","name":"DocumentTitle","label":"Document Title","helpTexts":{"prefix":"","postfix":""},"spacing":{},"fullyQualifiedName":"DocumentTitle"},{"dataSource":"Confidentiality","displayColumn":"confidentiality","hideIfNoUserInteractionRequired":false,"distinct":true,"required":true,"autoSelectFirstOption":false,"type":"dropDown","name":"ConfidentialityClass","label":"Confidentiality Class","helpTexts":{"prefix":"","postfix":""},"spacing":{},"fullyQualifiedName":"ConfidentialityClass"},{"dataSource":"External Confidentiality label","displayColumn":"externalConfidentiality","hideIfNoUserInteractionRequired":false,"distinct":true,"required":false,"autoSelectFirstOption":false,"defaultValue":"1","type":"dropDown","name":"ExternalConfidentialityLabel","label":"External Confidentiality label","helpTexts":{"prefix":"","postfix":"If no external confidentiality class then please choose the blank value"},"spacing":{},"fullyQualifiedName":"ExternalConfidentialityLabel"},{"dataSource":"PowerPoint Document Type","column":"documentType","required":false,"placeholder":"","autoSelectFirstOption":false,"type":"comboBox","name":"DocTypePresentation","label":"Document Type Presentation","helpTexts":{"prefix":"","postfix":"If the document type differs from the default value, click on the X to delete and type/choose another type."},"spacing":{},"fullyQualifiedName":"DocTypePresentation"},{"required":false,"placeholder":"","lines":0,"type":"textBox","name":"DocumentNumber","label":"Document Number","helpTexts":{"prefix":"","postfix":""},"spacing":{},"fullyQualifiedName":"DocumentNumber"},{"dataSource":"Language code","displayColumn":"showName","hideIfNoUserInteractionRequired":false,"distinct":true,"required":false,"autoSelectFirstOption":false,"defaultValue":"1","type":"dropDown","name":"LanguageCode","label":"Language Code","helpTexts":{"prefix":"","postfix":"The language code will be appended to the Document No."},"spacing":{},"fullyQualifiedName":"LanguageCode"},{"dataSource":"Revision","column":"revision","required":false,"placeholder":"","autoSelectFirstOption":false,"type":"comboBox","name":"Revision","label":"Revision","helpTexts":{"prefix":"","postfix":""},"spacing":{},"fullyQualifiedName":"Revision"},{"required":false,"type":"datePicker","name":"Date","label":"Date","helpTexts":{"prefix":"","postfix":""},"spacing":{},"fullyQualifiedName":"Date"},{"type":"heading","name":"FooterVisibilityOptions","label":"Footer Visibility Options","helpTexts":{"prefix":"","postfix":""},"spacing":{},"fullyQualifiedName":"FooterVisibilityOptions"},{"dataSource":"PPT FooterVisibility","displayColumn":"templateType","hideIfNoUserInteractionRequired":false,"distinct":true,"required":true,"autoSelectFirstOption":false,"defaultValue":"1","type":"dropDown","name":"TemplateType","label":"Is this a document or presentation?","helpTexts":{"prefix":"","postfix":""},"spacing":{},"fullyQualifiedName":"TemplateType"},{"dataSource":"PPT FooterVisibility","displayColumn":"docTitle_label","hideIfNoUserInteractionRequired":false,"distinct":true,"required":false,"autoSelectFirstOption":true,"filter":{"column":"templateType","otherFieldName":"TemplateType","fullyQualifiedOtherFieldName":"TemplateType","otherFieldColumn":"TemplateType","formReference":"none","operator":"equals"},"type":"dropDown","name":"DocTitle","label":"Show document title in footer?","helpTexts":{"prefix":"","postfix":""},"spacing":{},"fullyQualifiedName":"DocTitle"},{"dataSource":"PPT FooterVisibility","displayColumn":"totalPageNo_text","hideIfNoUserInteractionRequired":false,"distinct":true,"required":false,"autoSelectFirstOption":true,"filter":{"column":"templateType","otherFieldName":"TemplateType","fullyQualifiedOtherFieldName":"TemplateType","otherFieldColumn":"TemplateType","formReference":"none","operator":"equals"},"type":"dropDown","name":"TotalPageNo","label":"Page numbering","helpTexts":{"prefix":"","postfix":""},"spacing":{},"fullyQualifiedName":"TotalPageNo"},{"required":false,"placeholder":"","lines":0,"defaultValue":"{{UserProfile.Prepared}}","type":"textBox","name":"Prepared","label":"Prepared By (Subject Responsible)","helpTexts":{"prefix":"","postfix":""},"spacing":{},"fullyQualifiedName":"Prepared"},{"required":false,"placeholder":"","lines":0,"type":"textBox","name":"ApprovedBy","label":"Approved By (Document Responsible)","helpTexts":{"prefix":"","postfix":""},"spacing":{},"fullyQualifiedName":"ApprovedBy"},{"required":false,"placeholder":"","lines":0,"type":"textBox","name":"Checked","label":"Checked","helpTexts":{"prefix":"","postfix":""},"spacing":{},"fullyQualifiedName":"Checked"},{"required":false,"placeholder":"","lines":0,"type":"textBox","name":"Reference","label":"Reference","helpTexts":{"prefix":"","postfix":""},"spacing":{},"fullyQualifiedName":"Reference"},{"required":false,"placeholder":"","lines":0,"type":"textBox","name":"Keywords","label":"Keywords","helpTexts":{"prefix":"","postfix":""},"spacing":{},"fullyQualifiedName":"Keywords"}],"formDataEntries":[{"name":"DocumentTitle","value":"HfKMJ7wB7KPEWJpFWibMqg=="},{"name":"ConfidentialityClass","value":"cT/FOwTWaPknrhRlNMh4SQ=="},{"name":"ExternalConfidentialityLabel","value":"u2D/MG3wyuAQhkGvE2fPaA=="},{"name":"LanguageCode","value":"5wlu7ZdPxHQj1W0w+yTNSg=="},{"name":"Date","value":"vb48xUhp/+BouvbbBJesXw=="},{"name":"TemplateType","value":"PxVEvJY8nE7m/hY9622Sng=="},{"name":"DocTitle","value":"PxVEvJY8nE7m/hY9622Sng=="},{"name":"TotalPageNo","value":"PxVEvJY8nE7m/hY9622Sng=="},{"name":"Prepared","value":"PqdHBiLjqdpOMxfLUK9Tonaq9XwuinzCFKYJ7RK3+SI="}]}]]></TemplafyFormConfiguration>
+</file>
+
+<file path=customXml/item11.xml><?xml version="1.0" encoding="utf-8"?>
 <TemplafySlideTemplateConfiguration><![CDATA[{"documentContentValidatorConfiguration":{"enableDocumentContentValidator":false,"documentContentValidatorVersion":0},"elementsMetadata":[],"slideId":"637037983905221558","enableDocumentContentUpdater":true,"version":"1.9"}]]></TemplafySlideTemplateConfiguration>
 </file>
 
-<file path=customXml/item11.xml><?xml version="1.0" encoding="utf-8"?>
+<file path=customXml/item12.xml><?xml version="1.0" encoding="utf-8"?>
 <TemplafySlideFormConfiguration><![CDATA[{"formFields":[],"formDataEntries":[]}]]></TemplafySlideFormConfiguration>
 </file>
 
-<file path=customXml/item12.xml><?xml version="1.0" encoding="utf-8"?>
+<file path=customXml/item13.xml><?xml version="1.0" encoding="utf-8"?>
+<TemplafySlideTemplateConfiguration><![CDATA[{"documentContentValidatorConfiguration":{"enableDocumentContentValidator":false,"documentContentValidatorVersion":0},"elementsMetadata":[],"slideId":"637171128435180813","enableDocumentContentUpdater":true,"version":"1.9"}]]></TemplafySlideTemplateConfiguration>
+</file>
+
+<file path=customXml/item14.xml><?xml version="1.0" encoding="utf-8"?>
+<TemplafySlideTemplateConfiguration><![CDATA[{"documentContentValidatorConfiguration":{"enableDocumentContentValidator":false,"documentContentValidatorVersion":0},"elementsMetadata":[],"slideId":"637171128435648944","enableDocumentContentUpdater":true,"version":"1.9"}]]></TemplafySlideTemplateConfiguration>
+</file>
+
+<file path=customXml/item15.xml><?xml version="1.0" encoding="utf-8"?>
+<TemplafySlideTemplateConfiguration><![CDATA[{"elementsMetadata":[],"documentContentValidatorConfiguration":{"enableDocumentContentValidator":false,"documentContentValidatorVersion":0},"slideId":"637027476704980324","enableDocumentContentUpdater":true,"version":"1.9"}]]></TemplafySlideTemplateConfiguration>
+</file>
+
+<file path=customXml/item16.xml><?xml version="1.0" encoding="utf-8"?>
+<TemplafySlideFormConfiguration><![CDATA[{"formFields":[],"formDataEntries":[]}]]></TemplafySlideFormConfiguration>
+</file>
+
+<file path=customXml/item17.xml><?xml version="1.0" encoding="utf-8"?>
+<?mso-contentType ?>
+<FormTemplates xmlns="http://schemas.microsoft.com/sharepoint/v3/contenttype/forms">
+  <Display>DocumentLibraryForm</Display>
+  <Edit>DocumentLibraryForm</Edit>
+  <New>DocumentLibraryForm</New>
+</FormTemplates>
+</file>
+
+<file path=customXml/item18.xml><?xml version="1.0" encoding="utf-8"?>
+<TemplafySlideFormConfiguration><![CDATA[{"formFields":[],"formDataEntries":[]}]]></TemplafySlideFormConfiguration>
+</file>
+
+<file path=customXml/item19.xml><?xml version="1.0" encoding="utf-8"?>
+<TemplafySlideTemplateConfiguration><![CDATA[{"documentContentValidatorConfiguration":{"enableDocumentContentValidator":false,"documentContentValidatorVersion":0},"elementsMetadata":[],"slideId":"637037983905678162","enableDocumentContentUpdater":true,"version":"1.9"}]]></TemplafySlideTemplateConfiguration>
+</file>
+
+<file path=customXml/item2.xml><?xml version="1.0" encoding="utf-8"?>
 <ct:contentTypeSchema xmlns:ct="http://schemas.microsoft.com/office/2006/metadata/contentType" xmlns:ma="http://schemas.microsoft.com/office/2006/metadata/properties/metaAttributes" ct:_="" ma:_="" ma:contentTypeName="Document" ma:contentTypeID="0x0101002C8661F604A9A64C9627B875CBEE0D49" ma:contentTypeVersion="13" ma:contentTypeDescription="Create a new document." ma:contentTypeScope="" ma:versionID="efb89547655977800231d60c8e2388d5">
   <xsd:schema xmlns:xsd="http://www.w3.org/2001/XMLSchema" xmlns:xs="http://www.w3.org/2001/XMLSchema" xmlns:p="http://schemas.microsoft.com/office/2006/metadata/properties" xmlns:ns3="92e1255f-bb7b-4dc9-b051-584cc104eb44" xmlns:ns4="a6550eff-0fc9-443f-8e77-72cbcf778382" targetNamespace="http://schemas.microsoft.com/office/2006/metadata/properties" ma:root="true" ma:fieldsID="5147822fdb6803771ba7305cbc438486" ns3:_="" ns4:_="">
     <xsd:import namespace="92e1255f-bb7b-4dc9-b051-584cc104eb44"/>
@@ -27533,63 +27595,26 @@
 </ct:contentTypeSchema>
 </file>
 
-<file path=customXml/item13.xml><?xml version="1.0" encoding="utf-8"?>
-<?mso-contentType ?>
-<FormTemplates xmlns="http://schemas.microsoft.com/sharepoint/v3/contenttype/forms">
-  <Display>DocumentLibraryForm</Display>
-  <Edit>DocumentLibraryForm</Edit>
-  <New>DocumentLibraryForm</New>
-</FormTemplates>
+<file path=customXml/item3.xml><?xml version="1.0" encoding="utf-8"?>
+<TemplafySlideFormConfiguration><![CDATA[{"formFields":[],"formDataEntries":[]}]]></TemplafySlideFormConfiguration>
 </file>
 
-<file path=customXml/item14.xml><?xml version="1.0" encoding="utf-8"?>
-<TemplafySlideTemplateConfiguration><![CDATA[{"elementsMetadata":[],"documentContentValidatorConfiguration":{"enableDocumentContentValidator":false,"documentContentValidatorVersion":0},"slideId":"637027476704980324","enableDocumentContentUpdater":true,"version":"1.9"}]]></TemplafySlideTemplateConfiguration>
+<file path=customXml/item4.xml><?xml version="1.0" encoding="utf-8"?>
+<TemplafySlideFormConfiguration><![CDATA[{"formFields":[],"formDataEntries":[]}]]></TemplafySlideFormConfiguration>
 </file>
 
-<file path=customXml/item15.xml><?xml version="1.0" encoding="utf-8"?>
-<TemplafyFormConfiguration><![CDATA[{"formFields":[{"required":true,"placeholder":"","lines":0,"type":"textBox","name":"DocumentTitle","label":"Document Title","helpTexts":{"prefix":"","postfix":""},"spacing":{},"fullyQualifiedName":"DocumentTitle"},{"dataSource":"Confidentiality","displayColumn":"confidentiality","hideIfNoUserInteractionRequired":false,"distinct":true,"required":true,"autoSelectFirstOption":false,"type":"dropDown","name":"ConfidentialityClass","label":"Confidentiality Class","helpTexts":{"prefix":"","postfix":""},"spacing":{},"fullyQualifiedName":"ConfidentialityClass"},{"dataSource":"External Confidentiality label","displayColumn":"externalConfidentiality","hideIfNoUserInteractionRequired":false,"distinct":true,"required":false,"autoSelectFirstOption":false,"defaultValue":"1","type":"dropDown","name":"ExternalConfidentialityLabel","label":"External Confidentiality label","helpTexts":{"prefix":"","postfix":"If no external confidentiality class then please choose the blank value"},"spacing":{},"fullyQualifiedName":"ExternalConfidentialityLabel"},{"dataSource":"PowerPoint Document Type","column":"documentType","required":false,"placeholder":"","autoSelectFirstOption":false,"type":"comboBox","name":"DocTypePresentation","label":"Document Type Presentation","helpTexts":{"prefix":"","postfix":"If the document type differs from the default value, click on the X to delete and type/choose another type."},"spacing":{},"fullyQualifiedName":"DocTypePresentation"},{"required":false,"placeholder":"","lines":0,"type":"textBox","name":"DocumentNumber","label":"Document Number","helpTexts":{"prefix":"","postfix":""},"spacing":{},"fullyQualifiedName":"DocumentNumber"},{"dataSource":"Language code","displayColumn":"showName","hideIfNoUserInteractionRequired":false,"distinct":true,"required":false,"autoSelectFirstOption":false,"defaultValue":"1","type":"dropDown","name":"LanguageCode","label":"Language Code","helpTexts":{"prefix":"","postfix":"The language code will be appended to the Document No."},"spacing":{},"fullyQualifiedName":"LanguageCode"},{"dataSource":"Revision","column":"revision","required":false,"placeholder":"","autoSelectFirstOption":false,"type":"comboBox","name":"Revision","label":"Revision","helpTexts":{"prefix":"","postfix":""},"spacing":{},"fullyQualifiedName":"Revision"},{"required":false,"type":"datePicker","name":"Date","label":"Date","helpTexts":{"prefix":"","postfix":""},"spacing":{},"fullyQualifiedName":"Date"},{"type":"heading","name":"FooterVisibilityOptions","label":"Footer Visibility Options","helpTexts":{"prefix":"","postfix":""},"spacing":{},"fullyQualifiedName":"FooterVisibilityOptions"},{"dataSource":"PPT FooterVisibility","displayColumn":"templateType","hideIfNoUserInteractionRequired":false,"distinct":true,"required":true,"autoSelectFirstOption":false,"defaultValue":"1","type":"dropDown","name":"TemplateType","label":"Is this a document or presentation?","helpTexts":{"prefix":"","postfix":""},"spacing":{},"fullyQualifiedName":"TemplateType"},{"dataSource":"PPT FooterVisibility","displayColumn":"docTitle_label","hideIfNoUserInteractionRequired":false,"distinct":true,"required":false,"autoSelectFirstOption":true,"filter":{"column":"templateType","otherFieldName":"TemplateType","fullyQualifiedOtherFieldName":"TemplateType","otherFieldColumn":"TemplateType","formReference":"none","operator":"equals"},"type":"dropDown","name":"DocTitle","label":"Show document title in footer?","helpTexts":{"prefix":"","postfix":""},"spacing":{},"fullyQualifiedName":"DocTitle"},{"dataSource":"PPT FooterVisibility","displayColumn":"totalPageNo_text","hideIfNoUserInteractionRequired":false,"distinct":true,"required":false,"autoSelectFirstOption":true,"filter":{"column":"templateType","otherFieldName":"TemplateType","fullyQualifiedOtherFieldName":"TemplateType","otherFieldColumn":"TemplateType","formReference":"none","operator":"equals"},"type":"dropDown","name":"TotalPageNo","label":"Page numbering","helpTexts":{"prefix":"","postfix":""},"spacing":{},"fullyQualifiedName":"TotalPageNo"},{"required":false,"placeholder":"","lines":0,"defaultValue":"{{UserProfile.Prepared}}","type":"textBox","name":"Prepared","label":"Prepared By (Subject Responsible)","helpTexts":{"prefix":"","postfix":""},"spacing":{},"fullyQualifiedName":"Prepared"},{"required":false,"placeholder":"","lines":0,"type":"textBox","name":"ApprovedBy","label":"Approved By (Document Responsible)","helpTexts":{"prefix":"","postfix":""},"spacing":{},"fullyQualifiedName":"ApprovedBy"},{"required":false,"placeholder":"","lines":0,"type":"textBox","name":"Checked","label":"Checked","helpTexts":{"prefix":"","postfix":""},"spacing":{},"fullyQualifiedName":"Checked"},{"required":false,"placeholder":"","lines":0,"type":"textBox","name":"Reference","label":"Reference","helpTexts":{"prefix":"","postfix":""},"spacing":{},"fullyQualifiedName":"Reference"},{"required":false,"placeholder":"","lines":0,"type":"textBox","name":"Keywords","label":"Keywords","helpTexts":{"prefix":"","postfix":""},"spacing":{},"fullyQualifiedName":"Keywords"}],"formDataEntries":[{"name":"DocumentTitle","value":"HfKMJ7wB7KPEWJpFWibMqg=="},{"name":"ConfidentialityClass","value":"cT/FOwTWaPknrhRlNMh4SQ=="},{"name":"ExternalConfidentialityLabel","value":"u2D/MG3wyuAQhkGvE2fPaA=="},{"name":"LanguageCode","value":"5wlu7ZdPxHQj1W0w+yTNSg=="},{"name":"Date","value":"vb48xUhp/+BouvbbBJesXw=="},{"name":"TemplateType","value":"PxVEvJY8nE7m/hY9622Sng=="},{"name":"DocTitle","value":"PxVEvJY8nE7m/hY9622Sng=="},{"name":"TotalPageNo","value":"PxVEvJY8nE7m/hY9622Sng=="},{"name":"Prepared","value":"PqdHBiLjqdpOMxfLUK9Tonaq9XwuinzCFKYJ7RK3+SI="}]}]]></TemplafyFormConfiguration>
-</file>
-
-<file path=customXml/item16.xml><?xml version="1.0" encoding="utf-8"?>
+<file path=customXml/item5.xml><?xml version="1.0" encoding="utf-8"?>
 <TemplafyTemplateConfiguration><![CDATA[{"elementsMetadata":[{"type":"shape","id":"5d67e717-74bf-41a6-8dce-47082e2c1da1","elementConfiguration":{"inheritDimensions":"inheritNone","height":"1.34 cm","binding":"Form.LogoInsertion.Pplogoname","disableUpdates":false,"type":"image"}}],"transformationConfigurations":[{"language":"{{DocumentLanguage}}","disableUpdates":false,"type":"proofingLanguage"},{"propertyName":"FooterText","propertyValue":"true","disableUpdates":false,"type":"customDocumentProperty"},{"propertyName":"SecurityClass","propertyValue":"{{Form.ConfidentialityClass.Confidentiality}}","disableUpdates":false,"type":"customDocumentProperty"},{"propertyName":"ExtConf","propertyValue":"{{Form.ExternalConfidentialityLabel.ExternalConfidentiality}}","disableUpdates":false,"type":"customDocumentProperty"},{"propertyName":"Prepared","propertyValue":"{{Form.Prepared}}","disableUpdates":false,"type":"customDocumentProperty"},{"propertyName":"ApprovedBy","propertyValue":"{{Form.ApprovedBy}}","disableUpdates":false,"type":"customDocumentProperty"},{"propertyName":"DocNo","propertyValue":"{{Form.DocumentNumber}} {{Form.LanguageCode.LanguageCode}}","disableUpdates":false,"type":"customDocumentProperty"},{"propertyName":"Checked","propertyValue":"{{Form.Checked}}","disableUpdates":false,"type":"customDocumentProperty"},{"propertyName":"Date","propertyValue":"{{Form.Date}}","disableUpdates":false,"type":"customDocumentProperty"},{"propertyName":"Reference","propertyValue":"{{Form.Reference}}","disableUpdates":false,"type":"customDocumentProperty"},{"propertyName":"Title","propertyValue":"{{Form.DocumentTitle}}","disableUpdates":false,"type":"customDocumentProperty"},{"propertyName":"Keyword","propertyValue":"{{Form.Keywords}}","disableUpdates":false,"type":"customDocumentProperty"},{"propertyName":"DocumentType","propertyValue":"Presentation2011","disableUpdates":false,"type":"customDocumentProperty"},{"propertyName":"Language","propertyValue":"EnglishUS","disableUpdates":false,"type":"customDocumentProperty"},{"propertyName":"TemplateID","propertyValue":"FALSE","disableUpdates":false,"type":"customDocumentProperty"},{"propertyName":"ConfCtrl","propertyValue":"FALSE","disableUpdates":false,"type":"customDocumentProperty"},{"propertyName":"title","propertyValue":"{{Form.DocumentTitle}}","disableUpdates":false,"type":"documentProperty"},{"propertyName":"keywords","propertyValue":"{{Form.Keywords}}","disableUpdates":false,"type":"documentProperty"},{"propertyName":"creator","propertyValue":"{{Form.Prepared}}","disableUpdates":false,"type":"documentProperty"},{"propertyName":"DocTitle","propertyValue":"{{Form.DocTitle.DocTitle}}","disableUpdates":false,"type":"customDocumentProperty"},{"propertyName":"IsDocument","propertyValue":"{{Form.TemplateType.IsDocument}}","disableUpdates":false,"type":"customDocumentProperty"},{"propertyName":"IsPresentation","propertyValue":"{{Form.TemplateType.IsPresentation}}","disableUpdates":false,"type":"customDocumentProperty"},{"propertyName":"company","propertyValue":"Ericsson","disableUpdates":false,"type":"documentProperty"},{"propertyName":"PageNumberVisible","propertyValue":"{{Form.TotalPageNo.TotalPageNo_value}}","disableUpdates":false,"type":"customDocumentProperty"},{"propertyName":"Revision","propertyValue":"{{Form.Revision}}","disableUpdates":false,"type":"customDocumentProperty"},{"propertyName":"DocType","propertyValue":"{{Form.DocTypePresentation}}","disableUpdates":false,"type":"customDocumentProperty"},{"propertyName":"TemplateVersion","propertyValue":"R2A","disableUpdates":false,"type":"customDocumentProperty"},{"propertyName":"PackageNo","propertyValue":"LXA 119 603","disableUpdates":false,"type":"customDocumentProperty"},{"propertyName":"PackageVersion","propertyValue":"R6B","disableUpdates":false,"type":"customDocumentProperty"},{"propertyName":"TemplateName","propertyValue":"CXC 173 2731/1","disableUpdates":false,"type":"customDocumentProperty"},{"propertyName":"DocName","propertyValue":" ","disableUpdates":false,"type":"customDocumentProperty"},{"propertyName":"description","propertyValue":"{{Form.DocumentNumber}} {{Form.LanguageCode.LanguageCode}}\nRev {{Form.Revision}}","disableUpdates":false,"type":"documentProperty"}],"templateName":"New presentation (Standard landscape)","templateDescription":"","enableDocumentContentUpdater":true,"version":"1.9"}]]></TemplafyTemplateConfiguration>
 </file>
 
-<file path=customXml/item17.xml><?xml version="1.0" encoding="utf-8"?>
-<TemplafySlideFormConfiguration><![CDATA[{"formFields":[],"formDataEntries":[]}]]></TemplafySlideFormConfiguration>
+<file path=customXml/item6.xml><?xml version="1.0" encoding="utf-8"?>
+<TemplafySlideTemplateConfiguration><![CDATA[{"documentContentValidatorConfiguration":{"enableDocumentContentValidator":false,"documentContentValidatorVersion":0},"elementsMetadata":[],"slideId":"637050925554934895","enableDocumentContentUpdater":true,"version":"1.9"}]]></TemplafySlideTemplateConfiguration>
 </file>
 
-<file path=customXml/item18.xml><?xml version="1.0" encoding="utf-8"?>
-<TemplafySlideFormConfiguration><![CDATA[{"formFields":[],"formDataEntries":[]}]]></TemplafySlideFormConfiguration>
-</file>
-
-<file path=customXml/item19.xml><?xml version="1.0" encoding="utf-8"?>
-<TemplafySlideFormConfiguration><![CDATA[{"formFields":[],"formDataEntries":[]}]]></TemplafySlideFormConfiguration>
-</file>
-
-<file path=customXml/item2.xml><?xml version="1.0" encoding="utf-8"?>
-<TemplafySlideFormConfiguration><![CDATA[{"formFields":[],"formDataEntries":[]}]]></TemplafySlideFormConfiguration>
-</file>
-
-<file path=customXml/item3.xml><?xml version="1.0" encoding="utf-8"?>
-<TemplafySlideTemplateConfiguration><![CDATA[{"documentContentValidatorConfiguration":{"enableDocumentContentValidator":false,"documentContentValidatorVersion":0},"elementsMetadata":[],"slideId":"637037983905678162","enableDocumentContentUpdater":true,"version":"1.9"}]]></TemplafySlideTemplateConfiguration>
-</file>
-
-<file path=customXml/item4.xml><?xml version="1.0" encoding="utf-8"?>
-<TemplafySlideTemplateConfiguration><![CDATA[{"documentContentValidatorConfiguration":{"enableDocumentContentValidator":false,"documentContentValidatorVersion":0},"elementsMetadata":[],"slideId":"637171128435180813","enableDocumentContentUpdater":true,"version":"1.9"}]]></TemplafySlideTemplateConfiguration>
-</file>
-
-<file path=customXml/item5.xml><?xml version="1.0" encoding="utf-8"?>
-<TemplafySlideFormConfiguration><![CDATA[{"formFields":[],"formDataEntries":[]}]]></TemplafySlideFormConfiguration>
-</file>
-
-<file path=customXml/item6.xml><?xml version="1.0" encoding="utf-8"?>
+<file path=customXml/item7.xml><?xml version="1.0" encoding="utf-8"?>
 <p:properties xmlns:p="http://schemas.microsoft.com/office/2006/metadata/properties" xmlns:xsi="http://www.w3.org/2001/XMLSchema-instance" xmlns:pc="http://schemas.microsoft.com/office/infopath/2007/PartnerControls">
   <documentManagement/>
 </p:properties>
-</file>
-
-<file path=customXml/item7.xml><?xml version="1.0" encoding="utf-8"?>
-<TemplafySlideTemplateConfiguration><![CDATA[{"documentContentValidatorConfiguration":{"enableDocumentContentValidator":false,"documentContentValidatorVersion":0},"elementsMetadata":[],"slideId":"637037983905221557","enableDocumentContentUpdater":true,"version":"1.9"}]]></TemplafySlideTemplateConfiguration>
 </file>
 
 <file path=customXml/item8.xml><?xml version="1.0" encoding="utf-8"?>
@@ -27597,28 +27622,78 @@
 </file>
 
 <file path=customXml/item9.xml><?xml version="1.0" encoding="utf-8"?>
-<TemplafySlideTemplateConfiguration><![CDATA[{"documentContentValidatorConfiguration":{"enableDocumentContentValidator":false,"documentContentValidatorVersion":0},"elementsMetadata":[],"slideId":"637171128435648944","enableDocumentContentUpdater":true,"version":"1.9"}]]></TemplafySlideTemplateConfiguration>
+<TemplafySlideFormConfiguration><![CDATA[{"formFields":[],"formDataEntries":[]}]]></TemplafySlideFormConfiguration>
 </file>
 
 <file path=customXml/itemProps1.xml><?xml version="1.0" encoding="utf-8"?>
-<ds:datastoreItem xmlns:ds="http://schemas.openxmlformats.org/officeDocument/2006/customXml" ds:itemID="{03AF3FDC-ACD1-46F3-A43E-782322DF9816}">
+<ds:datastoreItem xmlns:ds="http://schemas.openxmlformats.org/officeDocument/2006/customXml" ds:itemID="{72516535-7702-46AF-9B1F-8623A67A824E}">
   <ds:schemaRefs/>
 </ds:datastoreItem>
 </file>
 
 <file path=customXml/itemProps10.xml><?xml version="1.0" encoding="utf-8"?>
+<ds:datastoreItem xmlns:ds="http://schemas.openxmlformats.org/officeDocument/2006/customXml" ds:itemID="{D92C3DF5-A179-4E2D-BD20-07044B39171F}">
+  <ds:schemaRefs/>
+</ds:datastoreItem>
+</file>
+
+<file path=customXml/itemProps11.xml><?xml version="1.0" encoding="utf-8"?>
 <ds:datastoreItem xmlns:ds="http://schemas.openxmlformats.org/officeDocument/2006/customXml" ds:itemID="{683FEB75-8CFA-449C-A6B1-B1E4A86A58A1}">
   <ds:schemaRefs/>
 </ds:datastoreItem>
 </file>
 
-<file path=customXml/itemProps11.xml><?xml version="1.0" encoding="utf-8"?>
-<ds:datastoreItem xmlns:ds="http://schemas.openxmlformats.org/officeDocument/2006/customXml" ds:itemID="{32BA7684-6BE4-4F73-B22E-30934AB379B8}">
+<file path=customXml/itemProps12.xml><?xml version="1.0" encoding="utf-8"?>
+<ds:datastoreItem xmlns:ds="http://schemas.openxmlformats.org/officeDocument/2006/customXml" ds:itemID="{B9AEDDE3-EA02-4A8F-B8F8-0606A0AA45FC}">
   <ds:schemaRefs/>
 </ds:datastoreItem>
 </file>
 
-<file path=customXml/itemProps12.xml><?xml version="1.0" encoding="utf-8"?>
+<file path=customXml/itemProps13.xml><?xml version="1.0" encoding="utf-8"?>
+<ds:datastoreItem xmlns:ds="http://schemas.openxmlformats.org/officeDocument/2006/customXml" ds:itemID="{AB2F4486-6448-49E3-8249-BB9C7492711D}">
+  <ds:schemaRefs/>
+</ds:datastoreItem>
+</file>
+
+<file path=customXml/itemProps14.xml><?xml version="1.0" encoding="utf-8"?>
+<ds:datastoreItem xmlns:ds="http://schemas.openxmlformats.org/officeDocument/2006/customXml" ds:itemID="{C750C5DC-043F-4BD3-940C-EB6F7625E286}">
+  <ds:schemaRefs/>
+</ds:datastoreItem>
+</file>
+
+<file path=customXml/itemProps15.xml><?xml version="1.0" encoding="utf-8"?>
+<ds:datastoreItem xmlns:ds="http://schemas.openxmlformats.org/officeDocument/2006/customXml" ds:itemID="{C09F197C-6A49-47D0-B877-F88807989676}">
+  <ds:schemaRefs/>
+</ds:datastoreItem>
+</file>
+
+<file path=customXml/itemProps16.xml><?xml version="1.0" encoding="utf-8"?>
+<ds:datastoreItem xmlns:ds="http://schemas.openxmlformats.org/officeDocument/2006/customXml" ds:itemID="{822D38AD-8010-4CD3-BD6B-117CB8DF70A4}">
+  <ds:schemaRefs/>
+</ds:datastoreItem>
+</file>
+
+<file path=customXml/itemProps17.xml><?xml version="1.0" encoding="utf-8"?>
+<ds:datastoreItem xmlns:ds="http://schemas.openxmlformats.org/officeDocument/2006/customXml" ds:itemID="{F5A7E41D-6E7F-4B05-AFAB-F540BD4C068B}">
+  <ds:schemaRefs>
+    <ds:schemaRef ds:uri="http://schemas.microsoft.com/sharepoint/v3/contenttype/forms"/>
+  </ds:schemaRefs>
+</ds:datastoreItem>
+</file>
+
+<file path=customXml/itemProps18.xml><?xml version="1.0" encoding="utf-8"?>
+<ds:datastoreItem xmlns:ds="http://schemas.openxmlformats.org/officeDocument/2006/customXml" ds:itemID="{847502A6-7CBE-43AF-BDF6-4D4423521D8C}">
+  <ds:schemaRefs/>
+</ds:datastoreItem>
+</file>
+
+<file path=customXml/itemProps19.xml><?xml version="1.0" encoding="utf-8"?>
+<ds:datastoreItem xmlns:ds="http://schemas.openxmlformats.org/officeDocument/2006/customXml" ds:itemID="{1CE36EA9-2186-4EB1-871A-8AE59C2A13BB}">
+  <ds:schemaRefs/>
+</ds:datastoreItem>
+</file>
+
+<file path=customXml/itemProps2.xml><?xml version="1.0" encoding="utf-8"?>
 <ds:datastoreItem xmlns:ds="http://schemas.openxmlformats.org/officeDocument/2006/customXml" ds:itemID="{058EED06-94C4-4781-888F-0A8BB816BC9F}">
   <ds:schemaRefs>
     <ds:schemaRef ds:uri="http://schemas.microsoft.com/office/2006/metadata/contentType"/>
@@ -27637,75 +27712,31 @@
 </ds:datastoreItem>
 </file>
 
-<file path=customXml/itemProps13.xml><?xml version="1.0" encoding="utf-8"?>
-<ds:datastoreItem xmlns:ds="http://schemas.openxmlformats.org/officeDocument/2006/customXml" ds:itemID="{F5A7E41D-6E7F-4B05-AFAB-F540BD4C068B}">
-  <ds:schemaRefs>
-    <ds:schemaRef ds:uri="http://schemas.microsoft.com/sharepoint/v3/contenttype/forms"/>
-  </ds:schemaRefs>
-</ds:datastoreItem>
-</file>
-
-<file path=customXml/itemProps14.xml><?xml version="1.0" encoding="utf-8"?>
-<ds:datastoreItem xmlns:ds="http://schemas.openxmlformats.org/officeDocument/2006/customXml" ds:itemID="{C09F197C-6A49-47D0-B877-F88807989676}">
+<file path=customXml/itemProps3.xml><?xml version="1.0" encoding="utf-8"?>
+<ds:datastoreItem xmlns:ds="http://schemas.openxmlformats.org/officeDocument/2006/customXml" ds:itemID="{58CC0B31-82B9-497A-9A2E-F3F72D0BBDAD}">
   <ds:schemaRefs/>
 </ds:datastoreItem>
 </file>
 
-<file path=customXml/itemProps15.xml><?xml version="1.0" encoding="utf-8"?>
-<ds:datastoreItem xmlns:ds="http://schemas.openxmlformats.org/officeDocument/2006/customXml" ds:itemID="{D92C3DF5-A179-4E2D-BD20-07044B39171F}">
+<file path=customXml/itemProps4.xml><?xml version="1.0" encoding="utf-8"?>
+<ds:datastoreItem xmlns:ds="http://schemas.openxmlformats.org/officeDocument/2006/customXml" ds:itemID="{D72A95EB-8536-47FD-944A-8DD76726FC96}">
   <ds:schemaRefs/>
 </ds:datastoreItem>
 </file>
 
-<file path=customXml/itemProps16.xml><?xml version="1.0" encoding="utf-8"?>
+<file path=customXml/itemProps5.xml><?xml version="1.0" encoding="utf-8"?>
 <ds:datastoreItem xmlns:ds="http://schemas.openxmlformats.org/officeDocument/2006/customXml" ds:itemID="{07958A4E-FAB1-42E4-B6B5-29B01F63F87B}">
   <ds:schemaRefs/>
 </ds:datastoreItem>
 </file>
 
-<file path=customXml/itemProps17.xml><?xml version="1.0" encoding="utf-8"?>
-<ds:datastoreItem xmlns:ds="http://schemas.openxmlformats.org/officeDocument/2006/customXml" ds:itemID="{58CC0B31-82B9-497A-9A2E-F3F72D0BBDAD}">
+<file path=customXml/itemProps6.xml><?xml version="1.0" encoding="utf-8"?>
+<ds:datastoreItem xmlns:ds="http://schemas.openxmlformats.org/officeDocument/2006/customXml" ds:itemID="{03AF3FDC-ACD1-46F3-A43E-782322DF9816}">
   <ds:schemaRefs/>
 </ds:datastoreItem>
 </file>
 
-<file path=customXml/itemProps18.xml><?xml version="1.0" encoding="utf-8"?>
-<ds:datastoreItem xmlns:ds="http://schemas.openxmlformats.org/officeDocument/2006/customXml" ds:itemID="{847502A6-7CBE-43AF-BDF6-4D4423521D8C}">
-  <ds:schemaRefs/>
-</ds:datastoreItem>
-</file>
-
-<file path=customXml/itemProps19.xml><?xml version="1.0" encoding="utf-8"?>
-<ds:datastoreItem xmlns:ds="http://schemas.openxmlformats.org/officeDocument/2006/customXml" ds:itemID="{B9AEDDE3-EA02-4A8F-B8F8-0606A0AA45FC}">
-  <ds:schemaRefs/>
-</ds:datastoreItem>
-</file>
-
-<file path=customXml/itemProps2.xml><?xml version="1.0" encoding="utf-8"?>
-<ds:datastoreItem xmlns:ds="http://schemas.openxmlformats.org/officeDocument/2006/customXml" ds:itemID="{D72A95EB-8536-47FD-944A-8DD76726FC96}">
-  <ds:schemaRefs/>
-</ds:datastoreItem>
-</file>
-
-<file path=customXml/itemProps3.xml><?xml version="1.0" encoding="utf-8"?>
-<ds:datastoreItem xmlns:ds="http://schemas.openxmlformats.org/officeDocument/2006/customXml" ds:itemID="{1CE36EA9-2186-4EB1-871A-8AE59C2A13BB}">
-  <ds:schemaRefs/>
-</ds:datastoreItem>
-</file>
-
-<file path=customXml/itemProps4.xml><?xml version="1.0" encoding="utf-8"?>
-<ds:datastoreItem xmlns:ds="http://schemas.openxmlformats.org/officeDocument/2006/customXml" ds:itemID="{AB2F4486-6448-49E3-8249-BB9C7492711D}">
-  <ds:schemaRefs/>
-</ds:datastoreItem>
-</file>
-
-<file path=customXml/itemProps5.xml><?xml version="1.0" encoding="utf-8"?>
-<ds:datastoreItem xmlns:ds="http://schemas.openxmlformats.org/officeDocument/2006/customXml" ds:itemID="{C99E78A0-C9D4-446F-B674-4DD3E2B46C5D}">
-  <ds:schemaRefs/>
-</ds:datastoreItem>
-</file>
-
-<file path=customXml/itemProps6.xml><?xml version="1.0" encoding="utf-8"?>
+<file path=customXml/itemProps7.xml><?xml version="1.0" encoding="utf-8"?>
 <ds:datastoreItem xmlns:ds="http://schemas.openxmlformats.org/officeDocument/2006/customXml" ds:itemID="{56F2EE69-0CCA-4F48-BE22-EC4A886C57A7}">
   <ds:schemaRefs>
     <ds:schemaRef ds:uri="http://schemas.microsoft.com/office/infopath/2007/PartnerControls"/>
@@ -27722,20 +27753,14 @@
 </ds:datastoreItem>
 </file>
 
-<file path=customXml/itemProps7.xml><?xml version="1.0" encoding="utf-8"?>
-<ds:datastoreItem xmlns:ds="http://schemas.openxmlformats.org/officeDocument/2006/customXml" ds:itemID="{72516535-7702-46AF-9B1F-8623A67A824E}">
-  <ds:schemaRefs/>
-</ds:datastoreItem>
-</file>
-
 <file path=customXml/itemProps8.xml><?xml version="1.0" encoding="utf-8"?>
-<ds:datastoreItem xmlns:ds="http://schemas.openxmlformats.org/officeDocument/2006/customXml" ds:itemID="{822D38AD-8010-4CD3-BD6B-117CB8DF70A4}">
+<ds:datastoreItem xmlns:ds="http://schemas.openxmlformats.org/officeDocument/2006/customXml" ds:itemID="{32BA7684-6BE4-4F73-B22E-30934AB379B8}">
   <ds:schemaRefs/>
 </ds:datastoreItem>
 </file>
 
 <file path=customXml/itemProps9.xml><?xml version="1.0" encoding="utf-8"?>
-<ds:datastoreItem xmlns:ds="http://schemas.openxmlformats.org/officeDocument/2006/customXml" ds:itemID="{C750C5DC-043F-4BD3-940C-EB6F7625E286}">
+<ds:datastoreItem xmlns:ds="http://schemas.openxmlformats.org/officeDocument/2006/customXml" ds:itemID="{C99E78A0-C9D4-446F-B674-4DD3E2B46C5D}">
   <ds:schemaRefs/>
 </ds:datastoreItem>
 </file>
</xml_diff>

<commit_message>
Added function that compensates for up to 0.05% positive clock drift
</commit_message>
<xml_diff>
--- a/code/bw-test-tool/SCReAM-BW-test-tool.pptx
+++ b/code/bw-test-tool/SCReAM-BW-test-tool.pptx
@@ -2666,7 +2666,7 @@
               </a:rPr>
               <a:t>  |  2020-03-20  |  Public  |  Page </a:t>
             </a:r>
-            <a:fld id="{63CA94DB-8262-47BD-AAFA-79610572CCBA}" type="slidenum">
+            <a:fld id="{B0600073-DB4F-46E2-A68F-01152A24D97C}" type="slidenum">
               <a:rPr lang="en-US" sz="800" b="0" i="0" u="none" smtClean="0">
                 <a:solidFill>
                   <a:srgbClr val="1A1816"/>
@@ -3171,7 +3171,7 @@
               </a:rPr>
               <a:t>  |  2020-03-20  |  Public  |  Page </a:t>
             </a:r>
-            <a:fld id="{14024C04-453F-4E15-9891-F00812768E29}" type="slidenum">
+            <a:fld id="{79B84D9A-A083-43D9-BE1B-62BDB888B2AD}" type="slidenum">
               <a:rPr lang="en-US" sz="800" b="0" i="0" u="none" smtClean="0">
                 <a:solidFill>
                   <a:schemeClr val="bg1"/>
@@ -3484,7 +3484,7 @@
               </a:rPr>
               <a:t>  |  2020-03-20  |  Public  |  Page </a:t>
             </a:r>
-            <a:fld id="{FA39CD18-C509-457A-BF94-411F910A3005}" type="slidenum">
+            <a:fld id="{7C0DCC2A-5261-4859-A219-CABB1AAC8438}" type="slidenum">
               <a:rPr lang="en-US" sz="800" b="0" i="0" u="none" smtClean="0">
                 <a:solidFill>
                   <a:srgbClr val="1A1816"/>
@@ -3717,7 +3717,7 @@
               </a:rPr>
               <a:t>  |  2020-03-20  |  Public  |  Page </a:t>
             </a:r>
-            <a:fld id="{29CDEC3E-7FE7-4D2A-8347-CF3D7703114F}" type="slidenum">
+            <a:fld id="{498ECBDE-ED5E-4F19-9AD9-FFF1B4317439}" type="slidenum">
               <a:rPr lang="en-US" sz="800" b="0" i="0" u="none" smtClean="0">
                 <a:solidFill>
                   <a:srgbClr val="1A1816"/>
@@ -3877,7 +3877,7 @@
               </a:rPr>
               <a:t>  |  2020-03-20  |  Public  |  Page </a:t>
             </a:r>
-            <a:fld id="{4373AE6A-A69F-4FD2-805B-D1A06DF6A015}" type="slidenum">
+            <a:fld id="{3CF1FE0B-CBAB-4D97-B660-FA67CA9A301E}" type="slidenum">
               <a:rPr lang="en-US" sz="800" b="0" i="0" u="none" smtClean="0">
                 <a:solidFill>
                   <a:srgbClr val="1A1816"/>
@@ -4083,7 +4083,7 @@
               </a:rPr>
               <a:t>  |  2020-03-20  |  Public  |  Page </a:t>
             </a:r>
-            <a:fld id="{1B5B77D0-F650-449F-B0AE-FA8693087582}" type="slidenum">
+            <a:fld id="{6DCFF22F-C6D8-4589-BE12-97C622E42C46}" type="slidenum">
               <a:rPr lang="en-US" sz="800" b="0" i="0" u="none" smtClean="0">
                 <a:solidFill>
                   <a:srgbClr val="1A1816"/>
@@ -4381,7 +4381,7 @@
               </a:rPr>
               <a:t>  |  2020-03-20  |  Public  |  Page </a:t>
             </a:r>
-            <a:fld id="{9631084D-463E-4A97-94FC-809E32060E48}" type="slidenum">
+            <a:fld id="{7EE5181D-105A-4DC5-83B6-665831D096C7}" type="slidenum">
               <a:rPr lang="en-US" sz="800" b="0" i="0" u="none" smtClean="0">
                 <a:solidFill>
                   <a:schemeClr val="bg1"/>
@@ -4679,7 +4679,7 @@
               </a:rPr>
               <a:t>  |  2020-03-20  |  Public  |  Page </a:t>
             </a:r>
-            <a:fld id="{21FDDC51-CC08-4D65-ACCD-13DD9D3E5FFB}" type="slidenum">
+            <a:fld id="{148A46A2-67F9-4C9A-BD07-81D31E59DB06}" type="slidenum">
               <a:rPr lang="en-US" sz="800" b="0" i="0" u="none" smtClean="0">
                 <a:solidFill>
                   <a:schemeClr val="bg1"/>
@@ -4977,7 +4977,7 @@
               </a:rPr>
               <a:t>  |  2020-03-20  |  Public  |  Page </a:t>
             </a:r>
-            <a:fld id="{6BEE33FA-6B49-41F9-9364-6E9C363D2297}" type="slidenum">
+            <a:fld id="{1AFD57B1-DBB7-450A-AF58-FC8E0B7208F0}" type="slidenum">
               <a:rPr lang="en-US" sz="800" b="0" i="0" u="none" smtClean="0">
                 <a:solidFill>
                   <a:schemeClr val="bg1"/>
@@ -5275,7 +5275,7 @@
               </a:rPr>
               <a:t>  |  2020-03-20  |  Public  |  Page </a:t>
             </a:r>
-            <a:fld id="{5270677C-57DE-40CA-8242-D99A903BB47F}" type="slidenum">
+            <a:fld id="{D345486F-9A4A-4C9B-981E-356B697F7977}" type="slidenum">
               <a:rPr lang="en-US" sz="800" b="0" i="0" u="none" smtClean="0">
                 <a:solidFill>
                   <a:schemeClr val="bg1"/>
@@ -5573,7 +5573,7 @@
               </a:rPr>
               <a:t>  |  2020-03-20  |  Public  |  Page </a:t>
             </a:r>
-            <a:fld id="{3875EB66-0E2A-4978-B754-A7909C990604}" type="slidenum">
+            <a:fld id="{F9A29876-DB8B-4E53-9F4C-E992F5801895}" type="slidenum">
               <a:rPr lang="en-US" sz="800" b="0" i="0" u="none" smtClean="0">
                 <a:solidFill>
                   <a:schemeClr val="bg1"/>
@@ -6087,7 +6087,7 @@
               </a:rPr>
               <a:t>  |  2020-03-20  |  Public  |  Page </a:t>
             </a:r>
-            <a:fld id="{B7AFECC3-F131-45A3-8389-8DC2F00147B8}" type="slidenum">
+            <a:fld id="{948DB9FB-8A8C-4E77-897A-B52E5682DB24}" type="slidenum">
               <a:rPr lang="en-US" sz="800" b="0" i="0" u="none" smtClean="0">
                 <a:solidFill>
                   <a:schemeClr val="bg1"/>
@@ -6391,7 +6391,7 @@
               </a:rPr>
               <a:t>  |  2020-03-20  |  Public  |  Page </a:t>
             </a:r>
-            <a:fld id="{9ACC98E2-AE88-4034-9888-2C98E6CA1D49}" type="slidenum">
+            <a:fld id="{4CCE248E-18D0-4BC4-B36D-498AB9E33DAB}" type="slidenum">
               <a:rPr lang="en-US" sz="800" b="0" i="0" u="none" smtClean="0">
                 <a:solidFill>
                   <a:schemeClr val="bg1"/>
@@ -6689,7 +6689,7 @@
               </a:rPr>
               <a:t>  |  2020-03-20  |  Public  |  Page </a:t>
             </a:r>
-            <a:fld id="{B8D93581-0BF6-4768-8996-21750764E12D}" type="slidenum">
+            <a:fld id="{E8015394-B0B0-4865-B555-7F43BE131A91}" type="slidenum">
               <a:rPr lang="en-US" sz="800" b="0" i="0" u="none" smtClean="0">
                 <a:solidFill>
                   <a:schemeClr val="bg1"/>
@@ -6976,7 +6976,7 @@
               </a:rPr>
               <a:t>  |  2020-03-20  |  Public  |  Page </a:t>
             </a:r>
-            <a:fld id="{83D78234-4DB8-4B89-A60B-632EBB3B10E0}" type="slidenum">
+            <a:fld id="{9F66DAB2-1D73-45C8-B763-87B37BE6CE20}" type="slidenum">
               <a:rPr lang="en-US" sz="800" b="0" i="0" u="none" smtClean="0">
                 <a:solidFill>
                   <a:srgbClr val="1A1816"/>
@@ -7263,7 +7263,7 @@
               </a:rPr>
               <a:t>  |  2020-03-20  |  Public  |  Page </a:t>
             </a:r>
-            <a:fld id="{AEE46CD5-8EC1-4EE6-B35D-6F4F568E78D3}" type="slidenum">
+            <a:fld id="{64A88DFA-CC5B-4028-B853-867D519F23DB}" type="slidenum">
               <a:rPr lang="en-US" sz="800" b="0" i="0" u="none" smtClean="0">
                 <a:solidFill>
                   <a:srgbClr val="1A1816"/>
@@ -7556,7 +7556,7 @@
               </a:rPr>
               <a:t>  |  2020-03-20  |  Public  |  Page </a:t>
             </a:r>
-            <a:fld id="{8D8B0C35-133A-46ED-848D-725C0BF72BFB}" type="slidenum">
+            <a:fld id="{157AC70E-3EC2-46E7-A7EF-7510C17C4FDF}" type="slidenum">
               <a:rPr lang="en-US" sz="800" b="0" i="0" u="none" smtClean="0">
                 <a:solidFill>
                   <a:srgbClr val="1A1816"/>
@@ -7843,7 +7843,7 @@
               </a:rPr>
               <a:t>  |  2020-03-20  |  Public  |  Page </a:t>
             </a:r>
-            <a:fld id="{0B3349E7-3869-4A94-8B78-087E62AA271C}" type="slidenum">
+            <a:fld id="{FE33D1E9-AF3C-45B9-9CCC-838428AA013E}" type="slidenum">
               <a:rPr lang="en-US" sz="800" b="0" i="0" u="none" smtClean="0">
                 <a:solidFill>
                   <a:srgbClr val="1A1816"/>
@@ -8165,7 +8165,7 @@
               </a:rPr>
               <a:t>  |  2020-03-20  |  Public  |  Page </a:t>
             </a:r>
-            <a:fld id="{43379AD3-204E-4621-BDF7-466ACE13200D}" type="slidenum">
+            <a:fld id="{5DECF39C-0FFF-43C5-A95B-F4526ABE5E5A}" type="slidenum">
               <a:rPr lang="en-US" sz="800" b="0" i="0" u="none" smtClean="0">
                 <a:solidFill>
                   <a:srgbClr val="1A1816"/>
@@ -8452,7 +8452,7 @@
               </a:rPr>
               <a:t>  |  2020-03-20  |  Public  |  Page </a:t>
             </a:r>
-            <a:fld id="{B160DAB3-7700-4308-A3BC-5398947D4CE4}" type="slidenum">
+            <a:fld id="{988678A2-9F26-4B1F-B575-0B8E1EA11DB5}" type="slidenum">
               <a:rPr lang="en-US" sz="800" b="0" i="0" u="none" smtClean="0">
                 <a:solidFill>
                   <a:srgbClr val="1A1816"/>
@@ -8774,7 +8774,7 @@
               </a:rPr>
               <a:t>  |  2020-03-20  |  Public  |  Page </a:t>
             </a:r>
-            <a:fld id="{B5A85A6D-2C27-4E61-889E-0C937E845EAA}" type="slidenum">
+            <a:fld id="{58E20478-00D7-4D51-845F-C7B5EF43C51D}" type="slidenum">
               <a:rPr lang="en-US" sz="800" b="0" i="0" u="none" smtClean="0">
                 <a:solidFill>
                   <a:srgbClr val="1A1816"/>
@@ -9136,7 +9136,7 @@
               </a:rPr>
               <a:t>  |  2020-03-20  |  Public  |  Page </a:t>
             </a:r>
-            <a:fld id="{D7028755-25F5-4DF4-9F03-5A3543FC8777}" type="slidenum">
+            <a:fld id="{CD615CC4-4E64-4257-954E-C6B0E98366A3}" type="slidenum">
               <a:rPr lang="en-US" sz="800" b="0" i="0" u="none" smtClean="0">
                 <a:solidFill>
                   <a:srgbClr val="1A1816"/>
@@ -9478,7 +9478,7 @@
               </a:rPr>
               <a:t>  |  2020-03-20  |  Public  |  Page </a:t>
             </a:r>
-            <a:fld id="{7FC7C50A-9164-46E4-9AD9-A6AE4EB0CC7A}" type="slidenum">
+            <a:fld id="{0E99FF0B-C61C-4E0D-9E2F-E8B11D8B00B3}" type="slidenum">
               <a:rPr lang="en-US" sz="800" b="0" i="0" u="none" smtClean="0">
                 <a:solidFill>
                   <a:srgbClr val="1A1816"/>
@@ -9827,7 +9827,7 @@
               </a:rPr>
               <a:t>  |  2020-03-20  |  Public  |  Page </a:t>
             </a:r>
-            <a:fld id="{853F0208-4CA1-40DC-8C80-E1645BF93206}" type="slidenum">
+            <a:fld id="{0A105209-5003-4FC6-A785-B3D158D258B9}" type="slidenum">
               <a:rPr lang="en-US" sz="800" b="0" i="0" u="none" smtClean="0">
                 <a:solidFill>
                   <a:srgbClr val="1A1816"/>
@@ -10189,7 +10189,7 @@
               </a:rPr>
               <a:t>  |  2020-03-20  |  Public  |  Page </a:t>
             </a:r>
-            <a:fld id="{438DB0ED-52AB-4318-9E52-F5431D9448BE}" type="slidenum">
+            <a:fld id="{377A1C07-7E71-45A5-9C63-CBA95D736960}" type="slidenum">
               <a:rPr lang="en-US" sz="800" b="0" i="0" u="none" smtClean="0">
                 <a:solidFill>
                   <a:srgbClr val="1A1816"/>
@@ -10551,7 +10551,7 @@
               </a:rPr>
               <a:t>  |  2020-03-20  |  Public  |  Page </a:t>
             </a:r>
-            <a:fld id="{90C33C8C-CD24-454B-A3B9-DA2A54EBDD48}" type="slidenum">
+            <a:fld id="{0FA6CF80-1EAF-4386-9F95-48ADD0778270}" type="slidenum">
               <a:rPr lang="en-US" sz="800" b="0" i="0" u="none" smtClean="0">
                 <a:solidFill>
                   <a:srgbClr val="1A1816"/>
@@ -10913,7 +10913,7 @@
               </a:rPr>
               <a:t>  |  2020-03-20  |  Public  |  Page </a:t>
             </a:r>
-            <a:fld id="{4C431B95-C2ED-400F-9A8D-3F799ED56EA6}" type="slidenum">
+            <a:fld id="{C06464C8-B84F-4E00-B595-6FD1D3D6035E}" type="slidenum">
               <a:rPr lang="en-US" sz="800" b="0" i="0" u="none" smtClean="0">
                 <a:solidFill>
                   <a:srgbClr val="1A1816"/>
@@ -11275,7 +11275,7 @@
               </a:rPr>
               <a:t>  |  2020-03-20  |  Public  |  Page </a:t>
             </a:r>
-            <a:fld id="{7DB39B48-A9EA-44EC-AB1D-94CDB2F5EEAC}" type="slidenum">
+            <a:fld id="{01A416DA-DECF-4E22-BE48-04CB4002C848}" type="slidenum">
               <a:rPr lang="en-US" sz="800" b="0" i="0" u="none" smtClean="0">
                 <a:solidFill>
                   <a:srgbClr val="1A1816"/>
@@ -11697,7 +11697,7 @@
               </a:rPr>
               <a:t>  |  2020-03-20  |  Public  |  Page </a:t>
             </a:r>
-            <a:fld id="{C9D813D3-D082-407C-A2F9-F9F91DCE55B7}" type="slidenum">
+            <a:fld id="{3347BBF8-C01F-4881-9784-A6C26CE9F7D4}" type="slidenum">
               <a:rPr lang="en-US" sz="800" b="0" i="0" u="none" smtClean="0">
                 <a:solidFill>
                   <a:srgbClr val="1A1816"/>
@@ -12113,7 +12113,7 @@
               </a:rPr>
               <a:t>  |  2020-03-20  |  Public  |  Page </a:t>
             </a:r>
-            <a:fld id="{D0E3E568-4ADD-41E3-9776-0D16881407F4}" type="slidenum">
+            <a:fld id="{492D7D59-3759-4013-BAE4-0720F304B8C7}" type="slidenum">
               <a:rPr lang="en-US" sz="800" b="0" i="0" u="none" smtClean="0">
                 <a:solidFill>
                   <a:srgbClr val="1A1816"/>
@@ -12588,7 +12588,7 @@
               </a:rPr>
               <a:t>  |  2020-03-20  |  Public  |  Page </a:t>
             </a:r>
-            <a:fld id="{00924039-CA18-4A6E-8722-AC55C366F1E6}" type="slidenum">
+            <a:fld id="{50D93646-4FED-4FAD-B6DE-E82D0EC2625F}" type="slidenum">
               <a:rPr lang="en-US" sz="800" b="0" i="0" u="none" smtClean="0">
                 <a:solidFill>
                   <a:srgbClr val="1A1816"/>
@@ -13083,7 +13083,7 @@
               </a:rPr>
               <a:t>  |  2020-03-20  |  Public  |  Page </a:t>
             </a:r>
-            <a:fld id="{20437BD8-67C0-4ACF-B8C7-75ED05CD139E}" type="slidenum">
+            <a:fld id="{1D1C418B-E623-452D-B02F-8B1E1D3FA76E}" type="slidenum">
               <a:rPr lang="en-US" sz="800" b="0" i="0" u="none" smtClean="0">
                 <a:solidFill>
                   <a:srgbClr val="1A1816"/>
@@ -13539,7 +13539,7 @@
               </a:rPr>
               <a:t>  |  2020-03-20  |  Public  |  Page </a:t>
             </a:r>
-            <a:fld id="{34E711AB-1303-487B-BFE0-E688BB941DEB}" type="slidenum">
+            <a:fld id="{5EBB6B80-DB88-494F-8128-DE666F8DAE35}" type="slidenum">
               <a:rPr lang="en-US" sz="800" b="0" i="0" u="none" smtClean="0">
                 <a:solidFill>
                   <a:srgbClr val="1A1816"/>
@@ -13927,7 +13927,7 @@
               </a:rPr>
               <a:t>  |  2020-03-20  |  Public  |  Page </a:t>
             </a:r>
-            <a:fld id="{AAA8EB4A-1189-42ED-BAF6-60669B70BDC8}" type="slidenum">
+            <a:fld id="{FFA72F9E-BA71-4228-9977-BB1AE640E31E}" type="slidenum">
               <a:rPr lang="en-US" sz="800" b="0" i="0" u="none" smtClean="0">
                 <a:solidFill>
                   <a:schemeClr val="bg1"/>
@@ -14446,7 +14446,7 @@
               </a:rPr>
               <a:t>  |  2020-03-20  |  Public  |  Page </a:t>
             </a:r>
-            <a:fld id="{A05B2520-F4C4-4127-BDF2-4D1FCB4F81A3}" type="slidenum">
+            <a:fld id="{E05887CF-F682-4DB2-A75C-F9C373DA509E}" type="slidenum">
               <a:rPr lang="en-US" sz="800" b="0" i="0" u="none" smtClean="0">
                 <a:solidFill>
                   <a:srgbClr val="1A1816"/>
@@ -15155,7 +15155,7 @@
               </a:rPr>
               <a:t>  |  2020-03-20  |  Public  |  Page </a:t>
             </a:r>
-            <a:fld id="{4EE3222A-91C3-4AC6-8475-2A92DA79B69B}" type="slidenum">
+            <a:fld id="{C29E20D6-ED3F-4676-907B-730B7573BB78}" type="slidenum">
               <a:rPr lang="en-US" sz="800" b="0" i="0" u="none" smtClean="0">
                 <a:solidFill>
                   <a:srgbClr val="1A1816"/>
@@ -16634,7 +16634,7 @@
               </a:rPr>
               <a:t>  |  2020-03-20  |  Public  |  Page </a:t>
             </a:r>
-            <a:fld id="{8D54201A-DEC8-43DB-81B2-E63CEBA33AAB}" type="slidenum">
+            <a:fld id="{9DA35740-B1CF-4B36-BDFC-BFA8F5F7B1D8}" type="slidenum">
               <a:rPr lang="en-US" sz="800" b="0" i="0" u="none" smtClean="0">
                 <a:solidFill>
                   <a:schemeClr val="bg1"/>
@@ -17146,7 +17146,7 @@
               </a:rPr>
               <a:t>  |  2020-03-20  |  Public  |  Page </a:t>
             </a:r>
-            <a:fld id="{8C948B89-8190-4284-8A47-1E9DC46D8233}" type="slidenum">
+            <a:fld id="{46A2F094-CF86-4C61-A254-4B13D88A40D4}" type="slidenum">
               <a:rPr lang="en-US" sz="800" b="0" i="0" u="none" smtClean="0">
                 <a:solidFill>
                   <a:schemeClr val="bg1"/>
@@ -17541,7 +17541,7 @@
               </a:rPr>
               <a:t>  |  2020-03-20  |  Public  |  Page </a:t>
             </a:r>
-            <a:fld id="{114B984F-679C-46B1-B125-C435D840A0B8}" type="slidenum">
+            <a:fld id="{7F7F410C-821C-4E43-90BC-D3570ED9BD2C}" type="slidenum">
               <a:rPr lang="en-US" sz="800" b="0" i="0" u="none" smtClean="0">
                 <a:solidFill>
                   <a:schemeClr val="bg1"/>
@@ -18041,7 +18041,7 @@
               </a:rPr>
               <a:t>  |  2020-03-20  |  Public  |  Page </a:t>
             </a:r>
-            <a:fld id="{BEAFF28B-3B83-45C7-99E9-18A160FF41FB}" type="slidenum">
+            <a:fld id="{49006D0B-CD3B-40DC-9685-B0AB1C76EA12}" type="slidenum">
               <a:rPr lang="en-US" sz="800" b="0" i="0" u="none" smtClean="0">
                 <a:solidFill>
                   <a:schemeClr val="bg1"/>
@@ -18541,7 +18541,7 @@
               </a:rPr>
               <a:t>  |  2020-03-20  |  Public  |  Page </a:t>
             </a:r>
-            <a:fld id="{5262A1BD-DB64-4FA7-B05F-2035F2AD8ACE}" type="slidenum">
+            <a:fld id="{E57F10B2-3270-4B53-BD0A-E497562DFEF4}" type="slidenum">
               <a:rPr lang="en-US" sz="800" b="0" i="0" u="none" smtClean="0">
                 <a:solidFill>
                   <a:schemeClr val="bg1"/>
@@ -19546,12 +19546,13 @@
               <a:t> BW test tool</a:t>
             </a:r>
             <a:br>
-              <a:rPr lang="en-US" dirty="0"/>
+              <a:rPr lang="en-US"/>
             </a:br>
             <a:r>
-              <a:rPr lang="en-US" sz="5400" dirty="0"/>
-              <a:t>2020-05-05</a:t>
-            </a:r>
+              <a:rPr lang="en-US" sz="5400"/>
+              <a:t>2020-05-06</a:t>
+            </a:r>
+            <a:endParaRPr lang="en-US" sz="5400" dirty="0"/>
           </a:p>
         </p:txBody>
       </p:sp>
@@ -22705,15 +22706,14 @@
           <a:p>
             <a:pPr lvl="1"/>
             <a:r>
-              <a:rPr lang="en-US" sz="1800"/>
+              <a:rPr lang="en-US" sz="1800" dirty="0"/>
               <a:t>One Receiver</a:t>
             </a:r>
-            <a:endParaRPr lang="en-US" sz="1800" dirty="0"/>
           </a:p>
           <a:p>
             <a:r>
               <a:rPr lang="en-US" sz="2000" dirty="0"/>
-              <a:t>Media rates up to ~150Mbps can be tested</a:t>
+              <a:t>Media rates up to ~500Mbps can be tested</a:t>
             </a:r>
           </a:p>
           <a:p>
@@ -23003,7 +23003,7 @@
           <a:graphicData uri="http://schemas.openxmlformats.org/presentationml/2006/ole">
             <mc:AlternateContent xmlns:mc="http://schemas.openxmlformats.org/markup-compatibility/2006">
               <mc:Choice xmlns:v="urn:schemas-microsoft-com:vml" Requires="v">
-                <p:oleObj spid="_x0000_s1038" name="Visio" r:id="rId5" imgW="2533577" imgH="3257685" progId="Visio.Drawing.11">
+                <p:oleObj spid="_x0000_s1042" name="Visio" r:id="rId5" imgW="2533577" imgH="3257685" progId="Visio.Drawing.11">
                   <p:embed/>
                 </p:oleObj>
               </mc:Choice>
@@ -24958,7 +24958,7 @@
           <a:p>
             <a:r>
               <a:rPr lang="en-US" sz="2000" dirty="0"/>
-              <a:t>By default the tester will run in rate adaptive mode with a RTP media rate that is almost constant (no key frames), the max rate is 50000kbps. In addition a summary report is printed on </a:t>
+              <a:t>By default the tester will run in rate adaptive mode with a RTP media rate that is almost constant (no key frames), the max rate is 200Mbps. In addition a summary report is printed on </a:t>
             </a:r>
             <a:r>
               <a:rPr lang="en-US" sz="2000" u="sng" dirty="0" err="1"/>
@@ -25009,6 +25009,21 @@
               <a:rPr lang="en-US" sz="2000" dirty="0"/>
               <a:t>option</a:t>
             </a:r>
+          </a:p>
+          <a:p>
+            <a:r>
+              <a:rPr lang="en-US" i="1" dirty="0"/>
+              <a:t>-</a:t>
+            </a:r>
+            <a:r>
+              <a:rPr lang="en-US" i="1" dirty="0" err="1"/>
+              <a:t>clockdrift</a:t>
+            </a:r>
+            <a:r>
+              <a:rPr lang="en-US" dirty="0"/>
+              <a:t> option compensates for up to 0.05% faster clock on the receiver side</a:t>
+            </a:r>
+            <a:endParaRPr lang="en-US" sz="2000" dirty="0"/>
           </a:p>
         </p:txBody>
       </p:sp>
@@ -25463,10 +25478,10 @@
       </p:sp>
       <p:pic>
         <p:nvPicPr>
-          <p:cNvPr id="3" name="Picture 2" descr="A screenshot of a cell phone&#10;&#10;Description automatically generated">
+          <p:cNvPr id="4" name="Picture 3" descr="A screenshot of text&#10;&#10;Description automatically generated">
             <a:extLst>
               <a:ext uri="{FF2B5EF4-FFF2-40B4-BE49-F238E27FC236}">
-                <a16:creationId xmlns:a16="http://schemas.microsoft.com/office/drawing/2014/main" id="{9FE178A1-7007-4801-894B-5AB74D624AC2}"/>
+                <a16:creationId xmlns:a16="http://schemas.microsoft.com/office/drawing/2014/main" id="{C079A6A1-F61C-4125-A05E-281386320FED}"/>
               </a:ext>
             </a:extLst>
           </p:cNvPr>
@@ -25489,8 +25504,8 @@
         </p:blipFill>
         <p:spPr>
           <a:xfrm>
-            <a:off x="6096000" y="2392723"/>
-            <a:ext cx="6096000" cy="4465277"/>
+            <a:off x="6586654" y="2387472"/>
+            <a:ext cx="5179083" cy="4399436"/>
           </a:xfrm>
           <a:prstGeom prst="rect">
             <a:avLst/>
@@ -27324,38 +27339,60 @@
 </file>
 
 <file path=customXml/item1.xml><?xml version="1.0" encoding="utf-8"?>
-<TemplafySlideTemplateConfiguration><![CDATA[{"documentContentValidatorConfiguration":{"enableDocumentContentValidator":false,"documentContentValidatorVersion":0},"elementsMetadata":[],"slideId":"637037983905221557","enableDocumentContentUpdater":true,"version":"1.9"}]]></TemplafySlideTemplateConfiguration>
+<TemplafySlideFormConfiguration><![CDATA[{"formFields":[],"formDataEntries":[]}]]></TemplafySlideFormConfiguration>
 </file>
 
 <file path=customXml/item10.xml><?xml version="1.0" encoding="utf-8"?>
+<TemplafyTemplateConfiguration><![CDATA[{"elementsMetadata":[{"type":"shape","id":"5d67e717-74bf-41a6-8dce-47082e2c1da1","elementConfiguration":{"inheritDimensions":"inheritNone","height":"1.34 cm","binding":"Form.LogoInsertion.Pplogoname","disableUpdates":false,"type":"image"}}],"transformationConfigurations":[{"language":"{{DocumentLanguage}}","disableUpdates":false,"type":"proofingLanguage"},{"propertyName":"FooterText","propertyValue":"true","disableUpdates":false,"type":"customDocumentProperty"},{"propertyName":"SecurityClass","propertyValue":"{{Form.ConfidentialityClass.Confidentiality}}","disableUpdates":false,"type":"customDocumentProperty"},{"propertyName":"ExtConf","propertyValue":"{{Form.ExternalConfidentialityLabel.ExternalConfidentiality}}","disableUpdates":false,"type":"customDocumentProperty"},{"propertyName":"Prepared","propertyValue":"{{Form.Prepared}}","disableUpdates":false,"type":"customDocumentProperty"},{"propertyName":"ApprovedBy","propertyValue":"{{Form.ApprovedBy}}","disableUpdates":false,"type":"customDocumentProperty"},{"propertyName":"DocNo","propertyValue":"{{Form.DocumentNumber}} {{Form.LanguageCode.LanguageCode}}","disableUpdates":false,"type":"customDocumentProperty"},{"propertyName":"Checked","propertyValue":"{{Form.Checked}}","disableUpdates":false,"type":"customDocumentProperty"},{"propertyName":"Date","propertyValue":"{{Form.Date}}","disableUpdates":false,"type":"customDocumentProperty"},{"propertyName":"Reference","propertyValue":"{{Form.Reference}}","disableUpdates":false,"type":"customDocumentProperty"},{"propertyName":"Title","propertyValue":"{{Form.DocumentTitle}}","disableUpdates":false,"type":"customDocumentProperty"},{"propertyName":"Keyword","propertyValue":"{{Form.Keywords}}","disableUpdates":false,"type":"customDocumentProperty"},{"propertyName":"DocumentType","propertyValue":"Presentation2011","disableUpdates":false,"type":"customDocumentProperty"},{"propertyName":"Language","propertyValue":"EnglishUS","disableUpdates":false,"type":"customDocumentProperty"},{"propertyName":"TemplateID","propertyValue":"FALSE","disableUpdates":false,"type":"customDocumentProperty"},{"propertyName":"ConfCtrl","propertyValue":"FALSE","disableUpdates":false,"type":"customDocumentProperty"},{"propertyName":"title","propertyValue":"{{Form.DocumentTitle}}","disableUpdates":false,"type":"documentProperty"},{"propertyName":"keywords","propertyValue":"{{Form.Keywords}}","disableUpdates":false,"type":"documentProperty"},{"propertyName":"creator","propertyValue":"{{Form.Prepared}}","disableUpdates":false,"type":"documentProperty"},{"propertyName":"DocTitle","propertyValue":"{{Form.DocTitle.DocTitle}}","disableUpdates":false,"type":"customDocumentProperty"},{"propertyName":"IsDocument","propertyValue":"{{Form.TemplateType.IsDocument}}","disableUpdates":false,"type":"customDocumentProperty"},{"propertyName":"IsPresentation","propertyValue":"{{Form.TemplateType.IsPresentation}}","disableUpdates":false,"type":"customDocumentProperty"},{"propertyName":"company","propertyValue":"Ericsson","disableUpdates":false,"type":"documentProperty"},{"propertyName":"PageNumberVisible","propertyValue":"{{Form.TotalPageNo.TotalPageNo_value}}","disableUpdates":false,"type":"customDocumentProperty"},{"propertyName":"Revision","propertyValue":"{{Form.Revision}}","disableUpdates":false,"type":"customDocumentProperty"},{"propertyName":"DocType","propertyValue":"{{Form.DocTypePresentation}}","disableUpdates":false,"type":"customDocumentProperty"},{"propertyName":"TemplateVersion","propertyValue":"R2A","disableUpdates":false,"type":"customDocumentProperty"},{"propertyName":"PackageNo","propertyValue":"LXA 119 603","disableUpdates":false,"type":"customDocumentProperty"},{"propertyName":"PackageVersion","propertyValue":"R6B","disableUpdates":false,"type":"customDocumentProperty"},{"propertyName":"TemplateName","propertyValue":"CXC 173 2731/1","disableUpdates":false,"type":"customDocumentProperty"},{"propertyName":"DocName","propertyValue":" ","disableUpdates":false,"type":"customDocumentProperty"},{"propertyName":"description","propertyValue":"{{Form.DocumentNumber}} {{Form.LanguageCode.LanguageCode}}\nRev {{Form.Revision}}","disableUpdates":false,"type":"documentProperty"}],"templateName":"New presentation (Standard landscape)","templateDescription":"","enableDocumentContentUpdater":true,"version":"1.9"}]]></TemplafyTemplateConfiguration>
+</file>
+
+<file path=customXml/item11.xml><?xml version="1.0" encoding="utf-8"?>
+<TemplafySlideTemplateConfiguration><![CDATA[{"elementsMetadata":[],"documentContentValidatorConfiguration":{"enableDocumentContentValidator":false,"documentContentValidatorVersion":0},"slideId":"637027476704980324","enableDocumentContentUpdater":true,"version":"1.9"}]]></TemplafySlideTemplateConfiguration>
+</file>
+
+<file path=customXml/item12.xml><?xml version="1.0" encoding="utf-8"?>
 <TemplafyFormConfiguration><![CDATA[{"formFields":[{"required":true,"placeholder":"","lines":0,"type":"textBox","name":"DocumentTitle","label":"Document Title","helpTexts":{"prefix":"","postfix":""},"spacing":{},"fullyQualifiedName":"DocumentTitle"},{"dataSource":"Confidentiality","displayColumn":"confidentiality","hideIfNoUserInteractionRequired":false,"distinct":true,"required":true,"autoSelectFirstOption":false,"type":"dropDown","name":"ConfidentialityClass","label":"Confidentiality Class","helpTexts":{"prefix":"","postfix":""},"spacing":{},"fullyQualifiedName":"ConfidentialityClass"},{"dataSource":"External Confidentiality label","displayColumn":"externalConfidentiality","hideIfNoUserInteractionRequired":false,"distinct":true,"required":false,"autoSelectFirstOption":false,"defaultValue":"1","type":"dropDown","name":"ExternalConfidentialityLabel","label":"External Confidentiality label","helpTexts":{"prefix":"","postfix":"If no external confidentiality class then please choose the blank value"},"spacing":{},"fullyQualifiedName":"ExternalConfidentialityLabel"},{"dataSource":"PowerPoint Document Type","column":"documentType","required":false,"placeholder":"","autoSelectFirstOption":false,"type":"comboBox","name":"DocTypePresentation","label":"Document Type Presentation","helpTexts":{"prefix":"","postfix":"If the document type differs from the default value, click on the X to delete and type/choose another type."},"spacing":{},"fullyQualifiedName":"DocTypePresentation"},{"required":false,"placeholder":"","lines":0,"type":"textBox","name":"DocumentNumber","label":"Document Number","helpTexts":{"prefix":"","postfix":""},"spacing":{},"fullyQualifiedName":"DocumentNumber"},{"dataSource":"Language code","displayColumn":"showName","hideIfNoUserInteractionRequired":false,"distinct":true,"required":false,"autoSelectFirstOption":false,"defaultValue":"1","type":"dropDown","name":"LanguageCode","label":"Language Code","helpTexts":{"prefix":"","postfix":"The language code will be appended to the Document No."},"spacing":{},"fullyQualifiedName":"LanguageCode"},{"dataSource":"Revision","column":"revision","required":false,"placeholder":"","autoSelectFirstOption":false,"type":"comboBox","name":"Revision","label":"Revision","helpTexts":{"prefix":"","postfix":""},"spacing":{},"fullyQualifiedName":"Revision"},{"required":false,"type":"datePicker","name":"Date","label":"Date","helpTexts":{"prefix":"","postfix":""},"spacing":{},"fullyQualifiedName":"Date"},{"type":"heading","name":"FooterVisibilityOptions","label":"Footer Visibility Options","helpTexts":{"prefix":"","postfix":""},"spacing":{},"fullyQualifiedName":"FooterVisibilityOptions"},{"dataSource":"PPT FooterVisibility","displayColumn":"templateType","hideIfNoUserInteractionRequired":false,"distinct":true,"required":true,"autoSelectFirstOption":false,"defaultValue":"1","type":"dropDown","name":"TemplateType","label":"Is this a document or presentation?","helpTexts":{"prefix":"","postfix":""},"spacing":{},"fullyQualifiedName":"TemplateType"},{"dataSource":"PPT FooterVisibility","displayColumn":"docTitle_label","hideIfNoUserInteractionRequired":false,"distinct":true,"required":false,"autoSelectFirstOption":true,"filter":{"column":"templateType","otherFieldName":"TemplateType","fullyQualifiedOtherFieldName":"TemplateType","otherFieldColumn":"TemplateType","formReference":"none","operator":"equals"},"type":"dropDown","name":"DocTitle","label":"Show document title in footer?","helpTexts":{"prefix":"","postfix":""},"spacing":{},"fullyQualifiedName":"DocTitle"},{"dataSource":"PPT FooterVisibility","displayColumn":"totalPageNo_text","hideIfNoUserInteractionRequired":false,"distinct":true,"required":false,"autoSelectFirstOption":true,"filter":{"column":"templateType","otherFieldName":"TemplateType","fullyQualifiedOtherFieldName":"TemplateType","otherFieldColumn":"TemplateType","formReference":"none","operator":"equals"},"type":"dropDown","name":"TotalPageNo","label":"Page numbering","helpTexts":{"prefix":"","postfix":""},"spacing":{},"fullyQualifiedName":"TotalPageNo"},{"required":false,"placeholder":"","lines":0,"defaultValue":"{{UserProfile.Prepared}}","type":"textBox","name":"Prepared","label":"Prepared By (Subject Responsible)","helpTexts":{"prefix":"","postfix":""},"spacing":{},"fullyQualifiedName":"Prepared"},{"required":false,"placeholder":"","lines":0,"type":"textBox","name":"ApprovedBy","label":"Approved By (Document Responsible)","helpTexts":{"prefix":"","postfix":""},"spacing":{},"fullyQualifiedName":"ApprovedBy"},{"required":false,"placeholder":"","lines":0,"type":"textBox","name":"Checked","label":"Checked","helpTexts":{"prefix":"","postfix":""},"spacing":{},"fullyQualifiedName":"Checked"},{"required":false,"placeholder":"","lines":0,"type":"textBox","name":"Reference","label":"Reference","helpTexts":{"prefix":"","postfix":""},"spacing":{},"fullyQualifiedName":"Reference"},{"required":false,"placeholder":"","lines":0,"type":"textBox","name":"Keywords","label":"Keywords","helpTexts":{"prefix":"","postfix":""},"spacing":{},"fullyQualifiedName":"Keywords"}],"formDataEntries":[{"name":"DocumentTitle","value":"HfKMJ7wB7KPEWJpFWibMqg=="},{"name":"ConfidentialityClass","value":"cT/FOwTWaPknrhRlNMh4SQ=="},{"name":"ExternalConfidentialityLabel","value":"u2D/MG3wyuAQhkGvE2fPaA=="},{"name":"LanguageCode","value":"5wlu7ZdPxHQj1W0w+yTNSg=="},{"name":"Date","value":"vb48xUhp/+BouvbbBJesXw=="},{"name":"TemplateType","value":"PxVEvJY8nE7m/hY9622Sng=="},{"name":"DocTitle","value":"PxVEvJY8nE7m/hY9622Sng=="},{"name":"TotalPageNo","value":"PxVEvJY8nE7m/hY9622Sng=="},{"name":"Prepared","value":"PqdHBiLjqdpOMxfLUK9Tonaq9XwuinzCFKYJ7RK3+SI="}]}]]></TemplafyFormConfiguration>
 </file>
 
-<file path=customXml/item11.xml><?xml version="1.0" encoding="utf-8"?>
-<TemplafySlideTemplateConfiguration><![CDATA[{"documentContentValidatorConfiguration":{"enableDocumentContentValidator":false,"documentContentValidatorVersion":0},"elementsMetadata":[],"slideId":"637037983905221558","enableDocumentContentUpdater":true,"version":"1.9"}]]></TemplafySlideTemplateConfiguration>
+<file path=customXml/item13.xml><?xml version="1.0" encoding="utf-8"?>
+<TemplafySlideTemplateConfiguration><![CDATA[{"documentContentValidatorConfiguration":{"enableDocumentContentValidator":false,"documentContentValidatorVersion":0},"elementsMetadata":[],"slideId":"637037983905678162","enableDocumentContentUpdater":true,"version":"1.9"}]]></TemplafySlideTemplateConfiguration>
 </file>
 
-<file path=customXml/item12.xml><?xml version="1.0" encoding="utf-8"?>
+<file path=customXml/item14.xml><?xml version="1.0" encoding="utf-8"?>
 <TemplafySlideFormConfiguration><![CDATA[{"formFields":[],"formDataEntries":[]}]]></TemplafySlideFormConfiguration>
 </file>
 
-<file path=customXml/item13.xml><?xml version="1.0" encoding="utf-8"?>
+<file path=customXml/item15.xml><?xml version="1.0" encoding="utf-8"?>
+<TemplafySlideFormConfiguration><![CDATA[{"formFields":[],"formDataEntries":[]}]]></TemplafySlideFormConfiguration>
+</file>
+
+<file path=customXml/item16.xml><?xml version="1.0" encoding="utf-8"?>
+<TemplafySlideTemplateConfiguration><![CDATA[{"documentContentValidatorConfiguration":{"enableDocumentContentValidator":false,"documentContentValidatorVersion":0},"elementsMetadata":[],"slideId":"637171128435648944","enableDocumentContentUpdater":true,"version":"1.9"}]]></TemplafySlideTemplateConfiguration>
+</file>
+
+<file path=customXml/item17.xml><?xml version="1.0" encoding="utf-8"?>
+<TemplafySlideFormConfiguration><![CDATA[{"formFields":[],"formDataEntries":[]}]]></TemplafySlideFormConfiguration>
+</file>
+
+<file path=customXml/item18.xml><?xml version="1.0" encoding="utf-8"?>
 <TemplafySlideTemplateConfiguration><![CDATA[{"documentContentValidatorConfiguration":{"enableDocumentContentValidator":false,"documentContentValidatorVersion":0},"elementsMetadata":[],"slideId":"637171128435180813","enableDocumentContentUpdater":true,"version":"1.9"}]]></TemplafySlideTemplateConfiguration>
 </file>
 
-<file path=customXml/item14.xml><?xml version="1.0" encoding="utf-8"?>
-<TemplafySlideTemplateConfiguration><![CDATA[{"documentContentValidatorConfiguration":{"enableDocumentContentValidator":false,"documentContentValidatorVersion":0},"elementsMetadata":[],"slideId":"637171128435648944","enableDocumentContentUpdater":true,"version":"1.9"}]]></TemplafySlideTemplateConfiguration>
-</file>
-
-<file path=customXml/item15.xml><?xml version="1.0" encoding="utf-8"?>
-<TemplafySlideTemplateConfiguration><![CDATA[{"elementsMetadata":[],"documentContentValidatorConfiguration":{"enableDocumentContentValidator":false,"documentContentValidatorVersion":0},"slideId":"637027476704980324","enableDocumentContentUpdater":true,"version":"1.9"}]]></TemplafySlideTemplateConfiguration>
-</file>
-
-<file path=customXml/item16.xml><?xml version="1.0" encoding="utf-8"?>
+<file path=customXml/item19.xml><?xml version="1.0" encoding="utf-8"?>
 <TemplafySlideFormConfiguration><![CDATA[{"formFields":[],"formDataEntries":[]}]]></TemplafySlideFormConfiguration>
 </file>
 
-<file path=customXml/item17.xml><?xml version="1.0" encoding="utf-8"?>
+<file path=customXml/item2.xml><?xml version="1.0" encoding="utf-8"?>
+<p:properties xmlns:p="http://schemas.microsoft.com/office/2006/metadata/properties" xmlns:xsi="http://www.w3.org/2001/XMLSchema-instance" xmlns:pc="http://schemas.microsoft.com/office/infopath/2007/PartnerControls">
+  <documentManagement/>
+</p:properties>
+</file>
+
+<file path=customXml/item3.xml><?xml version="1.0" encoding="utf-8"?>
+<TemplafySlideFormConfiguration><![CDATA[{"formFields":[],"formDataEntries":[]}]]></TemplafySlideFormConfiguration>
+</file>
+
+<file path=customXml/item4.xml><?xml version="1.0" encoding="utf-8"?>
 <?mso-contentType ?>
 <FormTemplates xmlns="http://schemas.microsoft.com/sharepoint/v3/contenttype/forms">
   <Display>DocumentLibraryForm</Display>
@@ -27364,15 +27401,7 @@
 </FormTemplates>
 </file>
 
-<file path=customXml/item18.xml><?xml version="1.0" encoding="utf-8"?>
-<TemplafySlideFormConfiguration><![CDATA[{"formFields":[],"formDataEntries":[]}]]></TemplafySlideFormConfiguration>
-</file>
-
-<file path=customXml/item19.xml><?xml version="1.0" encoding="utf-8"?>
-<TemplafySlideTemplateConfiguration><![CDATA[{"documentContentValidatorConfiguration":{"enableDocumentContentValidator":false,"documentContentValidatorVersion":0},"elementsMetadata":[],"slideId":"637037983905678162","enableDocumentContentUpdater":true,"version":"1.9"}]]></TemplafySlideTemplateConfiguration>
-</file>
-
-<file path=customXml/item2.xml><?xml version="1.0" encoding="utf-8"?>
+<file path=customXml/item5.xml><?xml version="1.0" encoding="utf-8"?>
 <ct:contentTypeSchema xmlns:ct="http://schemas.microsoft.com/office/2006/metadata/contentType" xmlns:ma="http://schemas.microsoft.com/office/2006/metadata/properties/metaAttributes" ct:_="" ma:_="" ma:contentTypeName="Document" ma:contentTypeID="0x0101002C8661F604A9A64C9627B875CBEE0D49" ma:contentTypeVersion="13" ma:contentTypeDescription="Create a new document." ma:contentTypeScope="" ma:versionID="efb89547655977800231d60c8e2388d5">
   <xsd:schema xmlns:xsd="http://www.w3.org/2001/XMLSchema" xmlns:xs="http://www.w3.org/2001/XMLSchema" xmlns:p="http://schemas.microsoft.com/office/2006/metadata/properties" xmlns:ns3="92e1255f-bb7b-4dc9-b051-584cc104eb44" xmlns:ns4="a6550eff-0fc9-443f-8e77-72cbcf778382" targetNamespace="http://schemas.microsoft.com/office/2006/metadata/properties" ma:root="true" ma:fieldsID="5147822fdb6803771ba7305cbc438486" ns3:_="" ns4:_="">
     <xsd:import namespace="92e1255f-bb7b-4dc9-b051-584cc104eb44"/>
@@ -27595,85 +27624,112 @@
 </ct:contentTypeSchema>
 </file>
 
-<file path=customXml/item3.xml><?xml version="1.0" encoding="utf-8"?>
+<file path=customXml/item6.xml><?xml version="1.0" encoding="utf-8"?>
 <TemplafySlideFormConfiguration><![CDATA[{"formFields":[],"formDataEntries":[]}]]></TemplafySlideFormConfiguration>
 </file>
 
-<file path=customXml/item4.xml><?xml version="1.0" encoding="utf-8"?>
-<TemplafySlideFormConfiguration><![CDATA[{"formFields":[],"formDataEntries":[]}]]></TemplafySlideFormConfiguration>
+<file path=customXml/item7.xml><?xml version="1.0" encoding="utf-8"?>
+<TemplafySlideTemplateConfiguration><![CDATA[{"documentContentValidatorConfiguration":{"enableDocumentContentValidator":false,"documentContentValidatorVersion":0},"elementsMetadata":[],"slideId":"637037983905221557","enableDocumentContentUpdater":true,"version":"1.9"}]]></TemplafySlideTemplateConfiguration>
 </file>
 
-<file path=customXml/item5.xml><?xml version="1.0" encoding="utf-8"?>
-<TemplafyTemplateConfiguration><![CDATA[{"elementsMetadata":[{"type":"shape","id":"5d67e717-74bf-41a6-8dce-47082e2c1da1","elementConfiguration":{"inheritDimensions":"inheritNone","height":"1.34 cm","binding":"Form.LogoInsertion.Pplogoname","disableUpdates":false,"type":"image"}}],"transformationConfigurations":[{"language":"{{DocumentLanguage}}","disableUpdates":false,"type":"proofingLanguage"},{"propertyName":"FooterText","propertyValue":"true","disableUpdates":false,"type":"customDocumentProperty"},{"propertyName":"SecurityClass","propertyValue":"{{Form.ConfidentialityClass.Confidentiality}}","disableUpdates":false,"type":"customDocumentProperty"},{"propertyName":"ExtConf","propertyValue":"{{Form.ExternalConfidentialityLabel.ExternalConfidentiality}}","disableUpdates":false,"type":"customDocumentProperty"},{"propertyName":"Prepared","propertyValue":"{{Form.Prepared}}","disableUpdates":false,"type":"customDocumentProperty"},{"propertyName":"ApprovedBy","propertyValue":"{{Form.ApprovedBy}}","disableUpdates":false,"type":"customDocumentProperty"},{"propertyName":"DocNo","propertyValue":"{{Form.DocumentNumber}} {{Form.LanguageCode.LanguageCode}}","disableUpdates":false,"type":"customDocumentProperty"},{"propertyName":"Checked","propertyValue":"{{Form.Checked}}","disableUpdates":false,"type":"customDocumentProperty"},{"propertyName":"Date","propertyValue":"{{Form.Date}}","disableUpdates":false,"type":"customDocumentProperty"},{"propertyName":"Reference","propertyValue":"{{Form.Reference}}","disableUpdates":false,"type":"customDocumentProperty"},{"propertyName":"Title","propertyValue":"{{Form.DocumentTitle}}","disableUpdates":false,"type":"customDocumentProperty"},{"propertyName":"Keyword","propertyValue":"{{Form.Keywords}}","disableUpdates":false,"type":"customDocumentProperty"},{"propertyName":"DocumentType","propertyValue":"Presentation2011","disableUpdates":false,"type":"customDocumentProperty"},{"propertyName":"Language","propertyValue":"EnglishUS","disableUpdates":false,"type":"customDocumentProperty"},{"propertyName":"TemplateID","propertyValue":"FALSE","disableUpdates":false,"type":"customDocumentProperty"},{"propertyName":"ConfCtrl","propertyValue":"FALSE","disableUpdates":false,"type":"customDocumentProperty"},{"propertyName":"title","propertyValue":"{{Form.DocumentTitle}}","disableUpdates":false,"type":"documentProperty"},{"propertyName":"keywords","propertyValue":"{{Form.Keywords}}","disableUpdates":false,"type":"documentProperty"},{"propertyName":"creator","propertyValue":"{{Form.Prepared}}","disableUpdates":false,"type":"documentProperty"},{"propertyName":"DocTitle","propertyValue":"{{Form.DocTitle.DocTitle}}","disableUpdates":false,"type":"customDocumentProperty"},{"propertyName":"IsDocument","propertyValue":"{{Form.TemplateType.IsDocument}}","disableUpdates":false,"type":"customDocumentProperty"},{"propertyName":"IsPresentation","propertyValue":"{{Form.TemplateType.IsPresentation}}","disableUpdates":false,"type":"customDocumentProperty"},{"propertyName":"company","propertyValue":"Ericsson","disableUpdates":false,"type":"documentProperty"},{"propertyName":"PageNumberVisible","propertyValue":"{{Form.TotalPageNo.TotalPageNo_value}}","disableUpdates":false,"type":"customDocumentProperty"},{"propertyName":"Revision","propertyValue":"{{Form.Revision}}","disableUpdates":false,"type":"customDocumentProperty"},{"propertyName":"DocType","propertyValue":"{{Form.DocTypePresentation}}","disableUpdates":false,"type":"customDocumentProperty"},{"propertyName":"TemplateVersion","propertyValue":"R2A","disableUpdates":false,"type":"customDocumentProperty"},{"propertyName":"PackageNo","propertyValue":"LXA 119 603","disableUpdates":false,"type":"customDocumentProperty"},{"propertyName":"PackageVersion","propertyValue":"R6B","disableUpdates":false,"type":"customDocumentProperty"},{"propertyName":"TemplateName","propertyValue":"CXC 173 2731/1","disableUpdates":false,"type":"customDocumentProperty"},{"propertyName":"DocName","propertyValue":" ","disableUpdates":false,"type":"customDocumentProperty"},{"propertyName":"description","propertyValue":"{{Form.DocumentNumber}} {{Form.LanguageCode.LanguageCode}}\nRev {{Form.Revision}}","disableUpdates":false,"type":"documentProperty"}],"templateName":"New presentation (Standard landscape)","templateDescription":"","enableDocumentContentUpdater":true,"version":"1.9"}]]></TemplafyTemplateConfiguration>
-</file>
-
-<file path=customXml/item6.xml><?xml version="1.0" encoding="utf-8"?>
+<file path=customXml/item8.xml><?xml version="1.0" encoding="utf-8"?>
 <TemplafySlideTemplateConfiguration><![CDATA[{"documentContentValidatorConfiguration":{"enableDocumentContentValidator":false,"documentContentValidatorVersion":0},"elementsMetadata":[],"slideId":"637050925554934895","enableDocumentContentUpdater":true,"version":"1.9"}]]></TemplafySlideTemplateConfiguration>
 </file>
 
-<file path=customXml/item7.xml><?xml version="1.0" encoding="utf-8"?>
-<p:properties xmlns:p="http://schemas.microsoft.com/office/2006/metadata/properties" xmlns:xsi="http://www.w3.org/2001/XMLSchema-instance" xmlns:pc="http://schemas.microsoft.com/office/infopath/2007/PartnerControls">
-  <documentManagement/>
-</p:properties>
-</file>
-
-<file path=customXml/item8.xml><?xml version="1.0" encoding="utf-8"?>
-<TemplafySlideFormConfiguration><![CDATA[{"formFields":[],"formDataEntries":[]}]]></TemplafySlideFormConfiguration>
-</file>
-
 <file path=customXml/item9.xml><?xml version="1.0" encoding="utf-8"?>
-<TemplafySlideFormConfiguration><![CDATA[{"formFields":[],"formDataEntries":[]}]]></TemplafySlideFormConfiguration>
+<TemplafySlideTemplateConfiguration><![CDATA[{"documentContentValidatorConfiguration":{"enableDocumentContentValidator":false,"documentContentValidatorVersion":0},"elementsMetadata":[],"slideId":"637037983905221558","enableDocumentContentUpdater":true,"version":"1.9"}]]></TemplafySlideTemplateConfiguration>
 </file>
 
 <file path=customXml/itemProps1.xml><?xml version="1.0" encoding="utf-8"?>
-<ds:datastoreItem xmlns:ds="http://schemas.openxmlformats.org/officeDocument/2006/customXml" ds:itemID="{72516535-7702-46AF-9B1F-8623A67A824E}">
+<ds:datastoreItem xmlns:ds="http://schemas.openxmlformats.org/officeDocument/2006/customXml" ds:itemID="{58CC0B31-82B9-497A-9A2E-F3F72D0BBDAD}">
   <ds:schemaRefs/>
 </ds:datastoreItem>
 </file>
 
 <file path=customXml/itemProps10.xml><?xml version="1.0" encoding="utf-8"?>
+<ds:datastoreItem xmlns:ds="http://schemas.openxmlformats.org/officeDocument/2006/customXml" ds:itemID="{07958A4E-FAB1-42E4-B6B5-29B01F63F87B}">
+  <ds:schemaRefs/>
+</ds:datastoreItem>
+</file>
+
+<file path=customXml/itemProps11.xml><?xml version="1.0" encoding="utf-8"?>
+<ds:datastoreItem xmlns:ds="http://schemas.openxmlformats.org/officeDocument/2006/customXml" ds:itemID="{C09F197C-6A49-47D0-B877-F88807989676}">
+  <ds:schemaRefs/>
+</ds:datastoreItem>
+</file>
+
+<file path=customXml/itemProps12.xml><?xml version="1.0" encoding="utf-8"?>
 <ds:datastoreItem xmlns:ds="http://schemas.openxmlformats.org/officeDocument/2006/customXml" ds:itemID="{D92C3DF5-A179-4E2D-BD20-07044B39171F}">
   <ds:schemaRefs/>
 </ds:datastoreItem>
 </file>
 
-<file path=customXml/itemProps11.xml><?xml version="1.0" encoding="utf-8"?>
-<ds:datastoreItem xmlns:ds="http://schemas.openxmlformats.org/officeDocument/2006/customXml" ds:itemID="{683FEB75-8CFA-449C-A6B1-B1E4A86A58A1}">
+<file path=customXml/itemProps13.xml><?xml version="1.0" encoding="utf-8"?>
+<ds:datastoreItem xmlns:ds="http://schemas.openxmlformats.org/officeDocument/2006/customXml" ds:itemID="{1CE36EA9-2186-4EB1-871A-8AE59C2A13BB}">
   <ds:schemaRefs/>
 </ds:datastoreItem>
 </file>
 
-<file path=customXml/itemProps12.xml><?xml version="1.0" encoding="utf-8"?>
+<file path=customXml/itemProps14.xml><?xml version="1.0" encoding="utf-8"?>
+<ds:datastoreItem xmlns:ds="http://schemas.openxmlformats.org/officeDocument/2006/customXml" ds:itemID="{D72A95EB-8536-47FD-944A-8DD76726FC96}">
+  <ds:schemaRefs/>
+</ds:datastoreItem>
+</file>
+
+<file path=customXml/itemProps15.xml><?xml version="1.0" encoding="utf-8"?>
+<ds:datastoreItem xmlns:ds="http://schemas.openxmlformats.org/officeDocument/2006/customXml" ds:itemID="{C99E78A0-C9D4-446F-B674-4DD3E2B46C5D}">
+  <ds:schemaRefs/>
+</ds:datastoreItem>
+</file>
+
+<file path=customXml/itemProps16.xml><?xml version="1.0" encoding="utf-8"?>
+<ds:datastoreItem xmlns:ds="http://schemas.openxmlformats.org/officeDocument/2006/customXml" ds:itemID="{C750C5DC-043F-4BD3-940C-EB6F7625E286}">
+  <ds:schemaRefs/>
+</ds:datastoreItem>
+</file>
+
+<file path=customXml/itemProps17.xml><?xml version="1.0" encoding="utf-8"?>
+<ds:datastoreItem xmlns:ds="http://schemas.openxmlformats.org/officeDocument/2006/customXml" ds:itemID="{32BA7684-6BE4-4F73-B22E-30934AB379B8}">
+  <ds:schemaRefs/>
+</ds:datastoreItem>
+</file>
+
+<file path=customXml/itemProps18.xml><?xml version="1.0" encoding="utf-8"?>
+<ds:datastoreItem xmlns:ds="http://schemas.openxmlformats.org/officeDocument/2006/customXml" ds:itemID="{AB2F4486-6448-49E3-8249-BB9C7492711D}">
+  <ds:schemaRefs/>
+</ds:datastoreItem>
+</file>
+
+<file path=customXml/itemProps19.xml><?xml version="1.0" encoding="utf-8"?>
+<ds:datastoreItem xmlns:ds="http://schemas.openxmlformats.org/officeDocument/2006/customXml" ds:itemID="{847502A6-7CBE-43AF-BDF6-4D4423521D8C}">
+  <ds:schemaRefs/>
+</ds:datastoreItem>
+</file>
+
+<file path=customXml/itemProps2.xml><?xml version="1.0" encoding="utf-8"?>
+<ds:datastoreItem xmlns:ds="http://schemas.openxmlformats.org/officeDocument/2006/customXml" ds:itemID="{56F2EE69-0CCA-4F48-BE22-EC4A886C57A7}">
+  <ds:schemaRefs>
+    <ds:schemaRef ds:uri="http://schemas.microsoft.com/office/infopath/2007/PartnerControls"/>
+    <ds:schemaRef ds:uri="http://purl.org/dc/elements/1.1/"/>
+    <ds:schemaRef ds:uri="http://schemas.microsoft.com/office/2006/metadata/properties"/>
+    <ds:schemaRef ds:uri="http://purl.org/dc/terms/"/>
+    <ds:schemaRef ds:uri="92e1255f-bb7b-4dc9-b051-584cc104eb44"/>
+    <ds:schemaRef ds:uri="http://schemas.openxmlformats.org/package/2006/metadata/core-properties"/>
+    <ds:schemaRef ds:uri="http://schemas.microsoft.com/office/2006/documentManagement/types"/>
+    <ds:schemaRef ds:uri="a6550eff-0fc9-443f-8e77-72cbcf778382"/>
+    <ds:schemaRef ds:uri="http://www.w3.org/XML/1998/namespace"/>
+    <ds:schemaRef ds:uri="http://purl.org/dc/dcmitype/"/>
+  </ds:schemaRefs>
+</ds:datastoreItem>
+</file>
+
+<file path=customXml/itemProps3.xml><?xml version="1.0" encoding="utf-8"?>
 <ds:datastoreItem xmlns:ds="http://schemas.openxmlformats.org/officeDocument/2006/customXml" ds:itemID="{B9AEDDE3-EA02-4A8F-B8F8-0606A0AA45FC}">
   <ds:schemaRefs/>
 </ds:datastoreItem>
 </file>
 
-<file path=customXml/itemProps13.xml><?xml version="1.0" encoding="utf-8"?>
-<ds:datastoreItem xmlns:ds="http://schemas.openxmlformats.org/officeDocument/2006/customXml" ds:itemID="{AB2F4486-6448-49E3-8249-BB9C7492711D}">
-  <ds:schemaRefs/>
-</ds:datastoreItem>
-</file>
-
-<file path=customXml/itemProps14.xml><?xml version="1.0" encoding="utf-8"?>
-<ds:datastoreItem xmlns:ds="http://schemas.openxmlformats.org/officeDocument/2006/customXml" ds:itemID="{C750C5DC-043F-4BD3-940C-EB6F7625E286}">
-  <ds:schemaRefs/>
-</ds:datastoreItem>
-</file>
-
-<file path=customXml/itemProps15.xml><?xml version="1.0" encoding="utf-8"?>
-<ds:datastoreItem xmlns:ds="http://schemas.openxmlformats.org/officeDocument/2006/customXml" ds:itemID="{C09F197C-6A49-47D0-B877-F88807989676}">
-  <ds:schemaRefs/>
-</ds:datastoreItem>
-</file>
-
-<file path=customXml/itemProps16.xml><?xml version="1.0" encoding="utf-8"?>
-<ds:datastoreItem xmlns:ds="http://schemas.openxmlformats.org/officeDocument/2006/customXml" ds:itemID="{822D38AD-8010-4CD3-BD6B-117CB8DF70A4}">
-  <ds:schemaRefs/>
-</ds:datastoreItem>
-</file>
-
-<file path=customXml/itemProps17.xml><?xml version="1.0" encoding="utf-8"?>
+<file path=customXml/itemProps4.xml><?xml version="1.0" encoding="utf-8"?>
 <ds:datastoreItem xmlns:ds="http://schemas.openxmlformats.org/officeDocument/2006/customXml" ds:itemID="{F5A7E41D-6E7F-4B05-AFAB-F540BD4C068B}">
   <ds:schemaRefs>
     <ds:schemaRef ds:uri="http://schemas.microsoft.com/sharepoint/v3/contenttype/forms"/>
@@ -27681,19 +27737,7 @@
 </ds:datastoreItem>
 </file>
 
-<file path=customXml/itemProps18.xml><?xml version="1.0" encoding="utf-8"?>
-<ds:datastoreItem xmlns:ds="http://schemas.openxmlformats.org/officeDocument/2006/customXml" ds:itemID="{847502A6-7CBE-43AF-BDF6-4D4423521D8C}">
-  <ds:schemaRefs/>
-</ds:datastoreItem>
-</file>
-
-<file path=customXml/itemProps19.xml><?xml version="1.0" encoding="utf-8"?>
-<ds:datastoreItem xmlns:ds="http://schemas.openxmlformats.org/officeDocument/2006/customXml" ds:itemID="{1CE36EA9-2186-4EB1-871A-8AE59C2A13BB}">
-  <ds:schemaRefs/>
-</ds:datastoreItem>
-</file>
-
-<file path=customXml/itemProps2.xml><?xml version="1.0" encoding="utf-8"?>
+<file path=customXml/itemProps5.xml><?xml version="1.0" encoding="utf-8"?>
 <ds:datastoreItem xmlns:ds="http://schemas.openxmlformats.org/officeDocument/2006/customXml" ds:itemID="{058EED06-94C4-4781-888F-0A8BB816BC9F}">
   <ds:schemaRefs>
     <ds:schemaRef ds:uri="http://schemas.microsoft.com/office/2006/metadata/contentType"/>
@@ -27712,55 +27756,26 @@
 </ds:datastoreItem>
 </file>
 
-<file path=customXml/itemProps3.xml><?xml version="1.0" encoding="utf-8"?>
-<ds:datastoreItem xmlns:ds="http://schemas.openxmlformats.org/officeDocument/2006/customXml" ds:itemID="{58CC0B31-82B9-497A-9A2E-F3F72D0BBDAD}">
+<file path=customXml/itemProps6.xml><?xml version="1.0" encoding="utf-8"?>
+<ds:datastoreItem xmlns:ds="http://schemas.openxmlformats.org/officeDocument/2006/customXml" ds:itemID="{822D38AD-8010-4CD3-BD6B-117CB8DF70A4}">
   <ds:schemaRefs/>
 </ds:datastoreItem>
 </file>
 
-<file path=customXml/itemProps4.xml><?xml version="1.0" encoding="utf-8"?>
-<ds:datastoreItem xmlns:ds="http://schemas.openxmlformats.org/officeDocument/2006/customXml" ds:itemID="{D72A95EB-8536-47FD-944A-8DD76726FC96}">
+<file path=customXml/itemProps7.xml><?xml version="1.0" encoding="utf-8"?>
+<ds:datastoreItem xmlns:ds="http://schemas.openxmlformats.org/officeDocument/2006/customXml" ds:itemID="{72516535-7702-46AF-9B1F-8623A67A824E}">
   <ds:schemaRefs/>
 </ds:datastoreItem>
 </file>
 
-<file path=customXml/itemProps5.xml><?xml version="1.0" encoding="utf-8"?>
-<ds:datastoreItem xmlns:ds="http://schemas.openxmlformats.org/officeDocument/2006/customXml" ds:itemID="{07958A4E-FAB1-42E4-B6B5-29B01F63F87B}">
-  <ds:schemaRefs/>
-</ds:datastoreItem>
-</file>
-
-<file path=customXml/itemProps6.xml><?xml version="1.0" encoding="utf-8"?>
+<file path=customXml/itemProps8.xml><?xml version="1.0" encoding="utf-8"?>
 <ds:datastoreItem xmlns:ds="http://schemas.openxmlformats.org/officeDocument/2006/customXml" ds:itemID="{03AF3FDC-ACD1-46F3-A43E-782322DF9816}">
   <ds:schemaRefs/>
 </ds:datastoreItem>
 </file>
 
-<file path=customXml/itemProps7.xml><?xml version="1.0" encoding="utf-8"?>
-<ds:datastoreItem xmlns:ds="http://schemas.openxmlformats.org/officeDocument/2006/customXml" ds:itemID="{56F2EE69-0CCA-4F48-BE22-EC4A886C57A7}">
-  <ds:schemaRefs>
-    <ds:schemaRef ds:uri="http://schemas.microsoft.com/office/infopath/2007/PartnerControls"/>
-    <ds:schemaRef ds:uri="http://purl.org/dc/elements/1.1/"/>
-    <ds:schemaRef ds:uri="http://schemas.microsoft.com/office/2006/metadata/properties"/>
-    <ds:schemaRef ds:uri="http://purl.org/dc/terms/"/>
-    <ds:schemaRef ds:uri="92e1255f-bb7b-4dc9-b051-584cc104eb44"/>
-    <ds:schemaRef ds:uri="http://schemas.openxmlformats.org/package/2006/metadata/core-properties"/>
-    <ds:schemaRef ds:uri="http://schemas.microsoft.com/office/2006/documentManagement/types"/>
-    <ds:schemaRef ds:uri="a6550eff-0fc9-443f-8e77-72cbcf778382"/>
-    <ds:schemaRef ds:uri="http://www.w3.org/XML/1998/namespace"/>
-    <ds:schemaRef ds:uri="http://purl.org/dc/dcmitype/"/>
-  </ds:schemaRefs>
-</ds:datastoreItem>
-</file>
-
-<file path=customXml/itemProps8.xml><?xml version="1.0" encoding="utf-8"?>
-<ds:datastoreItem xmlns:ds="http://schemas.openxmlformats.org/officeDocument/2006/customXml" ds:itemID="{32BA7684-6BE4-4F73-B22E-30934AB379B8}">
-  <ds:schemaRefs/>
-</ds:datastoreItem>
-</file>
-
 <file path=customXml/itemProps9.xml><?xml version="1.0" encoding="utf-8"?>
-<ds:datastoreItem xmlns:ds="http://schemas.openxmlformats.org/officeDocument/2006/customXml" ds:itemID="{C99E78A0-C9D4-446F-B674-4DD3E2B46C5D}">
+<ds:datastoreItem xmlns:ds="http://schemas.openxmlformats.org/officeDocument/2006/customXml" ds:itemID="{683FEB75-8CFA-449C-A6B1-B1E4A86A58A1}">
   <ds:schemaRefs/>
 </ds:datastoreItem>
 </file>
</xml_diff>

<commit_message>
Updated with new options in SCReAM BW test tool
</commit_message>
<xml_diff>
--- a/code/bw-test-tool/SCReAM-BW-test-tool.pptx
+++ b/code/bw-test-tool/SCReAM-BW-test-tool.pptx
@@ -2666,7 +2666,7 @@
               </a:rPr>
               <a:t>  |  2020-03-20  |  Public  |  Page </a:t>
             </a:r>
-            <a:fld id="{B0600073-DB4F-46E2-A68F-01152A24D97C}" type="slidenum">
+            <a:fld id="{96E77C6B-F8FF-4B10-860B-E8B52BFB432C}" type="slidenum">
               <a:rPr lang="en-US" sz="800" b="0" i="0" u="none" smtClean="0">
                 <a:solidFill>
                   <a:srgbClr val="1A1816"/>
@@ -3171,7 +3171,7 @@
               </a:rPr>
               <a:t>  |  2020-03-20  |  Public  |  Page </a:t>
             </a:r>
-            <a:fld id="{79B84D9A-A083-43D9-BE1B-62BDB888B2AD}" type="slidenum">
+            <a:fld id="{1D1B292E-6168-469C-91C5-5CD8B88AE4AA}" type="slidenum">
               <a:rPr lang="en-US" sz="800" b="0" i="0" u="none" smtClean="0">
                 <a:solidFill>
                   <a:schemeClr val="bg1"/>
@@ -3484,7 +3484,7 @@
               </a:rPr>
               <a:t>  |  2020-03-20  |  Public  |  Page </a:t>
             </a:r>
-            <a:fld id="{7C0DCC2A-5261-4859-A219-CABB1AAC8438}" type="slidenum">
+            <a:fld id="{767217F8-4DFD-49C5-8637-927F758C4BDD}" type="slidenum">
               <a:rPr lang="en-US" sz="800" b="0" i="0" u="none" smtClean="0">
                 <a:solidFill>
                   <a:srgbClr val="1A1816"/>
@@ -3717,7 +3717,7 @@
               </a:rPr>
               <a:t>  |  2020-03-20  |  Public  |  Page </a:t>
             </a:r>
-            <a:fld id="{498ECBDE-ED5E-4F19-9AD9-FFF1B4317439}" type="slidenum">
+            <a:fld id="{30E9E781-322E-424C-8069-7E0E2DD0D80A}" type="slidenum">
               <a:rPr lang="en-US" sz="800" b="0" i="0" u="none" smtClean="0">
                 <a:solidFill>
                   <a:srgbClr val="1A1816"/>
@@ -3877,7 +3877,7 @@
               </a:rPr>
               <a:t>  |  2020-03-20  |  Public  |  Page </a:t>
             </a:r>
-            <a:fld id="{3CF1FE0B-CBAB-4D97-B660-FA67CA9A301E}" type="slidenum">
+            <a:fld id="{3DC9F8EC-A7E7-4AF8-B5DA-71072059E3C3}" type="slidenum">
               <a:rPr lang="en-US" sz="800" b="0" i="0" u="none" smtClean="0">
                 <a:solidFill>
                   <a:srgbClr val="1A1816"/>
@@ -4083,7 +4083,7 @@
               </a:rPr>
               <a:t>  |  2020-03-20  |  Public  |  Page </a:t>
             </a:r>
-            <a:fld id="{6DCFF22F-C6D8-4589-BE12-97C622E42C46}" type="slidenum">
+            <a:fld id="{C36B0B55-6036-48AF-B8BF-8E92517F13E0}" type="slidenum">
               <a:rPr lang="en-US" sz="800" b="0" i="0" u="none" smtClean="0">
                 <a:solidFill>
                   <a:srgbClr val="1A1816"/>
@@ -4381,7 +4381,7 @@
               </a:rPr>
               <a:t>  |  2020-03-20  |  Public  |  Page </a:t>
             </a:r>
-            <a:fld id="{7EE5181D-105A-4DC5-83B6-665831D096C7}" type="slidenum">
+            <a:fld id="{51BCFF8B-0F81-49C2-9CFE-10FE6C5A3D0F}" type="slidenum">
               <a:rPr lang="en-US" sz="800" b="0" i="0" u="none" smtClean="0">
                 <a:solidFill>
                   <a:schemeClr val="bg1"/>
@@ -4679,7 +4679,7 @@
               </a:rPr>
               <a:t>  |  2020-03-20  |  Public  |  Page </a:t>
             </a:r>
-            <a:fld id="{148A46A2-67F9-4C9A-BD07-81D31E59DB06}" type="slidenum">
+            <a:fld id="{5D917DBE-F3E9-4FF4-916F-93A0F53ED8A3}" type="slidenum">
               <a:rPr lang="en-US" sz="800" b="0" i="0" u="none" smtClean="0">
                 <a:solidFill>
                   <a:schemeClr val="bg1"/>
@@ -4977,7 +4977,7 @@
               </a:rPr>
               <a:t>  |  2020-03-20  |  Public  |  Page </a:t>
             </a:r>
-            <a:fld id="{1AFD57B1-DBB7-450A-AF58-FC8E0B7208F0}" type="slidenum">
+            <a:fld id="{276ADFA5-8ED2-4EE1-B13B-1226084FF04D}" type="slidenum">
               <a:rPr lang="en-US" sz="800" b="0" i="0" u="none" smtClean="0">
                 <a:solidFill>
                   <a:schemeClr val="bg1"/>
@@ -5275,7 +5275,7 @@
               </a:rPr>
               <a:t>  |  2020-03-20  |  Public  |  Page </a:t>
             </a:r>
-            <a:fld id="{D345486F-9A4A-4C9B-981E-356B697F7977}" type="slidenum">
+            <a:fld id="{CB9AF568-03D2-41E4-BF5E-9214904E36CC}" type="slidenum">
               <a:rPr lang="en-US" sz="800" b="0" i="0" u="none" smtClean="0">
                 <a:solidFill>
                   <a:schemeClr val="bg1"/>
@@ -5573,7 +5573,7 @@
               </a:rPr>
               <a:t>  |  2020-03-20  |  Public  |  Page </a:t>
             </a:r>
-            <a:fld id="{F9A29876-DB8B-4E53-9F4C-E992F5801895}" type="slidenum">
+            <a:fld id="{97670298-4A07-4A1D-9C9C-B331BCD695E4}" type="slidenum">
               <a:rPr lang="en-US" sz="800" b="0" i="0" u="none" smtClean="0">
                 <a:solidFill>
                   <a:schemeClr val="bg1"/>
@@ -6087,7 +6087,7 @@
               </a:rPr>
               <a:t>  |  2020-03-20  |  Public  |  Page </a:t>
             </a:r>
-            <a:fld id="{948DB9FB-8A8C-4E77-897A-B52E5682DB24}" type="slidenum">
+            <a:fld id="{8BC8CC82-3B07-4F44-84F8-9C0D95A64019}" type="slidenum">
               <a:rPr lang="en-US" sz="800" b="0" i="0" u="none" smtClean="0">
                 <a:solidFill>
                   <a:schemeClr val="bg1"/>
@@ -6391,7 +6391,7 @@
               </a:rPr>
               <a:t>  |  2020-03-20  |  Public  |  Page </a:t>
             </a:r>
-            <a:fld id="{4CCE248E-18D0-4BC4-B36D-498AB9E33DAB}" type="slidenum">
+            <a:fld id="{2AC1BA8E-5EED-4D07-BE02-E201D4093831}" type="slidenum">
               <a:rPr lang="en-US" sz="800" b="0" i="0" u="none" smtClean="0">
                 <a:solidFill>
                   <a:schemeClr val="bg1"/>
@@ -6689,7 +6689,7 @@
               </a:rPr>
               <a:t>  |  2020-03-20  |  Public  |  Page </a:t>
             </a:r>
-            <a:fld id="{E8015394-B0B0-4865-B555-7F43BE131A91}" type="slidenum">
+            <a:fld id="{B36D4AA4-5EAD-4BAC-A74B-6180125CE069}" type="slidenum">
               <a:rPr lang="en-US" sz="800" b="0" i="0" u="none" smtClean="0">
                 <a:solidFill>
                   <a:schemeClr val="bg1"/>
@@ -6976,7 +6976,7 @@
               </a:rPr>
               <a:t>  |  2020-03-20  |  Public  |  Page </a:t>
             </a:r>
-            <a:fld id="{9F66DAB2-1D73-45C8-B763-87B37BE6CE20}" type="slidenum">
+            <a:fld id="{E67E360C-9699-48FD-A339-AD2ADB4F75DF}" type="slidenum">
               <a:rPr lang="en-US" sz="800" b="0" i="0" u="none" smtClean="0">
                 <a:solidFill>
                   <a:srgbClr val="1A1816"/>
@@ -7263,7 +7263,7 @@
               </a:rPr>
               <a:t>  |  2020-03-20  |  Public  |  Page </a:t>
             </a:r>
-            <a:fld id="{64A88DFA-CC5B-4028-B853-867D519F23DB}" type="slidenum">
+            <a:fld id="{43E26C7F-384A-41B0-BE70-128119ED4F65}" type="slidenum">
               <a:rPr lang="en-US" sz="800" b="0" i="0" u="none" smtClean="0">
                 <a:solidFill>
                   <a:srgbClr val="1A1816"/>
@@ -7556,7 +7556,7 @@
               </a:rPr>
               <a:t>  |  2020-03-20  |  Public  |  Page </a:t>
             </a:r>
-            <a:fld id="{157AC70E-3EC2-46E7-A7EF-7510C17C4FDF}" type="slidenum">
+            <a:fld id="{C0DA032F-000D-47BC-8995-4AC3F325806F}" type="slidenum">
               <a:rPr lang="en-US" sz="800" b="0" i="0" u="none" smtClean="0">
                 <a:solidFill>
                   <a:srgbClr val="1A1816"/>
@@ -7843,7 +7843,7 @@
               </a:rPr>
               <a:t>  |  2020-03-20  |  Public  |  Page </a:t>
             </a:r>
-            <a:fld id="{FE33D1E9-AF3C-45B9-9CCC-838428AA013E}" type="slidenum">
+            <a:fld id="{A250C3FD-7353-49A1-B4E6-3A6E0EAF81B6}" type="slidenum">
               <a:rPr lang="en-US" sz="800" b="0" i="0" u="none" smtClean="0">
                 <a:solidFill>
                   <a:srgbClr val="1A1816"/>
@@ -8165,7 +8165,7 @@
               </a:rPr>
               <a:t>  |  2020-03-20  |  Public  |  Page </a:t>
             </a:r>
-            <a:fld id="{5DECF39C-0FFF-43C5-A95B-F4526ABE5E5A}" type="slidenum">
+            <a:fld id="{7443D054-7406-4100-B8DF-E3CAB2806C71}" type="slidenum">
               <a:rPr lang="en-US" sz="800" b="0" i="0" u="none" smtClean="0">
                 <a:solidFill>
                   <a:srgbClr val="1A1816"/>
@@ -8452,7 +8452,7 @@
               </a:rPr>
               <a:t>  |  2020-03-20  |  Public  |  Page </a:t>
             </a:r>
-            <a:fld id="{988678A2-9F26-4B1F-B575-0B8E1EA11DB5}" type="slidenum">
+            <a:fld id="{752F03D2-70BB-433B-B28A-7F09316F4CA0}" type="slidenum">
               <a:rPr lang="en-US" sz="800" b="0" i="0" u="none" smtClean="0">
                 <a:solidFill>
                   <a:srgbClr val="1A1816"/>
@@ -8774,7 +8774,7 @@
               </a:rPr>
               <a:t>  |  2020-03-20  |  Public  |  Page </a:t>
             </a:r>
-            <a:fld id="{58E20478-00D7-4D51-845F-C7B5EF43C51D}" type="slidenum">
+            <a:fld id="{C965D537-7971-49BB-A942-0EBB9C9ADF5C}" type="slidenum">
               <a:rPr lang="en-US" sz="800" b="0" i="0" u="none" smtClean="0">
                 <a:solidFill>
                   <a:srgbClr val="1A1816"/>
@@ -9136,7 +9136,7 @@
               </a:rPr>
               <a:t>  |  2020-03-20  |  Public  |  Page </a:t>
             </a:r>
-            <a:fld id="{CD615CC4-4E64-4257-954E-C6B0E98366A3}" type="slidenum">
+            <a:fld id="{625DB15F-3B64-48CE-A334-F0C6E6172143}" type="slidenum">
               <a:rPr lang="en-US" sz="800" b="0" i="0" u="none" smtClean="0">
                 <a:solidFill>
                   <a:srgbClr val="1A1816"/>
@@ -9478,7 +9478,7 @@
               </a:rPr>
               <a:t>  |  2020-03-20  |  Public  |  Page </a:t>
             </a:r>
-            <a:fld id="{0E99FF0B-C61C-4E0D-9E2F-E8B11D8B00B3}" type="slidenum">
+            <a:fld id="{A04CE7EB-6CC6-4B2F-BC7A-9F7B69526D57}" type="slidenum">
               <a:rPr lang="en-US" sz="800" b="0" i="0" u="none" smtClean="0">
                 <a:solidFill>
                   <a:srgbClr val="1A1816"/>
@@ -9827,7 +9827,7 @@
               </a:rPr>
               <a:t>  |  2020-03-20  |  Public  |  Page </a:t>
             </a:r>
-            <a:fld id="{0A105209-5003-4FC6-A785-B3D158D258B9}" type="slidenum">
+            <a:fld id="{5A020A79-5434-4404-8010-B8D95B5B4483}" type="slidenum">
               <a:rPr lang="en-US" sz="800" b="0" i="0" u="none" smtClean="0">
                 <a:solidFill>
                   <a:srgbClr val="1A1816"/>
@@ -10189,7 +10189,7 @@
               </a:rPr>
               <a:t>  |  2020-03-20  |  Public  |  Page </a:t>
             </a:r>
-            <a:fld id="{377A1C07-7E71-45A5-9C63-CBA95D736960}" type="slidenum">
+            <a:fld id="{F6F7696E-FD2F-49E8-BC59-265CACA30A6D}" type="slidenum">
               <a:rPr lang="en-US" sz="800" b="0" i="0" u="none" smtClean="0">
                 <a:solidFill>
                   <a:srgbClr val="1A1816"/>
@@ -10551,7 +10551,7 @@
               </a:rPr>
               <a:t>  |  2020-03-20  |  Public  |  Page </a:t>
             </a:r>
-            <a:fld id="{0FA6CF80-1EAF-4386-9F95-48ADD0778270}" type="slidenum">
+            <a:fld id="{1663ED97-F8EF-4FFD-AD49-24BDA8C58BA2}" type="slidenum">
               <a:rPr lang="en-US" sz="800" b="0" i="0" u="none" smtClean="0">
                 <a:solidFill>
                   <a:srgbClr val="1A1816"/>
@@ -10913,7 +10913,7 @@
               </a:rPr>
               <a:t>  |  2020-03-20  |  Public  |  Page </a:t>
             </a:r>
-            <a:fld id="{C06464C8-B84F-4E00-B595-6FD1D3D6035E}" type="slidenum">
+            <a:fld id="{4D9F9C25-BED6-4B2F-A7C6-C52D8B9F776F}" type="slidenum">
               <a:rPr lang="en-US" sz="800" b="0" i="0" u="none" smtClean="0">
                 <a:solidFill>
                   <a:srgbClr val="1A1816"/>
@@ -11275,7 +11275,7 @@
               </a:rPr>
               <a:t>  |  2020-03-20  |  Public  |  Page </a:t>
             </a:r>
-            <a:fld id="{01A416DA-DECF-4E22-BE48-04CB4002C848}" type="slidenum">
+            <a:fld id="{422B57C6-33E2-4E42-B295-0CAA23287D83}" type="slidenum">
               <a:rPr lang="en-US" sz="800" b="0" i="0" u="none" smtClean="0">
                 <a:solidFill>
                   <a:srgbClr val="1A1816"/>
@@ -11697,7 +11697,7 @@
               </a:rPr>
               <a:t>  |  2020-03-20  |  Public  |  Page </a:t>
             </a:r>
-            <a:fld id="{3347BBF8-C01F-4881-9784-A6C26CE9F7D4}" type="slidenum">
+            <a:fld id="{E1694706-14CA-46FC-BF98-4477B7C76D1D}" type="slidenum">
               <a:rPr lang="en-US" sz="800" b="0" i="0" u="none" smtClean="0">
                 <a:solidFill>
                   <a:srgbClr val="1A1816"/>
@@ -12113,7 +12113,7 @@
               </a:rPr>
               <a:t>  |  2020-03-20  |  Public  |  Page </a:t>
             </a:r>
-            <a:fld id="{492D7D59-3759-4013-BAE4-0720F304B8C7}" type="slidenum">
+            <a:fld id="{C6923F99-0DE8-4995-9866-158394E78412}" type="slidenum">
               <a:rPr lang="en-US" sz="800" b="0" i="0" u="none" smtClean="0">
                 <a:solidFill>
                   <a:srgbClr val="1A1816"/>
@@ -12588,7 +12588,7 @@
               </a:rPr>
               <a:t>  |  2020-03-20  |  Public  |  Page </a:t>
             </a:r>
-            <a:fld id="{50D93646-4FED-4FAD-B6DE-E82D0EC2625F}" type="slidenum">
+            <a:fld id="{1D3EB680-CD1F-4C85-BE15-D84E18737CA2}" type="slidenum">
               <a:rPr lang="en-US" sz="800" b="0" i="0" u="none" smtClean="0">
                 <a:solidFill>
                   <a:srgbClr val="1A1816"/>
@@ -13083,7 +13083,7 @@
               </a:rPr>
               <a:t>  |  2020-03-20  |  Public  |  Page </a:t>
             </a:r>
-            <a:fld id="{1D1C418B-E623-452D-B02F-8B1E1D3FA76E}" type="slidenum">
+            <a:fld id="{06C87DE7-0D0E-4174-8E41-E12F1FAA7A0F}" type="slidenum">
               <a:rPr lang="en-US" sz="800" b="0" i="0" u="none" smtClean="0">
                 <a:solidFill>
                   <a:srgbClr val="1A1816"/>
@@ -13539,7 +13539,7 @@
               </a:rPr>
               <a:t>  |  2020-03-20  |  Public  |  Page </a:t>
             </a:r>
-            <a:fld id="{5EBB6B80-DB88-494F-8128-DE666F8DAE35}" type="slidenum">
+            <a:fld id="{CAC891B0-1BBF-49D2-820F-72D03ECF34C4}" type="slidenum">
               <a:rPr lang="en-US" sz="800" b="0" i="0" u="none" smtClean="0">
                 <a:solidFill>
                   <a:srgbClr val="1A1816"/>
@@ -13927,7 +13927,7 @@
               </a:rPr>
               <a:t>  |  2020-03-20  |  Public  |  Page </a:t>
             </a:r>
-            <a:fld id="{FFA72F9E-BA71-4228-9977-BB1AE640E31E}" type="slidenum">
+            <a:fld id="{BBB05478-8C19-43D0-8DF6-55739792671A}" type="slidenum">
               <a:rPr lang="en-US" sz="800" b="0" i="0" u="none" smtClean="0">
                 <a:solidFill>
                   <a:schemeClr val="bg1"/>
@@ -14446,7 +14446,7 @@
               </a:rPr>
               <a:t>  |  2020-03-20  |  Public  |  Page </a:t>
             </a:r>
-            <a:fld id="{E05887CF-F682-4DB2-A75C-F9C373DA509E}" type="slidenum">
+            <a:fld id="{A516671E-4743-4D7C-BBB6-7D32B26F53CE}" type="slidenum">
               <a:rPr lang="en-US" sz="800" b="0" i="0" u="none" smtClean="0">
                 <a:solidFill>
                   <a:srgbClr val="1A1816"/>
@@ -15155,7 +15155,7 @@
               </a:rPr>
               <a:t>  |  2020-03-20  |  Public  |  Page </a:t>
             </a:r>
-            <a:fld id="{C29E20D6-ED3F-4676-907B-730B7573BB78}" type="slidenum">
+            <a:fld id="{FE04AFF0-5151-4190-855B-02E873E52333}" type="slidenum">
               <a:rPr lang="en-US" sz="800" b="0" i="0" u="none" smtClean="0">
                 <a:solidFill>
                   <a:srgbClr val="1A1816"/>
@@ -16634,7 +16634,7 @@
               </a:rPr>
               <a:t>  |  2020-03-20  |  Public  |  Page </a:t>
             </a:r>
-            <a:fld id="{9DA35740-B1CF-4B36-BDFC-BFA8F5F7B1D8}" type="slidenum">
+            <a:fld id="{926F6D38-3AE5-46AD-A56B-7FC334A47411}" type="slidenum">
               <a:rPr lang="en-US" sz="800" b="0" i="0" u="none" smtClean="0">
                 <a:solidFill>
                   <a:schemeClr val="bg1"/>
@@ -17146,7 +17146,7 @@
               </a:rPr>
               <a:t>  |  2020-03-20  |  Public  |  Page </a:t>
             </a:r>
-            <a:fld id="{46A2F094-CF86-4C61-A254-4B13D88A40D4}" type="slidenum">
+            <a:fld id="{80CFD00F-84EA-4A7C-A0CC-57A672CF8B0C}" type="slidenum">
               <a:rPr lang="en-US" sz="800" b="0" i="0" u="none" smtClean="0">
                 <a:solidFill>
                   <a:schemeClr val="bg1"/>
@@ -17541,7 +17541,7 @@
               </a:rPr>
               <a:t>  |  2020-03-20  |  Public  |  Page </a:t>
             </a:r>
-            <a:fld id="{7F7F410C-821C-4E43-90BC-D3570ED9BD2C}" type="slidenum">
+            <a:fld id="{F21DDB61-407F-46BA-80FE-4B63B30B6E50}" type="slidenum">
               <a:rPr lang="en-US" sz="800" b="0" i="0" u="none" smtClean="0">
                 <a:solidFill>
                   <a:schemeClr val="bg1"/>
@@ -18041,7 +18041,7 @@
               </a:rPr>
               <a:t>  |  2020-03-20  |  Public  |  Page </a:t>
             </a:r>
-            <a:fld id="{49006D0B-CD3B-40DC-9685-B0AB1C76EA12}" type="slidenum">
+            <a:fld id="{1D82B79A-8F0E-4BDF-9A77-6901FAA86EC1}" type="slidenum">
               <a:rPr lang="en-US" sz="800" b="0" i="0" u="none" smtClean="0">
                 <a:solidFill>
                   <a:schemeClr val="bg1"/>
@@ -18541,7 +18541,7 @@
               </a:rPr>
               <a:t>  |  2020-03-20  |  Public  |  Page </a:t>
             </a:r>
-            <a:fld id="{E57F10B2-3270-4B53-BD0A-E497562DFEF4}" type="slidenum">
+            <a:fld id="{14AB3056-61DF-41CB-8A67-139555F277A2}" type="slidenum">
               <a:rPr lang="en-US" sz="800" b="0" i="0" u="none" smtClean="0">
                 <a:solidFill>
                   <a:schemeClr val="bg1"/>
@@ -19546,13 +19546,12 @@
               <a:t> BW test tool</a:t>
             </a:r>
             <a:br>
-              <a:rPr lang="en-US"/>
+              <a:rPr lang="en-US" dirty="0"/>
             </a:br>
             <a:r>
-              <a:rPr lang="en-US" sz="5400"/>
-              <a:t>2020-05-06</a:t>
-            </a:r>
-            <a:endParaRPr lang="en-US" sz="5400" dirty="0"/>
+              <a:rPr lang="en-US" sz="5400" dirty="0"/>
+              <a:t>2020-05-13</a:t>
+            </a:r>
           </a:p>
         </p:txBody>
       </p:sp>
@@ -20141,6 +20140,21 @@
             </a:r>
           </a:p>
           <a:p>
+            <a:pPr lvl="1"/>
+            <a:r>
+              <a:rPr lang="en-US" sz="1400" dirty="0"/>
+              <a:t>-</a:t>
+            </a:r>
+            <a:r>
+              <a:rPr lang="en-US" sz="1400" dirty="0" err="1"/>
+              <a:t>ntp</a:t>
+            </a:r>
+            <a:r>
+              <a:rPr lang="en-US" sz="1400" dirty="0"/>
+              <a:t> option enables NTP  timestamp</a:t>
+            </a:r>
+          </a:p>
+          <a:p>
             <a:r>
               <a:rPr lang="en-US" sz="1400" dirty="0"/>
               <a:t>13 columns of data</a:t>
@@ -23003,7 +23017,7 @@
           <a:graphicData uri="http://schemas.openxmlformats.org/presentationml/2006/ole">
             <mc:AlternateContent xmlns:mc="http://schemas.openxmlformats.org/markup-compatibility/2006">
               <mc:Choice xmlns:v="urn:schemas-microsoft-com:vml" Requires="v">
-                <p:oleObj spid="_x0000_s1042" name="Visio" r:id="rId5" imgW="2533577" imgH="3257685" progId="Visio.Drawing.11">
+                <p:oleObj spid="_x0000_s1046" name="Visio" r:id="rId5" imgW="2533577" imgH="3257685" progId="Visio.Drawing.11">
                   <p:embed/>
                 </p:oleObj>
               </mc:Choice>
@@ -25478,10 +25492,10 @@
       </p:sp>
       <p:pic>
         <p:nvPicPr>
-          <p:cNvPr id="4" name="Picture 3" descr="A screenshot of text&#10;&#10;Description automatically generated">
+          <p:cNvPr id="3" name="Picture 2" descr="A screenshot of a cell phone&#10;&#10;Description automatically generated">
             <a:extLst>
               <a:ext uri="{FF2B5EF4-FFF2-40B4-BE49-F238E27FC236}">
-                <a16:creationId xmlns:a16="http://schemas.microsoft.com/office/drawing/2014/main" id="{C079A6A1-F61C-4125-A05E-281386320FED}"/>
+                <a16:creationId xmlns:a16="http://schemas.microsoft.com/office/drawing/2014/main" id="{A75E5ADB-9D10-4D59-9121-E5564B514B01}"/>
               </a:ext>
             </a:extLst>
           </p:cNvPr>
@@ -25504,8 +25518,8 @@
         </p:blipFill>
         <p:spPr>
           <a:xfrm>
-            <a:off x="6586654" y="2387472"/>
-            <a:ext cx="5179083" cy="4399436"/>
+            <a:off x="6043448" y="2371020"/>
+            <a:ext cx="6148552" cy="4486979"/>
           </a:xfrm>
           <a:prstGeom prst="rect">
             <a:avLst/>
@@ -27339,69 +27353,20 @@
 </file>
 
 <file path=customXml/item1.xml><?xml version="1.0" encoding="utf-8"?>
-<TemplafySlideFormConfiguration><![CDATA[{"formFields":[],"formDataEntries":[]}]]></TemplafySlideFormConfiguration>
+<TemplafyFormConfiguration><![CDATA[{"formFields":[{"required":true,"placeholder":"","lines":0,"type":"textBox","name":"DocumentTitle","label":"Document Title","helpTexts":{"prefix":"","postfix":""},"spacing":{},"fullyQualifiedName":"DocumentTitle"},{"dataSource":"Confidentiality","displayColumn":"confidentiality","hideIfNoUserInteractionRequired":false,"distinct":true,"required":true,"autoSelectFirstOption":false,"type":"dropDown","name":"ConfidentialityClass","label":"Confidentiality Class","helpTexts":{"prefix":"","postfix":""},"spacing":{},"fullyQualifiedName":"ConfidentialityClass"},{"dataSource":"External Confidentiality label","displayColumn":"externalConfidentiality","hideIfNoUserInteractionRequired":false,"distinct":true,"required":false,"autoSelectFirstOption":false,"defaultValue":"1","type":"dropDown","name":"ExternalConfidentialityLabel","label":"External Confidentiality label","helpTexts":{"prefix":"","postfix":"If no external confidentiality class then please choose the blank value"},"spacing":{},"fullyQualifiedName":"ExternalConfidentialityLabel"},{"dataSource":"PowerPoint Document Type","column":"documentType","required":false,"placeholder":"","autoSelectFirstOption":false,"type":"comboBox","name":"DocTypePresentation","label":"Document Type Presentation","helpTexts":{"prefix":"","postfix":"If the document type differs from the default value, click on the X to delete and type/choose another type."},"spacing":{},"fullyQualifiedName":"DocTypePresentation"},{"required":false,"placeholder":"","lines":0,"type":"textBox","name":"DocumentNumber","label":"Document Number","helpTexts":{"prefix":"","postfix":""},"spacing":{},"fullyQualifiedName":"DocumentNumber"},{"dataSource":"Language code","displayColumn":"showName","hideIfNoUserInteractionRequired":false,"distinct":true,"required":false,"autoSelectFirstOption":false,"defaultValue":"1","type":"dropDown","name":"LanguageCode","label":"Language Code","helpTexts":{"prefix":"","postfix":"The language code will be appended to the Document No."},"spacing":{},"fullyQualifiedName":"LanguageCode"},{"dataSource":"Revision","column":"revision","required":false,"placeholder":"","autoSelectFirstOption":false,"type":"comboBox","name":"Revision","label":"Revision","helpTexts":{"prefix":"","postfix":""},"spacing":{},"fullyQualifiedName":"Revision"},{"required":false,"type":"datePicker","name":"Date","label":"Date","helpTexts":{"prefix":"","postfix":""},"spacing":{},"fullyQualifiedName":"Date"},{"type":"heading","name":"FooterVisibilityOptions","label":"Footer Visibility Options","helpTexts":{"prefix":"","postfix":""},"spacing":{},"fullyQualifiedName":"FooterVisibilityOptions"},{"dataSource":"PPT FooterVisibility","displayColumn":"templateType","hideIfNoUserInteractionRequired":false,"distinct":true,"required":true,"autoSelectFirstOption":false,"defaultValue":"1","type":"dropDown","name":"TemplateType","label":"Is this a document or presentation?","helpTexts":{"prefix":"","postfix":""},"spacing":{},"fullyQualifiedName":"TemplateType"},{"dataSource":"PPT FooterVisibility","displayColumn":"docTitle_label","hideIfNoUserInteractionRequired":false,"distinct":true,"required":false,"autoSelectFirstOption":true,"filter":{"column":"templateType","otherFieldName":"TemplateType","fullyQualifiedOtherFieldName":"TemplateType","otherFieldColumn":"TemplateType","formReference":"none","operator":"equals"},"type":"dropDown","name":"DocTitle","label":"Show document title in footer?","helpTexts":{"prefix":"","postfix":""},"spacing":{},"fullyQualifiedName":"DocTitle"},{"dataSource":"PPT FooterVisibility","displayColumn":"totalPageNo_text","hideIfNoUserInteractionRequired":false,"distinct":true,"required":false,"autoSelectFirstOption":true,"filter":{"column":"templateType","otherFieldName":"TemplateType","fullyQualifiedOtherFieldName":"TemplateType","otherFieldColumn":"TemplateType","formReference":"none","operator":"equals"},"type":"dropDown","name":"TotalPageNo","label":"Page numbering","helpTexts":{"prefix":"","postfix":""},"spacing":{},"fullyQualifiedName":"TotalPageNo"},{"required":false,"placeholder":"","lines":0,"defaultValue":"{{UserProfile.Prepared}}","type":"textBox","name":"Prepared","label":"Prepared By (Subject Responsible)","helpTexts":{"prefix":"","postfix":""},"spacing":{},"fullyQualifiedName":"Prepared"},{"required":false,"placeholder":"","lines":0,"type":"textBox","name":"ApprovedBy","label":"Approved By (Document Responsible)","helpTexts":{"prefix":"","postfix":""},"spacing":{},"fullyQualifiedName":"ApprovedBy"},{"required":false,"placeholder":"","lines":0,"type":"textBox","name":"Checked","label":"Checked","helpTexts":{"prefix":"","postfix":""},"spacing":{},"fullyQualifiedName":"Checked"},{"required":false,"placeholder":"","lines":0,"type":"textBox","name":"Reference","label":"Reference","helpTexts":{"prefix":"","postfix":""},"spacing":{},"fullyQualifiedName":"Reference"},{"required":false,"placeholder":"","lines":0,"type":"textBox","name":"Keywords","label":"Keywords","helpTexts":{"prefix":"","postfix":""},"spacing":{},"fullyQualifiedName":"Keywords"}],"formDataEntries":[{"name":"DocumentTitle","value":"HfKMJ7wB7KPEWJpFWibMqg=="},{"name":"ConfidentialityClass","value":"cT/FOwTWaPknrhRlNMh4SQ=="},{"name":"ExternalConfidentialityLabel","value":"u2D/MG3wyuAQhkGvE2fPaA=="},{"name":"LanguageCode","value":"5wlu7ZdPxHQj1W0w+yTNSg=="},{"name":"Date","value":"vb48xUhp/+BouvbbBJesXw=="},{"name":"TemplateType","value":"PxVEvJY8nE7m/hY9622Sng=="},{"name":"DocTitle","value":"PxVEvJY8nE7m/hY9622Sng=="},{"name":"TotalPageNo","value":"PxVEvJY8nE7m/hY9622Sng=="},{"name":"Prepared","value":"PqdHBiLjqdpOMxfLUK9Tonaq9XwuinzCFKYJ7RK3+SI="}]}]]></TemplafyFormConfiguration>
 </file>
 
 <file path=customXml/item10.xml><?xml version="1.0" encoding="utf-8"?>
-<TemplafyTemplateConfiguration><![CDATA[{"elementsMetadata":[{"type":"shape","id":"5d67e717-74bf-41a6-8dce-47082e2c1da1","elementConfiguration":{"inheritDimensions":"inheritNone","height":"1.34 cm","binding":"Form.LogoInsertion.Pplogoname","disableUpdates":false,"type":"image"}}],"transformationConfigurations":[{"language":"{{DocumentLanguage}}","disableUpdates":false,"type":"proofingLanguage"},{"propertyName":"FooterText","propertyValue":"true","disableUpdates":false,"type":"customDocumentProperty"},{"propertyName":"SecurityClass","propertyValue":"{{Form.ConfidentialityClass.Confidentiality}}","disableUpdates":false,"type":"customDocumentProperty"},{"propertyName":"ExtConf","propertyValue":"{{Form.ExternalConfidentialityLabel.ExternalConfidentiality}}","disableUpdates":false,"type":"customDocumentProperty"},{"propertyName":"Prepared","propertyValue":"{{Form.Prepared}}","disableUpdates":false,"type":"customDocumentProperty"},{"propertyName":"ApprovedBy","propertyValue":"{{Form.ApprovedBy}}","disableUpdates":false,"type":"customDocumentProperty"},{"propertyName":"DocNo","propertyValue":"{{Form.DocumentNumber}} {{Form.LanguageCode.LanguageCode}}","disableUpdates":false,"type":"customDocumentProperty"},{"propertyName":"Checked","propertyValue":"{{Form.Checked}}","disableUpdates":false,"type":"customDocumentProperty"},{"propertyName":"Date","propertyValue":"{{Form.Date}}","disableUpdates":false,"type":"customDocumentProperty"},{"propertyName":"Reference","propertyValue":"{{Form.Reference}}","disableUpdates":false,"type":"customDocumentProperty"},{"propertyName":"Title","propertyValue":"{{Form.DocumentTitle}}","disableUpdates":false,"type":"customDocumentProperty"},{"propertyName":"Keyword","propertyValue":"{{Form.Keywords}}","disableUpdates":false,"type":"customDocumentProperty"},{"propertyName":"DocumentType","propertyValue":"Presentation2011","disableUpdates":false,"type":"customDocumentProperty"},{"propertyName":"Language","propertyValue":"EnglishUS","disableUpdates":false,"type":"customDocumentProperty"},{"propertyName":"TemplateID","propertyValue":"FALSE","disableUpdates":false,"type":"customDocumentProperty"},{"propertyName":"ConfCtrl","propertyValue":"FALSE","disableUpdates":false,"type":"customDocumentProperty"},{"propertyName":"title","propertyValue":"{{Form.DocumentTitle}}","disableUpdates":false,"type":"documentProperty"},{"propertyName":"keywords","propertyValue":"{{Form.Keywords}}","disableUpdates":false,"type":"documentProperty"},{"propertyName":"creator","propertyValue":"{{Form.Prepared}}","disableUpdates":false,"type":"documentProperty"},{"propertyName":"DocTitle","propertyValue":"{{Form.DocTitle.DocTitle}}","disableUpdates":false,"type":"customDocumentProperty"},{"propertyName":"IsDocument","propertyValue":"{{Form.TemplateType.IsDocument}}","disableUpdates":false,"type":"customDocumentProperty"},{"propertyName":"IsPresentation","propertyValue":"{{Form.TemplateType.IsPresentation}}","disableUpdates":false,"type":"customDocumentProperty"},{"propertyName":"company","propertyValue":"Ericsson","disableUpdates":false,"type":"documentProperty"},{"propertyName":"PageNumberVisible","propertyValue":"{{Form.TotalPageNo.TotalPageNo_value}}","disableUpdates":false,"type":"customDocumentProperty"},{"propertyName":"Revision","propertyValue":"{{Form.Revision}}","disableUpdates":false,"type":"customDocumentProperty"},{"propertyName":"DocType","propertyValue":"{{Form.DocTypePresentation}}","disableUpdates":false,"type":"customDocumentProperty"},{"propertyName":"TemplateVersion","propertyValue":"R2A","disableUpdates":false,"type":"customDocumentProperty"},{"propertyName":"PackageNo","propertyValue":"LXA 119 603","disableUpdates":false,"type":"customDocumentProperty"},{"propertyName":"PackageVersion","propertyValue":"R6B","disableUpdates":false,"type":"customDocumentProperty"},{"propertyName":"TemplateName","propertyValue":"CXC 173 2731/1","disableUpdates":false,"type":"customDocumentProperty"},{"propertyName":"DocName","propertyValue":" ","disableUpdates":false,"type":"customDocumentProperty"},{"propertyName":"description","propertyValue":"{{Form.DocumentNumber}} {{Form.LanguageCode.LanguageCode}}\nRev {{Form.Revision}}","disableUpdates":false,"type":"documentProperty"}],"templateName":"New presentation (Standard landscape)","templateDescription":"","enableDocumentContentUpdater":true,"version":"1.9"}]]></TemplafyTemplateConfiguration>
-</file>
-
-<file path=customXml/item11.xml><?xml version="1.0" encoding="utf-8"?>
-<TemplafySlideTemplateConfiguration><![CDATA[{"elementsMetadata":[],"documentContentValidatorConfiguration":{"enableDocumentContentValidator":false,"documentContentValidatorVersion":0},"slideId":"637027476704980324","enableDocumentContentUpdater":true,"version":"1.9"}]]></TemplafySlideTemplateConfiguration>
-</file>
-
-<file path=customXml/item12.xml><?xml version="1.0" encoding="utf-8"?>
-<TemplafyFormConfiguration><![CDATA[{"formFields":[{"required":true,"placeholder":"","lines":0,"type":"textBox","name":"DocumentTitle","label":"Document Title","helpTexts":{"prefix":"","postfix":""},"spacing":{},"fullyQualifiedName":"DocumentTitle"},{"dataSource":"Confidentiality","displayColumn":"confidentiality","hideIfNoUserInteractionRequired":false,"distinct":true,"required":true,"autoSelectFirstOption":false,"type":"dropDown","name":"ConfidentialityClass","label":"Confidentiality Class","helpTexts":{"prefix":"","postfix":""},"spacing":{},"fullyQualifiedName":"ConfidentialityClass"},{"dataSource":"External Confidentiality label","displayColumn":"externalConfidentiality","hideIfNoUserInteractionRequired":false,"distinct":true,"required":false,"autoSelectFirstOption":false,"defaultValue":"1","type":"dropDown","name":"ExternalConfidentialityLabel","label":"External Confidentiality label","helpTexts":{"prefix":"","postfix":"If no external confidentiality class then please choose the blank value"},"spacing":{},"fullyQualifiedName":"ExternalConfidentialityLabel"},{"dataSource":"PowerPoint Document Type","column":"documentType","required":false,"placeholder":"","autoSelectFirstOption":false,"type":"comboBox","name":"DocTypePresentation","label":"Document Type Presentation","helpTexts":{"prefix":"","postfix":"If the document type differs from the default value, click on the X to delete and type/choose another type."},"spacing":{},"fullyQualifiedName":"DocTypePresentation"},{"required":false,"placeholder":"","lines":0,"type":"textBox","name":"DocumentNumber","label":"Document Number","helpTexts":{"prefix":"","postfix":""},"spacing":{},"fullyQualifiedName":"DocumentNumber"},{"dataSource":"Language code","displayColumn":"showName","hideIfNoUserInteractionRequired":false,"distinct":true,"required":false,"autoSelectFirstOption":false,"defaultValue":"1","type":"dropDown","name":"LanguageCode","label":"Language Code","helpTexts":{"prefix":"","postfix":"The language code will be appended to the Document No."},"spacing":{},"fullyQualifiedName":"LanguageCode"},{"dataSource":"Revision","column":"revision","required":false,"placeholder":"","autoSelectFirstOption":false,"type":"comboBox","name":"Revision","label":"Revision","helpTexts":{"prefix":"","postfix":""},"spacing":{},"fullyQualifiedName":"Revision"},{"required":false,"type":"datePicker","name":"Date","label":"Date","helpTexts":{"prefix":"","postfix":""},"spacing":{},"fullyQualifiedName":"Date"},{"type":"heading","name":"FooterVisibilityOptions","label":"Footer Visibility Options","helpTexts":{"prefix":"","postfix":""},"spacing":{},"fullyQualifiedName":"FooterVisibilityOptions"},{"dataSource":"PPT FooterVisibility","displayColumn":"templateType","hideIfNoUserInteractionRequired":false,"distinct":true,"required":true,"autoSelectFirstOption":false,"defaultValue":"1","type":"dropDown","name":"TemplateType","label":"Is this a document or presentation?","helpTexts":{"prefix":"","postfix":""},"spacing":{},"fullyQualifiedName":"TemplateType"},{"dataSource":"PPT FooterVisibility","displayColumn":"docTitle_label","hideIfNoUserInteractionRequired":false,"distinct":true,"required":false,"autoSelectFirstOption":true,"filter":{"column":"templateType","otherFieldName":"TemplateType","fullyQualifiedOtherFieldName":"TemplateType","otherFieldColumn":"TemplateType","formReference":"none","operator":"equals"},"type":"dropDown","name":"DocTitle","label":"Show document title in footer?","helpTexts":{"prefix":"","postfix":""},"spacing":{},"fullyQualifiedName":"DocTitle"},{"dataSource":"PPT FooterVisibility","displayColumn":"totalPageNo_text","hideIfNoUserInteractionRequired":false,"distinct":true,"required":false,"autoSelectFirstOption":true,"filter":{"column":"templateType","otherFieldName":"TemplateType","fullyQualifiedOtherFieldName":"TemplateType","otherFieldColumn":"TemplateType","formReference":"none","operator":"equals"},"type":"dropDown","name":"TotalPageNo","label":"Page numbering","helpTexts":{"prefix":"","postfix":""},"spacing":{},"fullyQualifiedName":"TotalPageNo"},{"required":false,"placeholder":"","lines":0,"defaultValue":"{{UserProfile.Prepared}}","type":"textBox","name":"Prepared","label":"Prepared By (Subject Responsible)","helpTexts":{"prefix":"","postfix":""},"spacing":{},"fullyQualifiedName":"Prepared"},{"required":false,"placeholder":"","lines":0,"type":"textBox","name":"ApprovedBy","label":"Approved By (Document Responsible)","helpTexts":{"prefix":"","postfix":""},"spacing":{},"fullyQualifiedName":"ApprovedBy"},{"required":false,"placeholder":"","lines":0,"type":"textBox","name":"Checked","label":"Checked","helpTexts":{"prefix":"","postfix":""},"spacing":{},"fullyQualifiedName":"Checked"},{"required":false,"placeholder":"","lines":0,"type":"textBox","name":"Reference","label":"Reference","helpTexts":{"prefix":"","postfix":""},"spacing":{},"fullyQualifiedName":"Reference"},{"required":false,"placeholder":"","lines":0,"type":"textBox","name":"Keywords","label":"Keywords","helpTexts":{"prefix":"","postfix":""},"spacing":{},"fullyQualifiedName":"Keywords"}],"formDataEntries":[{"name":"DocumentTitle","value":"HfKMJ7wB7KPEWJpFWibMqg=="},{"name":"ConfidentialityClass","value":"cT/FOwTWaPknrhRlNMh4SQ=="},{"name":"ExternalConfidentialityLabel","value":"u2D/MG3wyuAQhkGvE2fPaA=="},{"name":"LanguageCode","value":"5wlu7ZdPxHQj1W0w+yTNSg=="},{"name":"Date","value":"vb48xUhp/+BouvbbBJesXw=="},{"name":"TemplateType","value":"PxVEvJY8nE7m/hY9622Sng=="},{"name":"DocTitle","value":"PxVEvJY8nE7m/hY9622Sng=="},{"name":"TotalPageNo","value":"PxVEvJY8nE7m/hY9622Sng=="},{"name":"Prepared","value":"PqdHBiLjqdpOMxfLUK9Tonaq9XwuinzCFKYJ7RK3+SI="}]}]]></TemplafyFormConfiguration>
-</file>
-
-<file path=customXml/item13.xml><?xml version="1.0" encoding="utf-8"?>
-<TemplafySlideTemplateConfiguration><![CDATA[{"documentContentValidatorConfiguration":{"enableDocumentContentValidator":false,"documentContentValidatorVersion":0},"elementsMetadata":[],"slideId":"637037983905678162","enableDocumentContentUpdater":true,"version":"1.9"}]]></TemplafySlideTemplateConfiguration>
-</file>
-
-<file path=customXml/item14.xml><?xml version="1.0" encoding="utf-8"?>
-<TemplafySlideFormConfiguration><![CDATA[{"formFields":[],"formDataEntries":[]}]]></TemplafySlideFormConfiguration>
-</file>
-
-<file path=customXml/item15.xml><?xml version="1.0" encoding="utf-8"?>
-<TemplafySlideFormConfiguration><![CDATA[{"formFields":[],"formDataEntries":[]}]]></TemplafySlideFormConfiguration>
-</file>
-
-<file path=customXml/item16.xml><?xml version="1.0" encoding="utf-8"?>
-<TemplafySlideTemplateConfiguration><![CDATA[{"documentContentValidatorConfiguration":{"enableDocumentContentValidator":false,"documentContentValidatorVersion":0},"elementsMetadata":[],"slideId":"637171128435648944","enableDocumentContentUpdater":true,"version":"1.9"}]]></TemplafySlideTemplateConfiguration>
-</file>
-
-<file path=customXml/item17.xml><?xml version="1.0" encoding="utf-8"?>
-<TemplafySlideFormConfiguration><![CDATA[{"formFields":[],"formDataEntries":[]}]]></TemplafySlideFormConfiguration>
-</file>
-
-<file path=customXml/item18.xml><?xml version="1.0" encoding="utf-8"?>
-<TemplafySlideTemplateConfiguration><![CDATA[{"documentContentValidatorConfiguration":{"enableDocumentContentValidator":false,"documentContentValidatorVersion":0},"elementsMetadata":[],"slideId":"637171128435180813","enableDocumentContentUpdater":true,"version":"1.9"}]]></TemplafySlideTemplateConfiguration>
-</file>
-
-<file path=customXml/item19.xml><?xml version="1.0" encoding="utf-8"?>
-<TemplafySlideFormConfiguration><![CDATA[{"formFields":[],"formDataEntries":[]}]]></TemplafySlideFormConfiguration>
-</file>
-
-<file path=customXml/item2.xml><?xml version="1.0" encoding="utf-8"?>
 <p:properties xmlns:p="http://schemas.microsoft.com/office/2006/metadata/properties" xmlns:xsi="http://www.w3.org/2001/XMLSchema-instance" xmlns:pc="http://schemas.microsoft.com/office/infopath/2007/PartnerControls">
   <documentManagement/>
 </p:properties>
 </file>
 
-<file path=customXml/item3.xml><?xml version="1.0" encoding="utf-8"?>
-<TemplafySlideFormConfiguration><![CDATA[{"formFields":[],"formDataEntries":[]}]]></TemplafySlideFormConfiguration>
+<file path=customXml/item11.xml><?xml version="1.0" encoding="utf-8"?>
+<TemplafySlideTemplateConfiguration><![CDATA[{"documentContentValidatorConfiguration":{"enableDocumentContentValidator":false,"documentContentValidatorVersion":0},"elementsMetadata":[],"slideId":"637037983905221558","enableDocumentContentUpdater":true,"version":"1.9"}]]></TemplafySlideTemplateConfiguration>
 </file>
 
-<file path=customXml/item4.xml><?xml version="1.0" encoding="utf-8"?>
-<?mso-contentType ?>
-<FormTemplates xmlns="http://schemas.microsoft.com/sharepoint/v3/contenttype/forms">
-  <Display>DocumentLibraryForm</Display>
-  <Edit>DocumentLibraryForm</Edit>
-  <New>DocumentLibraryForm</New>
-</FormTemplates>
-</file>
-
-<file path=customXml/item5.xml><?xml version="1.0" encoding="utf-8"?>
+<file path=customXml/item12.xml><?xml version="1.0" encoding="utf-8"?>
 <ct:contentTypeSchema xmlns:ct="http://schemas.microsoft.com/office/2006/metadata/contentType" xmlns:ma="http://schemas.microsoft.com/office/2006/metadata/properties/metaAttributes" ct:_="" ma:_="" ma:contentTypeName="Document" ma:contentTypeID="0x0101002C8661F604A9A64C9627B875CBEE0D49" ma:contentTypeVersion="13" ma:contentTypeDescription="Create a new document." ma:contentTypeScope="" ma:versionID="efb89547655977800231d60c8e2388d5">
   <xsd:schema xmlns:xsd="http://www.w3.org/2001/XMLSchema" xmlns:xs="http://www.w3.org/2001/XMLSchema" xmlns:p="http://schemas.microsoft.com/office/2006/metadata/properties" xmlns:ns3="92e1255f-bb7b-4dc9-b051-584cc104eb44" xmlns:ns4="a6550eff-0fc9-443f-8e77-72cbcf778382" targetNamespace="http://schemas.microsoft.com/office/2006/metadata/properties" ma:root="true" ma:fieldsID="5147822fdb6803771ba7305cbc438486" ns3:_="" ns4:_="">
     <xsd:import namespace="92e1255f-bb7b-4dc9-b051-584cc104eb44"/>
@@ -27624,89 +27589,78 @@
 </ct:contentTypeSchema>
 </file>
 
+<file path=customXml/item13.xml><?xml version="1.0" encoding="utf-8"?>
+<TemplafySlideTemplateConfiguration><![CDATA[{"documentContentValidatorConfiguration":{"enableDocumentContentValidator":false,"documentContentValidatorVersion":0},"elementsMetadata":[],"slideId":"637171128435180813","enableDocumentContentUpdater":true,"version":"1.9"}]]></TemplafySlideTemplateConfiguration>
+</file>
+
+<file path=customXml/item14.xml><?xml version="1.0" encoding="utf-8"?>
+<TemplafySlideFormConfiguration><![CDATA[{"formFields":[],"formDataEntries":[]}]]></TemplafySlideFormConfiguration>
+</file>
+
+<file path=customXml/item15.xml><?xml version="1.0" encoding="utf-8"?>
+<TemplafySlideTemplateConfiguration><![CDATA[{"elementsMetadata":[],"documentContentValidatorConfiguration":{"enableDocumentContentValidator":false,"documentContentValidatorVersion":0},"slideId":"637027476704980324","enableDocumentContentUpdater":true,"version":"1.9"}]]></TemplafySlideTemplateConfiguration>
+</file>
+
+<file path=customXml/item16.xml><?xml version="1.0" encoding="utf-8"?>
+<?mso-contentType ?>
+<FormTemplates xmlns="http://schemas.microsoft.com/sharepoint/v3/contenttype/forms">
+  <Display>DocumentLibraryForm</Display>
+  <Edit>DocumentLibraryForm</Edit>
+  <New>DocumentLibraryForm</New>
+</FormTemplates>
+</file>
+
+<file path=customXml/item17.xml><?xml version="1.0" encoding="utf-8"?>
+<TemplafySlideFormConfiguration><![CDATA[{"formFields":[],"formDataEntries":[]}]]></TemplafySlideFormConfiguration>
+</file>
+
+<file path=customXml/item18.xml><?xml version="1.0" encoding="utf-8"?>
+<TemplafySlideFormConfiguration><![CDATA[{"formFields":[],"formDataEntries":[]}]]></TemplafySlideFormConfiguration>
+</file>
+
+<file path=customXml/item19.xml><?xml version="1.0" encoding="utf-8"?>
+<TemplafySlideTemplateConfiguration><![CDATA[{"documentContentValidatorConfiguration":{"enableDocumentContentValidator":false,"documentContentValidatorVersion":0},"elementsMetadata":[],"slideId":"637037983905678162","enableDocumentContentUpdater":true,"version":"1.9"}]]></TemplafySlideTemplateConfiguration>
+</file>
+
+<file path=customXml/item2.xml><?xml version="1.0" encoding="utf-8"?>
+<TemplafySlideFormConfiguration><![CDATA[{"formFields":[],"formDataEntries":[]}]]></TemplafySlideFormConfiguration>
+</file>
+
+<file path=customXml/item3.xml><?xml version="1.0" encoding="utf-8"?>
+<TemplafyTemplateConfiguration><![CDATA[{"elementsMetadata":[{"type":"shape","id":"5d67e717-74bf-41a6-8dce-47082e2c1da1","elementConfiguration":{"inheritDimensions":"inheritNone","height":"1.34 cm","binding":"Form.LogoInsertion.Pplogoname","disableUpdates":false,"type":"image"}}],"transformationConfigurations":[{"language":"{{DocumentLanguage}}","disableUpdates":false,"type":"proofingLanguage"},{"propertyName":"FooterText","propertyValue":"true","disableUpdates":false,"type":"customDocumentProperty"},{"propertyName":"SecurityClass","propertyValue":"{{Form.ConfidentialityClass.Confidentiality}}","disableUpdates":false,"type":"customDocumentProperty"},{"propertyName":"ExtConf","propertyValue":"{{Form.ExternalConfidentialityLabel.ExternalConfidentiality}}","disableUpdates":false,"type":"customDocumentProperty"},{"propertyName":"Prepared","propertyValue":"{{Form.Prepared}}","disableUpdates":false,"type":"customDocumentProperty"},{"propertyName":"ApprovedBy","propertyValue":"{{Form.ApprovedBy}}","disableUpdates":false,"type":"customDocumentProperty"},{"propertyName":"DocNo","propertyValue":"{{Form.DocumentNumber}} {{Form.LanguageCode.LanguageCode}}","disableUpdates":false,"type":"customDocumentProperty"},{"propertyName":"Checked","propertyValue":"{{Form.Checked}}","disableUpdates":false,"type":"customDocumentProperty"},{"propertyName":"Date","propertyValue":"{{Form.Date}}","disableUpdates":false,"type":"customDocumentProperty"},{"propertyName":"Reference","propertyValue":"{{Form.Reference}}","disableUpdates":false,"type":"customDocumentProperty"},{"propertyName":"Title","propertyValue":"{{Form.DocumentTitle}}","disableUpdates":false,"type":"customDocumentProperty"},{"propertyName":"Keyword","propertyValue":"{{Form.Keywords}}","disableUpdates":false,"type":"customDocumentProperty"},{"propertyName":"DocumentType","propertyValue":"Presentation2011","disableUpdates":false,"type":"customDocumentProperty"},{"propertyName":"Language","propertyValue":"EnglishUS","disableUpdates":false,"type":"customDocumentProperty"},{"propertyName":"TemplateID","propertyValue":"FALSE","disableUpdates":false,"type":"customDocumentProperty"},{"propertyName":"ConfCtrl","propertyValue":"FALSE","disableUpdates":false,"type":"customDocumentProperty"},{"propertyName":"title","propertyValue":"{{Form.DocumentTitle}}","disableUpdates":false,"type":"documentProperty"},{"propertyName":"keywords","propertyValue":"{{Form.Keywords}}","disableUpdates":false,"type":"documentProperty"},{"propertyName":"creator","propertyValue":"{{Form.Prepared}}","disableUpdates":false,"type":"documentProperty"},{"propertyName":"DocTitle","propertyValue":"{{Form.DocTitle.DocTitle}}","disableUpdates":false,"type":"customDocumentProperty"},{"propertyName":"IsDocument","propertyValue":"{{Form.TemplateType.IsDocument}}","disableUpdates":false,"type":"customDocumentProperty"},{"propertyName":"IsPresentation","propertyValue":"{{Form.TemplateType.IsPresentation}}","disableUpdates":false,"type":"customDocumentProperty"},{"propertyName":"company","propertyValue":"Ericsson","disableUpdates":false,"type":"documentProperty"},{"propertyName":"PageNumberVisible","propertyValue":"{{Form.TotalPageNo.TotalPageNo_value}}","disableUpdates":false,"type":"customDocumentProperty"},{"propertyName":"Revision","propertyValue":"{{Form.Revision}}","disableUpdates":false,"type":"customDocumentProperty"},{"propertyName":"DocType","propertyValue":"{{Form.DocTypePresentation}}","disableUpdates":false,"type":"customDocumentProperty"},{"propertyName":"TemplateVersion","propertyValue":"R2A","disableUpdates":false,"type":"customDocumentProperty"},{"propertyName":"PackageNo","propertyValue":"LXA 119 603","disableUpdates":false,"type":"customDocumentProperty"},{"propertyName":"PackageVersion","propertyValue":"R6B","disableUpdates":false,"type":"customDocumentProperty"},{"propertyName":"TemplateName","propertyValue":"CXC 173 2731/1","disableUpdates":false,"type":"customDocumentProperty"},{"propertyName":"DocName","propertyValue":" ","disableUpdates":false,"type":"customDocumentProperty"},{"propertyName":"description","propertyValue":"{{Form.DocumentNumber}} {{Form.LanguageCode.LanguageCode}}\nRev {{Form.Revision}}","disableUpdates":false,"type":"documentProperty"}],"templateName":"New presentation (Standard landscape)","templateDescription":"","enableDocumentContentUpdater":true,"version":"1.9"}]]></TemplafyTemplateConfiguration>
+</file>
+
+<file path=customXml/item4.xml><?xml version="1.0" encoding="utf-8"?>
+<TemplafySlideTemplateConfiguration><![CDATA[{"documentContentValidatorConfiguration":{"enableDocumentContentValidator":false,"documentContentValidatorVersion":0},"elementsMetadata":[],"slideId":"637050925554934895","enableDocumentContentUpdater":true,"version":"1.9"}]]></TemplafySlideTemplateConfiguration>
+</file>
+
+<file path=customXml/item5.xml><?xml version="1.0" encoding="utf-8"?>
+<TemplafySlideTemplateConfiguration><![CDATA[{"documentContentValidatorConfiguration":{"enableDocumentContentValidator":false,"documentContentValidatorVersion":0},"elementsMetadata":[],"slideId":"637037983905221557","enableDocumentContentUpdater":true,"version":"1.9"}]]></TemplafySlideTemplateConfiguration>
+</file>
+
 <file path=customXml/item6.xml><?xml version="1.0" encoding="utf-8"?>
 <TemplafySlideFormConfiguration><![CDATA[{"formFields":[],"formDataEntries":[]}]]></TemplafySlideFormConfiguration>
 </file>
 
 <file path=customXml/item7.xml><?xml version="1.0" encoding="utf-8"?>
-<TemplafySlideTemplateConfiguration><![CDATA[{"documentContentValidatorConfiguration":{"enableDocumentContentValidator":false,"documentContentValidatorVersion":0},"elementsMetadata":[],"slideId":"637037983905221557","enableDocumentContentUpdater":true,"version":"1.9"}]]></TemplafySlideTemplateConfiguration>
+<TemplafySlideFormConfiguration><![CDATA[{"formFields":[],"formDataEntries":[]}]]></TemplafySlideFormConfiguration>
 </file>
 
 <file path=customXml/item8.xml><?xml version="1.0" encoding="utf-8"?>
-<TemplafySlideTemplateConfiguration><![CDATA[{"documentContentValidatorConfiguration":{"enableDocumentContentValidator":false,"documentContentValidatorVersion":0},"elementsMetadata":[],"slideId":"637050925554934895","enableDocumentContentUpdater":true,"version":"1.9"}]]></TemplafySlideTemplateConfiguration>
+<TemplafySlideTemplateConfiguration><![CDATA[{"documentContentValidatorConfiguration":{"enableDocumentContentValidator":false,"documentContentValidatorVersion":0},"elementsMetadata":[],"slideId":"637171128435648944","enableDocumentContentUpdater":true,"version":"1.9"}]]></TemplafySlideTemplateConfiguration>
 </file>
 
 <file path=customXml/item9.xml><?xml version="1.0" encoding="utf-8"?>
-<TemplafySlideTemplateConfiguration><![CDATA[{"documentContentValidatorConfiguration":{"enableDocumentContentValidator":false,"documentContentValidatorVersion":0},"elementsMetadata":[],"slideId":"637037983905221558","enableDocumentContentUpdater":true,"version":"1.9"}]]></TemplafySlideTemplateConfiguration>
+<TemplafySlideFormConfiguration><![CDATA[{"formFields":[],"formDataEntries":[]}]]></TemplafySlideFormConfiguration>
 </file>
 
 <file path=customXml/itemProps1.xml><?xml version="1.0" encoding="utf-8"?>
-<ds:datastoreItem xmlns:ds="http://schemas.openxmlformats.org/officeDocument/2006/customXml" ds:itemID="{58CC0B31-82B9-497A-9A2E-F3F72D0BBDAD}">
+<ds:datastoreItem xmlns:ds="http://schemas.openxmlformats.org/officeDocument/2006/customXml" ds:itemID="{D92C3DF5-A179-4E2D-BD20-07044B39171F}">
   <ds:schemaRefs/>
 </ds:datastoreItem>
 </file>
 
 <file path=customXml/itemProps10.xml><?xml version="1.0" encoding="utf-8"?>
-<ds:datastoreItem xmlns:ds="http://schemas.openxmlformats.org/officeDocument/2006/customXml" ds:itemID="{07958A4E-FAB1-42E4-B6B5-29B01F63F87B}">
-  <ds:schemaRefs/>
-</ds:datastoreItem>
-</file>
-
-<file path=customXml/itemProps11.xml><?xml version="1.0" encoding="utf-8"?>
-<ds:datastoreItem xmlns:ds="http://schemas.openxmlformats.org/officeDocument/2006/customXml" ds:itemID="{C09F197C-6A49-47D0-B877-F88807989676}">
-  <ds:schemaRefs/>
-</ds:datastoreItem>
-</file>
-
-<file path=customXml/itemProps12.xml><?xml version="1.0" encoding="utf-8"?>
-<ds:datastoreItem xmlns:ds="http://schemas.openxmlformats.org/officeDocument/2006/customXml" ds:itemID="{D92C3DF5-A179-4E2D-BD20-07044B39171F}">
-  <ds:schemaRefs/>
-</ds:datastoreItem>
-</file>
-
-<file path=customXml/itemProps13.xml><?xml version="1.0" encoding="utf-8"?>
-<ds:datastoreItem xmlns:ds="http://schemas.openxmlformats.org/officeDocument/2006/customXml" ds:itemID="{1CE36EA9-2186-4EB1-871A-8AE59C2A13BB}">
-  <ds:schemaRefs/>
-</ds:datastoreItem>
-</file>
-
-<file path=customXml/itemProps14.xml><?xml version="1.0" encoding="utf-8"?>
-<ds:datastoreItem xmlns:ds="http://schemas.openxmlformats.org/officeDocument/2006/customXml" ds:itemID="{D72A95EB-8536-47FD-944A-8DD76726FC96}">
-  <ds:schemaRefs/>
-</ds:datastoreItem>
-</file>
-
-<file path=customXml/itemProps15.xml><?xml version="1.0" encoding="utf-8"?>
-<ds:datastoreItem xmlns:ds="http://schemas.openxmlformats.org/officeDocument/2006/customXml" ds:itemID="{C99E78A0-C9D4-446F-B674-4DD3E2B46C5D}">
-  <ds:schemaRefs/>
-</ds:datastoreItem>
-</file>
-
-<file path=customXml/itemProps16.xml><?xml version="1.0" encoding="utf-8"?>
-<ds:datastoreItem xmlns:ds="http://schemas.openxmlformats.org/officeDocument/2006/customXml" ds:itemID="{C750C5DC-043F-4BD3-940C-EB6F7625E286}">
-  <ds:schemaRefs/>
-</ds:datastoreItem>
-</file>
-
-<file path=customXml/itemProps17.xml><?xml version="1.0" encoding="utf-8"?>
-<ds:datastoreItem xmlns:ds="http://schemas.openxmlformats.org/officeDocument/2006/customXml" ds:itemID="{32BA7684-6BE4-4F73-B22E-30934AB379B8}">
-  <ds:schemaRefs/>
-</ds:datastoreItem>
-</file>
-
-<file path=customXml/itemProps18.xml><?xml version="1.0" encoding="utf-8"?>
-<ds:datastoreItem xmlns:ds="http://schemas.openxmlformats.org/officeDocument/2006/customXml" ds:itemID="{AB2F4486-6448-49E3-8249-BB9C7492711D}">
-  <ds:schemaRefs/>
-</ds:datastoreItem>
-</file>
-
-<file path=customXml/itemProps19.xml><?xml version="1.0" encoding="utf-8"?>
-<ds:datastoreItem xmlns:ds="http://schemas.openxmlformats.org/officeDocument/2006/customXml" ds:itemID="{847502A6-7CBE-43AF-BDF6-4D4423521D8C}">
-  <ds:schemaRefs/>
-</ds:datastoreItem>
-</file>
-
-<file path=customXml/itemProps2.xml><?xml version="1.0" encoding="utf-8"?>
 <ds:datastoreItem xmlns:ds="http://schemas.openxmlformats.org/officeDocument/2006/customXml" ds:itemID="{56F2EE69-0CCA-4F48-BE22-EC4A886C57A7}">
   <ds:schemaRefs>
     <ds:schemaRef ds:uri="http://schemas.microsoft.com/office/infopath/2007/PartnerControls"/>
@@ -27723,21 +27677,13 @@
 </ds:datastoreItem>
 </file>
 
-<file path=customXml/itemProps3.xml><?xml version="1.0" encoding="utf-8"?>
-<ds:datastoreItem xmlns:ds="http://schemas.openxmlformats.org/officeDocument/2006/customXml" ds:itemID="{B9AEDDE3-EA02-4A8F-B8F8-0606A0AA45FC}">
+<file path=customXml/itemProps11.xml><?xml version="1.0" encoding="utf-8"?>
+<ds:datastoreItem xmlns:ds="http://schemas.openxmlformats.org/officeDocument/2006/customXml" ds:itemID="{683FEB75-8CFA-449C-A6B1-B1E4A86A58A1}">
   <ds:schemaRefs/>
 </ds:datastoreItem>
 </file>
 
-<file path=customXml/itemProps4.xml><?xml version="1.0" encoding="utf-8"?>
-<ds:datastoreItem xmlns:ds="http://schemas.openxmlformats.org/officeDocument/2006/customXml" ds:itemID="{F5A7E41D-6E7F-4B05-AFAB-F540BD4C068B}">
-  <ds:schemaRefs>
-    <ds:schemaRef ds:uri="http://schemas.microsoft.com/sharepoint/v3/contenttype/forms"/>
-  </ds:schemaRefs>
-</ds:datastoreItem>
-</file>
-
-<file path=customXml/itemProps5.xml><?xml version="1.0" encoding="utf-8"?>
+<file path=customXml/itemProps12.xml><?xml version="1.0" encoding="utf-8"?>
 <ds:datastoreItem xmlns:ds="http://schemas.openxmlformats.org/officeDocument/2006/customXml" ds:itemID="{058EED06-94C4-4781-888F-0A8BB816BC9F}">
   <ds:schemaRefs>
     <ds:schemaRef ds:uri="http://schemas.microsoft.com/office/2006/metadata/contentType"/>
@@ -27756,26 +27702,94 @@
 </ds:datastoreItem>
 </file>
 
-<file path=customXml/itemProps6.xml><?xml version="1.0" encoding="utf-8"?>
+<file path=customXml/itemProps13.xml><?xml version="1.0" encoding="utf-8"?>
+<ds:datastoreItem xmlns:ds="http://schemas.openxmlformats.org/officeDocument/2006/customXml" ds:itemID="{AB2F4486-6448-49E3-8249-BB9C7492711D}">
+  <ds:schemaRefs/>
+</ds:datastoreItem>
+</file>
+
+<file path=customXml/itemProps14.xml><?xml version="1.0" encoding="utf-8"?>
+<ds:datastoreItem xmlns:ds="http://schemas.openxmlformats.org/officeDocument/2006/customXml" ds:itemID="{32BA7684-6BE4-4F73-B22E-30934AB379B8}">
+  <ds:schemaRefs/>
+</ds:datastoreItem>
+</file>
+
+<file path=customXml/itemProps15.xml><?xml version="1.0" encoding="utf-8"?>
+<ds:datastoreItem xmlns:ds="http://schemas.openxmlformats.org/officeDocument/2006/customXml" ds:itemID="{C09F197C-6A49-47D0-B877-F88807989676}">
+  <ds:schemaRefs/>
+</ds:datastoreItem>
+</file>
+
+<file path=customXml/itemProps16.xml><?xml version="1.0" encoding="utf-8"?>
+<ds:datastoreItem xmlns:ds="http://schemas.openxmlformats.org/officeDocument/2006/customXml" ds:itemID="{F5A7E41D-6E7F-4B05-AFAB-F540BD4C068B}">
+  <ds:schemaRefs>
+    <ds:schemaRef ds:uri="http://schemas.microsoft.com/sharepoint/v3/contenttype/forms"/>
+  </ds:schemaRefs>
+</ds:datastoreItem>
+</file>
+
+<file path=customXml/itemProps17.xml><?xml version="1.0" encoding="utf-8"?>
 <ds:datastoreItem xmlns:ds="http://schemas.openxmlformats.org/officeDocument/2006/customXml" ds:itemID="{822D38AD-8010-4CD3-BD6B-117CB8DF70A4}">
   <ds:schemaRefs/>
 </ds:datastoreItem>
 </file>
 
-<file path=customXml/itemProps7.xml><?xml version="1.0" encoding="utf-8"?>
+<file path=customXml/itemProps18.xml><?xml version="1.0" encoding="utf-8"?>
+<ds:datastoreItem xmlns:ds="http://schemas.openxmlformats.org/officeDocument/2006/customXml" ds:itemID="{847502A6-7CBE-43AF-BDF6-4D4423521D8C}">
+  <ds:schemaRefs/>
+</ds:datastoreItem>
+</file>
+
+<file path=customXml/itemProps19.xml><?xml version="1.0" encoding="utf-8"?>
+<ds:datastoreItem xmlns:ds="http://schemas.openxmlformats.org/officeDocument/2006/customXml" ds:itemID="{1CE36EA9-2186-4EB1-871A-8AE59C2A13BB}">
+  <ds:schemaRefs/>
+</ds:datastoreItem>
+</file>
+
+<file path=customXml/itemProps2.xml><?xml version="1.0" encoding="utf-8"?>
+<ds:datastoreItem xmlns:ds="http://schemas.openxmlformats.org/officeDocument/2006/customXml" ds:itemID="{58CC0B31-82B9-497A-9A2E-F3F72D0BBDAD}">
+  <ds:schemaRefs/>
+</ds:datastoreItem>
+</file>
+
+<file path=customXml/itemProps3.xml><?xml version="1.0" encoding="utf-8"?>
+<ds:datastoreItem xmlns:ds="http://schemas.openxmlformats.org/officeDocument/2006/customXml" ds:itemID="{07958A4E-FAB1-42E4-B6B5-29B01F63F87B}">
+  <ds:schemaRefs/>
+</ds:datastoreItem>
+</file>
+
+<file path=customXml/itemProps4.xml><?xml version="1.0" encoding="utf-8"?>
+<ds:datastoreItem xmlns:ds="http://schemas.openxmlformats.org/officeDocument/2006/customXml" ds:itemID="{03AF3FDC-ACD1-46F3-A43E-782322DF9816}">
+  <ds:schemaRefs/>
+</ds:datastoreItem>
+</file>
+
+<file path=customXml/itemProps5.xml><?xml version="1.0" encoding="utf-8"?>
 <ds:datastoreItem xmlns:ds="http://schemas.openxmlformats.org/officeDocument/2006/customXml" ds:itemID="{72516535-7702-46AF-9B1F-8623A67A824E}">
   <ds:schemaRefs/>
 </ds:datastoreItem>
 </file>
 
+<file path=customXml/itemProps6.xml><?xml version="1.0" encoding="utf-8"?>
+<ds:datastoreItem xmlns:ds="http://schemas.openxmlformats.org/officeDocument/2006/customXml" ds:itemID="{D72A95EB-8536-47FD-944A-8DD76726FC96}">
+  <ds:schemaRefs/>
+</ds:datastoreItem>
+</file>
+
+<file path=customXml/itemProps7.xml><?xml version="1.0" encoding="utf-8"?>
+<ds:datastoreItem xmlns:ds="http://schemas.openxmlformats.org/officeDocument/2006/customXml" ds:itemID="{B9AEDDE3-EA02-4A8F-B8F8-0606A0AA45FC}">
+  <ds:schemaRefs/>
+</ds:datastoreItem>
+</file>
+
 <file path=customXml/itemProps8.xml><?xml version="1.0" encoding="utf-8"?>
-<ds:datastoreItem xmlns:ds="http://schemas.openxmlformats.org/officeDocument/2006/customXml" ds:itemID="{03AF3FDC-ACD1-46F3-A43E-782322DF9816}">
+<ds:datastoreItem xmlns:ds="http://schemas.openxmlformats.org/officeDocument/2006/customXml" ds:itemID="{C750C5DC-043F-4BD3-940C-EB6F7625E286}">
   <ds:schemaRefs/>
 </ds:datastoreItem>
 </file>
 
 <file path=customXml/itemProps9.xml><?xml version="1.0" encoding="utf-8"?>
-<ds:datastoreItem xmlns:ds="http://schemas.openxmlformats.org/officeDocument/2006/customXml" ds:itemID="{683FEB75-8CFA-449C-A6B1-B1E4A86A58A1}">
+<ds:datastoreItem xmlns:ds="http://schemas.openxmlformats.org/officeDocument/2006/customXml" ds:itemID="{C99E78A0-C9D4-446F-B674-4DD3E2B46C5D}">
   <ds:schemaRefs/>
 </ds:datastoreItem>
 </file>
</xml_diff>

<commit_message>
Update with new options and more items in logfile
</commit_message>
<xml_diff>
--- a/code/bw-test-tool/SCReAM-BW-test-tool.pptx
+++ b/code/bw-test-tool/SCReAM-BW-test-tool.pptx
@@ -32,24 +32,20 @@
   <p:notesSz cx="6858000" cy="9144000"/>
   <p:embeddedFontLst>
     <p:embeddedFont>
-      <p:font typeface="Ericsson Capital TT" panose="02000503000000020004" pitchFamily="2" charset="0"/>
+      <p:font typeface="Ericsson Hilda" panose="00000500000000000000" pitchFamily="2" charset="0"/>
       <p:regular r:id="rId39"/>
-    </p:embeddedFont>
-    <p:embeddedFont>
-      <p:font typeface="Ericsson Hilda" panose="00000500000000000000" pitchFamily="2" charset="0"/>
-      <p:regular r:id="rId40"/>
-      <p:bold r:id="rId41"/>
+      <p:bold r:id="rId40"/>
     </p:embeddedFont>
     <p:embeddedFont>
       <p:font typeface="Ericsson Hilda Light" panose="00000400000000000000" pitchFamily="2" charset="0"/>
-      <p:regular r:id="rId42"/>
+      <p:regular r:id="rId41"/>
     </p:embeddedFont>
     <p:embeddedFont>
       <p:font typeface="Ericsson Technical Icons" panose="00000500000000000000" pitchFamily="2" charset="0"/>
-      <p:regular r:id="rId43"/>
-      <p:bold r:id="rId44"/>
-      <p:italic r:id="rId45"/>
-      <p:boldItalic r:id="rId46"/>
+      <p:regular r:id="rId42"/>
+      <p:bold r:id="rId43"/>
+      <p:italic r:id="rId44"/>
+      <p:boldItalic r:id="rId45"/>
     </p:embeddedFont>
   </p:embeddedFontLst>
   <p:defaultTextStyle>
@@ -2666,7 +2662,7 @@
               </a:rPr>
               <a:t>  |  2020-03-20  |  Public  |  Page </a:t>
             </a:r>
-            <a:fld id="{96E77C6B-F8FF-4B10-860B-E8B52BFB432C}" type="slidenum">
+            <a:fld id="{39E92338-C324-4C81-94F8-2CA2D063B9B8}" type="slidenum">
               <a:rPr lang="en-US" sz="800" b="0" i="0" u="none" smtClean="0">
                 <a:solidFill>
                   <a:srgbClr val="1A1816"/>
@@ -3171,7 +3167,7 @@
               </a:rPr>
               <a:t>  |  2020-03-20  |  Public  |  Page </a:t>
             </a:r>
-            <a:fld id="{1D1B292E-6168-469C-91C5-5CD8B88AE4AA}" type="slidenum">
+            <a:fld id="{5B37E778-21B6-49C6-B60A-A6F5DFC0B481}" type="slidenum">
               <a:rPr lang="en-US" sz="800" b="0" i="0" u="none" smtClean="0">
                 <a:solidFill>
                   <a:schemeClr val="bg1"/>
@@ -3484,7 +3480,7 @@
               </a:rPr>
               <a:t>  |  2020-03-20  |  Public  |  Page </a:t>
             </a:r>
-            <a:fld id="{767217F8-4DFD-49C5-8637-927F758C4BDD}" type="slidenum">
+            <a:fld id="{ED27C954-40E4-4E37-8ED7-2632636BA1C1}" type="slidenum">
               <a:rPr lang="en-US" sz="800" b="0" i="0" u="none" smtClean="0">
                 <a:solidFill>
                   <a:srgbClr val="1A1816"/>
@@ -3717,7 +3713,7 @@
               </a:rPr>
               <a:t>  |  2020-03-20  |  Public  |  Page </a:t>
             </a:r>
-            <a:fld id="{30E9E781-322E-424C-8069-7E0E2DD0D80A}" type="slidenum">
+            <a:fld id="{41F88A6D-27F0-486C-B21A-6FE59F5541CE}" type="slidenum">
               <a:rPr lang="en-US" sz="800" b="0" i="0" u="none" smtClean="0">
                 <a:solidFill>
                   <a:srgbClr val="1A1816"/>
@@ -3877,7 +3873,7 @@
               </a:rPr>
               <a:t>  |  2020-03-20  |  Public  |  Page </a:t>
             </a:r>
-            <a:fld id="{3DC9F8EC-A7E7-4AF8-B5DA-71072059E3C3}" type="slidenum">
+            <a:fld id="{52214FB1-6AE5-4F91-B970-1DB3C9278A5C}" type="slidenum">
               <a:rPr lang="en-US" sz="800" b="0" i="0" u="none" smtClean="0">
                 <a:solidFill>
                   <a:srgbClr val="1A1816"/>
@@ -4083,7 +4079,7 @@
               </a:rPr>
               <a:t>  |  2020-03-20  |  Public  |  Page </a:t>
             </a:r>
-            <a:fld id="{C36B0B55-6036-48AF-B8BF-8E92517F13E0}" type="slidenum">
+            <a:fld id="{6C01A206-C6C7-4463-93BC-D2ED5AB9C94D}" type="slidenum">
               <a:rPr lang="en-US" sz="800" b="0" i="0" u="none" smtClean="0">
                 <a:solidFill>
                   <a:srgbClr val="1A1816"/>
@@ -4381,7 +4377,7 @@
               </a:rPr>
               <a:t>  |  2020-03-20  |  Public  |  Page </a:t>
             </a:r>
-            <a:fld id="{51BCFF8B-0F81-49C2-9CFE-10FE6C5A3D0F}" type="slidenum">
+            <a:fld id="{3A13A736-D9A4-4C56-B850-F9B04B57F90A}" type="slidenum">
               <a:rPr lang="en-US" sz="800" b="0" i="0" u="none" smtClean="0">
                 <a:solidFill>
                   <a:schemeClr val="bg1"/>
@@ -4679,7 +4675,7 @@
               </a:rPr>
               <a:t>  |  2020-03-20  |  Public  |  Page </a:t>
             </a:r>
-            <a:fld id="{5D917DBE-F3E9-4FF4-916F-93A0F53ED8A3}" type="slidenum">
+            <a:fld id="{EB54737B-D178-4527-86D7-43303BABC163}" type="slidenum">
               <a:rPr lang="en-US" sz="800" b="0" i="0" u="none" smtClean="0">
                 <a:solidFill>
                   <a:schemeClr val="bg1"/>
@@ -4977,7 +4973,7 @@
               </a:rPr>
               <a:t>  |  2020-03-20  |  Public  |  Page </a:t>
             </a:r>
-            <a:fld id="{276ADFA5-8ED2-4EE1-B13B-1226084FF04D}" type="slidenum">
+            <a:fld id="{8BB33304-0DBE-4E38-9BAD-1D891B30FB09}" type="slidenum">
               <a:rPr lang="en-US" sz="800" b="0" i="0" u="none" smtClean="0">
                 <a:solidFill>
                   <a:schemeClr val="bg1"/>
@@ -5275,7 +5271,7 @@
               </a:rPr>
               <a:t>  |  2020-03-20  |  Public  |  Page </a:t>
             </a:r>
-            <a:fld id="{CB9AF568-03D2-41E4-BF5E-9214904E36CC}" type="slidenum">
+            <a:fld id="{EBD2C42C-BAF8-46A0-87B7-B60B4678CD10}" type="slidenum">
               <a:rPr lang="en-US" sz="800" b="0" i="0" u="none" smtClean="0">
                 <a:solidFill>
                   <a:schemeClr val="bg1"/>
@@ -5573,7 +5569,7 @@
               </a:rPr>
               <a:t>  |  2020-03-20  |  Public  |  Page </a:t>
             </a:r>
-            <a:fld id="{97670298-4A07-4A1D-9C9C-B331BCD695E4}" type="slidenum">
+            <a:fld id="{49D26BE7-11BB-4328-AC64-389331579213}" type="slidenum">
               <a:rPr lang="en-US" sz="800" b="0" i="0" u="none" smtClean="0">
                 <a:solidFill>
                   <a:schemeClr val="bg1"/>
@@ -6087,7 +6083,7 @@
               </a:rPr>
               <a:t>  |  2020-03-20  |  Public  |  Page </a:t>
             </a:r>
-            <a:fld id="{8BC8CC82-3B07-4F44-84F8-9C0D95A64019}" type="slidenum">
+            <a:fld id="{C9E2DE48-D800-475D-AA95-C213FEEDEA5E}" type="slidenum">
               <a:rPr lang="en-US" sz="800" b="0" i="0" u="none" smtClean="0">
                 <a:solidFill>
                   <a:schemeClr val="bg1"/>
@@ -6391,7 +6387,7 @@
               </a:rPr>
               <a:t>  |  2020-03-20  |  Public  |  Page </a:t>
             </a:r>
-            <a:fld id="{2AC1BA8E-5EED-4D07-BE02-E201D4093831}" type="slidenum">
+            <a:fld id="{A5DBBA94-F79B-49BF-838A-C19DA377B22D}" type="slidenum">
               <a:rPr lang="en-US" sz="800" b="0" i="0" u="none" smtClean="0">
                 <a:solidFill>
                   <a:schemeClr val="bg1"/>
@@ -6689,7 +6685,7 @@
               </a:rPr>
               <a:t>  |  2020-03-20  |  Public  |  Page </a:t>
             </a:r>
-            <a:fld id="{B36D4AA4-5EAD-4BAC-A74B-6180125CE069}" type="slidenum">
+            <a:fld id="{FE6CA46B-A760-421E-95E8-9930DE2B792C}" type="slidenum">
               <a:rPr lang="en-US" sz="800" b="0" i="0" u="none" smtClean="0">
                 <a:solidFill>
                   <a:schemeClr val="bg1"/>
@@ -6976,7 +6972,7 @@
               </a:rPr>
               <a:t>  |  2020-03-20  |  Public  |  Page </a:t>
             </a:r>
-            <a:fld id="{E67E360C-9699-48FD-A339-AD2ADB4F75DF}" type="slidenum">
+            <a:fld id="{6B2AE526-F1A2-4DB0-8594-AB79A30AEDF4}" type="slidenum">
               <a:rPr lang="en-US" sz="800" b="0" i="0" u="none" smtClean="0">
                 <a:solidFill>
                   <a:srgbClr val="1A1816"/>
@@ -7263,7 +7259,7 @@
               </a:rPr>
               <a:t>  |  2020-03-20  |  Public  |  Page </a:t>
             </a:r>
-            <a:fld id="{43E26C7F-384A-41B0-BE70-128119ED4F65}" type="slidenum">
+            <a:fld id="{F0BC7A93-7C27-454B-A1A1-B56DFF9D9083}" type="slidenum">
               <a:rPr lang="en-US" sz="800" b="0" i="0" u="none" smtClean="0">
                 <a:solidFill>
                   <a:srgbClr val="1A1816"/>
@@ -7556,7 +7552,7 @@
               </a:rPr>
               <a:t>  |  2020-03-20  |  Public  |  Page </a:t>
             </a:r>
-            <a:fld id="{C0DA032F-000D-47BC-8995-4AC3F325806F}" type="slidenum">
+            <a:fld id="{B2564BE6-FCE9-4959-B1AD-A1B0538CADA0}" type="slidenum">
               <a:rPr lang="en-US" sz="800" b="0" i="0" u="none" smtClean="0">
                 <a:solidFill>
                   <a:srgbClr val="1A1816"/>
@@ -7843,7 +7839,7 @@
               </a:rPr>
               <a:t>  |  2020-03-20  |  Public  |  Page </a:t>
             </a:r>
-            <a:fld id="{A250C3FD-7353-49A1-B4E6-3A6E0EAF81B6}" type="slidenum">
+            <a:fld id="{02C4714F-AD91-4185-A52A-332D9AF7E4A8}" type="slidenum">
               <a:rPr lang="en-US" sz="800" b="0" i="0" u="none" smtClean="0">
                 <a:solidFill>
                   <a:srgbClr val="1A1816"/>
@@ -8165,7 +8161,7 @@
               </a:rPr>
               <a:t>  |  2020-03-20  |  Public  |  Page </a:t>
             </a:r>
-            <a:fld id="{7443D054-7406-4100-B8DF-E3CAB2806C71}" type="slidenum">
+            <a:fld id="{54B536FD-4813-4E35-9DC6-2DF53D3945D6}" type="slidenum">
               <a:rPr lang="en-US" sz="800" b="0" i="0" u="none" smtClean="0">
                 <a:solidFill>
                   <a:srgbClr val="1A1816"/>
@@ -8452,7 +8448,7 @@
               </a:rPr>
               <a:t>  |  2020-03-20  |  Public  |  Page </a:t>
             </a:r>
-            <a:fld id="{752F03D2-70BB-433B-B28A-7F09316F4CA0}" type="slidenum">
+            <a:fld id="{7855FBC2-31B1-48A2-B710-DEAC3E61E475}" type="slidenum">
               <a:rPr lang="en-US" sz="800" b="0" i="0" u="none" smtClean="0">
                 <a:solidFill>
                   <a:srgbClr val="1A1816"/>
@@ -8774,7 +8770,7 @@
               </a:rPr>
               <a:t>  |  2020-03-20  |  Public  |  Page </a:t>
             </a:r>
-            <a:fld id="{C965D537-7971-49BB-A942-0EBB9C9ADF5C}" type="slidenum">
+            <a:fld id="{C7D36A9A-BF73-41A9-BCAE-C76191A846AE}" type="slidenum">
               <a:rPr lang="en-US" sz="800" b="0" i="0" u="none" smtClean="0">
                 <a:solidFill>
                   <a:srgbClr val="1A1816"/>
@@ -9136,7 +9132,7 @@
               </a:rPr>
               <a:t>  |  2020-03-20  |  Public  |  Page </a:t>
             </a:r>
-            <a:fld id="{625DB15F-3B64-48CE-A334-F0C6E6172143}" type="slidenum">
+            <a:fld id="{23A6A158-56A6-4427-8CFC-4F2A10E35846}" type="slidenum">
               <a:rPr lang="en-US" sz="800" b="0" i="0" u="none" smtClean="0">
                 <a:solidFill>
                   <a:srgbClr val="1A1816"/>
@@ -9478,7 +9474,7 @@
               </a:rPr>
               <a:t>  |  2020-03-20  |  Public  |  Page </a:t>
             </a:r>
-            <a:fld id="{A04CE7EB-6CC6-4B2F-BC7A-9F7B69526D57}" type="slidenum">
+            <a:fld id="{29781648-0B66-4F06-A9D8-6DD6F603EEF9}" type="slidenum">
               <a:rPr lang="en-US" sz="800" b="0" i="0" u="none" smtClean="0">
                 <a:solidFill>
                   <a:srgbClr val="1A1816"/>
@@ -9827,7 +9823,7 @@
               </a:rPr>
               <a:t>  |  2020-03-20  |  Public  |  Page </a:t>
             </a:r>
-            <a:fld id="{5A020A79-5434-4404-8010-B8D95B5B4483}" type="slidenum">
+            <a:fld id="{70CE9081-90A4-4DD4-B6AC-66886E78BE93}" type="slidenum">
               <a:rPr lang="en-US" sz="800" b="0" i="0" u="none" smtClean="0">
                 <a:solidFill>
                   <a:srgbClr val="1A1816"/>
@@ -10189,7 +10185,7 @@
               </a:rPr>
               <a:t>  |  2020-03-20  |  Public  |  Page </a:t>
             </a:r>
-            <a:fld id="{F6F7696E-FD2F-49E8-BC59-265CACA30A6D}" type="slidenum">
+            <a:fld id="{E06A7B12-0BD2-4088-B566-E0D13E9EA390}" type="slidenum">
               <a:rPr lang="en-US" sz="800" b="0" i="0" u="none" smtClean="0">
                 <a:solidFill>
                   <a:srgbClr val="1A1816"/>
@@ -10551,7 +10547,7 @@
               </a:rPr>
               <a:t>  |  2020-03-20  |  Public  |  Page </a:t>
             </a:r>
-            <a:fld id="{1663ED97-F8EF-4FFD-AD49-24BDA8C58BA2}" type="slidenum">
+            <a:fld id="{28B6B1BA-F683-4728-943E-58D7D38141FB}" type="slidenum">
               <a:rPr lang="en-US" sz="800" b="0" i="0" u="none" smtClean="0">
                 <a:solidFill>
                   <a:srgbClr val="1A1816"/>
@@ -10913,7 +10909,7 @@
               </a:rPr>
               <a:t>  |  2020-03-20  |  Public  |  Page </a:t>
             </a:r>
-            <a:fld id="{4D9F9C25-BED6-4B2F-A7C6-C52D8B9F776F}" type="slidenum">
+            <a:fld id="{318FDF0A-3204-42DA-A7C5-9380397862AF}" type="slidenum">
               <a:rPr lang="en-US" sz="800" b="0" i="0" u="none" smtClean="0">
                 <a:solidFill>
                   <a:srgbClr val="1A1816"/>
@@ -11275,7 +11271,7 @@
               </a:rPr>
               <a:t>  |  2020-03-20  |  Public  |  Page </a:t>
             </a:r>
-            <a:fld id="{422B57C6-33E2-4E42-B295-0CAA23287D83}" type="slidenum">
+            <a:fld id="{5724BD58-E674-4C98-9D36-B0F8B34A51DE}" type="slidenum">
               <a:rPr lang="en-US" sz="800" b="0" i="0" u="none" smtClean="0">
                 <a:solidFill>
                   <a:srgbClr val="1A1816"/>
@@ -11697,7 +11693,7 @@
               </a:rPr>
               <a:t>  |  2020-03-20  |  Public  |  Page </a:t>
             </a:r>
-            <a:fld id="{E1694706-14CA-46FC-BF98-4477B7C76D1D}" type="slidenum">
+            <a:fld id="{F78AF158-FF51-4764-B7C5-C2DAAC01C176}" type="slidenum">
               <a:rPr lang="en-US" sz="800" b="0" i="0" u="none" smtClean="0">
                 <a:solidFill>
                   <a:srgbClr val="1A1816"/>
@@ -12113,7 +12109,7 @@
               </a:rPr>
               <a:t>  |  2020-03-20  |  Public  |  Page </a:t>
             </a:r>
-            <a:fld id="{C6923F99-0DE8-4995-9866-158394E78412}" type="slidenum">
+            <a:fld id="{5D6D2E9A-93EF-4A61-9904-F27BBA40DC6E}" type="slidenum">
               <a:rPr lang="en-US" sz="800" b="0" i="0" u="none" smtClean="0">
                 <a:solidFill>
                   <a:srgbClr val="1A1816"/>
@@ -12588,7 +12584,7 @@
               </a:rPr>
               <a:t>  |  2020-03-20  |  Public  |  Page </a:t>
             </a:r>
-            <a:fld id="{1D3EB680-CD1F-4C85-BE15-D84E18737CA2}" type="slidenum">
+            <a:fld id="{6D1CE4E1-C90F-4BCF-A457-FB5E69181E27}" type="slidenum">
               <a:rPr lang="en-US" sz="800" b="0" i="0" u="none" smtClean="0">
                 <a:solidFill>
                   <a:srgbClr val="1A1816"/>
@@ -13083,7 +13079,7 @@
               </a:rPr>
               <a:t>  |  2020-03-20  |  Public  |  Page </a:t>
             </a:r>
-            <a:fld id="{06C87DE7-0D0E-4174-8E41-E12F1FAA7A0F}" type="slidenum">
+            <a:fld id="{56827846-C9AE-42F4-8FA2-090DC13D363F}" type="slidenum">
               <a:rPr lang="en-US" sz="800" b="0" i="0" u="none" smtClean="0">
                 <a:solidFill>
                   <a:srgbClr val="1A1816"/>
@@ -13539,7 +13535,7 @@
               </a:rPr>
               <a:t>  |  2020-03-20  |  Public  |  Page </a:t>
             </a:r>
-            <a:fld id="{CAC891B0-1BBF-49D2-820F-72D03ECF34C4}" type="slidenum">
+            <a:fld id="{3B7D08E7-EF51-4CFD-92E5-F912BF71EAD8}" type="slidenum">
               <a:rPr lang="en-US" sz="800" b="0" i="0" u="none" smtClean="0">
                 <a:solidFill>
                   <a:srgbClr val="1A1816"/>
@@ -13927,7 +13923,7 @@
               </a:rPr>
               <a:t>  |  2020-03-20  |  Public  |  Page </a:t>
             </a:r>
-            <a:fld id="{BBB05478-8C19-43D0-8DF6-55739792671A}" type="slidenum">
+            <a:fld id="{FEA3F5F0-7EDE-45B6-AB6C-878FAA5CFC7E}" type="slidenum">
               <a:rPr lang="en-US" sz="800" b="0" i="0" u="none" smtClean="0">
                 <a:solidFill>
                   <a:schemeClr val="bg1"/>
@@ -14446,7 +14442,7 @@
               </a:rPr>
               <a:t>  |  2020-03-20  |  Public  |  Page </a:t>
             </a:r>
-            <a:fld id="{A516671E-4743-4D7C-BBB6-7D32B26F53CE}" type="slidenum">
+            <a:fld id="{56A8351E-EAD5-4F68-8E42-57F45591393F}" type="slidenum">
               <a:rPr lang="en-US" sz="800" b="0" i="0" u="none" smtClean="0">
                 <a:solidFill>
                   <a:srgbClr val="1A1816"/>
@@ -15155,7 +15151,7 @@
               </a:rPr>
               <a:t>  |  2020-03-20  |  Public  |  Page </a:t>
             </a:r>
-            <a:fld id="{FE04AFF0-5151-4190-855B-02E873E52333}" type="slidenum">
+            <a:fld id="{910AF893-5891-42B7-9202-940777E46C8C}" type="slidenum">
               <a:rPr lang="en-US" sz="800" b="0" i="0" u="none" smtClean="0">
                 <a:solidFill>
                   <a:srgbClr val="1A1816"/>
@@ -16634,7 +16630,7 @@
               </a:rPr>
               <a:t>  |  2020-03-20  |  Public  |  Page </a:t>
             </a:r>
-            <a:fld id="{926F6D38-3AE5-46AD-A56B-7FC334A47411}" type="slidenum">
+            <a:fld id="{F0FD93D1-0241-41A2-9FDA-04AF64A82EF4}" type="slidenum">
               <a:rPr lang="en-US" sz="800" b="0" i="0" u="none" smtClean="0">
                 <a:solidFill>
                   <a:schemeClr val="bg1"/>
@@ -17146,7 +17142,7 @@
               </a:rPr>
               <a:t>  |  2020-03-20  |  Public  |  Page </a:t>
             </a:r>
-            <a:fld id="{80CFD00F-84EA-4A7C-A0CC-57A672CF8B0C}" type="slidenum">
+            <a:fld id="{66E8DEAC-E6CB-4D33-A352-C2A5F1CFEB0B}" type="slidenum">
               <a:rPr lang="en-US" sz="800" b="0" i="0" u="none" smtClean="0">
                 <a:solidFill>
                   <a:schemeClr val="bg1"/>
@@ -17541,7 +17537,7 @@
               </a:rPr>
               <a:t>  |  2020-03-20  |  Public  |  Page </a:t>
             </a:r>
-            <a:fld id="{F21DDB61-407F-46BA-80FE-4B63B30B6E50}" type="slidenum">
+            <a:fld id="{A3A35EFD-BC7F-4BA9-B2A5-C16102A662A2}" type="slidenum">
               <a:rPr lang="en-US" sz="800" b="0" i="0" u="none" smtClean="0">
                 <a:solidFill>
                   <a:schemeClr val="bg1"/>
@@ -18041,7 +18037,7 @@
               </a:rPr>
               <a:t>  |  2020-03-20  |  Public  |  Page </a:t>
             </a:r>
-            <a:fld id="{1D82B79A-8F0E-4BDF-9A77-6901FAA86EC1}" type="slidenum">
+            <a:fld id="{60AC2EDC-8FB9-49E3-970E-F125B7907A71}" type="slidenum">
               <a:rPr lang="en-US" sz="800" b="0" i="0" u="none" smtClean="0">
                 <a:solidFill>
                   <a:schemeClr val="bg1"/>
@@ -18541,7 +18537,7 @@
               </a:rPr>
               <a:t>  |  2020-03-20  |  Public  |  Page </a:t>
             </a:r>
-            <a:fld id="{14AB3056-61DF-41CB-8A67-139555F277A2}" type="slidenum">
+            <a:fld id="{8075F076-C55D-4C7F-95E2-7CF164DB305A}" type="slidenum">
               <a:rPr lang="en-US" sz="800" b="0" i="0" u="none" smtClean="0">
                 <a:solidFill>
                   <a:schemeClr val="bg1"/>
@@ -19550,7 +19546,7 @@
             </a:br>
             <a:r>
               <a:rPr lang="en-US" sz="5400" dirty="0"/>
-              <a:t>2020-05-13</a:t>
+              <a:t>2020-05-27</a:t>
             </a:r>
           </a:p>
         </p:txBody>
@@ -20126,7 +20122,7 @@
         </p:nvSpPr>
         <p:spPr>
           <a:xfrm>
-            <a:off x="479425" y="1378146"/>
+            <a:off x="479425" y="1176268"/>
             <a:ext cx="5472113" cy="4392613"/>
           </a:xfrm>
         </p:spPr>
@@ -20161,170 +20157,242 @@
             </a:r>
           </a:p>
           <a:p>
-            <a:pPr marL="812800" lvl="1" indent="-457200">
+            <a:pPr marL="706500" lvl="2" indent="-342900">
+              <a:spcBef>
+                <a:spcPts val="0"/>
+              </a:spcBef>
               <a:buFont typeface="+mj-lt"/>
               <a:buAutoNum type="arabicPeriod"/>
             </a:pPr>
             <a:r>
-              <a:rPr lang="en-US" sz="1200" dirty="0"/>
-              <a:t>Time [s]</a:t>
-            </a:r>
-          </a:p>
-          <a:p>
-            <a:pPr marL="812800" lvl="1" indent="-457200">
+              <a:rPr lang="en-US" sz="1000" dirty="0"/>
+              <a:t>Time [s] </a:t>
+            </a:r>
+          </a:p>
+          <a:p>
+            <a:pPr marL="706500" lvl="2" indent="-342900">
+              <a:spcBef>
+                <a:spcPts val="0"/>
+              </a:spcBef>
               <a:buFont typeface="+mj-lt"/>
               <a:buAutoNum type="arabicPeriod"/>
             </a:pPr>
             <a:r>
-              <a:rPr lang="en-US" sz="1200" dirty="0"/>
-              <a:t>Estimated queue delay [s]</a:t>
-            </a:r>
-          </a:p>
-          <a:p>
-            <a:pPr marL="812800" lvl="1" indent="-457200">
+              <a:rPr lang="en-US" sz="1000" dirty="0"/>
+              <a:t>Estimated queue delay [s] </a:t>
+            </a:r>
+          </a:p>
+          <a:p>
+            <a:pPr marL="706500" lvl="2" indent="-342900">
+              <a:spcBef>
+                <a:spcPts val="0"/>
+              </a:spcBef>
               <a:buFont typeface="+mj-lt"/>
               <a:buAutoNum type="arabicPeriod"/>
             </a:pPr>
             <a:r>
-              <a:rPr lang="en-US" sz="1200" dirty="0"/>
-              <a:t>RTT [s]</a:t>
-            </a:r>
-          </a:p>
-          <a:p>
-            <a:pPr marL="812800" lvl="1" indent="-457200">
+              <a:rPr lang="en-US" sz="1000" dirty="0"/>
+              <a:t>RTT [s] </a:t>
+            </a:r>
+          </a:p>
+          <a:p>
+            <a:pPr marL="706500" lvl="2" indent="-342900">
+              <a:spcBef>
+                <a:spcPts val="0"/>
+              </a:spcBef>
               <a:buFont typeface="+mj-lt"/>
               <a:buAutoNum type="arabicPeriod"/>
             </a:pPr>
             <a:r>
-              <a:rPr lang="en-US" sz="1200" dirty="0"/>
-              <a:t>Congestion window [byte]</a:t>
-            </a:r>
-          </a:p>
-          <a:p>
-            <a:pPr marL="812800" lvl="1" indent="-457200">
+              <a:rPr lang="en-US" sz="1000" dirty="0"/>
+              <a:t>Congestion window [byte] </a:t>
+            </a:r>
+          </a:p>
+          <a:p>
+            <a:pPr marL="706500" lvl="2" indent="-342900">
+              <a:spcBef>
+                <a:spcPts val="0"/>
+              </a:spcBef>
               <a:buFont typeface="+mj-lt"/>
               <a:buAutoNum type="arabicPeriod"/>
             </a:pPr>
             <a:r>
-              <a:rPr lang="en-US" sz="1200" dirty="0"/>
-              <a:t>Bytes in flight [byte]</a:t>
-            </a:r>
-          </a:p>
-          <a:p>
-            <a:pPr marL="812800" lvl="1" indent="-457200">
+              <a:rPr lang="en-US" sz="1000" dirty="0"/>
+              <a:t>Bytes in flight [byte] </a:t>
+            </a:r>
+          </a:p>
+          <a:p>
+            <a:pPr marL="706500" lvl="2" indent="-342900">
+              <a:spcBef>
+                <a:spcPts val="0"/>
+              </a:spcBef>
               <a:buFont typeface="+mj-lt"/>
               <a:buAutoNum type="arabicPeriod"/>
             </a:pPr>
             <a:r>
-              <a:rPr lang="en-US" sz="1200" dirty="0"/>
-              <a:t>Total transmit bitrate [bps]</a:t>
-            </a:r>
-          </a:p>
-          <a:p>
-            <a:pPr marL="812800" lvl="1" indent="-457200">
+              <a:rPr lang="en-US" sz="1000" dirty="0"/>
+              <a:t>Fast increase mode</a:t>
+            </a:r>
+          </a:p>
+          <a:p>
+            <a:pPr marL="706500" lvl="2" indent="-342900">
+              <a:spcBef>
+                <a:spcPts val="0"/>
+              </a:spcBef>
               <a:buFont typeface="+mj-lt"/>
               <a:buAutoNum type="arabicPeriod"/>
             </a:pPr>
             <a:r>
-              <a:rPr lang="en-US" sz="1200" dirty="0"/>
-              <a:t>Stream ID</a:t>
-            </a:r>
-          </a:p>
-          <a:p>
-            <a:pPr marL="812800" lvl="1" indent="-457200">
+              <a:rPr lang="en-US" sz="1000" dirty="0"/>
+              <a:t>Total transmit bitrate [bps] </a:t>
+            </a:r>
+          </a:p>
+          <a:p>
+            <a:pPr marL="706500" lvl="2" indent="-342900">
+              <a:spcBef>
+                <a:spcPts val="0"/>
+              </a:spcBef>
               <a:buFont typeface="+mj-lt"/>
               <a:buAutoNum type="arabicPeriod"/>
             </a:pPr>
             <a:r>
-              <a:rPr lang="en-US" sz="1200" dirty="0"/>
-              <a:t>Bytes newly </a:t>
-            </a:r>
-            <a:r>
-              <a:rPr lang="en-US" sz="1200" dirty="0" err="1"/>
-              <a:t>ACKed</a:t>
-            </a:r>
-            <a:endParaRPr lang="en-US" sz="1200" dirty="0"/>
-          </a:p>
-          <a:p>
-            <a:pPr marL="812800" lvl="1" indent="-457200">
+              <a:rPr lang="en-US" sz="1000" dirty="0"/>
+              <a:t>Stream ID</a:t>
+            </a:r>
+          </a:p>
+          <a:p>
+            <a:pPr marL="706500" lvl="2" indent="-342900">
+              <a:spcBef>
+                <a:spcPts val="0"/>
+              </a:spcBef>
               <a:buFont typeface="+mj-lt"/>
               <a:buAutoNum type="arabicPeriod"/>
             </a:pPr>
             <a:r>
-              <a:rPr lang="en-US" sz="1200" dirty="0"/>
-              <a:t>Bytes newly </a:t>
-            </a:r>
-            <a:r>
-              <a:rPr lang="en-US" sz="1200" dirty="0" err="1"/>
-              <a:t>ACKed</a:t>
-            </a:r>
-            <a:r>
-              <a:rPr lang="en-US" sz="1200" dirty="0"/>
-              <a:t> and CE marked</a:t>
-            </a:r>
-          </a:p>
-          <a:p>
-            <a:pPr marL="812800" lvl="1" indent="-457200">
+              <a:rPr lang="en-US" sz="1000" dirty="0"/>
+              <a:t>RTP SN</a:t>
+            </a:r>
+          </a:p>
+          <a:p>
+            <a:pPr marL="706500" lvl="2" indent="-342900">
+              <a:spcBef>
+                <a:spcPts val="0"/>
+              </a:spcBef>
               <a:buFont typeface="+mj-lt"/>
               <a:buAutoNum type="arabicPeriod"/>
             </a:pPr>
             <a:r>
-              <a:rPr lang="en-US" sz="1200" dirty="0"/>
-              <a:t>Media coder bitrate [bps]</a:t>
-            </a:r>
-          </a:p>
-          <a:p>
-            <a:pPr marL="812800" lvl="1" indent="-457200">
+              <a:rPr lang="en-US" sz="1000" dirty="0"/>
+              <a:t>Bytes newly </a:t>
+            </a:r>
+            <a:r>
+              <a:rPr lang="en-US" sz="1000" dirty="0" err="1"/>
+              <a:t>ACKed</a:t>
+            </a:r>
+            <a:endParaRPr lang="en-US" sz="1000" dirty="0"/>
+          </a:p>
+          <a:p>
+            <a:pPr marL="706500" lvl="2" indent="-342900">
+              <a:spcBef>
+                <a:spcPts val="0"/>
+              </a:spcBef>
               <a:buFont typeface="+mj-lt"/>
               <a:buAutoNum type="arabicPeriod"/>
             </a:pPr>
             <a:r>
-              <a:rPr lang="en-US" sz="1200" dirty="0"/>
-              <a:t>Transmitted bitrate [bps]</a:t>
-            </a:r>
-          </a:p>
-          <a:p>
-            <a:pPr marL="812800" lvl="1" indent="-457200">
+              <a:rPr lang="en-US" sz="1000" dirty="0"/>
+              <a:t>Bytes newly </a:t>
+            </a:r>
+            <a:r>
+              <a:rPr lang="en-US" sz="1000" dirty="0" err="1"/>
+              <a:t>ACKed</a:t>
+            </a:r>
+            <a:r>
+              <a:rPr lang="en-US" sz="1000" dirty="0"/>
+              <a:t> and CE marked</a:t>
+            </a:r>
+          </a:p>
+          <a:p>
+            <a:pPr marL="706500" lvl="2" indent="-342900">
+              <a:spcBef>
+                <a:spcPts val="0"/>
+              </a:spcBef>
               <a:buFont typeface="+mj-lt"/>
               <a:buAutoNum type="arabicPeriod"/>
             </a:pPr>
             <a:r>
-              <a:rPr lang="en-US" sz="1200" dirty="0" err="1"/>
-              <a:t>ACKed</a:t>
-            </a:r>
-            <a:r>
-              <a:rPr lang="en-US" sz="1200" dirty="0"/>
-              <a:t> bitrate [bps]</a:t>
-            </a:r>
-          </a:p>
-          <a:p>
-            <a:pPr marL="812800" lvl="1" indent="-457200">
+              <a:rPr lang="en-US" sz="1000" dirty="0"/>
+              <a:t>Media coder bitrate [bps] </a:t>
+            </a:r>
+          </a:p>
+          <a:p>
+            <a:pPr marL="706500" lvl="2" indent="-342900">
+              <a:spcBef>
+                <a:spcPts val="0"/>
+              </a:spcBef>
               <a:buFont typeface="+mj-lt"/>
               <a:buAutoNum type="arabicPeriod"/>
             </a:pPr>
             <a:r>
-              <a:rPr lang="en-US" sz="1200" dirty="0"/>
-              <a:t>Lost bitrate [bps]</a:t>
-            </a:r>
-          </a:p>
-          <a:p>
-            <a:pPr marL="812800" lvl="1" indent="-457200">
+              <a:rPr lang="en-US" sz="1000" dirty="0"/>
+              <a:t>Transmitted bitrate [bps] </a:t>
+            </a:r>
+          </a:p>
+          <a:p>
+            <a:pPr marL="706500" lvl="2" indent="-342900">
+              <a:spcBef>
+                <a:spcPts val="0"/>
+              </a:spcBef>
               <a:buFont typeface="+mj-lt"/>
               <a:buAutoNum type="arabicPeriod"/>
             </a:pPr>
             <a:r>
-              <a:rPr lang="en-US" sz="1200" dirty="0"/>
-              <a:t>CE marked bitrate [bps]</a:t>
-            </a:r>
-          </a:p>
-          <a:p>
-            <a:pPr marL="0" indent="0">
-              <a:buNone/>
+              <a:rPr lang="en-US" sz="1000" dirty="0" err="1"/>
+              <a:t>ACKed</a:t>
+            </a:r>
+            <a:r>
+              <a:rPr lang="en-US" sz="1000" dirty="0"/>
+              <a:t> bitrate [bps] </a:t>
+            </a:r>
+          </a:p>
+          <a:p>
+            <a:pPr marL="706500" lvl="2" indent="-342900">
+              <a:spcBef>
+                <a:spcPts val="0"/>
+              </a:spcBef>
+              <a:buFont typeface="+mj-lt"/>
+              <a:buAutoNum type="arabicPeriod"/>
             </a:pPr>
-            <a:endParaRPr lang="en-US" dirty="0"/>
-          </a:p>
-          <a:p>
-            <a:endParaRPr lang="en-US" dirty="0"/>
+            <a:r>
+              <a:rPr lang="en-US" sz="1000" dirty="0"/>
+              <a:t>Lost bitrate [bps] </a:t>
+            </a:r>
+          </a:p>
+          <a:p>
+            <a:pPr marL="706500" lvl="2" indent="-342900">
+              <a:spcBef>
+                <a:spcPts val="0"/>
+              </a:spcBef>
+              <a:buFont typeface="+mj-lt"/>
+              <a:buAutoNum type="arabicPeriod"/>
+            </a:pPr>
+            <a:r>
+              <a:rPr lang="en-US" sz="1000" dirty="0"/>
+              <a:t>CE Marked bitrate [bps] </a:t>
+            </a:r>
+          </a:p>
+          <a:p>
+            <a:pPr marL="706500" lvl="2" indent="-342900">
+              <a:spcBef>
+                <a:spcPts val="0"/>
+              </a:spcBef>
+              <a:buFont typeface="+mj-lt"/>
+              <a:buAutoNum type="arabicPeriod"/>
+            </a:pPr>
+            <a:r>
+              <a:rPr lang="en-US" sz="1000" dirty="0"/>
+              <a:t>Marker bit set</a:t>
+            </a:r>
           </a:p>
         </p:txBody>
       </p:sp>
@@ -20342,8 +20410,8 @@
         </p:nvSpPr>
         <p:spPr>
           <a:xfrm>
-            <a:off x="6492913" y="1416862"/>
-            <a:ext cx="6096000" cy="4578176"/>
+            <a:off x="5784851" y="1557338"/>
+            <a:ext cx="6096000" cy="4901342"/>
           </a:xfrm>
           <a:prstGeom prst="rect">
             <a:avLst/>
@@ -20355,111 +20423,147 @@
           </a:bodyPr>
           <a:lstStyle/>
           <a:p>
+            <a:pPr marL="0" indent="0">
+              <a:buNone/>
+            </a:pPr>
             <a:r>
               <a:rPr lang="en-US" sz="800" dirty="0">
                 <a:latin typeface="Courier New" panose="02070309020205020404" pitchFamily="49" charset="0"/>
                 <a:cs typeface="Courier New" panose="02070309020205020404" pitchFamily="49" charset="0"/>
               </a:rPr>
-              <a:t>0.071,0.000,0.065, 12500,7720,0,0,2424,0,0,0,0,0,</a:t>
-            </a:r>
-          </a:p>
-          <a:p>
+              <a:t>1.4666,0.0009,0.1003, 28425,18983,1,1421877,0,212,2518,0,1421877,1421877,1338874,0,0,1</a:t>
+            </a:r>
+          </a:p>
+          <a:p>
+            <a:pPr marL="0" indent="0">
+              <a:buNone/>
+            </a:pPr>
             <a:r>
               <a:rPr lang="en-US" sz="800" dirty="0">
                 <a:latin typeface="Courier New" panose="02070309020205020404" pitchFamily="49" charset="0"/>
                 <a:cs typeface="Courier New" panose="02070309020205020404" pitchFamily="49" charset="0"/>
               </a:rPr>
-              <a:t>0.281,0.010,0.174, 12500,112,25343,0,15104,0,126715,25343,0,0,</a:t>
-            </a:r>
-          </a:p>
-          <a:p>
+              <a:t>1.4666,0.0004,0.0802, 28425,15253,1,1421877,0,216,3730,0,1421877,1421877,1338874,0,0,1</a:t>
+            </a:r>
+          </a:p>
+          <a:p>
+            <a:pPr marL="0" indent="0">
+              <a:buNone/>
+            </a:pPr>
             <a:r>
               <a:rPr lang="en-US" sz="800" dirty="0">
                 <a:latin typeface="Courier New" panose="02070309020205020404" pitchFamily="49" charset="0"/>
                 <a:cs typeface="Courier New" panose="02070309020205020404" pitchFamily="49" charset="0"/>
               </a:rPr>
-              <a:t>0.349,0.016,0.068, 21106,8820,240232,0,12792,0,253449,240232,126734,0,</a:t>
-            </a:r>
-          </a:p>
-          <a:p>
+              <a:t>1.4666,0.0009,0.0602, 28425,11523,1,1421877,0,220,3730,0,1421877,1421877,1338874,0,0,1</a:t>
+            </a:r>
+          </a:p>
+          <a:p>
+            <a:pPr marL="0" indent="0">
+              <a:buNone/>
+            </a:pPr>
             <a:r>
               <a:rPr lang="en-US" sz="800" dirty="0">
                 <a:latin typeface="Courier New" panose="02070309020205020404" pitchFamily="49" charset="0"/>
                 <a:cs typeface="Courier New" panose="02070309020205020404" pitchFamily="49" charset="0"/>
               </a:rPr>
-              <a:t>0.403,0.001,0.053, 35659,8932,418697,0,13892,0,405461,418697,382325,0,</a:t>
-            </a:r>
-          </a:p>
-          <a:p>
+              <a:t>1.4666,0.0005,0.0403, 28425,7793,1,1421877,0,224,3730,0,1421877,1421877,1338874,0,0,1</a:t>
+            </a:r>
+          </a:p>
+          <a:p>
+            <a:pPr marL="0" indent="0">
+              <a:buNone/>
+            </a:pPr>
             <a:r>
               <a:rPr lang="en-US" sz="800" dirty="0">
                 <a:latin typeface="Courier New" panose="02070309020205020404" pitchFamily="49" charset="0"/>
                 <a:cs typeface="Courier New" panose="02070309020205020404" pitchFamily="49" charset="0"/>
               </a:rPr>
-              <a:t>0.491,0.010,0.062, 25106,7720,671988,0,13892,0,658752,671988,659978,0,</a:t>
-            </a:r>
-          </a:p>
-          <a:p>
+              <a:t>1.4666,0.0000,0.0202, 28425,6581,1,1421877,0,225,1212,0,1421877,1421877,1338874,0,0,0</a:t>
+            </a:r>
+          </a:p>
+          <a:p>
+            <a:pPr marL="0" indent="0">
+              <a:buNone/>
+            </a:pPr>
             <a:r>
               <a:rPr lang="en-US" sz="800" dirty="0">
                 <a:latin typeface="Courier New" panose="02070309020205020404" pitchFamily="49" charset="0"/>
                 <a:cs typeface="Courier New" panose="02070309020205020404" pitchFamily="49" charset="0"/>
               </a:rPr>
-              <a:t>0.612,0.029,0.082, 25106,10144,1026836,0,12792,0,1013600,1026836,937632,0,</a:t>
-            </a:r>
-          </a:p>
-          <a:p>
+              <a:t>1.5465,0.0007,0.1001, 28425,20315,1,1462577,0,228,2518,0,1462577,1462577,1303788,0,0,1</a:t>
+            </a:r>
+          </a:p>
+          <a:p>
+            <a:pPr marL="0" indent="0">
+              <a:buNone/>
+            </a:pPr>
             <a:r>
               <a:rPr lang="en-US" sz="800" dirty="0">
                 <a:latin typeface="Courier New" panose="02070309020205020404" pitchFamily="49" charset="0"/>
                 <a:cs typeface="Courier New" panose="02070309020205020404" pitchFamily="49" charset="0"/>
               </a:rPr>
-              <a:t>0.711,0.009,0.060, 25229,7143,1059941,0,14141,0,1033487,1059941,1066566,0,</a:t>
-            </a:r>
-          </a:p>
-          <a:p>
+              <a:t>1.5465,0.0003,0.0802, 28425,16252,1,1462577,0,232,4063,0,1462577,1462577,1303788,0,0,1</a:t>
+            </a:r>
+          </a:p>
+          <a:p>
+            <a:pPr marL="0" indent="0">
+              <a:buNone/>
+            </a:pPr>
             <a:r>
               <a:rPr lang="en-US" sz="800" dirty="0">
                 <a:latin typeface="Courier New" panose="02070309020205020404" pitchFamily="49" charset="0"/>
                 <a:cs typeface="Courier New" panose="02070309020205020404" pitchFamily="49" charset="0"/>
               </a:rPr>
-              <a:t>0.811,0.008,0.060, 25229,5931,1058417,0,15137,0,1058417,1058417,815952,0,</a:t>
-            </a:r>
-          </a:p>
-          <a:p>
+              <a:t>1.5465,0.0008,0.0602, 28425,12189,1,1462577,0,236,4063,0,1462577,1462577,1303788,0,0,1</a:t>
+            </a:r>
+          </a:p>
+          <a:p>
+            <a:pPr marL="0" indent="0">
+              <a:buNone/>
+            </a:pPr>
             <a:r>
               <a:rPr lang="en-US" sz="800" dirty="0">
                 <a:latin typeface="Courier New" panose="02070309020205020404" pitchFamily="49" charset="0"/>
                 <a:cs typeface="Courier New" panose="02070309020205020404" pitchFamily="49" charset="0"/>
               </a:rPr>
-              <a:t>0.940,0.033,0.086, 25229,11604,1105407,0,14836,0,1105407,1105407,840743,0,</a:t>
-            </a:r>
-          </a:p>
-          <a:p>
+              <a:t>1.5465,0.0004,0.0402, 28425,8126,1,1462577,0,240,4063,0,1462577,1462577,1303788,0,0,1</a:t>
+            </a:r>
+          </a:p>
+          <a:p>
+            <a:pPr marL="0" indent="0">
+              <a:buNone/>
+            </a:pPr>
             <a:r>
               <a:rPr lang="en-US" sz="800" dirty="0">
                 <a:latin typeface="Courier New" panose="02070309020205020404" pitchFamily="49" charset="0"/>
                 <a:cs typeface="Courier New" panose="02070309020205020404" pitchFamily="49" charset="0"/>
               </a:rPr>
-              <a:t>1.039,0.014,0.065, 29084,11331,1157763,0,16512,0,1157763,1157763,1137264,0,</a:t>
-            </a:r>
-          </a:p>
-          <a:p>
+              <a:t>1.5465,0.0000,0.0203, 28425,6914,1,1462577,0,241,1212,0,1462577,1462577,1303788,0,0,0</a:t>
+            </a:r>
+          </a:p>
+          <a:p>
+            <a:pPr marL="0" indent="0">
+              <a:buNone/>
+            </a:pPr>
             <a:r>
               <a:rPr lang="en-US" sz="800" dirty="0">
                 <a:latin typeface="Courier New" panose="02070309020205020404" pitchFamily="49" charset="0"/>
                 <a:cs typeface="Courier New" panose="02070309020205020404" pitchFamily="49" charset="0"/>
               </a:rPr>
-              <a:t>1.132,0.006,0.059, 30627,7665,1214285,0,17118,0,1214285,1214285,1211413,0,</a:t>
-            </a:r>
-          </a:p>
-          <a:p>
+              <a:t>1.6265,0.0008,0.1003, 28425,20315,1,1530568,0,244,2851,0,1530568,1530568,1259669,0,0,1</a:t>
+            </a:r>
+          </a:p>
+          <a:p>
+            <a:pPr marL="0" indent="0">
+              <a:buNone/>
+            </a:pPr>
             <a:r>
               <a:rPr lang="en-US" sz="800" dirty="0">
                 <a:latin typeface="Courier New" panose="02070309020205020404" pitchFamily="49" charset="0"/>
                 <a:cs typeface="Courier New" panose="02070309020205020404" pitchFamily="49" charset="0"/>
               </a:rPr>
-              <a:t>1.253,0.023,0.077, 30627,10434,1271821,0,17754,0,1271821,1271821,1270809,0,</a:t>
+              <a:t>1.6265,0.0003,0.0802, 28425,16252,1,1530568,0,248,4063,0,1530568,1530568,1259669,0,0,1</a:t>
             </a:r>
           </a:p>
           <a:p>
@@ -20490,120 +20594,177 @@
             </a:r>
           </a:p>
           <a:p>
+            <a:endParaRPr lang="en-US" sz="800" dirty="0">
+              <a:latin typeface="Courier New" panose="02070309020205020404" pitchFamily="49" charset="0"/>
+              <a:cs typeface="Courier New" panose="02070309020205020404" pitchFamily="49" charset="0"/>
+            </a:endParaRPr>
+          </a:p>
+          <a:p>
+            <a:pPr marL="0" indent="0">
+              <a:buNone/>
+            </a:pPr>
             <a:r>
               <a:rPr lang="en-US" sz="800" dirty="0">
                 <a:latin typeface="Courier New" panose="02070309020205020404" pitchFamily="49" charset="0"/>
                 <a:cs typeface="Courier New" panose="02070309020205020404" pitchFamily="49" charset="0"/>
               </a:rPr>
-              <a:t>30.535,0.013,0.060, 313866,166287,22373506,0,41847,0,22840770,22373506,22187054,0,</a:t>
-            </a:r>
-          </a:p>
-          <a:p>
+              <a:t>14.6419,0.0126,0.0328, 309809,121390,0,43145928,0,35993,14544,0,43145928,43145928,43045184,0,0,0</a:t>
+            </a:r>
+          </a:p>
+          <a:p>
+            <a:pPr marL="0" indent="0">
+              <a:buNone/>
+            </a:pPr>
             <a:r>
               <a:rPr lang="en-US" sz="800" dirty="0">
                 <a:latin typeface="Courier New" panose="02070309020205020404" pitchFamily="49" charset="0"/>
                 <a:cs typeface="Courier New" panose="02070309020205020404" pitchFamily="49" charset="0"/>
               </a:rPr>
-              <a:t>30.542,0.014,0.064, 313866,186891,22373506,0,10908,0,22840770,22373506,22187054,0,</a:t>
-            </a:r>
-          </a:p>
-          <a:p>
+              <a:t>14.6442,0.0147,0.0349, 309809,108058,0,43145928,0,36004,13332,0,43145928,43145928,43045184,0,0,0</a:t>
+            </a:r>
+          </a:p>
+          <a:p>
+            <a:pPr marL="0" indent="0">
+              <a:buNone/>
+            </a:pPr>
             <a:r>
               <a:rPr lang="en-US" sz="800" dirty="0">
                 <a:latin typeface="Courier New" panose="02070309020205020404" pitchFamily="49" charset="0"/>
                 <a:cs typeface="Courier New" panose="02070309020205020404" pitchFamily="49" charset="0"/>
               </a:rPr>
-              <a:t>30.549,0.023,0.070, 313866,197476,22373506,0,26664,0,22840770,22373506,22187054,0,</a:t>
-            </a:r>
-          </a:p>
-          <a:p>
+              <a:t>14.6478,0.0153,0.0385, 309809,174623,0,43145928,0,36005,95,0,43145928,43145928,43045184,0,0,1</a:t>
+            </a:r>
+          </a:p>
+          <a:p>
+            <a:pPr marL="0" indent="0">
+              <a:buNone/>
+            </a:pPr>
             <a:r>
               <a:rPr lang="en-US" sz="800" dirty="0">
                 <a:latin typeface="Courier New" panose="02070309020205020404" pitchFamily="49" charset="0"/>
                 <a:cs typeface="Courier New" panose="02070309020205020404" pitchFamily="49" charset="0"/>
               </a:rPr>
-              <a:t>30.554,0.023,0.072, 313866,180508,22373506,0,16968,0,22840770,22373506,22187054,0,</a:t>
-            </a:r>
-          </a:p>
-          <a:p>
+              <a:t>14.6478,0.0011,0.0214, 309809,164927,0,43145928,0,36013,9696,0,43145928,43145928,43045184,0,0,0</a:t>
+            </a:r>
+          </a:p>
+          <a:p>
+            <a:pPr marL="0" indent="0">
+              <a:buNone/>
+            </a:pPr>
             <a:r>
               <a:rPr lang="en-US" sz="800" dirty="0">
                 <a:latin typeface="Courier New" panose="02070309020205020404" pitchFamily="49" charset="0"/>
                 <a:cs typeface="Courier New" panose="02070309020205020404" pitchFamily="49" charset="0"/>
               </a:rPr>
-              <a:t>30.554,0.012,0.058, 313866,169923,22373506,0,27553,0,22840770,22373506,22187054,0,</a:t>
-            </a:r>
-          </a:p>
-          <a:p>
+              <a:t>14.6501,0.0030,0.0232, 309809,192898,0,43145928,0,36024,13332,0,43145928,43145928,43045184,0,0,0</a:t>
+            </a:r>
+          </a:p>
+          <a:p>
+            <a:pPr marL="0" indent="0">
+              <a:buNone/>
+            </a:pPr>
             <a:r>
               <a:rPr lang="en-US" sz="800" dirty="0">
                 <a:latin typeface="Courier New" panose="02070309020205020404" pitchFamily="49" charset="0"/>
                 <a:cs typeface="Courier New" panose="02070309020205020404" pitchFamily="49" charset="0"/>
               </a:rPr>
-              <a:t>30.561,0.014,0.064, 313866,191739,22373506,0,37249,0,22840770,22373506,22187054,0,</a:t>
-            </a:r>
-          </a:p>
-          <a:p>
+              <a:t>14.6523,0.0052,0.0254, 309809,178354,0,43145928,0,36036,14544,0,43145928,43145928,43045184,0,0,0</a:t>
+            </a:r>
+          </a:p>
+          <a:p>
+            <a:pPr marL="0" indent="0">
+              <a:buNone/>
+            </a:pPr>
             <a:r>
               <a:rPr lang="en-US" sz="800" dirty="0">
                 <a:latin typeface="Courier New" panose="02070309020205020404" pitchFamily="49" charset="0"/>
                 <a:cs typeface="Courier New" panose="02070309020205020404" pitchFamily="49" charset="0"/>
               </a:rPr>
-              <a:t>30.561,0.016,0.062, 312510,182043,22373506,0,9696,0,22840770,22373506,22187054,0,</a:t>
-            </a:r>
-          </a:p>
-          <a:p>
+              <a:t>14.6546,0.0073,0.0275, 309809,165022,0,43145928,0,36047,13332,0,43145928,43145928,43045184,0,0,0</a:t>
+            </a:r>
+          </a:p>
+          <a:p>
+            <a:pPr marL="0" indent="0">
+              <a:buNone/>
+            </a:pPr>
             <a:r>
               <a:rPr lang="en-US" sz="800" dirty="0">
                 <a:latin typeface="Courier New" panose="02070309020205020404" pitchFamily="49" charset="0"/>
                 <a:cs typeface="Courier New" panose="02070309020205020404" pitchFamily="49" charset="0"/>
               </a:rPr>
-              <a:t>30.566,0.018,0.066, 312510,195375,22373506,0,19392,0,22840770,22373506,22187054,0,</a:t>
-            </a:r>
-          </a:p>
-          <a:p>
+              <a:t>14.6570,0.0095,0.0298, 309809,151690,0,43145928,0,36058,13332,0,43145928,43145928,43045184,0,0,0</a:t>
+            </a:r>
+          </a:p>
+          <a:p>
+            <a:pPr marL="0" indent="0">
+              <a:buNone/>
+            </a:pPr>
             <a:r>
               <a:rPr lang="en-US" sz="800" dirty="0">
                 <a:latin typeface="Courier New" panose="02070309020205020404" pitchFamily="49" charset="0"/>
                 <a:cs typeface="Courier New" panose="02070309020205020404" pitchFamily="49" charset="0"/>
               </a:rPr>
-              <a:t>30.572,0.020,0.071, 312510,188992,22871936,0,29088,0,22850056,22871936,22226894,0,</a:t>
-            </a:r>
-          </a:p>
-          <a:p>
+              <a:t>14.6594,0.0100,0.0304, 309809,138358,0,43145928,0,36069,13332,0,43145928,43145928,43045184,0,0,0</a:t>
+            </a:r>
+          </a:p>
+          <a:p>
+            <a:pPr marL="0" indent="0">
+              <a:buNone/>
+            </a:pPr>
             <a:r>
               <a:rPr lang="en-US" sz="800" dirty="0">
                 <a:latin typeface="Courier New" panose="02070309020205020404" pitchFamily="49" charset="0"/>
                 <a:cs typeface="Courier New" panose="02070309020205020404" pitchFamily="49" charset="0"/>
               </a:rPr>
-              <a:t>30.572,0.021,0.069, 312510,179296,22871936,0,9696,0,22850056,22871936,22226894,0,</a:t>
-            </a:r>
-          </a:p>
-          <a:p>
+              <a:t>14.6616,0.0122,0.0324, 309809,123814,0,43145928,0,36081,14544,0,43145928,43145928,43045184,0,0,0</a:t>
+            </a:r>
+          </a:p>
+          <a:p>
+            <a:pPr marL="0" indent="0">
+              <a:buNone/>
+            </a:pPr>
             <a:r>
               <a:rPr lang="en-US" sz="800" dirty="0">
                 <a:latin typeface="Courier New" panose="02070309020205020404" pitchFamily="49" charset="0"/>
                 <a:cs typeface="Courier New" panose="02070309020205020404" pitchFamily="49" charset="0"/>
               </a:rPr>
-              <a:t>30.578,0.012,0.062, 312510,177195,22871936,0,20281,0,22850056,22871936,22226894,0,</a:t>
-            </a:r>
-          </a:p>
-          <a:p>
+              <a:t>14.6639,0.0144,0.0346, 309809,110482,0,43145928,0,36092,13332,0,43145928,43145928,43045184,0,0,0</a:t>
+            </a:r>
+          </a:p>
+          <a:p>
+            <a:pPr marL="0" indent="0">
+              <a:buNone/>
+            </a:pPr>
             <a:r>
               <a:rPr lang="en-US" sz="800" dirty="0">
                 <a:latin typeface="Courier New" panose="02070309020205020404" pitchFamily="49" charset="0"/>
                 <a:cs typeface="Courier New" panose="02070309020205020404" pitchFamily="49" charset="0"/>
               </a:rPr>
-              <a:t>30.578,0.014,0.061, 312510,167499,22871936,0,29977,0,22850056,22871936,22226894,0,</a:t>
-            </a:r>
-          </a:p>
-          <a:p>
+              <a:t>14.6673,0.0159,0.0381, 309809,168563,0,43145928,0,36095,2519,0,43145928,43145928,43045184,0,0,1</a:t>
+            </a:r>
+          </a:p>
+          <a:p>
+            <a:pPr marL="0" indent="0">
+              <a:buNone/>
+            </a:pPr>
             <a:r>
               <a:rPr lang="en-US" sz="800" dirty="0">
                 <a:latin typeface="Courier New" panose="02070309020205020404" pitchFamily="49" charset="0"/>
                 <a:cs typeface="Courier New" panose="02070309020205020404" pitchFamily="49" charset="0"/>
               </a:rPr>
-              <a:t>30.585,0.015,0.065, 312510,195375,22871936,0,39673,0,22850056,22871936,22226894,0,</a:t>
+              <a:t>14.6673,0.0007,0.0209, 309809,161291,0,43145928,0,36101,7272,0,43145928,43145928,43045184,0,0,0</a:t>
+            </a:r>
+          </a:p>
+          <a:p>
+            <a:pPr marL="0" indent="0">
+              <a:buNone/>
+            </a:pPr>
+            <a:r>
+              <a:rPr lang="en-US" sz="800" dirty="0">
+                <a:latin typeface="Courier New" panose="02070309020205020404" pitchFamily="49" charset="0"/>
+                <a:cs typeface="Courier New" panose="02070309020205020404" pitchFamily="49" charset="0"/>
+              </a:rPr>
+              <a:t>14.6697,0.0027,0.0230, 309809,195322,0,43145928,0,36112,13332,0,43145928,43145928,43045184,0,0,0</a:t>
             </a:r>
           </a:p>
         </p:txBody>
@@ -23017,7 +23178,7 @@
           <a:graphicData uri="http://schemas.openxmlformats.org/presentationml/2006/ole">
             <mc:AlternateContent xmlns:mc="http://schemas.openxmlformats.org/markup-compatibility/2006">
               <mc:Choice xmlns:v="urn:schemas-microsoft-com:vml" Requires="v">
-                <p:oleObj spid="_x0000_s1046" name="Visio" r:id="rId5" imgW="2533577" imgH="3257685" progId="Visio.Drawing.11">
+                <p:oleObj spid="_x0000_s1049" name="Visio" r:id="rId5" imgW="2533577" imgH="3257685" progId="Visio.Drawing.11">
                   <p:embed/>
                 </p:oleObj>
               </mc:Choice>
@@ -24956,8 +25117,8 @@
         </p:nvSpPr>
         <p:spPr>
           <a:xfrm>
-            <a:off x="479425" y="1586489"/>
-            <a:ext cx="5472113" cy="4392613"/>
+            <a:off x="479425" y="1016794"/>
+            <a:ext cx="5472113" cy="5364956"/>
           </a:xfrm>
         </p:spPr>
         <p:txBody>
@@ -24965,330 +25126,174 @@
           <a:lstStyle/>
           <a:p>
             <a:r>
-              <a:rPr lang="en-US" sz="2000" dirty="0"/>
+              <a:rPr lang="en-US" sz="1600" dirty="0"/>
               <a:t>Command line options explained to the right </a:t>
             </a:r>
           </a:p>
           <a:p>
             <a:r>
-              <a:rPr lang="en-US" sz="2000" dirty="0"/>
+              <a:rPr lang="en-US" sz="1600" dirty="0"/>
               <a:t>By default the tester will run in rate adaptive mode with a RTP media rate that is almost constant (no key frames), the max rate is 200Mbps. In addition a summary report is printed on </a:t>
             </a:r>
             <a:r>
-              <a:rPr lang="en-US" sz="2000" u="sng" dirty="0" err="1"/>
+              <a:rPr lang="en-US" sz="1600" u="sng" dirty="0" err="1"/>
               <a:t>stdout</a:t>
             </a:r>
             <a:r>
-              <a:rPr lang="en-US" sz="2000" u="sng" dirty="0"/>
+              <a:rPr lang="en-US" sz="1600" u="sng" dirty="0"/>
               <a:t>.</a:t>
             </a:r>
             <a:r>
-              <a:rPr lang="en-US" sz="2000" dirty="0"/>
+              <a:rPr lang="en-US" sz="1600" dirty="0"/>
               <a:t> Packet pacing is enabled by default</a:t>
             </a:r>
-            <a:endParaRPr lang="en-US" sz="2000" u="sng" dirty="0"/>
-          </a:p>
-          <a:p>
-            <a:r>
-              <a:rPr lang="en-US" sz="2000" dirty="0"/>
+            <a:endParaRPr lang="en-US" sz="1600" u="sng" dirty="0"/>
+          </a:p>
+          <a:p>
+            <a:r>
+              <a:rPr lang="en-US" sz="1600" dirty="0"/>
               <a:t>A verbose, more detailed log can be printed on </a:t>
             </a:r>
             <a:r>
-              <a:rPr lang="en-US" sz="2000" u="sng" dirty="0" err="1"/>
+              <a:rPr lang="en-US" sz="1600" u="sng" dirty="0" err="1"/>
               <a:t>stdout</a:t>
             </a:r>
             <a:r>
-              <a:rPr lang="en-US" sz="2000" dirty="0"/>
+              <a:rPr lang="en-US" sz="1600" dirty="0"/>
               <a:t> with the </a:t>
             </a:r>
             <a:r>
-              <a:rPr lang="en-US" sz="2000" i="1" dirty="0"/>
+              <a:rPr lang="en-US" sz="1600" i="1" dirty="0"/>
               <a:t>–verbose </a:t>
             </a:r>
             <a:r>
-              <a:rPr lang="en-US" sz="2000" dirty="0"/>
+              <a:rPr lang="en-US" sz="1600" dirty="0"/>
               <a:t>option</a:t>
             </a:r>
           </a:p>
           <a:p>
             <a:r>
-              <a:rPr lang="en-US" sz="2000" dirty="0"/>
+              <a:rPr lang="en-US" sz="1600" dirty="0"/>
               <a:t>Detailed per-ACK log with</a:t>
             </a:r>
             <a:r>
-              <a:rPr lang="en-US" sz="2000" i="1" dirty="0"/>
+              <a:rPr lang="en-US" sz="1600" i="1" dirty="0"/>
               <a:t> –log </a:t>
             </a:r>
             <a:r>
-              <a:rPr lang="en-US" sz="2000" dirty="0"/>
+              <a:rPr lang="en-US" sz="1600" dirty="0"/>
               <a:t>option</a:t>
             </a:r>
           </a:p>
           <a:p>
-            <a:r>
-              <a:rPr lang="en-US" i="1" dirty="0"/>
+            <a:pPr lvl="1"/>
+            <a:r>
+              <a:rPr lang="en-US" sz="1600" dirty="0"/>
               <a:t>-</a:t>
             </a:r>
             <a:r>
-              <a:rPr lang="en-US" i="1" dirty="0" err="1"/>
+              <a:rPr lang="en-US" sz="1600" dirty="0" err="1"/>
+              <a:t>itemlist</a:t>
+            </a:r>
+            <a:r>
+              <a:rPr lang="en-US" sz="1600" dirty="0"/>
+              <a:t> option adds a line in the beginning that describes the data columns, log file can be read with </a:t>
+            </a:r>
+            <a:r>
+              <a:rPr lang="en-US" sz="1600" dirty="0" err="1"/>
+              <a:t>readtable</a:t>
+            </a:r>
+            <a:r>
+              <a:rPr lang="en-US" sz="1600" dirty="0"/>
+              <a:t> in </a:t>
+            </a:r>
+            <a:r>
+              <a:rPr lang="en-US" sz="1600" dirty="0" err="1"/>
+              <a:t>matlab</a:t>
+            </a:r>
+            <a:r>
+              <a:rPr lang="en-US" sz="1600" dirty="0"/>
+              <a:t>.</a:t>
+            </a:r>
+          </a:p>
+          <a:p>
+            <a:r>
+              <a:rPr lang="en-US" sz="1600" i="1" dirty="0"/>
+              <a:t>-</a:t>
+            </a:r>
+            <a:r>
+              <a:rPr lang="en-US" sz="1600" i="1" dirty="0" err="1"/>
               <a:t>clockdrift</a:t>
             </a:r>
             <a:r>
-              <a:rPr lang="en-US" dirty="0"/>
+              <a:rPr lang="en-US" sz="1600" dirty="0"/>
               <a:t> option compensates for up to 0.05% faster clock on the receiver side</a:t>
             </a:r>
-            <a:endParaRPr lang="en-US" sz="2000" dirty="0"/>
-          </a:p>
-        </p:txBody>
-      </p:sp>
-      <p:sp>
-        <p:nvSpPr>
-          <p:cNvPr id="7" name="Content Placeholder 4"/>
-          <p:cNvSpPr txBox="1">
-            <a:spLocks/>
-          </p:cNvSpPr>
-          <p:nvPr/>
-        </p:nvSpPr>
-        <p:spPr bwMode="auto">
-          <a:xfrm>
-            <a:off x="6096000" y="1073394"/>
-            <a:ext cx="5473700" cy="2234750"/>
-          </a:xfrm>
-          <a:prstGeom prst="rect">
-            <a:avLst/>
-          </a:prstGeom>
-          <a:noFill/>
-          <a:ln w="9525">
-            <a:noFill/>
-            <a:miter lim="800000"/>
-            <a:headEnd/>
-            <a:tailEnd/>
-          </a:ln>
-        </p:spPr>
-        <p:txBody>
-          <a:bodyPr vert="horz" wrap="square" lIns="72000" tIns="0" rIns="72000" bIns="0" numCol="1" anchor="t" anchorCtr="0" compatLnSpc="1">
-            <a:prstTxWarp prst="textNoShape">
-              <a:avLst/>
-            </a:prstTxWarp>
-          </a:bodyPr>
-          <a:lstStyle>
-            <a:lvl1pPr marL="176213" indent="-176213" algn="l" rtl="0" eaLnBrk="1" fontAlgn="base" hangingPunct="1">
-              <a:spcBef>
-                <a:spcPct val="20000"/>
-              </a:spcBef>
-              <a:spcAft>
-                <a:spcPct val="0"/>
-              </a:spcAft>
-              <a:buClr>
-                <a:srgbClr val="00A9D4"/>
-              </a:buClr>
-              <a:buFont typeface="Arial" charset="0"/>
-              <a:buChar char="›"/>
-              <a:defRPr sz="2400">
-                <a:solidFill>
-                  <a:schemeClr val="tx1"/>
-                </a:solidFill>
-                <a:latin typeface="+mn-lt"/>
-                <a:ea typeface="+mn-ea"/>
-                <a:cs typeface="+mn-cs"/>
-              </a:defRPr>
-            </a:lvl1pPr>
-            <a:lvl2pPr marL="533400" indent="-177800" algn="l" rtl="0" eaLnBrk="1" fontAlgn="base" hangingPunct="1">
-              <a:spcBef>
-                <a:spcPct val="20000"/>
-              </a:spcBef>
-              <a:spcAft>
-                <a:spcPct val="0"/>
-              </a:spcAft>
-              <a:buClr>
-                <a:schemeClr val="tx1"/>
-              </a:buClr>
-              <a:buFont typeface="Ericsson Capital TT" pitchFamily="2" charset="0"/>
-              <a:buChar char="–"/>
-              <a:defRPr sz="2000">
-                <a:solidFill>
-                  <a:schemeClr val="tx1"/>
-                </a:solidFill>
-                <a:latin typeface="+mn-lt"/>
-              </a:defRPr>
-            </a:lvl2pPr>
-            <a:lvl3pPr marL="892175" indent="-179388" algn="l" rtl="0" eaLnBrk="1" fontAlgn="base" hangingPunct="1">
-              <a:spcBef>
-                <a:spcPct val="20000"/>
-              </a:spcBef>
-              <a:spcAft>
-                <a:spcPct val="0"/>
-              </a:spcAft>
-              <a:buClr>
-                <a:srgbClr val="92CCE5"/>
-              </a:buClr>
-              <a:buFont typeface="Ericsson Capital TT" pitchFamily="2" charset="0"/>
-              <a:buChar char="›"/>
-              <a:defRPr sz="2000">
-                <a:solidFill>
-                  <a:schemeClr val="tx1"/>
-                </a:solidFill>
-                <a:latin typeface="+mn-lt"/>
-              </a:defRPr>
-            </a:lvl3pPr>
-            <a:lvl4pPr marL="1252538" indent="-180975" algn="l" rtl="0" eaLnBrk="1" fontAlgn="base" hangingPunct="1">
-              <a:spcBef>
-                <a:spcPct val="20000"/>
-              </a:spcBef>
-              <a:spcAft>
-                <a:spcPct val="0"/>
-              </a:spcAft>
-              <a:buClr>
-                <a:schemeClr val="tx1"/>
-              </a:buClr>
-              <a:buFont typeface="Ericsson Capital TT" pitchFamily="2" charset="0"/>
-              <a:buChar char="-"/>
-              <a:defRPr sz="2000">
-                <a:solidFill>
-                  <a:schemeClr val="tx1"/>
-                </a:solidFill>
-                <a:latin typeface="+mn-lt"/>
-              </a:defRPr>
-            </a:lvl4pPr>
-            <a:lvl5pPr marL="1614488" indent="-180975" algn="l" rtl="0" eaLnBrk="1" fontAlgn="base" hangingPunct="1">
-              <a:spcBef>
-                <a:spcPct val="20000"/>
-              </a:spcBef>
-              <a:spcAft>
-                <a:spcPct val="0"/>
-              </a:spcAft>
-              <a:buClr>
-                <a:schemeClr val="tx1"/>
-              </a:buClr>
-              <a:buFont typeface="Ericsson Capital TT" pitchFamily="2" charset="0"/>
-              <a:buChar char="›"/>
-              <a:defRPr sz="2000">
-                <a:solidFill>
-                  <a:schemeClr val="tx1"/>
-                </a:solidFill>
-                <a:latin typeface="+mn-lt"/>
-              </a:defRPr>
-            </a:lvl5pPr>
-            <a:lvl6pPr marL="2071688" indent="-180975" algn="l" rtl="0" eaLnBrk="1" fontAlgn="base" hangingPunct="1">
-              <a:spcBef>
-                <a:spcPct val="20000"/>
-              </a:spcBef>
-              <a:spcAft>
-                <a:spcPct val="0"/>
-              </a:spcAft>
-              <a:buClr>
-                <a:schemeClr val="tx1"/>
-              </a:buClr>
-              <a:buFont typeface="Ericsson Capital TT" pitchFamily="2" charset="0"/>
-              <a:buChar char="›"/>
-              <a:defRPr sz="2000">
-                <a:solidFill>
-                  <a:schemeClr val="tx1"/>
-                </a:solidFill>
-                <a:latin typeface="+mn-lt"/>
-              </a:defRPr>
-            </a:lvl6pPr>
-            <a:lvl7pPr marL="2528888" indent="-180975" algn="l" rtl="0" eaLnBrk="1" fontAlgn="base" hangingPunct="1">
-              <a:spcBef>
-                <a:spcPct val="20000"/>
-              </a:spcBef>
-              <a:spcAft>
-                <a:spcPct val="0"/>
-              </a:spcAft>
-              <a:buClr>
-                <a:schemeClr val="tx1"/>
-              </a:buClr>
-              <a:buFont typeface="Ericsson Capital TT" pitchFamily="2" charset="0"/>
-              <a:buChar char="›"/>
-              <a:defRPr sz="2000">
-                <a:solidFill>
-                  <a:schemeClr val="tx1"/>
-                </a:solidFill>
-                <a:latin typeface="+mn-lt"/>
-              </a:defRPr>
-            </a:lvl7pPr>
-            <a:lvl8pPr marL="2986088" indent="-180975" algn="l" rtl="0" eaLnBrk="1" fontAlgn="base" hangingPunct="1">
-              <a:spcBef>
-                <a:spcPct val="20000"/>
-              </a:spcBef>
-              <a:spcAft>
-                <a:spcPct val="0"/>
-              </a:spcAft>
-              <a:buClr>
-                <a:schemeClr val="tx1"/>
-              </a:buClr>
-              <a:buFont typeface="Ericsson Capital TT" pitchFamily="2" charset="0"/>
-              <a:buChar char="›"/>
-              <a:defRPr sz="2000">
-                <a:solidFill>
-                  <a:schemeClr val="tx1"/>
-                </a:solidFill>
-                <a:latin typeface="+mn-lt"/>
-              </a:defRPr>
-            </a:lvl8pPr>
-            <a:lvl9pPr marL="3443288" indent="-180975" algn="l" rtl="0" eaLnBrk="1" fontAlgn="base" hangingPunct="1">
-              <a:spcBef>
-                <a:spcPct val="20000"/>
-              </a:spcBef>
-              <a:spcAft>
-                <a:spcPct val="0"/>
-              </a:spcAft>
-              <a:buClr>
-                <a:schemeClr val="tx1"/>
-              </a:buClr>
-              <a:buFont typeface="Ericsson Capital TT" pitchFamily="2" charset="0"/>
-              <a:buChar char="›"/>
-              <a:defRPr sz="2000">
-                <a:solidFill>
-                  <a:schemeClr val="tx1"/>
-                </a:solidFill>
-                <a:latin typeface="+mn-lt"/>
-              </a:defRPr>
-            </a:lvl9pPr>
-          </a:lstStyle>
-          <a:p>
-            <a:r>
-              <a:rPr lang="en-US" sz="2000" kern="0" dirty="0"/>
+          </a:p>
+          <a:p>
+            <a:r>
+              <a:rPr lang="en-US" sz="1600" kern="0" dirty="0"/>
               <a:t>For more truthful modeling of video</a:t>
             </a:r>
           </a:p>
           <a:p>
             <a:pPr lvl="1"/>
             <a:r>
-              <a:rPr lang="en-US" sz="1800" kern="0" dirty="0"/>
+              <a:rPr lang="en-US" sz="1400" kern="0" dirty="0"/>
               <a:t>-key </a:t>
             </a:r>
             <a:r>
-              <a:rPr lang="en-US" sz="1800" i="1" kern="0" dirty="0"/>
+              <a:rPr lang="en-US" sz="1400" i="1" kern="0" dirty="0"/>
               <a:t>interval multiplier</a:t>
             </a:r>
             <a:r>
-              <a:rPr lang="en-US" sz="1800" kern="0" dirty="0"/>
+              <a:rPr lang="en-US" sz="1400" kern="0" dirty="0"/>
               <a:t> </a:t>
             </a:r>
           </a:p>
           <a:p>
+            <a:pPr lvl="2"/>
+            <a:r>
+              <a:rPr lang="en-US" sz="1400" kern="0" dirty="0"/>
+              <a:t>Generates key frames every </a:t>
+            </a:r>
+            <a:r>
+              <a:rPr lang="en-US" sz="1400" i="1" kern="0" dirty="0"/>
+              <a:t>interval</a:t>
+            </a:r>
+            <a:r>
+              <a:rPr lang="en-US" sz="1400" kern="0" dirty="0"/>
+              <a:t> s with a size </a:t>
+            </a:r>
+            <a:r>
+              <a:rPr lang="en-US" sz="1400" i="1" kern="0" dirty="0"/>
+              <a:t>multiplier </a:t>
+            </a:r>
+            <a:r>
+              <a:rPr lang="en-US" sz="1400" kern="0" dirty="0"/>
+              <a:t>times larger than the “P-frames”</a:t>
+            </a:r>
+          </a:p>
+          <a:p>
             <a:pPr lvl="1"/>
             <a:r>
-              <a:rPr lang="en-US" sz="1800" kern="0" dirty="0"/>
-              <a:t>Generates key frames every </a:t>
-            </a:r>
-            <a:r>
-              <a:rPr lang="en-US" sz="1800" i="1" kern="0" dirty="0"/>
-              <a:t>interval</a:t>
-            </a:r>
-            <a:r>
-              <a:rPr lang="en-US" sz="1800" kern="0" dirty="0"/>
-              <a:t> s with a size </a:t>
-            </a:r>
-            <a:r>
-              <a:rPr lang="en-US" sz="1800" i="1" kern="0" dirty="0"/>
-              <a:t>multiplier </a:t>
-            </a:r>
-            <a:r>
-              <a:rPr lang="en-US" sz="1800" kern="0" dirty="0"/>
-              <a:t>times larger than the “P-frames”</a:t>
-            </a:r>
+              <a:rPr lang="en-US" sz="1400" kern="0" dirty="0"/>
+              <a:t>-rand </a:t>
+            </a:r>
+            <a:r>
+              <a:rPr lang="en-US" sz="1400" i="1" kern="0" dirty="0"/>
+              <a:t>value</a:t>
+            </a:r>
+          </a:p>
+          <a:p>
+            <a:pPr lvl="2"/>
+            <a:r>
+              <a:rPr lang="en-US" sz="1400" kern="0" dirty="0"/>
+              <a:t>Randomizes frame sizes +/- value %</a:t>
+            </a:r>
+          </a:p>
+          <a:p>
+            <a:endParaRPr lang="en-US" sz="1600" dirty="0"/>
           </a:p>
         </p:txBody>
       </p:sp>
@@ -25492,10 +25497,10 @@
       </p:sp>
       <p:pic>
         <p:nvPicPr>
-          <p:cNvPr id="3" name="Picture 2" descr="A screenshot of a cell phone&#10;&#10;Description automatically generated">
+          <p:cNvPr id="4" name="Picture 3" descr="A screenshot of text&#10;&#10;Description automatically generated">
             <a:extLst>
               <a:ext uri="{FF2B5EF4-FFF2-40B4-BE49-F238E27FC236}">
-                <a16:creationId xmlns:a16="http://schemas.microsoft.com/office/drawing/2014/main" id="{A75E5ADB-9D10-4D59-9121-E5564B514B01}"/>
+                <a16:creationId xmlns:a16="http://schemas.microsoft.com/office/drawing/2014/main" id="{9E6360F1-BA56-4FF7-AD50-5A8A64FC8C8E}"/>
               </a:ext>
             </a:extLst>
           </p:cNvPr>
@@ -25518,8 +25523,8 @@
         </p:blipFill>
         <p:spPr>
           <a:xfrm>
-            <a:off x="6043448" y="2371020"/>
-            <a:ext cx="6148552" cy="4486979"/>
+            <a:off x="6240464" y="814456"/>
+            <a:ext cx="5766148" cy="5656877"/>
           </a:xfrm>
           <a:prstGeom prst="rect">
             <a:avLst/>
@@ -27353,20 +27358,6 @@
 </file>
 
 <file path=customXml/item1.xml><?xml version="1.0" encoding="utf-8"?>
-<TemplafyFormConfiguration><![CDATA[{"formFields":[{"required":true,"placeholder":"","lines":0,"type":"textBox","name":"DocumentTitle","label":"Document Title","helpTexts":{"prefix":"","postfix":""},"spacing":{},"fullyQualifiedName":"DocumentTitle"},{"dataSource":"Confidentiality","displayColumn":"confidentiality","hideIfNoUserInteractionRequired":false,"distinct":true,"required":true,"autoSelectFirstOption":false,"type":"dropDown","name":"ConfidentialityClass","label":"Confidentiality Class","helpTexts":{"prefix":"","postfix":""},"spacing":{},"fullyQualifiedName":"ConfidentialityClass"},{"dataSource":"External Confidentiality label","displayColumn":"externalConfidentiality","hideIfNoUserInteractionRequired":false,"distinct":true,"required":false,"autoSelectFirstOption":false,"defaultValue":"1","type":"dropDown","name":"ExternalConfidentialityLabel","label":"External Confidentiality label","helpTexts":{"prefix":"","postfix":"If no external confidentiality class then please choose the blank value"},"spacing":{},"fullyQualifiedName":"ExternalConfidentialityLabel"},{"dataSource":"PowerPoint Document Type","column":"documentType","required":false,"placeholder":"","autoSelectFirstOption":false,"type":"comboBox","name":"DocTypePresentation","label":"Document Type Presentation","helpTexts":{"prefix":"","postfix":"If the document type differs from the default value, click on the X to delete and type/choose another type."},"spacing":{},"fullyQualifiedName":"DocTypePresentation"},{"required":false,"placeholder":"","lines":0,"type":"textBox","name":"DocumentNumber","label":"Document Number","helpTexts":{"prefix":"","postfix":""},"spacing":{},"fullyQualifiedName":"DocumentNumber"},{"dataSource":"Language code","displayColumn":"showName","hideIfNoUserInteractionRequired":false,"distinct":true,"required":false,"autoSelectFirstOption":false,"defaultValue":"1","type":"dropDown","name":"LanguageCode","label":"Language Code","helpTexts":{"prefix":"","postfix":"The language code will be appended to the Document No."},"spacing":{},"fullyQualifiedName":"LanguageCode"},{"dataSource":"Revision","column":"revision","required":false,"placeholder":"","autoSelectFirstOption":false,"type":"comboBox","name":"Revision","label":"Revision","helpTexts":{"prefix":"","postfix":""},"spacing":{},"fullyQualifiedName":"Revision"},{"required":false,"type":"datePicker","name":"Date","label":"Date","helpTexts":{"prefix":"","postfix":""},"spacing":{},"fullyQualifiedName":"Date"},{"type":"heading","name":"FooterVisibilityOptions","label":"Footer Visibility Options","helpTexts":{"prefix":"","postfix":""},"spacing":{},"fullyQualifiedName":"FooterVisibilityOptions"},{"dataSource":"PPT FooterVisibility","displayColumn":"templateType","hideIfNoUserInteractionRequired":false,"distinct":true,"required":true,"autoSelectFirstOption":false,"defaultValue":"1","type":"dropDown","name":"TemplateType","label":"Is this a document or presentation?","helpTexts":{"prefix":"","postfix":""},"spacing":{},"fullyQualifiedName":"TemplateType"},{"dataSource":"PPT FooterVisibility","displayColumn":"docTitle_label","hideIfNoUserInteractionRequired":false,"distinct":true,"required":false,"autoSelectFirstOption":true,"filter":{"column":"templateType","otherFieldName":"TemplateType","fullyQualifiedOtherFieldName":"TemplateType","otherFieldColumn":"TemplateType","formReference":"none","operator":"equals"},"type":"dropDown","name":"DocTitle","label":"Show document title in footer?","helpTexts":{"prefix":"","postfix":""},"spacing":{},"fullyQualifiedName":"DocTitle"},{"dataSource":"PPT FooterVisibility","displayColumn":"totalPageNo_text","hideIfNoUserInteractionRequired":false,"distinct":true,"required":false,"autoSelectFirstOption":true,"filter":{"column":"templateType","otherFieldName":"TemplateType","fullyQualifiedOtherFieldName":"TemplateType","otherFieldColumn":"TemplateType","formReference":"none","operator":"equals"},"type":"dropDown","name":"TotalPageNo","label":"Page numbering","helpTexts":{"prefix":"","postfix":""},"spacing":{},"fullyQualifiedName":"TotalPageNo"},{"required":false,"placeholder":"","lines":0,"defaultValue":"{{UserProfile.Prepared}}","type":"textBox","name":"Prepared","label":"Prepared By (Subject Responsible)","helpTexts":{"prefix":"","postfix":""},"spacing":{},"fullyQualifiedName":"Prepared"},{"required":false,"placeholder":"","lines":0,"type":"textBox","name":"ApprovedBy","label":"Approved By (Document Responsible)","helpTexts":{"prefix":"","postfix":""},"spacing":{},"fullyQualifiedName":"ApprovedBy"},{"required":false,"placeholder":"","lines":0,"type":"textBox","name":"Checked","label":"Checked","helpTexts":{"prefix":"","postfix":""},"spacing":{},"fullyQualifiedName":"Checked"},{"required":false,"placeholder":"","lines":0,"type":"textBox","name":"Reference","label":"Reference","helpTexts":{"prefix":"","postfix":""},"spacing":{},"fullyQualifiedName":"Reference"},{"required":false,"placeholder":"","lines":0,"type":"textBox","name":"Keywords","label":"Keywords","helpTexts":{"prefix":"","postfix":""},"spacing":{},"fullyQualifiedName":"Keywords"}],"formDataEntries":[{"name":"DocumentTitle","value":"HfKMJ7wB7KPEWJpFWibMqg=="},{"name":"ConfidentialityClass","value":"cT/FOwTWaPknrhRlNMh4SQ=="},{"name":"ExternalConfidentialityLabel","value":"u2D/MG3wyuAQhkGvE2fPaA=="},{"name":"LanguageCode","value":"5wlu7ZdPxHQj1W0w+yTNSg=="},{"name":"Date","value":"vb48xUhp/+BouvbbBJesXw=="},{"name":"TemplateType","value":"PxVEvJY8nE7m/hY9622Sng=="},{"name":"DocTitle","value":"PxVEvJY8nE7m/hY9622Sng=="},{"name":"TotalPageNo","value":"PxVEvJY8nE7m/hY9622Sng=="},{"name":"Prepared","value":"PqdHBiLjqdpOMxfLUK9Tonaq9XwuinzCFKYJ7RK3+SI="}]}]]></TemplafyFormConfiguration>
-</file>
-
-<file path=customXml/item10.xml><?xml version="1.0" encoding="utf-8"?>
-<p:properties xmlns:p="http://schemas.microsoft.com/office/2006/metadata/properties" xmlns:xsi="http://www.w3.org/2001/XMLSchema-instance" xmlns:pc="http://schemas.microsoft.com/office/infopath/2007/PartnerControls">
-  <documentManagement/>
-</p:properties>
-</file>
-
-<file path=customXml/item11.xml><?xml version="1.0" encoding="utf-8"?>
-<TemplafySlideTemplateConfiguration><![CDATA[{"documentContentValidatorConfiguration":{"enableDocumentContentValidator":false,"documentContentValidatorVersion":0},"elementsMetadata":[],"slideId":"637037983905221558","enableDocumentContentUpdater":true,"version":"1.9"}]]></TemplafySlideTemplateConfiguration>
-</file>
-
-<file path=customXml/item12.xml><?xml version="1.0" encoding="utf-8"?>
 <ct:contentTypeSchema xmlns:ct="http://schemas.microsoft.com/office/2006/metadata/contentType" xmlns:ma="http://schemas.microsoft.com/office/2006/metadata/properties/metaAttributes" ct:_="" ma:_="" ma:contentTypeName="Document" ma:contentTypeID="0x0101002C8661F604A9A64C9627B875CBEE0D49" ma:contentTypeVersion="13" ma:contentTypeDescription="Create a new document." ma:contentTypeScope="" ma:versionID="efb89547655977800231d60c8e2388d5">
   <xsd:schema xmlns:xsd="http://www.w3.org/2001/XMLSchema" xmlns:xs="http://www.w3.org/2001/XMLSchema" xmlns:p="http://schemas.microsoft.com/office/2006/metadata/properties" xmlns:ns3="92e1255f-bb7b-4dc9-b051-584cc104eb44" xmlns:ns4="a6550eff-0fc9-443f-8e77-72cbcf778382" targetNamespace="http://schemas.microsoft.com/office/2006/metadata/properties" ma:root="true" ma:fieldsID="5147822fdb6803771ba7305cbc438486" ns3:_="" ns4:_="">
     <xsd:import namespace="92e1255f-bb7b-4dc9-b051-584cc104eb44"/>
@@ -27589,8 +27580,22 @@
 </ct:contentTypeSchema>
 </file>
 
+<file path=customXml/item10.xml><?xml version="1.0" encoding="utf-8"?>
+<p:properties xmlns:p="http://schemas.microsoft.com/office/2006/metadata/properties" xmlns:xsi="http://www.w3.org/2001/XMLSchema-instance" xmlns:pc="http://schemas.microsoft.com/office/infopath/2007/PartnerControls">
+  <documentManagement/>
+</p:properties>
+</file>
+
+<file path=customXml/item11.xml><?xml version="1.0" encoding="utf-8"?>
+<TemplafySlideTemplateConfiguration><![CDATA[{"documentContentValidatorConfiguration":{"enableDocumentContentValidator":false,"documentContentValidatorVersion":0},"elementsMetadata":[],"slideId":"637037983905678162","enableDocumentContentUpdater":true,"version":"1.9"}]]></TemplafySlideTemplateConfiguration>
+</file>
+
+<file path=customXml/item12.xml><?xml version="1.0" encoding="utf-8"?>
+<TemplafySlideTemplateConfiguration><![CDATA[{"documentContentValidatorConfiguration":{"enableDocumentContentValidator":false,"documentContentValidatorVersion":0},"elementsMetadata":[],"slideId":"637050925554934895","enableDocumentContentUpdater":true,"version":"1.9"}]]></TemplafySlideTemplateConfiguration>
+</file>
+
 <file path=customXml/item13.xml><?xml version="1.0" encoding="utf-8"?>
-<TemplafySlideTemplateConfiguration><![CDATA[{"documentContentValidatorConfiguration":{"enableDocumentContentValidator":false,"documentContentValidatorVersion":0},"elementsMetadata":[],"slideId":"637171128435180813","enableDocumentContentUpdater":true,"version":"1.9"}]]></TemplafySlideTemplateConfiguration>
+<TemplafySlideFormConfiguration><![CDATA[{"formFields":[],"formDataEntries":[]}]]></TemplafySlideFormConfiguration>
 </file>
 
 <file path=customXml/item14.xml><?xml version="1.0" encoding="utf-8"?>
@@ -27598,10 +27603,34 @@
 </file>
 
 <file path=customXml/item15.xml><?xml version="1.0" encoding="utf-8"?>
-<TemplafySlideTemplateConfiguration><![CDATA[{"elementsMetadata":[],"documentContentValidatorConfiguration":{"enableDocumentContentValidator":false,"documentContentValidatorVersion":0},"slideId":"637027476704980324","enableDocumentContentUpdater":true,"version":"1.9"}]]></TemplafySlideTemplateConfiguration>
+<TemplafySlideTemplateConfiguration><![CDATA[{"documentContentValidatorConfiguration":{"enableDocumentContentValidator":false,"documentContentValidatorVersion":0},"elementsMetadata":[],"slideId":"637171128435648944","enableDocumentContentUpdater":true,"version":"1.9"}]]></TemplafySlideTemplateConfiguration>
 </file>
 
 <file path=customXml/item16.xml><?xml version="1.0" encoding="utf-8"?>
+<TemplafySlideTemplateConfiguration><![CDATA[{"documentContentValidatorConfiguration":{"enableDocumentContentValidator":false,"documentContentValidatorVersion":0},"elementsMetadata":[],"slideId":"637171128435180813","enableDocumentContentUpdater":true,"version":"1.9"}]]></TemplafySlideTemplateConfiguration>
+</file>
+
+<file path=customXml/item17.xml><?xml version="1.0" encoding="utf-8"?>
+<TemplafySlideFormConfiguration><![CDATA[{"formFields":[],"formDataEntries":[]}]]></TemplafySlideFormConfiguration>
+</file>
+
+<file path=customXml/item18.xml><?xml version="1.0" encoding="utf-8"?>
+<TemplafyTemplateConfiguration><![CDATA[{"elementsMetadata":[{"type":"shape","id":"5d67e717-74bf-41a6-8dce-47082e2c1da1","elementConfiguration":{"inheritDimensions":"inheritNone","height":"1.34 cm","binding":"Form.LogoInsertion.Pplogoname","disableUpdates":false,"type":"image"}}],"transformationConfigurations":[{"language":"{{DocumentLanguage}}","disableUpdates":false,"type":"proofingLanguage"},{"propertyName":"FooterText","propertyValue":"true","disableUpdates":false,"type":"customDocumentProperty"},{"propertyName":"SecurityClass","propertyValue":"{{Form.ConfidentialityClass.Confidentiality}}","disableUpdates":false,"type":"customDocumentProperty"},{"propertyName":"ExtConf","propertyValue":"{{Form.ExternalConfidentialityLabel.ExternalConfidentiality}}","disableUpdates":false,"type":"customDocumentProperty"},{"propertyName":"Prepared","propertyValue":"{{Form.Prepared}}","disableUpdates":false,"type":"customDocumentProperty"},{"propertyName":"ApprovedBy","propertyValue":"{{Form.ApprovedBy}}","disableUpdates":false,"type":"customDocumentProperty"},{"propertyName":"DocNo","propertyValue":"{{Form.DocumentNumber}} {{Form.LanguageCode.LanguageCode}}","disableUpdates":false,"type":"customDocumentProperty"},{"propertyName":"Checked","propertyValue":"{{Form.Checked}}","disableUpdates":false,"type":"customDocumentProperty"},{"propertyName":"Date","propertyValue":"{{Form.Date}}","disableUpdates":false,"type":"customDocumentProperty"},{"propertyName":"Reference","propertyValue":"{{Form.Reference}}","disableUpdates":false,"type":"customDocumentProperty"},{"propertyName":"Title","propertyValue":"{{Form.DocumentTitle}}","disableUpdates":false,"type":"customDocumentProperty"},{"propertyName":"Keyword","propertyValue":"{{Form.Keywords}}","disableUpdates":false,"type":"customDocumentProperty"},{"propertyName":"DocumentType","propertyValue":"Presentation2011","disableUpdates":false,"type":"customDocumentProperty"},{"propertyName":"Language","propertyValue":"EnglishUS","disableUpdates":false,"type":"customDocumentProperty"},{"propertyName":"TemplateID","propertyValue":"FALSE","disableUpdates":false,"type":"customDocumentProperty"},{"propertyName":"ConfCtrl","propertyValue":"FALSE","disableUpdates":false,"type":"customDocumentProperty"},{"propertyName":"title","propertyValue":"{{Form.DocumentTitle}}","disableUpdates":false,"type":"documentProperty"},{"propertyName":"keywords","propertyValue":"{{Form.Keywords}}","disableUpdates":false,"type":"documentProperty"},{"propertyName":"creator","propertyValue":"{{Form.Prepared}}","disableUpdates":false,"type":"documentProperty"},{"propertyName":"DocTitle","propertyValue":"{{Form.DocTitle.DocTitle}}","disableUpdates":false,"type":"customDocumentProperty"},{"propertyName":"IsDocument","propertyValue":"{{Form.TemplateType.IsDocument}}","disableUpdates":false,"type":"customDocumentProperty"},{"propertyName":"IsPresentation","propertyValue":"{{Form.TemplateType.IsPresentation}}","disableUpdates":false,"type":"customDocumentProperty"},{"propertyName":"company","propertyValue":"Ericsson","disableUpdates":false,"type":"documentProperty"},{"propertyName":"PageNumberVisible","propertyValue":"{{Form.TotalPageNo.TotalPageNo_value}}","disableUpdates":false,"type":"customDocumentProperty"},{"propertyName":"Revision","propertyValue":"{{Form.Revision}}","disableUpdates":false,"type":"customDocumentProperty"},{"propertyName":"DocType","propertyValue":"{{Form.DocTypePresentation}}","disableUpdates":false,"type":"customDocumentProperty"},{"propertyName":"TemplateVersion","propertyValue":"R2A","disableUpdates":false,"type":"customDocumentProperty"},{"propertyName":"PackageNo","propertyValue":"LXA 119 603","disableUpdates":false,"type":"customDocumentProperty"},{"propertyName":"PackageVersion","propertyValue":"R6B","disableUpdates":false,"type":"customDocumentProperty"},{"propertyName":"TemplateName","propertyValue":"CXC 173 2731/1","disableUpdates":false,"type":"customDocumentProperty"},{"propertyName":"DocName","propertyValue":" ","disableUpdates":false,"type":"customDocumentProperty"},{"propertyName":"description","propertyValue":"{{Form.DocumentNumber}} {{Form.LanguageCode.LanguageCode}}\nRev {{Form.Revision}}","disableUpdates":false,"type":"documentProperty"}],"templateName":"New presentation (Standard landscape)","templateDescription":"","enableDocumentContentUpdater":true,"version":"1.9"}]]></TemplafyTemplateConfiguration>
+</file>
+
+<file path=customXml/item19.xml><?xml version="1.0" encoding="utf-8"?>
+<TemplafySlideFormConfiguration><![CDATA[{"formFields":[],"formDataEntries":[]}]]></TemplafySlideFormConfiguration>
+</file>
+
+<file path=customXml/item2.xml><?xml version="1.0" encoding="utf-8"?>
+<TemplafySlideFormConfiguration><![CDATA[{"formFields":[],"formDataEntries":[]}]]></TemplafySlideFormConfiguration>
+</file>
+
+<file path=customXml/item3.xml><?xml version="1.0" encoding="utf-8"?>
+<TemplafySlideFormConfiguration><![CDATA[{"formFields":[],"formDataEntries":[]}]]></TemplafySlideFormConfiguration>
+</file>
+
+<file path=customXml/item4.xml><?xml version="1.0" encoding="utf-8"?>
 <?mso-contentType ?>
 <FormTemplates xmlns="http://schemas.microsoft.com/sharepoint/v3/contenttype/forms">
   <Display>DocumentLibraryForm</Display>
@@ -27610,32 +27639,8 @@
 </FormTemplates>
 </file>
 
-<file path=customXml/item17.xml><?xml version="1.0" encoding="utf-8"?>
-<TemplafySlideFormConfiguration><![CDATA[{"formFields":[],"formDataEntries":[]}]]></TemplafySlideFormConfiguration>
-</file>
-
-<file path=customXml/item18.xml><?xml version="1.0" encoding="utf-8"?>
-<TemplafySlideFormConfiguration><![CDATA[{"formFields":[],"formDataEntries":[]}]]></TemplafySlideFormConfiguration>
-</file>
-
-<file path=customXml/item19.xml><?xml version="1.0" encoding="utf-8"?>
-<TemplafySlideTemplateConfiguration><![CDATA[{"documentContentValidatorConfiguration":{"enableDocumentContentValidator":false,"documentContentValidatorVersion":0},"elementsMetadata":[],"slideId":"637037983905678162","enableDocumentContentUpdater":true,"version":"1.9"}]]></TemplafySlideTemplateConfiguration>
-</file>
-
-<file path=customXml/item2.xml><?xml version="1.0" encoding="utf-8"?>
-<TemplafySlideFormConfiguration><![CDATA[{"formFields":[],"formDataEntries":[]}]]></TemplafySlideFormConfiguration>
-</file>
-
-<file path=customXml/item3.xml><?xml version="1.0" encoding="utf-8"?>
-<TemplafyTemplateConfiguration><![CDATA[{"elementsMetadata":[{"type":"shape","id":"5d67e717-74bf-41a6-8dce-47082e2c1da1","elementConfiguration":{"inheritDimensions":"inheritNone","height":"1.34 cm","binding":"Form.LogoInsertion.Pplogoname","disableUpdates":false,"type":"image"}}],"transformationConfigurations":[{"language":"{{DocumentLanguage}}","disableUpdates":false,"type":"proofingLanguage"},{"propertyName":"FooterText","propertyValue":"true","disableUpdates":false,"type":"customDocumentProperty"},{"propertyName":"SecurityClass","propertyValue":"{{Form.ConfidentialityClass.Confidentiality}}","disableUpdates":false,"type":"customDocumentProperty"},{"propertyName":"ExtConf","propertyValue":"{{Form.ExternalConfidentialityLabel.ExternalConfidentiality}}","disableUpdates":false,"type":"customDocumentProperty"},{"propertyName":"Prepared","propertyValue":"{{Form.Prepared}}","disableUpdates":false,"type":"customDocumentProperty"},{"propertyName":"ApprovedBy","propertyValue":"{{Form.ApprovedBy}}","disableUpdates":false,"type":"customDocumentProperty"},{"propertyName":"DocNo","propertyValue":"{{Form.DocumentNumber}} {{Form.LanguageCode.LanguageCode}}","disableUpdates":false,"type":"customDocumentProperty"},{"propertyName":"Checked","propertyValue":"{{Form.Checked}}","disableUpdates":false,"type":"customDocumentProperty"},{"propertyName":"Date","propertyValue":"{{Form.Date}}","disableUpdates":false,"type":"customDocumentProperty"},{"propertyName":"Reference","propertyValue":"{{Form.Reference}}","disableUpdates":false,"type":"customDocumentProperty"},{"propertyName":"Title","propertyValue":"{{Form.DocumentTitle}}","disableUpdates":false,"type":"customDocumentProperty"},{"propertyName":"Keyword","propertyValue":"{{Form.Keywords}}","disableUpdates":false,"type":"customDocumentProperty"},{"propertyName":"DocumentType","propertyValue":"Presentation2011","disableUpdates":false,"type":"customDocumentProperty"},{"propertyName":"Language","propertyValue":"EnglishUS","disableUpdates":false,"type":"customDocumentProperty"},{"propertyName":"TemplateID","propertyValue":"FALSE","disableUpdates":false,"type":"customDocumentProperty"},{"propertyName":"ConfCtrl","propertyValue":"FALSE","disableUpdates":false,"type":"customDocumentProperty"},{"propertyName":"title","propertyValue":"{{Form.DocumentTitle}}","disableUpdates":false,"type":"documentProperty"},{"propertyName":"keywords","propertyValue":"{{Form.Keywords}}","disableUpdates":false,"type":"documentProperty"},{"propertyName":"creator","propertyValue":"{{Form.Prepared}}","disableUpdates":false,"type":"documentProperty"},{"propertyName":"DocTitle","propertyValue":"{{Form.DocTitle.DocTitle}}","disableUpdates":false,"type":"customDocumentProperty"},{"propertyName":"IsDocument","propertyValue":"{{Form.TemplateType.IsDocument}}","disableUpdates":false,"type":"customDocumentProperty"},{"propertyName":"IsPresentation","propertyValue":"{{Form.TemplateType.IsPresentation}}","disableUpdates":false,"type":"customDocumentProperty"},{"propertyName":"company","propertyValue":"Ericsson","disableUpdates":false,"type":"documentProperty"},{"propertyName":"PageNumberVisible","propertyValue":"{{Form.TotalPageNo.TotalPageNo_value}}","disableUpdates":false,"type":"customDocumentProperty"},{"propertyName":"Revision","propertyValue":"{{Form.Revision}}","disableUpdates":false,"type":"customDocumentProperty"},{"propertyName":"DocType","propertyValue":"{{Form.DocTypePresentation}}","disableUpdates":false,"type":"customDocumentProperty"},{"propertyName":"TemplateVersion","propertyValue":"R2A","disableUpdates":false,"type":"customDocumentProperty"},{"propertyName":"PackageNo","propertyValue":"LXA 119 603","disableUpdates":false,"type":"customDocumentProperty"},{"propertyName":"PackageVersion","propertyValue":"R6B","disableUpdates":false,"type":"customDocumentProperty"},{"propertyName":"TemplateName","propertyValue":"CXC 173 2731/1","disableUpdates":false,"type":"customDocumentProperty"},{"propertyName":"DocName","propertyValue":" ","disableUpdates":false,"type":"customDocumentProperty"},{"propertyName":"description","propertyValue":"{{Form.DocumentNumber}} {{Form.LanguageCode.LanguageCode}}\nRev {{Form.Revision}}","disableUpdates":false,"type":"documentProperty"}],"templateName":"New presentation (Standard landscape)","templateDescription":"","enableDocumentContentUpdater":true,"version":"1.9"}]]></TemplafyTemplateConfiguration>
-</file>
-
-<file path=customXml/item4.xml><?xml version="1.0" encoding="utf-8"?>
-<TemplafySlideTemplateConfiguration><![CDATA[{"documentContentValidatorConfiguration":{"enableDocumentContentValidator":false,"documentContentValidatorVersion":0},"elementsMetadata":[],"slideId":"637050925554934895","enableDocumentContentUpdater":true,"version":"1.9"}]]></TemplafySlideTemplateConfiguration>
-</file>
-
 <file path=customXml/item5.xml><?xml version="1.0" encoding="utf-8"?>
-<TemplafySlideTemplateConfiguration><![CDATA[{"documentContentValidatorConfiguration":{"enableDocumentContentValidator":false,"documentContentValidatorVersion":0},"elementsMetadata":[],"slideId":"637037983905221557","enableDocumentContentUpdater":true,"version":"1.9"}]]></TemplafySlideTemplateConfiguration>
+<TemplafyFormConfiguration><![CDATA[{"formFields":[{"required":true,"placeholder":"","lines":0,"type":"textBox","name":"DocumentTitle","label":"Document Title","helpTexts":{"prefix":"","postfix":""},"spacing":{},"fullyQualifiedName":"DocumentTitle"},{"dataSource":"Confidentiality","displayColumn":"confidentiality","hideIfNoUserInteractionRequired":false,"distinct":true,"required":true,"autoSelectFirstOption":false,"type":"dropDown","name":"ConfidentialityClass","label":"Confidentiality Class","helpTexts":{"prefix":"","postfix":""},"spacing":{},"fullyQualifiedName":"ConfidentialityClass"},{"dataSource":"External Confidentiality label","displayColumn":"externalConfidentiality","hideIfNoUserInteractionRequired":false,"distinct":true,"required":false,"autoSelectFirstOption":false,"defaultValue":"1","type":"dropDown","name":"ExternalConfidentialityLabel","label":"External Confidentiality label","helpTexts":{"prefix":"","postfix":"If no external confidentiality class then please choose the blank value"},"spacing":{},"fullyQualifiedName":"ExternalConfidentialityLabel"},{"dataSource":"PowerPoint Document Type","column":"documentType","required":false,"placeholder":"","autoSelectFirstOption":false,"type":"comboBox","name":"DocTypePresentation","label":"Document Type Presentation","helpTexts":{"prefix":"","postfix":"If the document type differs from the default value, click on the X to delete and type/choose another type."},"spacing":{},"fullyQualifiedName":"DocTypePresentation"},{"required":false,"placeholder":"","lines":0,"type":"textBox","name":"DocumentNumber","label":"Document Number","helpTexts":{"prefix":"","postfix":""},"spacing":{},"fullyQualifiedName":"DocumentNumber"},{"dataSource":"Language code","displayColumn":"showName","hideIfNoUserInteractionRequired":false,"distinct":true,"required":false,"autoSelectFirstOption":false,"defaultValue":"1","type":"dropDown","name":"LanguageCode","label":"Language Code","helpTexts":{"prefix":"","postfix":"The language code will be appended to the Document No."},"spacing":{},"fullyQualifiedName":"LanguageCode"},{"dataSource":"Revision","column":"revision","required":false,"placeholder":"","autoSelectFirstOption":false,"type":"comboBox","name":"Revision","label":"Revision","helpTexts":{"prefix":"","postfix":""},"spacing":{},"fullyQualifiedName":"Revision"},{"required":false,"type":"datePicker","name":"Date","label":"Date","helpTexts":{"prefix":"","postfix":""},"spacing":{},"fullyQualifiedName":"Date"},{"type":"heading","name":"FooterVisibilityOptions","label":"Footer Visibility Options","helpTexts":{"prefix":"","postfix":""},"spacing":{},"fullyQualifiedName":"FooterVisibilityOptions"},{"dataSource":"PPT FooterVisibility","displayColumn":"templateType","hideIfNoUserInteractionRequired":false,"distinct":true,"required":true,"autoSelectFirstOption":false,"defaultValue":"1","type":"dropDown","name":"TemplateType","label":"Is this a document or presentation?","helpTexts":{"prefix":"","postfix":""},"spacing":{},"fullyQualifiedName":"TemplateType"},{"dataSource":"PPT FooterVisibility","displayColumn":"docTitle_label","hideIfNoUserInteractionRequired":false,"distinct":true,"required":false,"autoSelectFirstOption":true,"filter":{"column":"templateType","otherFieldName":"TemplateType","fullyQualifiedOtherFieldName":"TemplateType","otherFieldColumn":"TemplateType","formReference":"none","operator":"equals"},"type":"dropDown","name":"DocTitle","label":"Show document title in footer?","helpTexts":{"prefix":"","postfix":""},"spacing":{},"fullyQualifiedName":"DocTitle"},{"dataSource":"PPT FooterVisibility","displayColumn":"totalPageNo_text","hideIfNoUserInteractionRequired":false,"distinct":true,"required":false,"autoSelectFirstOption":true,"filter":{"column":"templateType","otherFieldName":"TemplateType","fullyQualifiedOtherFieldName":"TemplateType","otherFieldColumn":"TemplateType","formReference":"none","operator":"equals"},"type":"dropDown","name":"TotalPageNo","label":"Page numbering","helpTexts":{"prefix":"","postfix":""},"spacing":{},"fullyQualifiedName":"TotalPageNo"},{"required":false,"placeholder":"","lines":0,"defaultValue":"{{UserProfile.Prepared}}","type":"textBox","name":"Prepared","label":"Prepared By (Subject Responsible)","helpTexts":{"prefix":"","postfix":""},"spacing":{},"fullyQualifiedName":"Prepared"},{"required":false,"placeholder":"","lines":0,"type":"textBox","name":"ApprovedBy","label":"Approved By (Document Responsible)","helpTexts":{"prefix":"","postfix":""},"spacing":{},"fullyQualifiedName":"ApprovedBy"},{"required":false,"placeholder":"","lines":0,"type":"textBox","name":"Checked","label":"Checked","helpTexts":{"prefix":"","postfix":""},"spacing":{},"fullyQualifiedName":"Checked"},{"required":false,"placeholder":"","lines":0,"type":"textBox","name":"Reference","label":"Reference","helpTexts":{"prefix":"","postfix":""},"spacing":{},"fullyQualifiedName":"Reference"},{"required":false,"placeholder":"","lines":0,"type":"textBox","name":"Keywords","label":"Keywords","helpTexts":{"prefix":"","postfix":""},"spacing":{},"fullyQualifiedName":"Keywords"}],"formDataEntries":[{"name":"DocumentTitle","value":"HfKMJ7wB7KPEWJpFWibMqg=="},{"name":"ConfidentialityClass","value":"cT/FOwTWaPknrhRlNMh4SQ=="},{"name":"ExternalConfidentialityLabel","value":"u2D/MG3wyuAQhkGvE2fPaA=="},{"name":"LanguageCode","value":"5wlu7ZdPxHQj1W0w+yTNSg=="},{"name":"Date","value":"vb48xUhp/+BouvbbBJesXw=="},{"name":"TemplateType","value":"PxVEvJY8nE7m/hY9622Sng=="},{"name":"DocTitle","value":"PxVEvJY8nE7m/hY9622Sng=="},{"name":"TotalPageNo","value":"PxVEvJY8nE7m/hY9622Sng=="},{"name":"Prepared","value":"PqdHBiLjqdpOMxfLUK9Tonaq9XwuinzCFKYJ7RK3+SI="}]}]]></TemplafyFormConfiguration>
 </file>
 
 <file path=customXml/item6.xml><?xml version="1.0" encoding="utf-8"?>
@@ -27643,20 +27648,33 @@
 </file>
 
 <file path=customXml/item7.xml><?xml version="1.0" encoding="utf-8"?>
-<TemplafySlideFormConfiguration><![CDATA[{"formFields":[],"formDataEntries":[]}]]></TemplafySlideFormConfiguration>
+<TemplafySlideTemplateConfiguration><![CDATA[{"documentContentValidatorConfiguration":{"enableDocumentContentValidator":false,"documentContentValidatorVersion":0},"elementsMetadata":[],"slideId":"637037983905221558","enableDocumentContentUpdater":true,"version":"1.9"}]]></TemplafySlideTemplateConfiguration>
 </file>
 
 <file path=customXml/item8.xml><?xml version="1.0" encoding="utf-8"?>
-<TemplafySlideTemplateConfiguration><![CDATA[{"documentContentValidatorConfiguration":{"enableDocumentContentValidator":false,"documentContentValidatorVersion":0},"elementsMetadata":[],"slideId":"637171128435648944","enableDocumentContentUpdater":true,"version":"1.9"}]]></TemplafySlideTemplateConfiguration>
+<TemplafySlideTemplateConfiguration><![CDATA[{"documentContentValidatorConfiguration":{"enableDocumentContentValidator":false,"documentContentValidatorVersion":0},"elementsMetadata":[],"slideId":"637037983905221557","enableDocumentContentUpdater":true,"version":"1.9"}]]></TemplafySlideTemplateConfiguration>
 </file>
 
 <file path=customXml/item9.xml><?xml version="1.0" encoding="utf-8"?>
-<TemplafySlideFormConfiguration><![CDATA[{"formFields":[],"formDataEntries":[]}]]></TemplafySlideFormConfiguration>
+<TemplafySlideTemplateConfiguration><![CDATA[{"elementsMetadata":[],"documentContentValidatorConfiguration":{"enableDocumentContentValidator":false,"documentContentValidatorVersion":0},"slideId":"637027476704980324","enableDocumentContentUpdater":true,"version":"1.9"}]]></TemplafySlideTemplateConfiguration>
 </file>
 
 <file path=customXml/itemProps1.xml><?xml version="1.0" encoding="utf-8"?>
-<ds:datastoreItem xmlns:ds="http://schemas.openxmlformats.org/officeDocument/2006/customXml" ds:itemID="{D92C3DF5-A179-4E2D-BD20-07044B39171F}">
-  <ds:schemaRefs/>
+<ds:datastoreItem xmlns:ds="http://schemas.openxmlformats.org/officeDocument/2006/customXml" ds:itemID="{058EED06-94C4-4781-888F-0A8BB816BC9F}">
+  <ds:schemaRefs>
+    <ds:schemaRef ds:uri="http://schemas.microsoft.com/office/2006/metadata/contentType"/>
+    <ds:schemaRef ds:uri="http://schemas.microsoft.com/office/2006/metadata/properties/metaAttributes"/>
+    <ds:schemaRef ds:uri="http://www.w3.org/2001/XMLSchema"/>
+    <ds:schemaRef ds:uri="http://schemas.microsoft.com/office/2006/metadata/properties"/>
+    <ds:schemaRef ds:uri="92e1255f-bb7b-4dc9-b051-584cc104eb44"/>
+    <ds:schemaRef ds:uri="a6550eff-0fc9-443f-8e77-72cbcf778382"/>
+    <ds:schemaRef ds:uri="http://schemas.microsoft.com/office/2006/documentManagement/types"/>
+    <ds:schemaRef ds:uri="http://schemas.microsoft.com/office/infopath/2007/PartnerControls"/>
+    <ds:schemaRef ds:uri="http://schemas.openxmlformats.org/package/2006/metadata/core-properties"/>
+    <ds:schemaRef ds:uri="http://purl.org/dc/elements/1.1/"/>
+    <ds:schemaRef ds:uri="http://purl.org/dc/terms/"/>
+    <ds:schemaRef ds:uri="http://schemas.microsoft.com/internal/obd"/>
+  </ds:schemaRefs>
 </ds:datastoreItem>
 </file>
 
@@ -27678,32 +27696,19 @@
 </file>
 
 <file path=customXml/itemProps11.xml><?xml version="1.0" encoding="utf-8"?>
-<ds:datastoreItem xmlns:ds="http://schemas.openxmlformats.org/officeDocument/2006/customXml" ds:itemID="{683FEB75-8CFA-449C-A6B1-B1E4A86A58A1}">
+<ds:datastoreItem xmlns:ds="http://schemas.openxmlformats.org/officeDocument/2006/customXml" ds:itemID="{1CE36EA9-2186-4EB1-871A-8AE59C2A13BB}">
   <ds:schemaRefs/>
 </ds:datastoreItem>
 </file>
 
 <file path=customXml/itemProps12.xml><?xml version="1.0" encoding="utf-8"?>
-<ds:datastoreItem xmlns:ds="http://schemas.openxmlformats.org/officeDocument/2006/customXml" ds:itemID="{058EED06-94C4-4781-888F-0A8BB816BC9F}">
-  <ds:schemaRefs>
-    <ds:schemaRef ds:uri="http://schemas.microsoft.com/office/2006/metadata/contentType"/>
-    <ds:schemaRef ds:uri="http://schemas.microsoft.com/office/2006/metadata/properties/metaAttributes"/>
-    <ds:schemaRef ds:uri="http://www.w3.org/2001/XMLSchema"/>
-    <ds:schemaRef ds:uri="http://schemas.microsoft.com/office/2006/metadata/properties"/>
-    <ds:schemaRef ds:uri="92e1255f-bb7b-4dc9-b051-584cc104eb44"/>
-    <ds:schemaRef ds:uri="a6550eff-0fc9-443f-8e77-72cbcf778382"/>
-    <ds:schemaRef ds:uri="http://schemas.microsoft.com/office/2006/documentManagement/types"/>
-    <ds:schemaRef ds:uri="http://schemas.microsoft.com/office/infopath/2007/PartnerControls"/>
-    <ds:schemaRef ds:uri="http://schemas.openxmlformats.org/package/2006/metadata/core-properties"/>
-    <ds:schemaRef ds:uri="http://purl.org/dc/elements/1.1/"/>
-    <ds:schemaRef ds:uri="http://purl.org/dc/terms/"/>
-    <ds:schemaRef ds:uri="http://schemas.microsoft.com/internal/obd"/>
-  </ds:schemaRefs>
+<ds:datastoreItem xmlns:ds="http://schemas.openxmlformats.org/officeDocument/2006/customXml" ds:itemID="{03AF3FDC-ACD1-46F3-A43E-782322DF9816}">
+  <ds:schemaRefs/>
 </ds:datastoreItem>
 </file>
 
 <file path=customXml/itemProps13.xml><?xml version="1.0" encoding="utf-8"?>
-<ds:datastoreItem xmlns:ds="http://schemas.openxmlformats.org/officeDocument/2006/customXml" ds:itemID="{AB2F4486-6448-49E3-8249-BB9C7492711D}">
+<ds:datastoreItem xmlns:ds="http://schemas.openxmlformats.org/officeDocument/2006/customXml" ds:itemID="{C99E78A0-C9D4-446F-B674-4DD3E2B46C5D}">
   <ds:schemaRefs/>
 </ds:datastoreItem>
 </file>
@@ -27715,12 +27720,48 @@
 </file>
 
 <file path=customXml/itemProps15.xml><?xml version="1.0" encoding="utf-8"?>
-<ds:datastoreItem xmlns:ds="http://schemas.openxmlformats.org/officeDocument/2006/customXml" ds:itemID="{C09F197C-6A49-47D0-B877-F88807989676}">
+<ds:datastoreItem xmlns:ds="http://schemas.openxmlformats.org/officeDocument/2006/customXml" ds:itemID="{C750C5DC-043F-4BD3-940C-EB6F7625E286}">
   <ds:schemaRefs/>
 </ds:datastoreItem>
 </file>
 
 <file path=customXml/itemProps16.xml><?xml version="1.0" encoding="utf-8"?>
+<ds:datastoreItem xmlns:ds="http://schemas.openxmlformats.org/officeDocument/2006/customXml" ds:itemID="{AB2F4486-6448-49E3-8249-BB9C7492711D}">
+  <ds:schemaRefs/>
+</ds:datastoreItem>
+</file>
+
+<file path=customXml/itemProps17.xml><?xml version="1.0" encoding="utf-8"?>
+<ds:datastoreItem xmlns:ds="http://schemas.openxmlformats.org/officeDocument/2006/customXml" ds:itemID="{847502A6-7CBE-43AF-BDF6-4D4423521D8C}">
+  <ds:schemaRefs/>
+</ds:datastoreItem>
+</file>
+
+<file path=customXml/itemProps18.xml><?xml version="1.0" encoding="utf-8"?>
+<ds:datastoreItem xmlns:ds="http://schemas.openxmlformats.org/officeDocument/2006/customXml" ds:itemID="{07958A4E-FAB1-42E4-B6B5-29B01F63F87B}">
+  <ds:schemaRefs/>
+</ds:datastoreItem>
+</file>
+
+<file path=customXml/itemProps19.xml><?xml version="1.0" encoding="utf-8"?>
+<ds:datastoreItem xmlns:ds="http://schemas.openxmlformats.org/officeDocument/2006/customXml" ds:itemID="{B9AEDDE3-EA02-4A8F-B8F8-0606A0AA45FC}">
+  <ds:schemaRefs/>
+</ds:datastoreItem>
+</file>
+
+<file path=customXml/itemProps2.xml><?xml version="1.0" encoding="utf-8"?>
+<ds:datastoreItem xmlns:ds="http://schemas.openxmlformats.org/officeDocument/2006/customXml" ds:itemID="{822D38AD-8010-4CD3-BD6B-117CB8DF70A4}">
+  <ds:schemaRefs/>
+</ds:datastoreItem>
+</file>
+
+<file path=customXml/itemProps3.xml><?xml version="1.0" encoding="utf-8"?>
+<ds:datastoreItem xmlns:ds="http://schemas.openxmlformats.org/officeDocument/2006/customXml" ds:itemID="{58CC0B31-82B9-497A-9A2E-F3F72D0BBDAD}">
+  <ds:schemaRefs/>
+</ds:datastoreItem>
+</file>
+
+<file path=customXml/itemProps4.xml><?xml version="1.0" encoding="utf-8"?>
 <ds:datastoreItem xmlns:ds="http://schemas.openxmlformats.org/officeDocument/2006/customXml" ds:itemID="{F5A7E41D-6E7F-4B05-AFAB-F540BD4C068B}">
   <ds:schemaRefs>
     <ds:schemaRef ds:uri="http://schemas.microsoft.com/sharepoint/v3/contenttype/forms"/>
@@ -27728,44 +27769,8 @@
 </ds:datastoreItem>
 </file>
 
-<file path=customXml/itemProps17.xml><?xml version="1.0" encoding="utf-8"?>
-<ds:datastoreItem xmlns:ds="http://schemas.openxmlformats.org/officeDocument/2006/customXml" ds:itemID="{822D38AD-8010-4CD3-BD6B-117CB8DF70A4}">
-  <ds:schemaRefs/>
-</ds:datastoreItem>
-</file>
-
-<file path=customXml/itemProps18.xml><?xml version="1.0" encoding="utf-8"?>
-<ds:datastoreItem xmlns:ds="http://schemas.openxmlformats.org/officeDocument/2006/customXml" ds:itemID="{847502A6-7CBE-43AF-BDF6-4D4423521D8C}">
-  <ds:schemaRefs/>
-</ds:datastoreItem>
-</file>
-
-<file path=customXml/itemProps19.xml><?xml version="1.0" encoding="utf-8"?>
-<ds:datastoreItem xmlns:ds="http://schemas.openxmlformats.org/officeDocument/2006/customXml" ds:itemID="{1CE36EA9-2186-4EB1-871A-8AE59C2A13BB}">
-  <ds:schemaRefs/>
-</ds:datastoreItem>
-</file>
-
-<file path=customXml/itemProps2.xml><?xml version="1.0" encoding="utf-8"?>
-<ds:datastoreItem xmlns:ds="http://schemas.openxmlformats.org/officeDocument/2006/customXml" ds:itemID="{58CC0B31-82B9-497A-9A2E-F3F72D0BBDAD}">
-  <ds:schemaRefs/>
-</ds:datastoreItem>
-</file>
-
-<file path=customXml/itemProps3.xml><?xml version="1.0" encoding="utf-8"?>
-<ds:datastoreItem xmlns:ds="http://schemas.openxmlformats.org/officeDocument/2006/customXml" ds:itemID="{07958A4E-FAB1-42E4-B6B5-29B01F63F87B}">
-  <ds:schemaRefs/>
-</ds:datastoreItem>
-</file>
-
-<file path=customXml/itemProps4.xml><?xml version="1.0" encoding="utf-8"?>
-<ds:datastoreItem xmlns:ds="http://schemas.openxmlformats.org/officeDocument/2006/customXml" ds:itemID="{03AF3FDC-ACD1-46F3-A43E-782322DF9816}">
-  <ds:schemaRefs/>
-</ds:datastoreItem>
-</file>
-
 <file path=customXml/itemProps5.xml><?xml version="1.0" encoding="utf-8"?>
-<ds:datastoreItem xmlns:ds="http://schemas.openxmlformats.org/officeDocument/2006/customXml" ds:itemID="{72516535-7702-46AF-9B1F-8623A67A824E}">
+<ds:datastoreItem xmlns:ds="http://schemas.openxmlformats.org/officeDocument/2006/customXml" ds:itemID="{D92C3DF5-A179-4E2D-BD20-07044B39171F}">
   <ds:schemaRefs/>
 </ds:datastoreItem>
 </file>
@@ -27777,19 +27782,19 @@
 </file>
 
 <file path=customXml/itemProps7.xml><?xml version="1.0" encoding="utf-8"?>
-<ds:datastoreItem xmlns:ds="http://schemas.openxmlformats.org/officeDocument/2006/customXml" ds:itemID="{B9AEDDE3-EA02-4A8F-B8F8-0606A0AA45FC}">
+<ds:datastoreItem xmlns:ds="http://schemas.openxmlformats.org/officeDocument/2006/customXml" ds:itemID="{683FEB75-8CFA-449C-A6B1-B1E4A86A58A1}">
   <ds:schemaRefs/>
 </ds:datastoreItem>
 </file>
 
 <file path=customXml/itemProps8.xml><?xml version="1.0" encoding="utf-8"?>
-<ds:datastoreItem xmlns:ds="http://schemas.openxmlformats.org/officeDocument/2006/customXml" ds:itemID="{C750C5DC-043F-4BD3-940C-EB6F7625E286}">
+<ds:datastoreItem xmlns:ds="http://schemas.openxmlformats.org/officeDocument/2006/customXml" ds:itemID="{72516535-7702-46AF-9B1F-8623A67A824E}">
   <ds:schemaRefs/>
 </ds:datastoreItem>
 </file>
 
 <file path=customXml/itemProps9.xml><?xml version="1.0" encoding="utf-8"?>
-<ds:datastoreItem xmlns:ds="http://schemas.openxmlformats.org/officeDocument/2006/customXml" ds:itemID="{C99E78A0-C9D4-446F-B674-4DD3E2B46C5D}">
+<ds:datastoreItem xmlns:ds="http://schemas.openxmlformats.org/officeDocument/2006/customXml" ds:itemID="{C09F197C-6A49-47D0-B877-F88807989676}">
   <ds:schemaRefs/>
 </ds:datastoreItem>
 </file>
</xml_diff>

<commit_message>
Added -if option to specify interface
</commit_message>
<xml_diff>
--- a/code/bw-test-tool/SCReAM-BW-test-tool.pptx
+++ b/code/bw-test-tool/SCReAM-BW-test-tool.pptx
@@ -2662,7 +2662,7 @@
               </a:rPr>
               <a:t>  |  2020-03-20  |  Public  |  Page </a:t>
             </a:r>
-            <a:fld id="{39E92338-C324-4C81-94F8-2CA2D063B9B8}" type="slidenum">
+            <a:fld id="{59B0EB0B-32F1-44AF-873F-76D2041FD604}" type="slidenum">
               <a:rPr lang="en-US" sz="800" b="0" i="0" u="none" smtClean="0">
                 <a:solidFill>
                   <a:srgbClr val="1A1816"/>
@@ -3167,7 +3167,7 @@
               </a:rPr>
               <a:t>  |  2020-03-20  |  Public  |  Page </a:t>
             </a:r>
-            <a:fld id="{5B37E778-21B6-49C6-B60A-A6F5DFC0B481}" type="slidenum">
+            <a:fld id="{7FCCDACB-8646-4FF0-BE9A-888990334A97}" type="slidenum">
               <a:rPr lang="en-US" sz="800" b="0" i="0" u="none" smtClean="0">
                 <a:solidFill>
                   <a:schemeClr val="bg1"/>
@@ -3480,7 +3480,7 @@
               </a:rPr>
               <a:t>  |  2020-03-20  |  Public  |  Page </a:t>
             </a:r>
-            <a:fld id="{ED27C954-40E4-4E37-8ED7-2632636BA1C1}" type="slidenum">
+            <a:fld id="{4EB0BD48-4B76-4E8F-B89D-3CC9C94F5CED}" type="slidenum">
               <a:rPr lang="en-US" sz="800" b="0" i="0" u="none" smtClean="0">
                 <a:solidFill>
                   <a:srgbClr val="1A1816"/>
@@ -3713,7 +3713,7 @@
               </a:rPr>
               <a:t>  |  2020-03-20  |  Public  |  Page </a:t>
             </a:r>
-            <a:fld id="{41F88A6D-27F0-486C-B21A-6FE59F5541CE}" type="slidenum">
+            <a:fld id="{61B8A68D-4A22-4850-A554-581913112E9F}" type="slidenum">
               <a:rPr lang="en-US" sz="800" b="0" i="0" u="none" smtClean="0">
                 <a:solidFill>
                   <a:srgbClr val="1A1816"/>
@@ -3873,7 +3873,7 @@
               </a:rPr>
               <a:t>  |  2020-03-20  |  Public  |  Page </a:t>
             </a:r>
-            <a:fld id="{52214FB1-6AE5-4F91-B970-1DB3C9278A5C}" type="slidenum">
+            <a:fld id="{09A2A857-8AA2-4DEF-AE16-D8F39F6CB871}" type="slidenum">
               <a:rPr lang="en-US" sz="800" b="0" i="0" u="none" smtClean="0">
                 <a:solidFill>
                   <a:srgbClr val="1A1816"/>
@@ -4079,7 +4079,7 @@
               </a:rPr>
               <a:t>  |  2020-03-20  |  Public  |  Page </a:t>
             </a:r>
-            <a:fld id="{6C01A206-C6C7-4463-93BC-D2ED5AB9C94D}" type="slidenum">
+            <a:fld id="{40116754-92DB-4050-9032-1FEC49122933}" type="slidenum">
               <a:rPr lang="en-US" sz="800" b="0" i="0" u="none" smtClean="0">
                 <a:solidFill>
                   <a:srgbClr val="1A1816"/>
@@ -4377,7 +4377,7 @@
               </a:rPr>
               <a:t>  |  2020-03-20  |  Public  |  Page </a:t>
             </a:r>
-            <a:fld id="{3A13A736-D9A4-4C56-B850-F9B04B57F90A}" type="slidenum">
+            <a:fld id="{B9157249-2568-4CB9-B757-68B1D8F97B0A}" type="slidenum">
               <a:rPr lang="en-US" sz="800" b="0" i="0" u="none" smtClean="0">
                 <a:solidFill>
                   <a:schemeClr val="bg1"/>
@@ -4675,7 +4675,7 @@
               </a:rPr>
               <a:t>  |  2020-03-20  |  Public  |  Page </a:t>
             </a:r>
-            <a:fld id="{EB54737B-D178-4527-86D7-43303BABC163}" type="slidenum">
+            <a:fld id="{1A2E96AF-73EF-4156-BAE4-7CEA16C3FBDD}" type="slidenum">
               <a:rPr lang="en-US" sz="800" b="0" i="0" u="none" smtClean="0">
                 <a:solidFill>
                   <a:schemeClr val="bg1"/>
@@ -4973,7 +4973,7 @@
               </a:rPr>
               <a:t>  |  2020-03-20  |  Public  |  Page </a:t>
             </a:r>
-            <a:fld id="{8BB33304-0DBE-4E38-9BAD-1D891B30FB09}" type="slidenum">
+            <a:fld id="{64A9BBE9-9190-4EDF-9825-DE06957E6F7A}" type="slidenum">
               <a:rPr lang="en-US" sz="800" b="0" i="0" u="none" smtClean="0">
                 <a:solidFill>
                   <a:schemeClr val="bg1"/>
@@ -5271,7 +5271,7 @@
               </a:rPr>
               <a:t>  |  2020-03-20  |  Public  |  Page </a:t>
             </a:r>
-            <a:fld id="{EBD2C42C-BAF8-46A0-87B7-B60B4678CD10}" type="slidenum">
+            <a:fld id="{5FEBAF7A-F75A-426B-A4B4-75216B4BF9D5}" type="slidenum">
               <a:rPr lang="en-US" sz="800" b="0" i="0" u="none" smtClean="0">
                 <a:solidFill>
                   <a:schemeClr val="bg1"/>
@@ -5569,7 +5569,7 @@
               </a:rPr>
               <a:t>  |  2020-03-20  |  Public  |  Page </a:t>
             </a:r>
-            <a:fld id="{49D26BE7-11BB-4328-AC64-389331579213}" type="slidenum">
+            <a:fld id="{485CF1EC-BEE5-476F-8587-3B408826BF2F}" type="slidenum">
               <a:rPr lang="en-US" sz="800" b="0" i="0" u="none" smtClean="0">
                 <a:solidFill>
                   <a:schemeClr val="bg1"/>
@@ -6083,7 +6083,7 @@
               </a:rPr>
               <a:t>  |  2020-03-20  |  Public  |  Page </a:t>
             </a:r>
-            <a:fld id="{C9E2DE48-D800-475D-AA95-C213FEEDEA5E}" type="slidenum">
+            <a:fld id="{735056AA-1CCE-459F-B7A6-8ED2EDC2FC5F}" type="slidenum">
               <a:rPr lang="en-US" sz="800" b="0" i="0" u="none" smtClean="0">
                 <a:solidFill>
                   <a:schemeClr val="bg1"/>
@@ -6387,7 +6387,7 @@
               </a:rPr>
               <a:t>  |  2020-03-20  |  Public  |  Page </a:t>
             </a:r>
-            <a:fld id="{A5DBBA94-F79B-49BF-838A-C19DA377B22D}" type="slidenum">
+            <a:fld id="{D2BF82C9-28C0-4137-8A4E-72F8413A0627}" type="slidenum">
               <a:rPr lang="en-US" sz="800" b="0" i="0" u="none" smtClean="0">
                 <a:solidFill>
                   <a:schemeClr val="bg1"/>
@@ -6685,7 +6685,7 @@
               </a:rPr>
               <a:t>  |  2020-03-20  |  Public  |  Page </a:t>
             </a:r>
-            <a:fld id="{FE6CA46B-A760-421E-95E8-9930DE2B792C}" type="slidenum">
+            <a:fld id="{003E9166-D26A-4D07-8FFA-A796F05B4A63}" type="slidenum">
               <a:rPr lang="en-US" sz="800" b="0" i="0" u="none" smtClean="0">
                 <a:solidFill>
                   <a:schemeClr val="bg1"/>
@@ -6972,7 +6972,7 @@
               </a:rPr>
               <a:t>  |  2020-03-20  |  Public  |  Page </a:t>
             </a:r>
-            <a:fld id="{6B2AE526-F1A2-4DB0-8594-AB79A30AEDF4}" type="slidenum">
+            <a:fld id="{714DD31A-5E7C-40A9-974C-05A97ECC36E6}" type="slidenum">
               <a:rPr lang="en-US" sz="800" b="0" i="0" u="none" smtClean="0">
                 <a:solidFill>
                   <a:srgbClr val="1A1816"/>
@@ -7259,7 +7259,7 @@
               </a:rPr>
               <a:t>  |  2020-03-20  |  Public  |  Page </a:t>
             </a:r>
-            <a:fld id="{F0BC7A93-7C27-454B-A1A1-B56DFF9D9083}" type="slidenum">
+            <a:fld id="{11B012F2-D3D3-4811-B2F2-167230284800}" type="slidenum">
               <a:rPr lang="en-US" sz="800" b="0" i="0" u="none" smtClean="0">
                 <a:solidFill>
                   <a:srgbClr val="1A1816"/>
@@ -7552,7 +7552,7 @@
               </a:rPr>
               <a:t>  |  2020-03-20  |  Public  |  Page </a:t>
             </a:r>
-            <a:fld id="{B2564BE6-FCE9-4959-B1AD-A1B0538CADA0}" type="slidenum">
+            <a:fld id="{8E0CF207-20D3-4162-8E75-69D1958C795E}" type="slidenum">
               <a:rPr lang="en-US" sz="800" b="0" i="0" u="none" smtClean="0">
                 <a:solidFill>
                   <a:srgbClr val="1A1816"/>
@@ -7839,7 +7839,7 @@
               </a:rPr>
               <a:t>  |  2020-03-20  |  Public  |  Page </a:t>
             </a:r>
-            <a:fld id="{02C4714F-AD91-4185-A52A-332D9AF7E4A8}" type="slidenum">
+            <a:fld id="{0CD03271-1A55-4FFB-93B4-054A4A7A6A15}" type="slidenum">
               <a:rPr lang="en-US" sz="800" b="0" i="0" u="none" smtClean="0">
                 <a:solidFill>
                   <a:srgbClr val="1A1816"/>
@@ -8161,7 +8161,7 @@
               </a:rPr>
               <a:t>  |  2020-03-20  |  Public  |  Page </a:t>
             </a:r>
-            <a:fld id="{54B536FD-4813-4E35-9DC6-2DF53D3945D6}" type="slidenum">
+            <a:fld id="{79CEA849-5E6B-48D1-82BA-636362EFA22D}" type="slidenum">
               <a:rPr lang="en-US" sz="800" b="0" i="0" u="none" smtClean="0">
                 <a:solidFill>
                   <a:srgbClr val="1A1816"/>
@@ -8448,7 +8448,7 @@
               </a:rPr>
               <a:t>  |  2020-03-20  |  Public  |  Page </a:t>
             </a:r>
-            <a:fld id="{7855FBC2-31B1-48A2-B710-DEAC3E61E475}" type="slidenum">
+            <a:fld id="{3E7CAA79-7FCB-45AC-961C-96225C68B6C7}" type="slidenum">
               <a:rPr lang="en-US" sz="800" b="0" i="0" u="none" smtClean="0">
                 <a:solidFill>
                   <a:srgbClr val="1A1816"/>
@@ -8770,7 +8770,7 @@
               </a:rPr>
               <a:t>  |  2020-03-20  |  Public  |  Page </a:t>
             </a:r>
-            <a:fld id="{C7D36A9A-BF73-41A9-BCAE-C76191A846AE}" type="slidenum">
+            <a:fld id="{9928B449-6381-4B26-B937-346BA4FC2C8C}" type="slidenum">
               <a:rPr lang="en-US" sz="800" b="0" i="0" u="none" smtClean="0">
                 <a:solidFill>
                   <a:srgbClr val="1A1816"/>
@@ -9132,7 +9132,7 @@
               </a:rPr>
               <a:t>  |  2020-03-20  |  Public  |  Page </a:t>
             </a:r>
-            <a:fld id="{23A6A158-56A6-4427-8CFC-4F2A10E35846}" type="slidenum">
+            <a:fld id="{7A2790D3-ECF9-4F30-9152-F66E1D841CC3}" type="slidenum">
               <a:rPr lang="en-US" sz="800" b="0" i="0" u="none" smtClean="0">
                 <a:solidFill>
                   <a:srgbClr val="1A1816"/>
@@ -9474,7 +9474,7 @@
               </a:rPr>
               <a:t>  |  2020-03-20  |  Public  |  Page </a:t>
             </a:r>
-            <a:fld id="{29781648-0B66-4F06-A9D8-6DD6F603EEF9}" type="slidenum">
+            <a:fld id="{426DEE38-A107-4734-925E-21E509B9DF3F}" type="slidenum">
               <a:rPr lang="en-US" sz="800" b="0" i="0" u="none" smtClean="0">
                 <a:solidFill>
                   <a:srgbClr val="1A1816"/>
@@ -9823,7 +9823,7 @@
               </a:rPr>
               <a:t>  |  2020-03-20  |  Public  |  Page </a:t>
             </a:r>
-            <a:fld id="{70CE9081-90A4-4DD4-B6AC-66886E78BE93}" type="slidenum">
+            <a:fld id="{E45DFDF6-4ADE-4DE8-B192-40C12F697E2F}" type="slidenum">
               <a:rPr lang="en-US" sz="800" b="0" i="0" u="none" smtClean="0">
                 <a:solidFill>
                   <a:srgbClr val="1A1816"/>
@@ -10185,7 +10185,7 @@
               </a:rPr>
               <a:t>  |  2020-03-20  |  Public  |  Page </a:t>
             </a:r>
-            <a:fld id="{E06A7B12-0BD2-4088-B566-E0D13E9EA390}" type="slidenum">
+            <a:fld id="{1364CC24-13CC-40B8-BF5F-226B538B9D49}" type="slidenum">
               <a:rPr lang="en-US" sz="800" b="0" i="0" u="none" smtClean="0">
                 <a:solidFill>
                   <a:srgbClr val="1A1816"/>
@@ -10547,7 +10547,7 @@
               </a:rPr>
               <a:t>  |  2020-03-20  |  Public  |  Page </a:t>
             </a:r>
-            <a:fld id="{28B6B1BA-F683-4728-943E-58D7D38141FB}" type="slidenum">
+            <a:fld id="{2C148506-E9FC-47C4-B403-3D3DA5C9AE79}" type="slidenum">
               <a:rPr lang="en-US" sz="800" b="0" i="0" u="none" smtClean="0">
                 <a:solidFill>
                   <a:srgbClr val="1A1816"/>
@@ -10909,7 +10909,7 @@
               </a:rPr>
               <a:t>  |  2020-03-20  |  Public  |  Page </a:t>
             </a:r>
-            <a:fld id="{318FDF0A-3204-42DA-A7C5-9380397862AF}" type="slidenum">
+            <a:fld id="{BABF7CCE-B55E-4409-82D9-E95C8212B5D2}" type="slidenum">
               <a:rPr lang="en-US" sz="800" b="0" i="0" u="none" smtClean="0">
                 <a:solidFill>
                   <a:srgbClr val="1A1816"/>
@@ -11271,7 +11271,7 @@
               </a:rPr>
               <a:t>  |  2020-03-20  |  Public  |  Page </a:t>
             </a:r>
-            <a:fld id="{5724BD58-E674-4C98-9D36-B0F8B34A51DE}" type="slidenum">
+            <a:fld id="{1F550298-DD6F-4259-BC6F-E383F5980E1A}" type="slidenum">
               <a:rPr lang="en-US" sz="800" b="0" i="0" u="none" smtClean="0">
                 <a:solidFill>
                   <a:srgbClr val="1A1816"/>
@@ -11693,7 +11693,7 @@
               </a:rPr>
               <a:t>  |  2020-03-20  |  Public  |  Page </a:t>
             </a:r>
-            <a:fld id="{F78AF158-FF51-4764-B7C5-C2DAAC01C176}" type="slidenum">
+            <a:fld id="{3DFCA28F-5741-4C33-B69F-C78E055EF074}" type="slidenum">
               <a:rPr lang="en-US" sz="800" b="0" i="0" u="none" smtClean="0">
                 <a:solidFill>
                   <a:srgbClr val="1A1816"/>
@@ -12109,7 +12109,7 @@
               </a:rPr>
               <a:t>  |  2020-03-20  |  Public  |  Page </a:t>
             </a:r>
-            <a:fld id="{5D6D2E9A-93EF-4A61-9904-F27BBA40DC6E}" type="slidenum">
+            <a:fld id="{1E3194C1-5627-4C48-A3AB-AE7715F09A57}" type="slidenum">
               <a:rPr lang="en-US" sz="800" b="0" i="0" u="none" smtClean="0">
                 <a:solidFill>
                   <a:srgbClr val="1A1816"/>
@@ -12584,7 +12584,7 @@
               </a:rPr>
               <a:t>  |  2020-03-20  |  Public  |  Page </a:t>
             </a:r>
-            <a:fld id="{6D1CE4E1-C90F-4BCF-A457-FB5E69181E27}" type="slidenum">
+            <a:fld id="{1535CCE5-B2EF-4643-ACA5-8B309E06F355}" type="slidenum">
               <a:rPr lang="en-US" sz="800" b="0" i="0" u="none" smtClean="0">
                 <a:solidFill>
                   <a:srgbClr val="1A1816"/>
@@ -13079,7 +13079,7 @@
               </a:rPr>
               <a:t>  |  2020-03-20  |  Public  |  Page </a:t>
             </a:r>
-            <a:fld id="{56827846-C9AE-42F4-8FA2-090DC13D363F}" type="slidenum">
+            <a:fld id="{58F2EBC6-1097-4825-9E48-724F28655369}" type="slidenum">
               <a:rPr lang="en-US" sz="800" b="0" i="0" u="none" smtClean="0">
                 <a:solidFill>
                   <a:srgbClr val="1A1816"/>
@@ -13535,7 +13535,7 @@
               </a:rPr>
               <a:t>  |  2020-03-20  |  Public  |  Page </a:t>
             </a:r>
-            <a:fld id="{3B7D08E7-EF51-4CFD-92E5-F912BF71EAD8}" type="slidenum">
+            <a:fld id="{5CE807DD-C082-4322-B0ED-54385FC02734}" type="slidenum">
               <a:rPr lang="en-US" sz="800" b="0" i="0" u="none" smtClean="0">
                 <a:solidFill>
                   <a:srgbClr val="1A1816"/>
@@ -13923,7 +13923,7 @@
               </a:rPr>
               <a:t>  |  2020-03-20  |  Public  |  Page </a:t>
             </a:r>
-            <a:fld id="{FEA3F5F0-7EDE-45B6-AB6C-878FAA5CFC7E}" type="slidenum">
+            <a:fld id="{3D3769FB-7E60-4983-AE85-DDCDBB17F715}" type="slidenum">
               <a:rPr lang="en-US" sz="800" b="0" i="0" u="none" smtClean="0">
                 <a:solidFill>
                   <a:schemeClr val="bg1"/>
@@ -14442,7 +14442,7 @@
               </a:rPr>
               <a:t>  |  2020-03-20  |  Public  |  Page </a:t>
             </a:r>
-            <a:fld id="{56A8351E-EAD5-4F68-8E42-57F45591393F}" type="slidenum">
+            <a:fld id="{F13FB835-9D61-41A6-9C08-0CAE75F2AB14}" type="slidenum">
               <a:rPr lang="en-US" sz="800" b="0" i="0" u="none" smtClean="0">
                 <a:solidFill>
                   <a:srgbClr val="1A1816"/>
@@ -15151,7 +15151,7 @@
               </a:rPr>
               <a:t>  |  2020-03-20  |  Public  |  Page </a:t>
             </a:r>
-            <a:fld id="{910AF893-5891-42B7-9202-940777E46C8C}" type="slidenum">
+            <a:fld id="{47AC60D3-D940-4437-AE2F-A7F8B940BA64}" type="slidenum">
               <a:rPr lang="en-US" sz="800" b="0" i="0" u="none" smtClean="0">
                 <a:solidFill>
                   <a:srgbClr val="1A1816"/>
@@ -16630,7 +16630,7 @@
               </a:rPr>
               <a:t>  |  2020-03-20  |  Public  |  Page </a:t>
             </a:r>
-            <a:fld id="{F0FD93D1-0241-41A2-9FDA-04AF64A82EF4}" type="slidenum">
+            <a:fld id="{AFFAA1D4-1517-4EA7-9223-94CA475C9323}" type="slidenum">
               <a:rPr lang="en-US" sz="800" b="0" i="0" u="none" smtClean="0">
                 <a:solidFill>
                   <a:schemeClr val="bg1"/>
@@ -17142,7 +17142,7 @@
               </a:rPr>
               <a:t>  |  2020-03-20  |  Public  |  Page </a:t>
             </a:r>
-            <a:fld id="{66E8DEAC-E6CB-4D33-A352-C2A5F1CFEB0B}" type="slidenum">
+            <a:fld id="{A692DD62-616B-494A-A7B1-DA4E1AD25C0B}" type="slidenum">
               <a:rPr lang="en-US" sz="800" b="0" i="0" u="none" smtClean="0">
                 <a:solidFill>
                   <a:schemeClr val="bg1"/>
@@ -17537,7 +17537,7 @@
               </a:rPr>
               <a:t>  |  2020-03-20  |  Public  |  Page </a:t>
             </a:r>
-            <a:fld id="{A3A35EFD-BC7F-4BA9-B2A5-C16102A662A2}" type="slidenum">
+            <a:fld id="{1047FC3B-5FA8-422C-985E-4B897019C728}" type="slidenum">
               <a:rPr lang="en-US" sz="800" b="0" i="0" u="none" smtClean="0">
                 <a:solidFill>
                   <a:schemeClr val="bg1"/>
@@ -18037,7 +18037,7 @@
               </a:rPr>
               <a:t>  |  2020-03-20  |  Public  |  Page </a:t>
             </a:r>
-            <a:fld id="{60AC2EDC-8FB9-49E3-970E-F125B7907A71}" type="slidenum">
+            <a:fld id="{2BF234DB-AE9A-48FD-9509-A1D6867B191C}" type="slidenum">
               <a:rPr lang="en-US" sz="800" b="0" i="0" u="none" smtClean="0">
                 <a:solidFill>
                   <a:schemeClr val="bg1"/>
@@ -18537,7 +18537,7 @@
               </a:rPr>
               <a:t>  |  2020-03-20  |  Public  |  Page </a:t>
             </a:r>
-            <a:fld id="{8075F076-C55D-4C7F-95E2-7CF164DB305A}" type="slidenum">
+            <a:fld id="{758143D3-03D4-45C0-9A51-0A6AD7736F1D}" type="slidenum">
               <a:rPr lang="en-US" sz="800" b="0" i="0" u="none" smtClean="0">
                 <a:solidFill>
                   <a:schemeClr val="bg1"/>
@@ -19546,7 +19546,7 @@
             </a:br>
             <a:r>
               <a:rPr lang="en-US" sz="5400" dirty="0"/>
-              <a:t>2020-05-27</a:t>
+              <a:t>2020-05-29</a:t>
             </a:r>
           </a:p>
         </p:txBody>
@@ -23178,7 +23178,7 @@
           <a:graphicData uri="http://schemas.openxmlformats.org/presentationml/2006/ole">
             <mc:AlternateContent xmlns:mc="http://schemas.openxmlformats.org/markup-compatibility/2006">
               <mc:Choice xmlns:v="urn:schemas-microsoft-com:vml" Requires="v">
-                <p:oleObj spid="_x0000_s1049" name="Visio" r:id="rId5" imgW="2533577" imgH="3257685" progId="Visio.Drawing.11">
+                <p:oleObj spid="_x0000_s1051" name="Visio" r:id="rId5" imgW="2533577" imgH="3257685" progId="Visio.Drawing.11">
                   <p:embed/>
                 </p:oleObj>
               </mc:Choice>
@@ -25118,7 +25118,7 @@
         <p:spPr>
           <a:xfrm>
             <a:off x="479425" y="1016794"/>
-            <a:ext cx="5472113" cy="5364956"/>
+            <a:ext cx="5128273" cy="5364956"/>
           </a:xfrm>
         </p:spPr>
         <p:txBody>
@@ -25497,10 +25497,10 @@
       </p:sp>
       <p:pic>
         <p:nvPicPr>
-          <p:cNvPr id="4" name="Picture 3" descr="A screenshot of text&#10;&#10;Description automatically generated">
+          <p:cNvPr id="3" name="Picture 2" descr="A screenshot of text&#10;&#10;Description automatically generated">
             <a:extLst>
               <a:ext uri="{FF2B5EF4-FFF2-40B4-BE49-F238E27FC236}">
-                <a16:creationId xmlns:a16="http://schemas.microsoft.com/office/drawing/2014/main" id="{9E6360F1-BA56-4FF7-AD50-5A8A64FC8C8E}"/>
+                <a16:creationId xmlns:a16="http://schemas.microsoft.com/office/drawing/2014/main" id="{B49A7B29-4692-4F5F-A0B5-A5B1636E831B}"/>
               </a:ext>
             </a:extLst>
           </p:cNvPr>
@@ -25523,8 +25523,8 @@
         </p:blipFill>
         <p:spPr>
           <a:xfrm>
-            <a:off x="6240464" y="814456"/>
-            <a:ext cx="5766148" cy="5656877"/>
+            <a:off x="5794310" y="853488"/>
+            <a:ext cx="6307483" cy="5740143"/>
           </a:xfrm>
           <a:prstGeom prst="rect">
             <a:avLst/>
@@ -25861,12 +25861,206 @@
           </a:p>
         </p:txBody>
       </p:sp>
+      <p:sp>
+        <p:nvSpPr>
+          <p:cNvPr id="9" name="Title 8">
+            <a:extLst>
+              <a:ext uri="{FF2B5EF4-FFF2-40B4-BE49-F238E27FC236}">
+                <a16:creationId xmlns:a16="http://schemas.microsoft.com/office/drawing/2014/main" id="{380870E8-669C-4569-AA1E-0297E2D29A2F}"/>
+              </a:ext>
+            </a:extLst>
+          </p:cNvPr>
+          <p:cNvSpPr txBox="1">
+            <a:spLocks/>
+          </p:cNvSpPr>
+          <p:nvPr/>
+        </p:nvSpPr>
+        <p:spPr bwMode="auto">
+          <a:xfrm>
+            <a:off x="479425" y="476250"/>
+            <a:ext cx="8353426" cy="1081088"/>
+          </a:xfrm>
+          <a:prstGeom prst="rect">
+            <a:avLst/>
+          </a:prstGeom>
+          <a:noFill/>
+          <a:ln w="9525">
+            <a:noFill/>
+            <a:miter lim="800000"/>
+            <a:headEnd/>
+            <a:tailEnd/>
+          </a:ln>
+        </p:spPr>
+        <p:txBody>
+          <a:bodyPr vert="horz" wrap="square" lIns="72000" tIns="36000" rIns="73152" bIns="36576" numCol="1" anchor="t" anchorCtr="0" compatLnSpc="1">
+            <a:prstTxWarp prst="textNoShape">
+              <a:avLst/>
+            </a:prstTxWarp>
+            <a:noAutofit/>
+          </a:bodyPr>
+          <a:lstStyle>
+            <a:lvl1pPr algn="l" rtl="0" eaLnBrk="1" fontAlgn="base" hangingPunct="1">
+              <a:lnSpc>
+                <a:spcPct val="85000"/>
+              </a:lnSpc>
+              <a:spcBef>
+                <a:spcPts val="300"/>
+              </a:spcBef>
+              <a:spcAft>
+                <a:spcPct val="0"/>
+              </a:spcAft>
+              <a:defRPr sz="4000" kern="1400" spc="-160">
+                <a:solidFill>
+                  <a:schemeClr val="tx1"/>
+                </a:solidFill>
+                <a:latin typeface="+mj-lt"/>
+                <a:ea typeface="+mj-ea"/>
+                <a:cs typeface="+mj-cs"/>
+              </a:defRPr>
+            </a:lvl1pPr>
+            <a:lvl2pPr algn="l" rtl="0" eaLnBrk="1" fontAlgn="base" hangingPunct="1">
+              <a:lnSpc>
+                <a:spcPct val="85000"/>
+              </a:lnSpc>
+              <a:spcBef>
+                <a:spcPct val="0"/>
+              </a:spcBef>
+              <a:spcAft>
+                <a:spcPct val="0"/>
+              </a:spcAft>
+              <a:defRPr sz="4000">
+                <a:solidFill>
+                  <a:schemeClr val="tx1"/>
+                </a:solidFill>
+                <a:latin typeface="Ericsson Hilda" pitchFamily="2" charset="0"/>
+              </a:defRPr>
+            </a:lvl2pPr>
+            <a:lvl3pPr algn="l" rtl="0" eaLnBrk="1" fontAlgn="base" hangingPunct="1">
+              <a:lnSpc>
+                <a:spcPct val="85000"/>
+              </a:lnSpc>
+              <a:spcBef>
+                <a:spcPct val="0"/>
+              </a:spcBef>
+              <a:spcAft>
+                <a:spcPct val="0"/>
+              </a:spcAft>
+              <a:defRPr sz="4000">
+                <a:solidFill>
+                  <a:schemeClr val="tx1"/>
+                </a:solidFill>
+                <a:latin typeface="Ericsson Hilda" pitchFamily="2" charset="0"/>
+              </a:defRPr>
+            </a:lvl3pPr>
+            <a:lvl4pPr algn="l" rtl="0" eaLnBrk="1" fontAlgn="base" hangingPunct="1">
+              <a:lnSpc>
+                <a:spcPct val="85000"/>
+              </a:lnSpc>
+              <a:spcBef>
+                <a:spcPct val="0"/>
+              </a:spcBef>
+              <a:spcAft>
+                <a:spcPct val="0"/>
+              </a:spcAft>
+              <a:defRPr sz="4000">
+                <a:solidFill>
+                  <a:schemeClr val="tx1"/>
+                </a:solidFill>
+                <a:latin typeface="Ericsson Hilda" pitchFamily="2" charset="0"/>
+              </a:defRPr>
+            </a:lvl4pPr>
+            <a:lvl5pPr algn="l" rtl="0" eaLnBrk="1" fontAlgn="base" hangingPunct="1">
+              <a:lnSpc>
+                <a:spcPct val="85000"/>
+              </a:lnSpc>
+              <a:spcBef>
+                <a:spcPct val="0"/>
+              </a:spcBef>
+              <a:spcAft>
+                <a:spcPct val="0"/>
+              </a:spcAft>
+              <a:defRPr sz="4000">
+                <a:solidFill>
+                  <a:schemeClr val="tx1"/>
+                </a:solidFill>
+                <a:latin typeface="Ericsson Hilda" pitchFamily="2" charset="0"/>
+              </a:defRPr>
+            </a:lvl5pPr>
+            <a:lvl6pPr marL="457200" algn="l" rtl="0" eaLnBrk="1" fontAlgn="base" hangingPunct="1">
+              <a:spcBef>
+                <a:spcPct val="0"/>
+              </a:spcBef>
+              <a:spcAft>
+                <a:spcPct val="0"/>
+              </a:spcAft>
+              <a:defRPr sz="3200">
+                <a:solidFill>
+                  <a:schemeClr val="tx1"/>
+                </a:solidFill>
+                <a:latin typeface="Ericsson Hilda" pitchFamily="2" charset="0"/>
+              </a:defRPr>
+            </a:lvl6pPr>
+            <a:lvl7pPr marL="914400" algn="l" rtl="0" eaLnBrk="1" fontAlgn="base" hangingPunct="1">
+              <a:spcBef>
+                <a:spcPct val="0"/>
+              </a:spcBef>
+              <a:spcAft>
+                <a:spcPct val="0"/>
+              </a:spcAft>
+              <a:defRPr sz="3200">
+                <a:solidFill>
+                  <a:schemeClr val="tx1"/>
+                </a:solidFill>
+                <a:latin typeface="Ericsson Hilda" pitchFamily="2" charset="0"/>
+              </a:defRPr>
+            </a:lvl7pPr>
+            <a:lvl8pPr marL="1371600" algn="l" rtl="0" eaLnBrk="1" fontAlgn="base" hangingPunct="1">
+              <a:spcBef>
+                <a:spcPct val="0"/>
+              </a:spcBef>
+              <a:spcAft>
+                <a:spcPct val="0"/>
+              </a:spcAft>
+              <a:defRPr sz="3200">
+                <a:solidFill>
+                  <a:schemeClr val="tx1"/>
+                </a:solidFill>
+                <a:latin typeface="Ericsson Hilda" pitchFamily="2" charset="0"/>
+              </a:defRPr>
+            </a:lvl8pPr>
+            <a:lvl9pPr marL="1828800" algn="l" rtl="0" eaLnBrk="1" fontAlgn="base" hangingPunct="1">
+              <a:spcBef>
+                <a:spcPct val="0"/>
+              </a:spcBef>
+              <a:spcAft>
+                <a:spcPct val="0"/>
+              </a:spcAft>
+              <a:defRPr sz="3200">
+                <a:solidFill>
+                  <a:schemeClr val="tx1"/>
+                </a:solidFill>
+                <a:latin typeface="Ericsson Hilda" pitchFamily="2" charset="0"/>
+              </a:defRPr>
+            </a:lvl9pPr>
+          </a:lstStyle>
+          <a:p>
+            <a:pPr marL="0" indent="0">
+              <a:buFontTx/>
+              <a:buNone/>
+            </a:pPr>
+            <a:r>
+              <a:rPr lang="en-US" dirty="0"/>
+              <a:t>Receiver side</a:t>
+            </a:r>
+          </a:p>
+        </p:txBody>
+      </p:sp>
       <p:pic>
         <p:nvPicPr>
-          <p:cNvPr id="8" name="Picture 7" descr="A close up of a sign&#10;&#10;Description automatically generated">
+          <p:cNvPr id="3" name="Picture 2" descr="A screenshot of a cell phone&#10;&#10;Description automatically generated">
             <a:extLst>
               <a:ext uri="{FF2B5EF4-FFF2-40B4-BE49-F238E27FC236}">
-                <a16:creationId xmlns:a16="http://schemas.microsoft.com/office/drawing/2014/main" id="{2C49E164-B7DA-4D8C-A34A-5134DE24D27F}"/>
+                <a16:creationId xmlns:a16="http://schemas.microsoft.com/office/drawing/2014/main" id="{A1030931-F5A5-441B-9BE9-1187BBDCD3EE}"/>
               </a:ext>
             </a:extLst>
           </p:cNvPr>
@@ -25889,208 +26083,14 @@
         </p:blipFill>
         <p:spPr>
           <a:xfrm>
-            <a:off x="6151034" y="2471057"/>
-            <a:ext cx="5942648" cy="1222534"/>
+            <a:off x="5784980" y="2727263"/>
+            <a:ext cx="6338240" cy="1240820"/>
           </a:xfrm>
           <a:prstGeom prst="rect">
             <a:avLst/>
           </a:prstGeom>
         </p:spPr>
       </p:pic>
-      <p:sp>
-        <p:nvSpPr>
-          <p:cNvPr id="9" name="Title 8">
-            <a:extLst>
-              <a:ext uri="{FF2B5EF4-FFF2-40B4-BE49-F238E27FC236}">
-                <a16:creationId xmlns:a16="http://schemas.microsoft.com/office/drawing/2014/main" id="{380870E8-669C-4569-AA1E-0297E2D29A2F}"/>
-              </a:ext>
-            </a:extLst>
-          </p:cNvPr>
-          <p:cNvSpPr txBox="1">
-            <a:spLocks/>
-          </p:cNvSpPr>
-          <p:nvPr/>
-        </p:nvSpPr>
-        <p:spPr bwMode="auto">
-          <a:xfrm>
-            <a:off x="479425" y="476250"/>
-            <a:ext cx="8353426" cy="1081088"/>
-          </a:xfrm>
-          <a:prstGeom prst="rect">
-            <a:avLst/>
-          </a:prstGeom>
-          <a:noFill/>
-          <a:ln w="9525">
-            <a:noFill/>
-            <a:miter lim="800000"/>
-            <a:headEnd/>
-            <a:tailEnd/>
-          </a:ln>
-        </p:spPr>
-        <p:txBody>
-          <a:bodyPr vert="horz" wrap="square" lIns="72000" tIns="36000" rIns="73152" bIns="36576" numCol="1" anchor="t" anchorCtr="0" compatLnSpc="1">
-            <a:prstTxWarp prst="textNoShape">
-              <a:avLst/>
-            </a:prstTxWarp>
-            <a:noAutofit/>
-          </a:bodyPr>
-          <a:lstStyle>
-            <a:lvl1pPr algn="l" rtl="0" eaLnBrk="1" fontAlgn="base" hangingPunct="1">
-              <a:lnSpc>
-                <a:spcPct val="85000"/>
-              </a:lnSpc>
-              <a:spcBef>
-                <a:spcPts val="300"/>
-              </a:spcBef>
-              <a:spcAft>
-                <a:spcPct val="0"/>
-              </a:spcAft>
-              <a:defRPr sz="4000" kern="1400" spc="-160">
-                <a:solidFill>
-                  <a:schemeClr val="tx1"/>
-                </a:solidFill>
-                <a:latin typeface="+mj-lt"/>
-                <a:ea typeface="+mj-ea"/>
-                <a:cs typeface="+mj-cs"/>
-              </a:defRPr>
-            </a:lvl1pPr>
-            <a:lvl2pPr algn="l" rtl="0" eaLnBrk="1" fontAlgn="base" hangingPunct="1">
-              <a:lnSpc>
-                <a:spcPct val="85000"/>
-              </a:lnSpc>
-              <a:spcBef>
-                <a:spcPct val="0"/>
-              </a:spcBef>
-              <a:spcAft>
-                <a:spcPct val="0"/>
-              </a:spcAft>
-              <a:defRPr sz="4000">
-                <a:solidFill>
-                  <a:schemeClr val="tx1"/>
-                </a:solidFill>
-                <a:latin typeface="Ericsson Hilda" pitchFamily="2" charset="0"/>
-              </a:defRPr>
-            </a:lvl2pPr>
-            <a:lvl3pPr algn="l" rtl="0" eaLnBrk="1" fontAlgn="base" hangingPunct="1">
-              <a:lnSpc>
-                <a:spcPct val="85000"/>
-              </a:lnSpc>
-              <a:spcBef>
-                <a:spcPct val="0"/>
-              </a:spcBef>
-              <a:spcAft>
-                <a:spcPct val="0"/>
-              </a:spcAft>
-              <a:defRPr sz="4000">
-                <a:solidFill>
-                  <a:schemeClr val="tx1"/>
-                </a:solidFill>
-                <a:latin typeface="Ericsson Hilda" pitchFamily="2" charset="0"/>
-              </a:defRPr>
-            </a:lvl3pPr>
-            <a:lvl4pPr algn="l" rtl="0" eaLnBrk="1" fontAlgn="base" hangingPunct="1">
-              <a:lnSpc>
-                <a:spcPct val="85000"/>
-              </a:lnSpc>
-              <a:spcBef>
-                <a:spcPct val="0"/>
-              </a:spcBef>
-              <a:spcAft>
-                <a:spcPct val="0"/>
-              </a:spcAft>
-              <a:defRPr sz="4000">
-                <a:solidFill>
-                  <a:schemeClr val="tx1"/>
-                </a:solidFill>
-                <a:latin typeface="Ericsson Hilda" pitchFamily="2" charset="0"/>
-              </a:defRPr>
-            </a:lvl4pPr>
-            <a:lvl5pPr algn="l" rtl="0" eaLnBrk="1" fontAlgn="base" hangingPunct="1">
-              <a:lnSpc>
-                <a:spcPct val="85000"/>
-              </a:lnSpc>
-              <a:spcBef>
-                <a:spcPct val="0"/>
-              </a:spcBef>
-              <a:spcAft>
-                <a:spcPct val="0"/>
-              </a:spcAft>
-              <a:defRPr sz="4000">
-                <a:solidFill>
-                  <a:schemeClr val="tx1"/>
-                </a:solidFill>
-                <a:latin typeface="Ericsson Hilda" pitchFamily="2" charset="0"/>
-              </a:defRPr>
-            </a:lvl5pPr>
-            <a:lvl6pPr marL="457200" algn="l" rtl="0" eaLnBrk="1" fontAlgn="base" hangingPunct="1">
-              <a:spcBef>
-                <a:spcPct val="0"/>
-              </a:spcBef>
-              <a:spcAft>
-                <a:spcPct val="0"/>
-              </a:spcAft>
-              <a:defRPr sz="3200">
-                <a:solidFill>
-                  <a:schemeClr val="tx1"/>
-                </a:solidFill>
-                <a:latin typeface="Ericsson Hilda" pitchFamily="2" charset="0"/>
-              </a:defRPr>
-            </a:lvl6pPr>
-            <a:lvl7pPr marL="914400" algn="l" rtl="0" eaLnBrk="1" fontAlgn="base" hangingPunct="1">
-              <a:spcBef>
-                <a:spcPct val="0"/>
-              </a:spcBef>
-              <a:spcAft>
-                <a:spcPct val="0"/>
-              </a:spcAft>
-              <a:defRPr sz="3200">
-                <a:solidFill>
-                  <a:schemeClr val="tx1"/>
-                </a:solidFill>
-                <a:latin typeface="Ericsson Hilda" pitchFamily="2" charset="0"/>
-              </a:defRPr>
-            </a:lvl7pPr>
-            <a:lvl8pPr marL="1371600" algn="l" rtl="0" eaLnBrk="1" fontAlgn="base" hangingPunct="1">
-              <a:spcBef>
-                <a:spcPct val="0"/>
-              </a:spcBef>
-              <a:spcAft>
-                <a:spcPct val="0"/>
-              </a:spcAft>
-              <a:defRPr sz="3200">
-                <a:solidFill>
-                  <a:schemeClr val="tx1"/>
-                </a:solidFill>
-                <a:latin typeface="Ericsson Hilda" pitchFamily="2" charset="0"/>
-              </a:defRPr>
-            </a:lvl8pPr>
-            <a:lvl9pPr marL="1828800" algn="l" rtl="0" eaLnBrk="1" fontAlgn="base" hangingPunct="1">
-              <a:spcBef>
-                <a:spcPct val="0"/>
-              </a:spcBef>
-              <a:spcAft>
-                <a:spcPct val="0"/>
-              </a:spcAft>
-              <a:defRPr sz="3200">
-                <a:solidFill>
-                  <a:schemeClr val="tx1"/>
-                </a:solidFill>
-                <a:latin typeface="Ericsson Hilda" pitchFamily="2" charset="0"/>
-              </a:defRPr>
-            </a:lvl9pPr>
-          </a:lstStyle>
-          <a:p>
-            <a:pPr marL="0" indent="0">
-              <a:buFontTx/>
-              <a:buNone/>
-            </a:pPr>
-            <a:r>
-              <a:rPr lang="en-US" dirty="0"/>
-              <a:t>Receiver side</a:t>
-            </a:r>
-          </a:p>
-        </p:txBody>
-      </p:sp>
     </p:spTree>
     <p:extLst>
       <p:ext uri="{BB962C8B-B14F-4D97-AF65-F5344CB8AC3E}">
@@ -27358,6 +27358,77 @@
 </file>
 
 <file path=customXml/item1.xml><?xml version="1.0" encoding="utf-8"?>
+<TemplafySlideFormConfiguration><![CDATA[{"formFields":[],"formDataEntries":[]}]]></TemplafySlideFormConfiguration>
+</file>
+
+<file path=customXml/item10.xml><?xml version="1.0" encoding="utf-8"?>
+<TemplafyFormConfiguration><![CDATA[{"formFields":[{"required":true,"placeholder":"","lines":0,"type":"textBox","name":"DocumentTitle","label":"Document Title","helpTexts":{"prefix":"","postfix":""},"spacing":{},"fullyQualifiedName":"DocumentTitle"},{"dataSource":"Confidentiality","displayColumn":"confidentiality","hideIfNoUserInteractionRequired":false,"distinct":true,"required":true,"autoSelectFirstOption":false,"type":"dropDown","name":"ConfidentialityClass","label":"Confidentiality Class","helpTexts":{"prefix":"","postfix":""},"spacing":{},"fullyQualifiedName":"ConfidentialityClass"},{"dataSource":"External Confidentiality label","displayColumn":"externalConfidentiality","hideIfNoUserInteractionRequired":false,"distinct":true,"required":false,"autoSelectFirstOption":false,"defaultValue":"1","type":"dropDown","name":"ExternalConfidentialityLabel","label":"External Confidentiality label","helpTexts":{"prefix":"","postfix":"If no external confidentiality class then please choose the blank value"},"spacing":{},"fullyQualifiedName":"ExternalConfidentialityLabel"},{"dataSource":"PowerPoint Document Type","column":"documentType","required":false,"placeholder":"","autoSelectFirstOption":false,"type":"comboBox","name":"DocTypePresentation","label":"Document Type Presentation","helpTexts":{"prefix":"","postfix":"If the document type differs from the default value, click on the X to delete and type/choose another type."},"spacing":{},"fullyQualifiedName":"DocTypePresentation"},{"required":false,"placeholder":"","lines":0,"type":"textBox","name":"DocumentNumber","label":"Document Number","helpTexts":{"prefix":"","postfix":""},"spacing":{},"fullyQualifiedName":"DocumentNumber"},{"dataSource":"Language code","displayColumn":"showName","hideIfNoUserInteractionRequired":false,"distinct":true,"required":false,"autoSelectFirstOption":false,"defaultValue":"1","type":"dropDown","name":"LanguageCode","label":"Language Code","helpTexts":{"prefix":"","postfix":"The language code will be appended to the Document No."},"spacing":{},"fullyQualifiedName":"LanguageCode"},{"dataSource":"Revision","column":"revision","required":false,"placeholder":"","autoSelectFirstOption":false,"type":"comboBox","name":"Revision","label":"Revision","helpTexts":{"prefix":"","postfix":""},"spacing":{},"fullyQualifiedName":"Revision"},{"required":false,"type":"datePicker","name":"Date","label":"Date","helpTexts":{"prefix":"","postfix":""},"spacing":{},"fullyQualifiedName":"Date"},{"type":"heading","name":"FooterVisibilityOptions","label":"Footer Visibility Options","helpTexts":{"prefix":"","postfix":""},"spacing":{},"fullyQualifiedName":"FooterVisibilityOptions"},{"dataSource":"PPT FooterVisibility","displayColumn":"templateType","hideIfNoUserInteractionRequired":false,"distinct":true,"required":true,"autoSelectFirstOption":false,"defaultValue":"1","type":"dropDown","name":"TemplateType","label":"Is this a document or presentation?","helpTexts":{"prefix":"","postfix":""},"spacing":{},"fullyQualifiedName":"TemplateType"},{"dataSource":"PPT FooterVisibility","displayColumn":"docTitle_label","hideIfNoUserInteractionRequired":false,"distinct":true,"required":false,"autoSelectFirstOption":true,"filter":{"column":"templateType","otherFieldName":"TemplateType","fullyQualifiedOtherFieldName":"TemplateType","otherFieldColumn":"TemplateType","formReference":"none","operator":"equals"},"type":"dropDown","name":"DocTitle","label":"Show document title in footer?","helpTexts":{"prefix":"","postfix":""},"spacing":{},"fullyQualifiedName":"DocTitle"},{"dataSource":"PPT FooterVisibility","displayColumn":"totalPageNo_text","hideIfNoUserInteractionRequired":false,"distinct":true,"required":false,"autoSelectFirstOption":true,"filter":{"column":"templateType","otherFieldName":"TemplateType","fullyQualifiedOtherFieldName":"TemplateType","otherFieldColumn":"TemplateType","formReference":"none","operator":"equals"},"type":"dropDown","name":"TotalPageNo","label":"Page numbering","helpTexts":{"prefix":"","postfix":""},"spacing":{},"fullyQualifiedName":"TotalPageNo"},{"required":false,"placeholder":"","lines":0,"defaultValue":"{{UserProfile.Prepared}}","type":"textBox","name":"Prepared","label":"Prepared By (Subject Responsible)","helpTexts":{"prefix":"","postfix":""},"spacing":{},"fullyQualifiedName":"Prepared"},{"required":false,"placeholder":"","lines":0,"type":"textBox","name":"ApprovedBy","label":"Approved By (Document Responsible)","helpTexts":{"prefix":"","postfix":""},"spacing":{},"fullyQualifiedName":"ApprovedBy"},{"required":false,"placeholder":"","lines":0,"type":"textBox","name":"Checked","label":"Checked","helpTexts":{"prefix":"","postfix":""},"spacing":{},"fullyQualifiedName":"Checked"},{"required":false,"placeholder":"","lines":0,"type":"textBox","name":"Reference","label":"Reference","helpTexts":{"prefix":"","postfix":""},"spacing":{},"fullyQualifiedName":"Reference"},{"required":false,"placeholder":"","lines":0,"type":"textBox","name":"Keywords","label":"Keywords","helpTexts":{"prefix":"","postfix":""},"spacing":{},"fullyQualifiedName":"Keywords"}],"formDataEntries":[{"name":"DocumentTitle","value":"HfKMJ7wB7KPEWJpFWibMqg=="},{"name":"ConfidentialityClass","value":"cT/FOwTWaPknrhRlNMh4SQ=="},{"name":"ExternalConfidentialityLabel","value":"u2D/MG3wyuAQhkGvE2fPaA=="},{"name":"LanguageCode","value":"5wlu7ZdPxHQj1W0w+yTNSg=="},{"name":"Date","value":"vb48xUhp/+BouvbbBJesXw=="},{"name":"TemplateType","value":"PxVEvJY8nE7m/hY9622Sng=="},{"name":"DocTitle","value":"PxVEvJY8nE7m/hY9622Sng=="},{"name":"TotalPageNo","value":"PxVEvJY8nE7m/hY9622Sng=="},{"name":"Prepared","value":"PqdHBiLjqdpOMxfLUK9Tonaq9XwuinzCFKYJ7RK3+SI="}]}]]></TemplafyFormConfiguration>
+</file>
+
+<file path=customXml/item11.xml><?xml version="1.0" encoding="utf-8"?>
+<TemplafySlideTemplateConfiguration><![CDATA[{"documentContentValidatorConfiguration":{"enableDocumentContentValidator":false,"documentContentValidatorVersion":0},"elementsMetadata":[],"slideId":"637171128435648944","enableDocumentContentUpdater":true,"version":"1.9"}]]></TemplafySlideTemplateConfiguration>
+</file>
+
+<file path=customXml/item12.xml><?xml version="1.0" encoding="utf-8"?>
+<p:properties xmlns:p="http://schemas.microsoft.com/office/2006/metadata/properties" xmlns:xsi="http://www.w3.org/2001/XMLSchema-instance" xmlns:pc="http://schemas.microsoft.com/office/infopath/2007/PartnerControls">
+  <documentManagement/>
+</p:properties>
+</file>
+
+<file path=customXml/item13.xml><?xml version="1.0" encoding="utf-8"?>
+<TemplafySlideFormConfiguration><![CDATA[{"formFields":[],"formDataEntries":[]}]]></TemplafySlideFormConfiguration>
+</file>
+
+<file path=customXml/item14.xml><?xml version="1.0" encoding="utf-8"?>
+<?mso-contentType ?>
+<FormTemplates xmlns="http://schemas.microsoft.com/sharepoint/v3/contenttype/forms">
+  <Display>DocumentLibraryForm</Display>
+  <Edit>DocumentLibraryForm</Edit>
+  <New>DocumentLibraryForm</New>
+</FormTemplates>
+</file>
+
+<file path=customXml/item15.xml><?xml version="1.0" encoding="utf-8"?>
+<TemplafySlideTemplateConfiguration><![CDATA[{"elementsMetadata":[],"documentContentValidatorConfiguration":{"enableDocumentContentValidator":false,"documentContentValidatorVersion":0},"slideId":"637027476704980324","enableDocumentContentUpdater":true,"version":"1.9"}]]></TemplafySlideTemplateConfiguration>
+</file>
+
+<file path=customXml/item16.xml><?xml version="1.0" encoding="utf-8"?>
+<TemplafySlideFormConfiguration><![CDATA[{"formFields":[],"formDataEntries":[]}]]></TemplafySlideFormConfiguration>
+</file>
+
+<file path=customXml/item17.xml><?xml version="1.0" encoding="utf-8"?>
+<TemplafySlideTemplateConfiguration><![CDATA[{"documentContentValidatorConfiguration":{"enableDocumentContentValidator":false,"documentContentValidatorVersion":0},"elementsMetadata":[],"slideId":"637037983905221557","enableDocumentContentUpdater":true,"version":"1.9"}]]></TemplafySlideTemplateConfiguration>
+</file>
+
+<file path=customXml/item18.xml><?xml version="1.0" encoding="utf-8"?>
+<TemplafySlideFormConfiguration><![CDATA[{"formFields":[],"formDataEntries":[]}]]></TemplafySlideFormConfiguration>
+</file>
+
+<file path=customXml/item19.xml><?xml version="1.0" encoding="utf-8"?>
+<TemplafyTemplateConfiguration><![CDATA[{"elementsMetadata":[{"type":"shape","id":"5d67e717-74bf-41a6-8dce-47082e2c1da1","elementConfiguration":{"inheritDimensions":"inheritNone","height":"1.34 cm","binding":"Form.LogoInsertion.Pplogoname","disableUpdates":false,"type":"image"}}],"transformationConfigurations":[{"language":"{{DocumentLanguage}}","disableUpdates":false,"type":"proofingLanguage"},{"propertyName":"FooterText","propertyValue":"true","disableUpdates":false,"type":"customDocumentProperty"},{"propertyName":"SecurityClass","propertyValue":"{{Form.ConfidentialityClass.Confidentiality}}","disableUpdates":false,"type":"customDocumentProperty"},{"propertyName":"ExtConf","propertyValue":"{{Form.ExternalConfidentialityLabel.ExternalConfidentiality}}","disableUpdates":false,"type":"customDocumentProperty"},{"propertyName":"Prepared","propertyValue":"{{Form.Prepared}}","disableUpdates":false,"type":"customDocumentProperty"},{"propertyName":"ApprovedBy","propertyValue":"{{Form.ApprovedBy}}","disableUpdates":false,"type":"customDocumentProperty"},{"propertyName":"DocNo","propertyValue":"{{Form.DocumentNumber}} {{Form.LanguageCode.LanguageCode}}","disableUpdates":false,"type":"customDocumentProperty"},{"propertyName":"Checked","propertyValue":"{{Form.Checked}}","disableUpdates":false,"type":"customDocumentProperty"},{"propertyName":"Date","propertyValue":"{{Form.Date}}","disableUpdates":false,"type":"customDocumentProperty"},{"propertyName":"Reference","propertyValue":"{{Form.Reference}}","disableUpdates":false,"type":"customDocumentProperty"},{"propertyName":"Title","propertyValue":"{{Form.DocumentTitle}}","disableUpdates":false,"type":"customDocumentProperty"},{"propertyName":"Keyword","propertyValue":"{{Form.Keywords}}","disableUpdates":false,"type":"customDocumentProperty"},{"propertyName":"DocumentType","propertyValue":"Presentation2011","disableUpdates":false,"type":"customDocumentProperty"},{"propertyName":"Language","propertyValue":"EnglishUS","disableUpdates":false,"type":"customDocumentProperty"},{"propertyName":"TemplateID","propertyValue":"FALSE","disableUpdates":false,"type":"customDocumentProperty"},{"propertyName":"ConfCtrl","propertyValue":"FALSE","disableUpdates":false,"type":"customDocumentProperty"},{"propertyName":"title","propertyValue":"{{Form.DocumentTitle}}","disableUpdates":false,"type":"documentProperty"},{"propertyName":"keywords","propertyValue":"{{Form.Keywords}}","disableUpdates":false,"type":"documentProperty"},{"propertyName":"creator","propertyValue":"{{Form.Prepared}}","disableUpdates":false,"type":"documentProperty"},{"propertyName":"DocTitle","propertyValue":"{{Form.DocTitle.DocTitle}}","disableUpdates":false,"type":"customDocumentProperty"},{"propertyName":"IsDocument","propertyValue":"{{Form.TemplateType.IsDocument}}","disableUpdates":false,"type":"customDocumentProperty"},{"propertyName":"IsPresentation","propertyValue":"{{Form.TemplateType.IsPresentation}}","disableUpdates":false,"type":"customDocumentProperty"},{"propertyName":"company","propertyValue":"Ericsson","disableUpdates":false,"type":"documentProperty"},{"propertyName":"PageNumberVisible","propertyValue":"{{Form.TotalPageNo.TotalPageNo_value}}","disableUpdates":false,"type":"customDocumentProperty"},{"propertyName":"Revision","propertyValue":"{{Form.Revision}}","disableUpdates":false,"type":"customDocumentProperty"},{"propertyName":"DocType","propertyValue":"{{Form.DocTypePresentation}}","disableUpdates":false,"type":"customDocumentProperty"},{"propertyName":"TemplateVersion","propertyValue":"R2A","disableUpdates":false,"type":"customDocumentProperty"},{"propertyName":"PackageNo","propertyValue":"LXA 119 603","disableUpdates":false,"type":"customDocumentProperty"},{"propertyName":"PackageVersion","propertyValue":"R6B","disableUpdates":false,"type":"customDocumentProperty"},{"propertyName":"TemplateName","propertyValue":"CXC 173 2731/1","disableUpdates":false,"type":"customDocumentProperty"},{"propertyName":"DocName","propertyValue":" ","disableUpdates":false,"type":"customDocumentProperty"},{"propertyName":"description","propertyValue":"{{Form.DocumentNumber}} {{Form.LanguageCode.LanguageCode}}\nRev {{Form.Revision}}","disableUpdates":false,"type":"documentProperty"}],"templateName":"New presentation (Standard landscape)","templateDescription":"","enableDocumentContentUpdater":true,"version":"1.9"}]]></TemplafyTemplateConfiguration>
+</file>
+
+<file path=customXml/item2.xml><?xml version="1.0" encoding="utf-8"?>
+<TemplafySlideTemplateConfiguration><![CDATA[{"documentContentValidatorConfiguration":{"enableDocumentContentValidator":false,"documentContentValidatorVersion":0},"elementsMetadata":[],"slideId":"637037983905221558","enableDocumentContentUpdater":true,"version":"1.9"}]]></TemplafySlideTemplateConfiguration>
+</file>
+
+<file path=customXml/item3.xml><?xml version="1.0" encoding="utf-8"?>
+<TemplafySlideTemplateConfiguration><![CDATA[{"documentContentValidatorConfiguration":{"enableDocumentContentValidator":false,"documentContentValidatorVersion":0},"elementsMetadata":[],"slideId":"637050925554934895","enableDocumentContentUpdater":true,"version":"1.9"}]]></TemplafySlideTemplateConfiguration>
+</file>
+
+<file path=customXml/item4.xml><?xml version="1.0" encoding="utf-8"?>
+<TemplafySlideFormConfiguration><![CDATA[{"formFields":[],"formDataEntries":[]}]]></TemplafySlideFormConfiguration>
+</file>
+
+<file path=customXml/item5.xml><?xml version="1.0" encoding="utf-8"?>
+<TemplafySlideFormConfiguration><![CDATA[{"formFields":[],"formDataEntries":[]}]]></TemplafySlideFormConfiguration>
+</file>
+
+<file path=customXml/item6.xml><?xml version="1.0" encoding="utf-8"?>
+<TemplafySlideTemplateConfiguration><![CDATA[{"documentContentValidatorConfiguration":{"enableDocumentContentValidator":false,"documentContentValidatorVersion":0},"elementsMetadata":[],"slideId":"637171128435180813","enableDocumentContentUpdater":true,"version":"1.9"}]]></TemplafySlideTemplateConfiguration>
+</file>
+
+<file path=customXml/item7.xml><?xml version="1.0" encoding="utf-8"?>
 <ct:contentTypeSchema xmlns:ct="http://schemas.microsoft.com/office/2006/metadata/contentType" xmlns:ma="http://schemas.microsoft.com/office/2006/metadata/properties/metaAttributes" ct:_="" ma:_="" ma:contentTypeName="Document" ma:contentTypeID="0x0101002C8661F604A9A64C9627B875CBEE0D49" ma:contentTypeVersion="13" ma:contentTypeDescription="Create a new document." ma:contentTypeScope="" ma:versionID="efb89547655977800231d60c8e2388d5">
   <xsd:schema xmlns:xsd="http://www.w3.org/2001/XMLSchema" xmlns:xs="http://www.w3.org/2001/XMLSchema" xmlns:p="http://schemas.microsoft.com/office/2006/metadata/properties" xmlns:ns3="92e1255f-bb7b-4dc9-b051-584cc104eb44" xmlns:ns4="a6550eff-0fc9-443f-8e77-72cbcf778382" targetNamespace="http://schemas.microsoft.com/office/2006/metadata/properties" ma:root="true" ma:fieldsID="5147822fdb6803771ba7305cbc438486" ns3:_="" ns4:_="">
     <xsd:import namespace="92e1255f-bb7b-4dc9-b051-584cc104eb44"/>
@@ -27580,86 +27651,124 @@
 </ct:contentTypeSchema>
 </file>
 
-<file path=customXml/item10.xml><?xml version="1.0" encoding="utf-8"?>
-<p:properties xmlns:p="http://schemas.microsoft.com/office/2006/metadata/properties" xmlns:xsi="http://www.w3.org/2001/XMLSchema-instance" xmlns:pc="http://schemas.microsoft.com/office/infopath/2007/PartnerControls">
-  <documentManagement/>
-</p:properties>
+<file path=customXml/item8.xml><?xml version="1.0" encoding="utf-8"?>
+<TemplafySlideFormConfiguration><![CDATA[{"formFields":[],"formDataEntries":[]}]]></TemplafySlideFormConfiguration>
 </file>
 
-<file path=customXml/item11.xml><?xml version="1.0" encoding="utf-8"?>
+<file path=customXml/item9.xml><?xml version="1.0" encoding="utf-8"?>
 <TemplafySlideTemplateConfiguration><![CDATA[{"documentContentValidatorConfiguration":{"enableDocumentContentValidator":false,"documentContentValidatorVersion":0},"elementsMetadata":[],"slideId":"637037983905678162","enableDocumentContentUpdater":true,"version":"1.9"}]]></TemplafySlideTemplateConfiguration>
 </file>
 
-<file path=customXml/item12.xml><?xml version="1.0" encoding="utf-8"?>
-<TemplafySlideTemplateConfiguration><![CDATA[{"documentContentValidatorConfiguration":{"enableDocumentContentValidator":false,"documentContentValidatorVersion":0},"elementsMetadata":[],"slideId":"637050925554934895","enableDocumentContentUpdater":true,"version":"1.9"}]]></TemplafySlideTemplateConfiguration>
+<file path=customXml/itemProps1.xml><?xml version="1.0" encoding="utf-8"?>
+<ds:datastoreItem xmlns:ds="http://schemas.openxmlformats.org/officeDocument/2006/customXml" ds:itemID="{58CC0B31-82B9-497A-9A2E-F3F72D0BBDAD}">
+  <ds:schemaRefs/>
+</ds:datastoreItem>
 </file>
 
-<file path=customXml/item13.xml><?xml version="1.0" encoding="utf-8"?>
-<TemplafySlideFormConfiguration><![CDATA[{"formFields":[],"formDataEntries":[]}]]></TemplafySlideFormConfiguration>
+<file path=customXml/itemProps10.xml><?xml version="1.0" encoding="utf-8"?>
+<ds:datastoreItem xmlns:ds="http://schemas.openxmlformats.org/officeDocument/2006/customXml" ds:itemID="{D92C3DF5-A179-4E2D-BD20-07044B39171F}">
+  <ds:schemaRefs/>
+</ds:datastoreItem>
 </file>
 
-<file path=customXml/item14.xml><?xml version="1.0" encoding="utf-8"?>
-<TemplafySlideFormConfiguration><![CDATA[{"formFields":[],"formDataEntries":[]}]]></TemplafySlideFormConfiguration>
+<file path=customXml/itemProps11.xml><?xml version="1.0" encoding="utf-8"?>
+<ds:datastoreItem xmlns:ds="http://schemas.openxmlformats.org/officeDocument/2006/customXml" ds:itemID="{C750C5DC-043F-4BD3-940C-EB6F7625E286}">
+  <ds:schemaRefs/>
+</ds:datastoreItem>
 </file>
 
-<file path=customXml/item15.xml><?xml version="1.0" encoding="utf-8"?>
-<TemplafySlideTemplateConfiguration><![CDATA[{"documentContentValidatorConfiguration":{"enableDocumentContentValidator":false,"documentContentValidatorVersion":0},"elementsMetadata":[],"slideId":"637171128435648944","enableDocumentContentUpdater":true,"version":"1.9"}]]></TemplafySlideTemplateConfiguration>
+<file path=customXml/itemProps12.xml><?xml version="1.0" encoding="utf-8"?>
+<ds:datastoreItem xmlns:ds="http://schemas.openxmlformats.org/officeDocument/2006/customXml" ds:itemID="{56F2EE69-0CCA-4F48-BE22-EC4A886C57A7}">
+  <ds:schemaRefs>
+    <ds:schemaRef ds:uri="http://schemas.microsoft.com/office/infopath/2007/PartnerControls"/>
+    <ds:schemaRef ds:uri="http://purl.org/dc/elements/1.1/"/>
+    <ds:schemaRef ds:uri="http://schemas.microsoft.com/office/2006/metadata/properties"/>
+    <ds:schemaRef ds:uri="http://purl.org/dc/terms/"/>
+    <ds:schemaRef ds:uri="92e1255f-bb7b-4dc9-b051-584cc104eb44"/>
+    <ds:schemaRef ds:uri="http://schemas.openxmlformats.org/package/2006/metadata/core-properties"/>
+    <ds:schemaRef ds:uri="http://schemas.microsoft.com/office/2006/documentManagement/types"/>
+    <ds:schemaRef ds:uri="a6550eff-0fc9-443f-8e77-72cbcf778382"/>
+    <ds:schemaRef ds:uri="http://www.w3.org/XML/1998/namespace"/>
+    <ds:schemaRef ds:uri="http://purl.org/dc/dcmitype/"/>
+  </ds:schemaRefs>
+</ds:datastoreItem>
 </file>
 
-<file path=customXml/item16.xml><?xml version="1.0" encoding="utf-8"?>
-<TemplafySlideTemplateConfiguration><![CDATA[{"documentContentValidatorConfiguration":{"enableDocumentContentValidator":false,"documentContentValidatorVersion":0},"elementsMetadata":[],"slideId":"637171128435180813","enableDocumentContentUpdater":true,"version":"1.9"}]]></TemplafySlideTemplateConfiguration>
+<file path=customXml/itemProps13.xml><?xml version="1.0" encoding="utf-8"?>
+<ds:datastoreItem xmlns:ds="http://schemas.openxmlformats.org/officeDocument/2006/customXml" ds:itemID="{B9AEDDE3-EA02-4A8F-B8F8-0606A0AA45FC}">
+  <ds:schemaRefs/>
+</ds:datastoreItem>
 </file>
 
-<file path=customXml/item17.xml><?xml version="1.0" encoding="utf-8"?>
-<TemplafySlideFormConfiguration><![CDATA[{"formFields":[],"formDataEntries":[]}]]></TemplafySlideFormConfiguration>
+<file path=customXml/itemProps14.xml><?xml version="1.0" encoding="utf-8"?>
+<ds:datastoreItem xmlns:ds="http://schemas.openxmlformats.org/officeDocument/2006/customXml" ds:itemID="{F5A7E41D-6E7F-4B05-AFAB-F540BD4C068B}">
+  <ds:schemaRefs>
+    <ds:schemaRef ds:uri="http://schemas.microsoft.com/sharepoint/v3/contenttype/forms"/>
+  </ds:schemaRefs>
+</ds:datastoreItem>
 </file>
 
-<file path=customXml/item18.xml><?xml version="1.0" encoding="utf-8"?>
-<TemplafyTemplateConfiguration><![CDATA[{"elementsMetadata":[{"type":"shape","id":"5d67e717-74bf-41a6-8dce-47082e2c1da1","elementConfiguration":{"inheritDimensions":"inheritNone","height":"1.34 cm","binding":"Form.LogoInsertion.Pplogoname","disableUpdates":false,"type":"image"}}],"transformationConfigurations":[{"language":"{{DocumentLanguage}}","disableUpdates":false,"type":"proofingLanguage"},{"propertyName":"FooterText","propertyValue":"true","disableUpdates":false,"type":"customDocumentProperty"},{"propertyName":"SecurityClass","propertyValue":"{{Form.ConfidentialityClass.Confidentiality}}","disableUpdates":false,"type":"customDocumentProperty"},{"propertyName":"ExtConf","propertyValue":"{{Form.ExternalConfidentialityLabel.ExternalConfidentiality}}","disableUpdates":false,"type":"customDocumentProperty"},{"propertyName":"Prepared","propertyValue":"{{Form.Prepared}}","disableUpdates":false,"type":"customDocumentProperty"},{"propertyName":"ApprovedBy","propertyValue":"{{Form.ApprovedBy}}","disableUpdates":false,"type":"customDocumentProperty"},{"propertyName":"DocNo","propertyValue":"{{Form.DocumentNumber}} {{Form.LanguageCode.LanguageCode}}","disableUpdates":false,"type":"customDocumentProperty"},{"propertyName":"Checked","propertyValue":"{{Form.Checked}}","disableUpdates":false,"type":"customDocumentProperty"},{"propertyName":"Date","propertyValue":"{{Form.Date}}","disableUpdates":false,"type":"customDocumentProperty"},{"propertyName":"Reference","propertyValue":"{{Form.Reference}}","disableUpdates":false,"type":"customDocumentProperty"},{"propertyName":"Title","propertyValue":"{{Form.DocumentTitle}}","disableUpdates":false,"type":"customDocumentProperty"},{"propertyName":"Keyword","propertyValue":"{{Form.Keywords}}","disableUpdates":false,"type":"customDocumentProperty"},{"propertyName":"DocumentType","propertyValue":"Presentation2011","disableUpdates":false,"type":"customDocumentProperty"},{"propertyName":"Language","propertyValue":"EnglishUS","disableUpdates":false,"type":"customDocumentProperty"},{"propertyName":"TemplateID","propertyValue":"FALSE","disableUpdates":false,"type":"customDocumentProperty"},{"propertyName":"ConfCtrl","propertyValue":"FALSE","disableUpdates":false,"type":"customDocumentProperty"},{"propertyName":"title","propertyValue":"{{Form.DocumentTitle}}","disableUpdates":false,"type":"documentProperty"},{"propertyName":"keywords","propertyValue":"{{Form.Keywords}}","disableUpdates":false,"type":"documentProperty"},{"propertyName":"creator","propertyValue":"{{Form.Prepared}}","disableUpdates":false,"type":"documentProperty"},{"propertyName":"DocTitle","propertyValue":"{{Form.DocTitle.DocTitle}}","disableUpdates":false,"type":"customDocumentProperty"},{"propertyName":"IsDocument","propertyValue":"{{Form.TemplateType.IsDocument}}","disableUpdates":false,"type":"customDocumentProperty"},{"propertyName":"IsPresentation","propertyValue":"{{Form.TemplateType.IsPresentation}}","disableUpdates":false,"type":"customDocumentProperty"},{"propertyName":"company","propertyValue":"Ericsson","disableUpdates":false,"type":"documentProperty"},{"propertyName":"PageNumberVisible","propertyValue":"{{Form.TotalPageNo.TotalPageNo_value}}","disableUpdates":false,"type":"customDocumentProperty"},{"propertyName":"Revision","propertyValue":"{{Form.Revision}}","disableUpdates":false,"type":"customDocumentProperty"},{"propertyName":"DocType","propertyValue":"{{Form.DocTypePresentation}}","disableUpdates":false,"type":"customDocumentProperty"},{"propertyName":"TemplateVersion","propertyValue":"R2A","disableUpdates":false,"type":"customDocumentProperty"},{"propertyName":"PackageNo","propertyValue":"LXA 119 603","disableUpdates":false,"type":"customDocumentProperty"},{"propertyName":"PackageVersion","propertyValue":"R6B","disableUpdates":false,"type":"customDocumentProperty"},{"propertyName":"TemplateName","propertyValue":"CXC 173 2731/1","disableUpdates":false,"type":"customDocumentProperty"},{"propertyName":"DocName","propertyValue":" ","disableUpdates":false,"type":"customDocumentProperty"},{"propertyName":"description","propertyValue":"{{Form.DocumentNumber}} {{Form.LanguageCode.LanguageCode}}\nRev {{Form.Revision}}","disableUpdates":false,"type":"documentProperty"}],"templateName":"New presentation (Standard landscape)","templateDescription":"","enableDocumentContentUpdater":true,"version":"1.9"}]]></TemplafyTemplateConfiguration>
+<file path=customXml/itemProps15.xml><?xml version="1.0" encoding="utf-8"?>
+<ds:datastoreItem xmlns:ds="http://schemas.openxmlformats.org/officeDocument/2006/customXml" ds:itemID="{C09F197C-6A49-47D0-B877-F88807989676}">
+  <ds:schemaRefs/>
+</ds:datastoreItem>
 </file>
 
-<file path=customXml/item19.xml><?xml version="1.0" encoding="utf-8"?>
-<TemplafySlideFormConfiguration><![CDATA[{"formFields":[],"formDataEntries":[]}]]></TemplafySlideFormConfiguration>
+<file path=customXml/itemProps16.xml><?xml version="1.0" encoding="utf-8"?>
+<ds:datastoreItem xmlns:ds="http://schemas.openxmlformats.org/officeDocument/2006/customXml" ds:itemID="{32BA7684-6BE4-4F73-B22E-30934AB379B8}">
+  <ds:schemaRefs/>
+</ds:datastoreItem>
 </file>
 
-<file path=customXml/item2.xml><?xml version="1.0" encoding="utf-8"?>
-<TemplafySlideFormConfiguration><![CDATA[{"formFields":[],"formDataEntries":[]}]]></TemplafySlideFormConfiguration>
+<file path=customXml/itemProps17.xml><?xml version="1.0" encoding="utf-8"?>
+<ds:datastoreItem xmlns:ds="http://schemas.openxmlformats.org/officeDocument/2006/customXml" ds:itemID="{72516535-7702-46AF-9B1F-8623A67A824E}">
+  <ds:schemaRefs/>
+</ds:datastoreItem>
 </file>
 
-<file path=customXml/item3.xml><?xml version="1.0" encoding="utf-8"?>
-<TemplafySlideFormConfiguration><![CDATA[{"formFields":[],"formDataEntries":[]}]]></TemplafySlideFormConfiguration>
+<file path=customXml/itemProps18.xml><?xml version="1.0" encoding="utf-8"?>
+<ds:datastoreItem xmlns:ds="http://schemas.openxmlformats.org/officeDocument/2006/customXml" ds:itemID="{C99E78A0-C9D4-446F-B674-4DD3E2B46C5D}">
+  <ds:schemaRefs/>
+</ds:datastoreItem>
 </file>
 
-<file path=customXml/item4.xml><?xml version="1.0" encoding="utf-8"?>
-<?mso-contentType ?>
-<FormTemplates xmlns="http://schemas.microsoft.com/sharepoint/v3/contenttype/forms">
-  <Display>DocumentLibraryForm</Display>
-  <Edit>DocumentLibraryForm</Edit>
-  <New>DocumentLibraryForm</New>
-</FormTemplates>
+<file path=customXml/itemProps19.xml><?xml version="1.0" encoding="utf-8"?>
+<ds:datastoreItem xmlns:ds="http://schemas.openxmlformats.org/officeDocument/2006/customXml" ds:itemID="{07958A4E-FAB1-42E4-B6B5-29B01F63F87B}">
+  <ds:schemaRefs/>
+</ds:datastoreItem>
 </file>
 
-<file path=customXml/item5.xml><?xml version="1.0" encoding="utf-8"?>
-<TemplafyFormConfiguration><![CDATA[{"formFields":[{"required":true,"placeholder":"","lines":0,"type":"textBox","name":"DocumentTitle","label":"Document Title","helpTexts":{"prefix":"","postfix":""},"spacing":{},"fullyQualifiedName":"DocumentTitle"},{"dataSource":"Confidentiality","displayColumn":"confidentiality","hideIfNoUserInteractionRequired":false,"distinct":true,"required":true,"autoSelectFirstOption":false,"type":"dropDown","name":"ConfidentialityClass","label":"Confidentiality Class","helpTexts":{"prefix":"","postfix":""},"spacing":{},"fullyQualifiedName":"ConfidentialityClass"},{"dataSource":"External Confidentiality label","displayColumn":"externalConfidentiality","hideIfNoUserInteractionRequired":false,"distinct":true,"required":false,"autoSelectFirstOption":false,"defaultValue":"1","type":"dropDown","name":"ExternalConfidentialityLabel","label":"External Confidentiality label","helpTexts":{"prefix":"","postfix":"If no external confidentiality class then please choose the blank value"},"spacing":{},"fullyQualifiedName":"ExternalConfidentialityLabel"},{"dataSource":"PowerPoint Document Type","column":"documentType","required":false,"placeholder":"","autoSelectFirstOption":false,"type":"comboBox","name":"DocTypePresentation","label":"Document Type Presentation","helpTexts":{"prefix":"","postfix":"If the document type differs from the default value, click on the X to delete and type/choose another type."},"spacing":{},"fullyQualifiedName":"DocTypePresentation"},{"required":false,"placeholder":"","lines":0,"type":"textBox","name":"DocumentNumber","label":"Document Number","helpTexts":{"prefix":"","postfix":""},"spacing":{},"fullyQualifiedName":"DocumentNumber"},{"dataSource":"Language code","displayColumn":"showName","hideIfNoUserInteractionRequired":false,"distinct":true,"required":false,"autoSelectFirstOption":false,"defaultValue":"1","type":"dropDown","name":"LanguageCode","label":"Language Code","helpTexts":{"prefix":"","postfix":"The language code will be appended to the Document No."},"spacing":{},"fullyQualifiedName":"LanguageCode"},{"dataSource":"Revision","column":"revision","required":false,"placeholder":"","autoSelectFirstOption":false,"type":"comboBox","name":"Revision","label":"Revision","helpTexts":{"prefix":"","postfix":""},"spacing":{},"fullyQualifiedName":"Revision"},{"required":false,"type":"datePicker","name":"Date","label":"Date","helpTexts":{"prefix":"","postfix":""},"spacing":{},"fullyQualifiedName":"Date"},{"type":"heading","name":"FooterVisibilityOptions","label":"Footer Visibility Options","helpTexts":{"prefix":"","postfix":""},"spacing":{},"fullyQualifiedName":"FooterVisibilityOptions"},{"dataSource":"PPT FooterVisibility","displayColumn":"templateType","hideIfNoUserInteractionRequired":false,"distinct":true,"required":true,"autoSelectFirstOption":false,"defaultValue":"1","type":"dropDown","name":"TemplateType","label":"Is this a document or presentation?","helpTexts":{"prefix":"","postfix":""},"spacing":{},"fullyQualifiedName":"TemplateType"},{"dataSource":"PPT FooterVisibility","displayColumn":"docTitle_label","hideIfNoUserInteractionRequired":false,"distinct":true,"required":false,"autoSelectFirstOption":true,"filter":{"column":"templateType","otherFieldName":"TemplateType","fullyQualifiedOtherFieldName":"TemplateType","otherFieldColumn":"TemplateType","formReference":"none","operator":"equals"},"type":"dropDown","name":"DocTitle","label":"Show document title in footer?","helpTexts":{"prefix":"","postfix":""},"spacing":{},"fullyQualifiedName":"DocTitle"},{"dataSource":"PPT FooterVisibility","displayColumn":"totalPageNo_text","hideIfNoUserInteractionRequired":false,"distinct":true,"required":false,"autoSelectFirstOption":true,"filter":{"column":"templateType","otherFieldName":"TemplateType","fullyQualifiedOtherFieldName":"TemplateType","otherFieldColumn":"TemplateType","formReference":"none","operator":"equals"},"type":"dropDown","name":"TotalPageNo","label":"Page numbering","helpTexts":{"prefix":"","postfix":""},"spacing":{},"fullyQualifiedName":"TotalPageNo"},{"required":false,"placeholder":"","lines":0,"defaultValue":"{{UserProfile.Prepared}}","type":"textBox","name":"Prepared","label":"Prepared By (Subject Responsible)","helpTexts":{"prefix":"","postfix":""},"spacing":{},"fullyQualifiedName":"Prepared"},{"required":false,"placeholder":"","lines":0,"type":"textBox","name":"ApprovedBy","label":"Approved By (Document Responsible)","helpTexts":{"prefix":"","postfix":""},"spacing":{},"fullyQualifiedName":"ApprovedBy"},{"required":false,"placeholder":"","lines":0,"type":"textBox","name":"Checked","label":"Checked","helpTexts":{"prefix":"","postfix":""},"spacing":{},"fullyQualifiedName":"Checked"},{"required":false,"placeholder":"","lines":0,"type":"textBox","name":"Reference","label":"Reference","helpTexts":{"prefix":"","postfix":""},"spacing":{},"fullyQualifiedName":"Reference"},{"required":false,"placeholder":"","lines":0,"type":"textBox","name":"Keywords","label":"Keywords","helpTexts":{"prefix":"","postfix":""},"spacing":{},"fullyQualifiedName":"Keywords"}],"formDataEntries":[{"name":"DocumentTitle","value":"HfKMJ7wB7KPEWJpFWibMqg=="},{"name":"ConfidentialityClass","value":"cT/FOwTWaPknrhRlNMh4SQ=="},{"name":"ExternalConfidentialityLabel","value":"u2D/MG3wyuAQhkGvE2fPaA=="},{"name":"LanguageCode","value":"5wlu7ZdPxHQj1W0w+yTNSg=="},{"name":"Date","value":"vb48xUhp/+BouvbbBJesXw=="},{"name":"TemplateType","value":"PxVEvJY8nE7m/hY9622Sng=="},{"name":"DocTitle","value":"PxVEvJY8nE7m/hY9622Sng=="},{"name":"TotalPageNo","value":"PxVEvJY8nE7m/hY9622Sng=="},{"name":"Prepared","value":"PqdHBiLjqdpOMxfLUK9Tonaq9XwuinzCFKYJ7RK3+SI="}]}]]></TemplafyFormConfiguration>
+<file path=customXml/itemProps2.xml><?xml version="1.0" encoding="utf-8"?>
+<ds:datastoreItem xmlns:ds="http://schemas.openxmlformats.org/officeDocument/2006/customXml" ds:itemID="{683FEB75-8CFA-449C-A6B1-B1E4A86A58A1}">
+  <ds:schemaRefs/>
+</ds:datastoreItem>
 </file>
 
-<file path=customXml/item6.xml><?xml version="1.0" encoding="utf-8"?>
-<TemplafySlideFormConfiguration><![CDATA[{"formFields":[],"formDataEntries":[]}]]></TemplafySlideFormConfiguration>
+<file path=customXml/itemProps3.xml><?xml version="1.0" encoding="utf-8"?>
+<ds:datastoreItem xmlns:ds="http://schemas.openxmlformats.org/officeDocument/2006/customXml" ds:itemID="{03AF3FDC-ACD1-46F3-A43E-782322DF9816}">
+  <ds:schemaRefs/>
+</ds:datastoreItem>
 </file>
 
-<file path=customXml/item7.xml><?xml version="1.0" encoding="utf-8"?>
-<TemplafySlideTemplateConfiguration><![CDATA[{"documentContentValidatorConfiguration":{"enableDocumentContentValidator":false,"documentContentValidatorVersion":0},"elementsMetadata":[],"slideId":"637037983905221558","enableDocumentContentUpdater":true,"version":"1.9"}]]></TemplafySlideTemplateConfiguration>
+<file path=customXml/itemProps4.xml><?xml version="1.0" encoding="utf-8"?>
+<ds:datastoreItem xmlns:ds="http://schemas.openxmlformats.org/officeDocument/2006/customXml" ds:itemID="{847502A6-7CBE-43AF-BDF6-4D4423521D8C}">
+  <ds:schemaRefs/>
+</ds:datastoreItem>
 </file>
 
-<file path=customXml/item8.xml><?xml version="1.0" encoding="utf-8"?>
-<TemplafySlideTemplateConfiguration><![CDATA[{"documentContentValidatorConfiguration":{"enableDocumentContentValidator":false,"documentContentValidatorVersion":0},"elementsMetadata":[],"slideId":"637037983905221557","enableDocumentContentUpdater":true,"version":"1.9"}]]></TemplafySlideTemplateConfiguration>
+<file path=customXml/itemProps5.xml><?xml version="1.0" encoding="utf-8"?>
+<ds:datastoreItem xmlns:ds="http://schemas.openxmlformats.org/officeDocument/2006/customXml" ds:itemID="{822D38AD-8010-4CD3-BD6B-117CB8DF70A4}">
+  <ds:schemaRefs/>
+</ds:datastoreItem>
 </file>
 
-<file path=customXml/item9.xml><?xml version="1.0" encoding="utf-8"?>
-<TemplafySlideTemplateConfiguration><![CDATA[{"elementsMetadata":[],"documentContentValidatorConfiguration":{"enableDocumentContentValidator":false,"documentContentValidatorVersion":0},"slideId":"637027476704980324","enableDocumentContentUpdater":true,"version":"1.9"}]]></TemplafySlideTemplateConfiguration>
+<file path=customXml/itemProps6.xml><?xml version="1.0" encoding="utf-8"?>
+<ds:datastoreItem xmlns:ds="http://schemas.openxmlformats.org/officeDocument/2006/customXml" ds:itemID="{AB2F4486-6448-49E3-8249-BB9C7492711D}">
+  <ds:schemaRefs/>
+</ds:datastoreItem>
 </file>
 
-<file path=customXml/itemProps1.xml><?xml version="1.0" encoding="utf-8"?>
+<file path=customXml/itemProps7.xml><?xml version="1.0" encoding="utf-8"?>
 <ds:datastoreItem xmlns:ds="http://schemas.openxmlformats.org/officeDocument/2006/customXml" ds:itemID="{058EED06-94C4-4781-888F-0A8BB816BC9F}">
   <ds:schemaRefs>
     <ds:schemaRef ds:uri="http://schemas.microsoft.com/office/2006/metadata/contentType"/>
@@ -27678,123 +27787,14 @@
 </ds:datastoreItem>
 </file>
 
-<file path=customXml/itemProps10.xml><?xml version="1.0" encoding="utf-8"?>
-<ds:datastoreItem xmlns:ds="http://schemas.openxmlformats.org/officeDocument/2006/customXml" ds:itemID="{56F2EE69-0CCA-4F48-BE22-EC4A886C57A7}">
-  <ds:schemaRefs>
-    <ds:schemaRef ds:uri="http://schemas.microsoft.com/office/infopath/2007/PartnerControls"/>
-    <ds:schemaRef ds:uri="http://purl.org/dc/elements/1.1/"/>
-    <ds:schemaRef ds:uri="http://schemas.microsoft.com/office/2006/metadata/properties"/>
-    <ds:schemaRef ds:uri="http://purl.org/dc/terms/"/>
-    <ds:schemaRef ds:uri="92e1255f-bb7b-4dc9-b051-584cc104eb44"/>
-    <ds:schemaRef ds:uri="http://schemas.openxmlformats.org/package/2006/metadata/core-properties"/>
-    <ds:schemaRef ds:uri="http://schemas.microsoft.com/office/2006/documentManagement/types"/>
-    <ds:schemaRef ds:uri="a6550eff-0fc9-443f-8e77-72cbcf778382"/>
-    <ds:schemaRef ds:uri="http://www.w3.org/XML/1998/namespace"/>
-    <ds:schemaRef ds:uri="http://purl.org/dc/dcmitype/"/>
-  </ds:schemaRefs>
-</ds:datastoreItem>
-</file>
-
-<file path=customXml/itemProps11.xml><?xml version="1.0" encoding="utf-8"?>
-<ds:datastoreItem xmlns:ds="http://schemas.openxmlformats.org/officeDocument/2006/customXml" ds:itemID="{1CE36EA9-2186-4EB1-871A-8AE59C2A13BB}">
-  <ds:schemaRefs/>
-</ds:datastoreItem>
-</file>
-
-<file path=customXml/itemProps12.xml><?xml version="1.0" encoding="utf-8"?>
-<ds:datastoreItem xmlns:ds="http://schemas.openxmlformats.org/officeDocument/2006/customXml" ds:itemID="{03AF3FDC-ACD1-46F3-A43E-782322DF9816}">
-  <ds:schemaRefs/>
-</ds:datastoreItem>
-</file>
-
-<file path=customXml/itemProps13.xml><?xml version="1.0" encoding="utf-8"?>
-<ds:datastoreItem xmlns:ds="http://schemas.openxmlformats.org/officeDocument/2006/customXml" ds:itemID="{C99E78A0-C9D4-446F-B674-4DD3E2B46C5D}">
-  <ds:schemaRefs/>
-</ds:datastoreItem>
-</file>
-
-<file path=customXml/itemProps14.xml><?xml version="1.0" encoding="utf-8"?>
-<ds:datastoreItem xmlns:ds="http://schemas.openxmlformats.org/officeDocument/2006/customXml" ds:itemID="{32BA7684-6BE4-4F73-B22E-30934AB379B8}">
-  <ds:schemaRefs/>
-</ds:datastoreItem>
-</file>
-
-<file path=customXml/itemProps15.xml><?xml version="1.0" encoding="utf-8"?>
-<ds:datastoreItem xmlns:ds="http://schemas.openxmlformats.org/officeDocument/2006/customXml" ds:itemID="{C750C5DC-043F-4BD3-940C-EB6F7625E286}">
-  <ds:schemaRefs/>
-</ds:datastoreItem>
-</file>
-
-<file path=customXml/itemProps16.xml><?xml version="1.0" encoding="utf-8"?>
-<ds:datastoreItem xmlns:ds="http://schemas.openxmlformats.org/officeDocument/2006/customXml" ds:itemID="{AB2F4486-6448-49E3-8249-BB9C7492711D}">
-  <ds:schemaRefs/>
-</ds:datastoreItem>
-</file>
-
-<file path=customXml/itemProps17.xml><?xml version="1.0" encoding="utf-8"?>
-<ds:datastoreItem xmlns:ds="http://schemas.openxmlformats.org/officeDocument/2006/customXml" ds:itemID="{847502A6-7CBE-43AF-BDF6-4D4423521D8C}">
-  <ds:schemaRefs/>
-</ds:datastoreItem>
-</file>
-
-<file path=customXml/itemProps18.xml><?xml version="1.0" encoding="utf-8"?>
-<ds:datastoreItem xmlns:ds="http://schemas.openxmlformats.org/officeDocument/2006/customXml" ds:itemID="{07958A4E-FAB1-42E4-B6B5-29B01F63F87B}">
-  <ds:schemaRefs/>
-</ds:datastoreItem>
-</file>
-
-<file path=customXml/itemProps19.xml><?xml version="1.0" encoding="utf-8"?>
-<ds:datastoreItem xmlns:ds="http://schemas.openxmlformats.org/officeDocument/2006/customXml" ds:itemID="{B9AEDDE3-EA02-4A8F-B8F8-0606A0AA45FC}">
-  <ds:schemaRefs/>
-</ds:datastoreItem>
-</file>
-
-<file path=customXml/itemProps2.xml><?xml version="1.0" encoding="utf-8"?>
-<ds:datastoreItem xmlns:ds="http://schemas.openxmlformats.org/officeDocument/2006/customXml" ds:itemID="{822D38AD-8010-4CD3-BD6B-117CB8DF70A4}">
-  <ds:schemaRefs/>
-</ds:datastoreItem>
-</file>
-
-<file path=customXml/itemProps3.xml><?xml version="1.0" encoding="utf-8"?>
-<ds:datastoreItem xmlns:ds="http://schemas.openxmlformats.org/officeDocument/2006/customXml" ds:itemID="{58CC0B31-82B9-497A-9A2E-F3F72D0BBDAD}">
-  <ds:schemaRefs/>
-</ds:datastoreItem>
-</file>
-
-<file path=customXml/itemProps4.xml><?xml version="1.0" encoding="utf-8"?>
-<ds:datastoreItem xmlns:ds="http://schemas.openxmlformats.org/officeDocument/2006/customXml" ds:itemID="{F5A7E41D-6E7F-4B05-AFAB-F540BD4C068B}">
-  <ds:schemaRefs>
-    <ds:schemaRef ds:uri="http://schemas.microsoft.com/sharepoint/v3/contenttype/forms"/>
-  </ds:schemaRefs>
-</ds:datastoreItem>
-</file>
-
-<file path=customXml/itemProps5.xml><?xml version="1.0" encoding="utf-8"?>
-<ds:datastoreItem xmlns:ds="http://schemas.openxmlformats.org/officeDocument/2006/customXml" ds:itemID="{D92C3DF5-A179-4E2D-BD20-07044B39171F}">
-  <ds:schemaRefs/>
-</ds:datastoreItem>
-</file>
-
-<file path=customXml/itemProps6.xml><?xml version="1.0" encoding="utf-8"?>
+<file path=customXml/itemProps8.xml><?xml version="1.0" encoding="utf-8"?>
 <ds:datastoreItem xmlns:ds="http://schemas.openxmlformats.org/officeDocument/2006/customXml" ds:itemID="{D72A95EB-8536-47FD-944A-8DD76726FC96}">
   <ds:schemaRefs/>
 </ds:datastoreItem>
 </file>
 
-<file path=customXml/itemProps7.xml><?xml version="1.0" encoding="utf-8"?>
-<ds:datastoreItem xmlns:ds="http://schemas.openxmlformats.org/officeDocument/2006/customXml" ds:itemID="{683FEB75-8CFA-449C-A6B1-B1E4A86A58A1}">
-  <ds:schemaRefs/>
-</ds:datastoreItem>
-</file>
-
-<file path=customXml/itemProps8.xml><?xml version="1.0" encoding="utf-8"?>
-<ds:datastoreItem xmlns:ds="http://schemas.openxmlformats.org/officeDocument/2006/customXml" ds:itemID="{72516535-7702-46AF-9B1F-8623A67A824E}">
-  <ds:schemaRefs/>
-</ds:datastoreItem>
-</file>
-
 <file path=customXml/itemProps9.xml><?xml version="1.0" encoding="utf-8"?>
-<ds:datastoreItem xmlns:ds="http://schemas.openxmlformats.org/officeDocument/2006/customXml" ds:itemID="{C09F197C-6A49-47D0-B877-F88807989676}">
+<ds:datastoreItem xmlns:ds="http://schemas.openxmlformats.org/officeDocument/2006/customXml" ds:itemID="{1CE36EA9-2186-4EB1-871A-8AE59C2A13BB}">
   <ds:schemaRefs/>
 </ds:datastoreItem>
 </file>
</xml_diff>

<commit_message>
Updated interfaces in ScreamTx Added -pushtraffic option in BW test tool
</commit_message>
<xml_diff>
--- a/code/bw-test-tool/SCReAM-BW-test-tool.pptx
+++ b/code/bw-test-tool/SCReAM-BW-test-tool.pptx
@@ -2662,7 +2662,7 @@
               </a:rPr>
               <a:t>  |  2020-03-20  |  Public  |  Page </a:t>
             </a:r>
-            <a:fld id="{59B0EB0B-32F1-44AF-873F-76D2041FD604}" type="slidenum">
+            <a:fld id="{162D2535-6665-4802-84AE-74D7EBA1669A}" type="slidenum">
               <a:rPr lang="en-US" sz="800" b="0" i="0" u="none" smtClean="0">
                 <a:solidFill>
                   <a:srgbClr val="1A1816"/>
@@ -3167,7 +3167,7 @@
               </a:rPr>
               <a:t>  |  2020-03-20  |  Public  |  Page </a:t>
             </a:r>
-            <a:fld id="{7FCCDACB-8646-4FF0-BE9A-888990334A97}" type="slidenum">
+            <a:fld id="{716E7308-F5B2-415C-9E55-A52F249EAD6F}" type="slidenum">
               <a:rPr lang="en-US" sz="800" b="0" i="0" u="none" smtClean="0">
                 <a:solidFill>
                   <a:schemeClr val="bg1"/>
@@ -3480,7 +3480,7 @@
               </a:rPr>
               <a:t>  |  2020-03-20  |  Public  |  Page </a:t>
             </a:r>
-            <a:fld id="{4EB0BD48-4B76-4E8F-B89D-3CC9C94F5CED}" type="slidenum">
+            <a:fld id="{8823537E-391E-4E4D-8765-9AEFE738880E}" type="slidenum">
               <a:rPr lang="en-US" sz="800" b="0" i="0" u="none" smtClean="0">
                 <a:solidFill>
                   <a:srgbClr val="1A1816"/>
@@ -3713,7 +3713,7 @@
               </a:rPr>
               <a:t>  |  2020-03-20  |  Public  |  Page </a:t>
             </a:r>
-            <a:fld id="{61B8A68D-4A22-4850-A554-581913112E9F}" type="slidenum">
+            <a:fld id="{98049AC5-FC58-42B0-9488-BED2432A9FB7}" type="slidenum">
               <a:rPr lang="en-US" sz="800" b="0" i="0" u="none" smtClean="0">
                 <a:solidFill>
                   <a:srgbClr val="1A1816"/>
@@ -3873,7 +3873,7 @@
               </a:rPr>
               <a:t>  |  2020-03-20  |  Public  |  Page </a:t>
             </a:r>
-            <a:fld id="{09A2A857-8AA2-4DEF-AE16-D8F39F6CB871}" type="slidenum">
+            <a:fld id="{D5CC6DB4-C460-491E-BDA5-EFD676F848D6}" type="slidenum">
               <a:rPr lang="en-US" sz="800" b="0" i="0" u="none" smtClean="0">
                 <a:solidFill>
                   <a:srgbClr val="1A1816"/>
@@ -4079,7 +4079,7 @@
               </a:rPr>
               <a:t>  |  2020-03-20  |  Public  |  Page </a:t>
             </a:r>
-            <a:fld id="{40116754-92DB-4050-9032-1FEC49122933}" type="slidenum">
+            <a:fld id="{412FB58F-AACF-403A-ABBB-7E8D17F8A2D9}" type="slidenum">
               <a:rPr lang="en-US" sz="800" b="0" i="0" u="none" smtClean="0">
                 <a:solidFill>
                   <a:srgbClr val="1A1816"/>
@@ -4377,7 +4377,7 @@
               </a:rPr>
               <a:t>  |  2020-03-20  |  Public  |  Page </a:t>
             </a:r>
-            <a:fld id="{B9157249-2568-4CB9-B757-68B1D8F97B0A}" type="slidenum">
+            <a:fld id="{105F4D16-988D-4270-80BF-DFACB75C2CCC}" type="slidenum">
               <a:rPr lang="en-US" sz="800" b="0" i="0" u="none" smtClean="0">
                 <a:solidFill>
                   <a:schemeClr val="bg1"/>
@@ -4675,7 +4675,7 @@
               </a:rPr>
               <a:t>  |  2020-03-20  |  Public  |  Page </a:t>
             </a:r>
-            <a:fld id="{1A2E96AF-73EF-4156-BAE4-7CEA16C3FBDD}" type="slidenum">
+            <a:fld id="{57FA43E7-F9AC-4569-B756-82A47BE355AB}" type="slidenum">
               <a:rPr lang="en-US" sz="800" b="0" i="0" u="none" smtClean="0">
                 <a:solidFill>
                   <a:schemeClr val="bg1"/>
@@ -4973,7 +4973,7 @@
               </a:rPr>
               <a:t>  |  2020-03-20  |  Public  |  Page </a:t>
             </a:r>
-            <a:fld id="{64A9BBE9-9190-4EDF-9825-DE06957E6F7A}" type="slidenum">
+            <a:fld id="{CBEA399E-25B6-4158-B66F-74B986D0703D}" type="slidenum">
               <a:rPr lang="en-US" sz="800" b="0" i="0" u="none" smtClean="0">
                 <a:solidFill>
                   <a:schemeClr val="bg1"/>
@@ -5271,7 +5271,7 @@
               </a:rPr>
               <a:t>  |  2020-03-20  |  Public  |  Page </a:t>
             </a:r>
-            <a:fld id="{5FEBAF7A-F75A-426B-A4B4-75216B4BF9D5}" type="slidenum">
+            <a:fld id="{D6296F93-1C02-424F-8288-3392D414F2D5}" type="slidenum">
               <a:rPr lang="en-US" sz="800" b="0" i="0" u="none" smtClean="0">
                 <a:solidFill>
                   <a:schemeClr val="bg1"/>
@@ -5569,7 +5569,7 @@
               </a:rPr>
               <a:t>  |  2020-03-20  |  Public  |  Page </a:t>
             </a:r>
-            <a:fld id="{485CF1EC-BEE5-476F-8587-3B408826BF2F}" type="slidenum">
+            <a:fld id="{DCDC8725-FDC9-48F4-8D74-A2505479465C}" type="slidenum">
               <a:rPr lang="en-US" sz="800" b="0" i="0" u="none" smtClean="0">
                 <a:solidFill>
                   <a:schemeClr val="bg1"/>
@@ -6083,7 +6083,7 @@
               </a:rPr>
               <a:t>  |  2020-03-20  |  Public  |  Page </a:t>
             </a:r>
-            <a:fld id="{735056AA-1CCE-459F-B7A6-8ED2EDC2FC5F}" type="slidenum">
+            <a:fld id="{50F98E73-649E-415F-800F-E1475477B47A}" type="slidenum">
               <a:rPr lang="en-US" sz="800" b="0" i="0" u="none" smtClean="0">
                 <a:solidFill>
                   <a:schemeClr val="bg1"/>
@@ -6387,7 +6387,7 @@
               </a:rPr>
               <a:t>  |  2020-03-20  |  Public  |  Page </a:t>
             </a:r>
-            <a:fld id="{D2BF82C9-28C0-4137-8A4E-72F8413A0627}" type="slidenum">
+            <a:fld id="{DBA5A759-EB0B-4642-9D1A-6C1895047DB0}" type="slidenum">
               <a:rPr lang="en-US" sz="800" b="0" i="0" u="none" smtClean="0">
                 <a:solidFill>
                   <a:schemeClr val="bg1"/>
@@ -6685,7 +6685,7 @@
               </a:rPr>
               <a:t>  |  2020-03-20  |  Public  |  Page </a:t>
             </a:r>
-            <a:fld id="{003E9166-D26A-4D07-8FFA-A796F05B4A63}" type="slidenum">
+            <a:fld id="{2F1648DC-6301-4857-9DDC-134B88974D3B}" type="slidenum">
               <a:rPr lang="en-US" sz="800" b="0" i="0" u="none" smtClean="0">
                 <a:solidFill>
                   <a:schemeClr val="bg1"/>
@@ -6972,7 +6972,7 @@
               </a:rPr>
               <a:t>  |  2020-03-20  |  Public  |  Page </a:t>
             </a:r>
-            <a:fld id="{714DD31A-5E7C-40A9-974C-05A97ECC36E6}" type="slidenum">
+            <a:fld id="{77716C36-567F-40EB-A99C-71498D8245DB}" type="slidenum">
               <a:rPr lang="en-US" sz="800" b="0" i="0" u="none" smtClean="0">
                 <a:solidFill>
                   <a:srgbClr val="1A1816"/>
@@ -7259,7 +7259,7 @@
               </a:rPr>
               <a:t>  |  2020-03-20  |  Public  |  Page </a:t>
             </a:r>
-            <a:fld id="{11B012F2-D3D3-4811-B2F2-167230284800}" type="slidenum">
+            <a:fld id="{A6DBDA91-6235-41FA-8454-00C23BB5DE04}" type="slidenum">
               <a:rPr lang="en-US" sz="800" b="0" i="0" u="none" smtClean="0">
                 <a:solidFill>
                   <a:srgbClr val="1A1816"/>
@@ -7552,7 +7552,7 @@
               </a:rPr>
               <a:t>  |  2020-03-20  |  Public  |  Page </a:t>
             </a:r>
-            <a:fld id="{8E0CF207-20D3-4162-8E75-69D1958C795E}" type="slidenum">
+            <a:fld id="{0989F935-D1F1-49CF-B0EA-AFD65A54D7E4}" type="slidenum">
               <a:rPr lang="en-US" sz="800" b="0" i="0" u="none" smtClean="0">
                 <a:solidFill>
                   <a:srgbClr val="1A1816"/>
@@ -7839,7 +7839,7 @@
               </a:rPr>
               <a:t>  |  2020-03-20  |  Public  |  Page </a:t>
             </a:r>
-            <a:fld id="{0CD03271-1A55-4FFB-93B4-054A4A7A6A15}" type="slidenum">
+            <a:fld id="{D4C784A2-5957-4DA5-A2E8-4D1087135DCC}" type="slidenum">
               <a:rPr lang="en-US" sz="800" b="0" i="0" u="none" smtClean="0">
                 <a:solidFill>
                   <a:srgbClr val="1A1816"/>
@@ -8161,7 +8161,7 @@
               </a:rPr>
               <a:t>  |  2020-03-20  |  Public  |  Page </a:t>
             </a:r>
-            <a:fld id="{79CEA849-5E6B-48D1-82BA-636362EFA22D}" type="slidenum">
+            <a:fld id="{16DFB972-C3D4-4FE1-AD61-FAA3C6CB2830}" type="slidenum">
               <a:rPr lang="en-US" sz="800" b="0" i="0" u="none" smtClean="0">
                 <a:solidFill>
                   <a:srgbClr val="1A1816"/>
@@ -8448,7 +8448,7 @@
               </a:rPr>
               <a:t>  |  2020-03-20  |  Public  |  Page </a:t>
             </a:r>
-            <a:fld id="{3E7CAA79-7FCB-45AC-961C-96225C68B6C7}" type="slidenum">
+            <a:fld id="{888B4F1D-CF2C-4E25-9068-1AF6E438DE87}" type="slidenum">
               <a:rPr lang="en-US" sz="800" b="0" i="0" u="none" smtClean="0">
                 <a:solidFill>
                   <a:srgbClr val="1A1816"/>
@@ -8770,7 +8770,7 @@
               </a:rPr>
               <a:t>  |  2020-03-20  |  Public  |  Page </a:t>
             </a:r>
-            <a:fld id="{9928B449-6381-4B26-B937-346BA4FC2C8C}" type="slidenum">
+            <a:fld id="{2573A8FC-525F-4EAE-ADAD-F2AAD124609A}" type="slidenum">
               <a:rPr lang="en-US" sz="800" b="0" i="0" u="none" smtClean="0">
                 <a:solidFill>
                   <a:srgbClr val="1A1816"/>
@@ -9132,7 +9132,7 @@
               </a:rPr>
               <a:t>  |  2020-03-20  |  Public  |  Page </a:t>
             </a:r>
-            <a:fld id="{7A2790D3-ECF9-4F30-9152-F66E1D841CC3}" type="slidenum">
+            <a:fld id="{FF352563-A4C5-4205-B2B9-B7540F117541}" type="slidenum">
               <a:rPr lang="en-US" sz="800" b="0" i="0" u="none" smtClean="0">
                 <a:solidFill>
                   <a:srgbClr val="1A1816"/>
@@ -9474,7 +9474,7 @@
               </a:rPr>
               <a:t>  |  2020-03-20  |  Public  |  Page </a:t>
             </a:r>
-            <a:fld id="{426DEE38-A107-4734-925E-21E509B9DF3F}" type="slidenum">
+            <a:fld id="{B4AE421F-75B4-4E34-ADB1-A07DAB916DB5}" type="slidenum">
               <a:rPr lang="en-US" sz="800" b="0" i="0" u="none" smtClean="0">
                 <a:solidFill>
                   <a:srgbClr val="1A1816"/>
@@ -9823,7 +9823,7 @@
               </a:rPr>
               <a:t>  |  2020-03-20  |  Public  |  Page </a:t>
             </a:r>
-            <a:fld id="{E45DFDF6-4ADE-4DE8-B192-40C12F697E2F}" type="slidenum">
+            <a:fld id="{7138514E-A377-4969-B371-D398842854C1}" type="slidenum">
               <a:rPr lang="en-US" sz="800" b="0" i="0" u="none" smtClean="0">
                 <a:solidFill>
                   <a:srgbClr val="1A1816"/>
@@ -10185,7 +10185,7 @@
               </a:rPr>
               <a:t>  |  2020-03-20  |  Public  |  Page </a:t>
             </a:r>
-            <a:fld id="{1364CC24-13CC-40B8-BF5F-226B538B9D49}" type="slidenum">
+            <a:fld id="{B2E8ED26-B8DC-48A4-B68B-4814C7353A39}" type="slidenum">
               <a:rPr lang="en-US" sz="800" b="0" i="0" u="none" smtClean="0">
                 <a:solidFill>
                   <a:srgbClr val="1A1816"/>
@@ -10547,7 +10547,7 @@
               </a:rPr>
               <a:t>  |  2020-03-20  |  Public  |  Page </a:t>
             </a:r>
-            <a:fld id="{2C148506-E9FC-47C4-B403-3D3DA5C9AE79}" type="slidenum">
+            <a:fld id="{7F05DB7E-68CD-45AC-A979-022B0E055963}" type="slidenum">
               <a:rPr lang="en-US" sz="800" b="0" i="0" u="none" smtClean="0">
                 <a:solidFill>
                   <a:srgbClr val="1A1816"/>
@@ -10909,7 +10909,7 @@
               </a:rPr>
               <a:t>  |  2020-03-20  |  Public  |  Page </a:t>
             </a:r>
-            <a:fld id="{BABF7CCE-B55E-4409-82D9-E95C8212B5D2}" type="slidenum">
+            <a:fld id="{B6C31DD3-174A-472C-9360-472CC7B56DC1}" type="slidenum">
               <a:rPr lang="en-US" sz="800" b="0" i="0" u="none" smtClean="0">
                 <a:solidFill>
                   <a:srgbClr val="1A1816"/>
@@ -11271,7 +11271,7 @@
               </a:rPr>
               <a:t>  |  2020-03-20  |  Public  |  Page </a:t>
             </a:r>
-            <a:fld id="{1F550298-DD6F-4259-BC6F-E383F5980E1A}" type="slidenum">
+            <a:fld id="{5841F6C6-88A6-44A1-8717-882CFB51EF6F}" type="slidenum">
               <a:rPr lang="en-US" sz="800" b="0" i="0" u="none" smtClean="0">
                 <a:solidFill>
                   <a:srgbClr val="1A1816"/>
@@ -11693,7 +11693,7 @@
               </a:rPr>
               <a:t>  |  2020-03-20  |  Public  |  Page </a:t>
             </a:r>
-            <a:fld id="{3DFCA28F-5741-4C33-B69F-C78E055EF074}" type="slidenum">
+            <a:fld id="{7279D8CF-093D-4654-BF69-AFFAC2DD0BC3}" type="slidenum">
               <a:rPr lang="en-US" sz="800" b="0" i="0" u="none" smtClean="0">
                 <a:solidFill>
                   <a:srgbClr val="1A1816"/>
@@ -12109,7 +12109,7 @@
               </a:rPr>
               <a:t>  |  2020-03-20  |  Public  |  Page </a:t>
             </a:r>
-            <a:fld id="{1E3194C1-5627-4C48-A3AB-AE7715F09A57}" type="slidenum">
+            <a:fld id="{0F83655A-579B-40A8-99CB-2A68DAB5728E}" type="slidenum">
               <a:rPr lang="en-US" sz="800" b="0" i="0" u="none" smtClean="0">
                 <a:solidFill>
                   <a:srgbClr val="1A1816"/>
@@ -12584,7 +12584,7 @@
               </a:rPr>
               <a:t>  |  2020-03-20  |  Public  |  Page </a:t>
             </a:r>
-            <a:fld id="{1535CCE5-B2EF-4643-ACA5-8B309E06F355}" type="slidenum">
+            <a:fld id="{A9997036-37EA-4B9F-A14D-DF041E5316BC}" type="slidenum">
               <a:rPr lang="en-US" sz="800" b="0" i="0" u="none" smtClean="0">
                 <a:solidFill>
                   <a:srgbClr val="1A1816"/>
@@ -13079,7 +13079,7 @@
               </a:rPr>
               <a:t>  |  2020-03-20  |  Public  |  Page </a:t>
             </a:r>
-            <a:fld id="{58F2EBC6-1097-4825-9E48-724F28655369}" type="slidenum">
+            <a:fld id="{2E656380-4DFF-4D60-A0A1-82EFC29FBB82}" type="slidenum">
               <a:rPr lang="en-US" sz="800" b="0" i="0" u="none" smtClean="0">
                 <a:solidFill>
                   <a:srgbClr val="1A1816"/>
@@ -13535,7 +13535,7 @@
               </a:rPr>
               <a:t>  |  2020-03-20  |  Public  |  Page </a:t>
             </a:r>
-            <a:fld id="{5CE807DD-C082-4322-B0ED-54385FC02734}" type="slidenum">
+            <a:fld id="{24D9AC68-C182-485C-A980-09E523B7F591}" type="slidenum">
               <a:rPr lang="en-US" sz="800" b="0" i="0" u="none" smtClean="0">
                 <a:solidFill>
                   <a:srgbClr val="1A1816"/>
@@ -13923,7 +13923,7 @@
               </a:rPr>
               <a:t>  |  2020-03-20  |  Public  |  Page </a:t>
             </a:r>
-            <a:fld id="{3D3769FB-7E60-4983-AE85-DDCDBB17F715}" type="slidenum">
+            <a:fld id="{566CFE76-7659-4598-9AF3-91E39A0F1DE9}" type="slidenum">
               <a:rPr lang="en-US" sz="800" b="0" i="0" u="none" smtClean="0">
                 <a:solidFill>
                   <a:schemeClr val="bg1"/>
@@ -14442,7 +14442,7 @@
               </a:rPr>
               <a:t>  |  2020-03-20  |  Public  |  Page </a:t>
             </a:r>
-            <a:fld id="{F13FB835-9D61-41A6-9C08-0CAE75F2AB14}" type="slidenum">
+            <a:fld id="{780E78B2-CC35-4A3B-88EB-50A0732FBE8C}" type="slidenum">
               <a:rPr lang="en-US" sz="800" b="0" i="0" u="none" smtClean="0">
                 <a:solidFill>
                   <a:srgbClr val="1A1816"/>
@@ -15151,7 +15151,7 @@
               </a:rPr>
               <a:t>  |  2020-03-20  |  Public  |  Page </a:t>
             </a:r>
-            <a:fld id="{47AC60D3-D940-4437-AE2F-A7F8B940BA64}" type="slidenum">
+            <a:fld id="{69E0A78D-14D5-4136-8338-E54F5F9A31D3}" type="slidenum">
               <a:rPr lang="en-US" sz="800" b="0" i="0" u="none" smtClean="0">
                 <a:solidFill>
                   <a:srgbClr val="1A1816"/>
@@ -16630,7 +16630,7 @@
               </a:rPr>
               <a:t>  |  2020-03-20  |  Public  |  Page </a:t>
             </a:r>
-            <a:fld id="{AFFAA1D4-1517-4EA7-9223-94CA475C9323}" type="slidenum">
+            <a:fld id="{6A084469-1BED-48E5-BD61-0B63C7E8FCB8}" type="slidenum">
               <a:rPr lang="en-US" sz="800" b="0" i="0" u="none" smtClean="0">
                 <a:solidFill>
                   <a:schemeClr val="bg1"/>
@@ -17142,7 +17142,7 @@
               </a:rPr>
               <a:t>  |  2020-03-20  |  Public  |  Page </a:t>
             </a:r>
-            <a:fld id="{A692DD62-616B-494A-A7B1-DA4E1AD25C0B}" type="slidenum">
+            <a:fld id="{1934B01C-7E43-489C-972F-38F321151719}" type="slidenum">
               <a:rPr lang="en-US" sz="800" b="0" i="0" u="none" smtClean="0">
                 <a:solidFill>
                   <a:schemeClr val="bg1"/>
@@ -17537,7 +17537,7 @@
               </a:rPr>
               <a:t>  |  2020-03-20  |  Public  |  Page </a:t>
             </a:r>
-            <a:fld id="{1047FC3B-5FA8-422C-985E-4B897019C728}" type="slidenum">
+            <a:fld id="{436895CA-37FA-478C-AC4E-E9942B1914ED}" type="slidenum">
               <a:rPr lang="en-US" sz="800" b="0" i="0" u="none" smtClean="0">
                 <a:solidFill>
                   <a:schemeClr val="bg1"/>
@@ -18037,7 +18037,7 @@
               </a:rPr>
               <a:t>  |  2020-03-20  |  Public  |  Page </a:t>
             </a:r>
-            <a:fld id="{2BF234DB-AE9A-48FD-9509-A1D6867B191C}" type="slidenum">
+            <a:fld id="{EDED6123-9200-4225-AA0D-55A167E443B5}" type="slidenum">
               <a:rPr lang="en-US" sz="800" b="0" i="0" u="none" smtClean="0">
                 <a:solidFill>
                   <a:schemeClr val="bg1"/>
@@ -18537,7 +18537,7 @@
               </a:rPr>
               <a:t>  |  2020-03-20  |  Public  |  Page </a:t>
             </a:r>
-            <a:fld id="{758143D3-03D4-45C0-9A51-0A6AD7736F1D}" type="slidenum">
+            <a:fld id="{19181C8B-6529-4D5B-8264-8F7EDBA46D58}" type="slidenum">
               <a:rPr lang="en-US" sz="800" b="0" i="0" u="none" smtClean="0">
                 <a:solidFill>
                   <a:schemeClr val="bg1"/>
@@ -19546,7 +19546,7 @@
             </a:br>
             <a:r>
               <a:rPr lang="en-US" sz="5400" dirty="0"/>
-              <a:t>2020-05-29</a:t>
+              <a:t>2020-06-09</a:t>
             </a:r>
           </a:p>
         </p:txBody>
@@ -23178,7 +23178,7 @@
           <a:graphicData uri="http://schemas.openxmlformats.org/presentationml/2006/ole">
             <mc:AlternateContent xmlns:mc="http://schemas.openxmlformats.org/markup-compatibility/2006">
               <mc:Choice xmlns:v="urn:schemas-microsoft-com:vml" Requires="v">
-                <p:oleObj spid="_x0000_s1051" name="Visio" r:id="rId5" imgW="2533577" imgH="3257685" progId="Visio.Drawing.11">
+                <p:oleObj spid="_x0000_s1053" name="Visio" r:id="rId5" imgW="2533577" imgH="3257685" progId="Visio.Drawing.11">
                   <p:embed/>
                 </p:oleObj>
               </mc:Choice>
@@ -25117,19 +25117,13 @@
         </p:nvSpPr>
         <p:spPr>
           <a:xfrm>
-            <a:off x="479425" y="1016794"/>
-            <a:ext cx="5128273" cy="5364956"/>
+            <a:off x="479425" y="1016793"/>
+            <a:ext cx="4798296" cy="5538989"/>
           </a:xfrm>
         </p:spPr>
         <p:txBody>
           <a:bodyPr/>
           <a:lstStyle/>
-          <a:p>
-            <a:r>
-              <a:rPr lang="en-US" sz="1600" dirty="0"/>
-              <a:t>Command line options explained to the right </a:t>
-            </a:r>
-          </a:p>
           <a:p>
             <a:r>
               <a:rPr lang="en-US" sz="1600" dirty="0"/>
@@ -25497,10 +25491,10 @@
       </p:sp>
       <p:pic>
         <p:nvPicPr>
-          <p:cNvPr id="3" name="Picture 2" descr="A screenshot of text&#10;&#10;Description automatically generated">
+          <p:cNvPr id="4" name="Picture 3" descr="A close up of text on a black background&#10;&#10;Description automatically generated">
             <a:extLst>
               <a:ext uri="{FF2B5EF4-FFF2-40B4-BE49-F238E27FC236}">
-                <a16:creationId xmlns:a16="http://schemas.microsoft.com/office/drawing/2014/main" id="{B49A7B29-4692-4F5F-A0B5-A5B1636E831B}"/>
+                <a16:creationId xmlns:a16="http://schemas.microsoft.com/office/drawing/2014/main" id="{B2D0B2C3-F3E0-4C29-BEE5-8DC734A2C3A5}"/>
               </a:ext>
             </a:extLst>
           </p:cNvPr>
@@ -25523,8 +25517,8 @@
         </p:blipFill>
         <p:spPr>
           <a:xfrm>
-            <a:off x="5794310" y="853488"/>
-            <a:ext cx="6307483" cy="5740143"/>
+            <a:off x="5277721" y="0"/>
+            <a:ext cx="6914279" cy="6858000"/>
           </a:xfrm>
           <a:prstGeom prst="rect">
             <a:avLst/>
@@ -27358,28 +27352,34 @@
 </file>
 
 <file path=customXml/item1.xml><?xml version="1.0" encoding="utf-8"?>
+<TemplafySlideTemplateConfiguration><![CDATA[{"documentContentValidatorConfiguration":{"enableDocumentContentValidator":false,"documentContentValidatorVersion":0},"elementsMetadata":[],"slideId":"637050925554934895","enableDocumentContentUpdater":true,"version":"1.9"}]]></TemplafySlideTemplateConfiguration>
+</file>
+
+<file path=customXml/item10.xml><?xml version="1.0" encoding="utf-8"?>
 <TemplafySlideFormConfiguration><![CDATA[{"formFields":[],"formDataEntries":[]}]]></TemplafySlideFormConfiguration>
 </file>
 
-<file path=customXml/item10.xml><?xml version="1.0" encoding="utf-8"?>
+<file path=customXml/item11.xml><?xml version="1.0" encoding="utf-8"?>
+<TemplafySlideTemplateConfiguration><![CDATA[{"elementsMetadata":[],"documentContentValidatorConfiguration":{"enableDocumentContentValidator":false,"documentContentValidatorVersion":0},"slideId":"637027476704980324","enableDocumentContentUpdater":true,"version":"1.9"}]]></TemplafySlideTemplateConfiguration>
+</file>
+
+<file path=customXml/item12.xml><?xml version="1.0" encoding="utf-8"?>
 <TemplafyFormConfiguration><![CDATA[{"formFields":[{"required":true,"placeholder":"","lines":0,"type":"textBox","name":"DocumentTitle","label":"Document Title","helpTexts":{"prefix":"","postfix":""},"spacing":{},"fullyQualifiedName":"DocumentTitle"},{"dataSource":"Confidentiality","displayColumn":"confidentiality","hideIfNoUserInteractionRequired":false,"distinct":true,"required":true,"autoSelectFirstOption":false,"type":"dropDown","name":"ConfidentialityClass","label":"Confidentiality Class","helpTexts":{"prefix":"","postfix":""},"spacing":{},"fullyQualifiedName":"ConfidentialityClass"},{"dataSource":"External Confidentiality label","displayColumn":"externalConfidentiality","hideIfNoUserInteractionRequired":false,"distinct":true,"required":false,"autoSelectFirstOption":false,"defaultValue":"1","type":"dropDown","name":"ExternalConfidentialityLabel","label":"External Confidentiality label","helpTexts":{"prefix":"","postfix":"If no external confidentiality class then please choose the blank value"},"spacing":{},"fullyQualifiedName":"ExternalConfidentialityLabel"},{"dataSource":"PowerPoint Document Type","column":"documentType","required":false,"placeholder":"","autoSelectFirstOption":false,"type":"comboBox","name":"DocTypePresentation","label":"Document Type Presentation","helpTexts":{"prefix":"","postfix":"If the document type differs from the default value, click on the X to delete and type/choose another type."},"spacing":{},"fullyQualifiedName":"DocTypePresentation"},{"required":false,"placeholder":"","lines":0,"type":"textBox","name":"DocumentNumber","label":"Document Number","helpTexts":{"prefix":"","postfix":""},"spacing":{},"fullyQualifiedName":"DocumentNumber"},{"dataSource":"Language code","displayColumn":"showName","hideIfNoUserInteractionRequired":false,"distinct":true,"required":false,"autoSelectFirstOption":false,"defaultValue":"1","type":"dropDown","name":"LanguageCode","label":"Language Code","helpTexts":{"prefix":"","postfix":"The language code will be appended to the Document No."},"spacing":{},"fullyQualifiedName":"LanguageCode"},{"dataSource":"Revision","column":"revision","required":false,"placeholder":"","autoSelectFirstOption":false,"type":"comboBox","name":"Revision","label":"Revision","helpTexts":{"prefix":"","postfix":""},"spacing":{},"fullyQualifiedName":"Revision"},{"required":false,"type":"datePicker","name":"Date","label":"Date","helpTexts":{"prefix":"","postfix":""},"spacing":{},"fullyQualifiedName":"Date"},{"type":"heading","name":"FooterVisibilityOptions","label":"Footer Visibility Options","helpTexts":{"prefix":"","postfix":""},"spacing":{},"fullyQualifiedName":"FooterVisibilityOptions"},{"dataSource":"PPT FooterVisibility","displayColumn":"templateType","hideIfNoUserInteractionRequired":false,"distinct":true,"required":true,"autoSelectFirstOption":false,"defaultValue":"1","type":"dropDown","name":"TemplateType","label":"Is this a document or presentation?","helpTexts":{"prefix":"","postfix":""},"spacing":{},"fullyQualifiedName":"TemplateType"},{"dataSource":"PPT FooterVisibility","displayColumn":"docTitle_label","hideIfNoUserInteractionRequired":false,"distinct":true,"required":false,"autoSelectFirstOption":true,"filter":{"column":"templateType","otherFieldName":"TemplateType","fullyQualifiedOtherFieldName":"TemplateType","otherFieldColumn":"TemplateType","formReference":"none","operator":"equals"},"type":"dropDown","name":"DocTitle","label":"Show document title in footer?","helpTexts":{"prefix":"","postfix":""},"spacing":{},"fullyQualifiedName":"DocTitle"},{"dataSource":"PPT FooterVisibility","displayColumn":"totalPageNo_text","hideIfNoUserInteractionRequired":false,"distinct":true,"required":false,"autoSelectFirstOption":true,"filter":{"column":"templateType","otherFieldName":"TemplateType","fullyQualifiedOtherFieldName":"TemplateType","otherFieldColumn":"TemplateType","formReference":"none","operator":"equals"},"type":"dropDown","name":"TotalPageNo","label":"Page numbering","helpTexts":{"prefix":"","postfix":""},"spacing":{},"fullyQualifiedName":"TotalPageNo"},{"required":false,"placeholder":"","lines":0,"defaultValue":"{{UserProfile.Prepared}}","type":"textBox","name":"Prepared","label":"Prepared By (Subject Responsible)","helpTexts":{"prefix":"","postfix":""},"spacing":{},"fullyQualifiedName":"Prepared"},{"required":false,"placeholder":"","lines":0,"type":"textBox","name":"ApprovedBy","label":"Approved By (Document Responsible)","helpTexts":{"prefix":"","postfix":""},"spacing":{},"fullyQualifiedName":"ApprovedBy"},{"required":false,"placeholder":"","lines":0,"type":"textBox","name":"Checked","label":"Checked","helpTexts":{"prefix":"","postfix":""},"spacing":{},"fullyQualifiedName":"Checked"},{"required":false,"placeholder":"","lines":0,"type":"textBox","name":"Reference","label":"Reference","helpTexts":{"prefix":"","postfix":""},"spacing":{},"fullyQualifiedName":"Reference"},{"required":false,"placeholder":"","lines":0,"type":"textBox","name":"Keywords","label":"Keywords","helpTexts":{"prefix":"","postfix":""},"spacing":{},"fullyQualifiedName":"Keywords"}],"formDataEntries":[{"name":"DocumentTitle","value":"HfKMJ7wB7KPEWJpFWibMqg=="},{"name":"ConfidentialityClass","value":"cT/FOwTWaPknrhRlNMh4SQ=="},{"name":"ExternalConfidentialityLabel","value":"u2D/MG3wyuAQhkGvE2fPaA=="},{"name":"LanguageCode","value":"5wlu7ZdPxHQj1W0w+yTNSg=="},{"name":"Date","value":"vb48xUhp/+BouvbbBJesXw=="},{"name":"TemplateType","value":"PxVEvJY8nE7m/hY9622Sng=="},{"name":"DocTitle","value":"PxVEvJY8nE7m/hY9622Sng=="},{"name":"TotalPageNo","value":"PxVEvJY8nE7m/hY9622Sng=="},{"name":"Prepared","value":"PqdHBiLjqdpOMxfLUK9Tonaq9XwuinzCFKYJ7RK3+SI="}]}]]></TemplafyFormConfiguration>
 </file>
 
-<file path=customXml/item11.xml><?xml version="1.0" encoding="utf-8"?>
-<TemplafySlideTemplateConfiguration><![CDATA[{"documentContentValidatorConfiguration":{"enableDocumentContentValidator":false,"documentContentValidatorVersion":0},"elementsMetadata":[],"slideId":"637171128435648944","enableDocumentContentUpdater":true,"version":"1.9"}]]></TemplafySlideTemplateConfiguration>
+<file path=customXml/item13.xml><?xml version="1.0" encoding="utf-8"?>
+<TemplafyTemplateConfiguration><![CDATA[{"elementsMetadata":[{"type":"shape","id":"5d67e717-74bf-41a6-8dce-47082e2c1da1","elementConfiguration":{"inheritDimensions":"inheritNone","height":"1.34 cm","binding":"Form.LogoInsertion.Pplogoname","disableUpdates":false,"type":"image"}}],"transformationConfigurations":[{"language":"{{DocumentLanguage}}","disableUpdates":false,"type":"proofingLanguage"},{"propertyName":"FooterText","propertyValue":"true","disableUpdates":false,"type":"customDocumentProperty"},{"propertyName":"SecurityClass","propertyValue":"{{Form.ConfidentialityClass.Confidentiality}}","disableUpdates":false,"type":"customDocumentProperty"},{"propertyName":"ExtConf","propertyValue":"{{Form.ExternalConfidentialityLabel.ExternalConfidentiality}}","disableUpdates":false,"type":"customDocumentProperty"},{"propertyName":"Prepared","propertyValue":"{{Form.Prepared}}","disableUpdates":false,"type":"customDocumentProperty"},{"propertyName":"ApprovedBy","propertyValue":"{{Form.ApprovedBy}}","disableUpdates":false,"type":"customDocumentProperty"},{"propertyName":"DocNo","propertyValue":"{{Form.DocumentNumber}} {{Form.LanguageCode.LanguageCode}}","disableUpdates":false,"type":"customDocumentProperty"},{"propertyName":"Checked","propertyValue":"{{Form.Checked}}","disableUpdates":false,"type":"customDocumentProperty"},{"propertyName":"Date","propertyValue":"{{Form.Date}}","disableUpdates":false,"type":"customDocumentProperty"},{"propertyName":"Reference","propertyValue":"{{Form.Reference}}","disableUpdates":false,"type":"customDocumentProperty"},{"propertyName":"Title","propertyValue":"{{Form.DocumentTitle}}","disableUpdates":false,"type":"customDocumentProperty"},{"propertyName":"Keyword","propertyValue":"{{Form.Keywords}}","disableUpdates":false,"type":"customDocumentProperty"},{"propertyName":"DocumentType","propertyValue":"Presentation2011","disableUpdates":false,"type":"customDocumentProperty"},{"propertyName":"Language","propertyValue":"EnglishUS","disableUpdates":false,"type":"customDocumentProperty"},{"propertyName":"TemplateID","propertyValue":"FALSE","disableUpdates":false,"type":"customDocumentProperty"},{"propertyName":"ConfCtrl","propertyValue":"FALSE","disableUpdates":false,"type":"customDocumentProperty"},{"propertyName":"title","propertyValue":"{{Form.DocumentTitle}}","disableUpdates":false,"type":"documentProperty"},{"propertyName":"keywords","propertyValue":"{{Form.Keywords}}","disableUpdates":false,"type":"documentProperty"},{"propertyName":"creator","propertyValue":"{{Form.Prepared}}","disableUpdates":false,"type":"documentProperty"},{"propertyName":"DocTitle","propertyValue":"{{Form.DocTitle.DocTitle}}","disableUpdates":false,"type":"customDocumentProperty"},{"propertyName":"IsDocument","propertyValue":"{{Form.TemplateType.IsDocument}}","disableUpdates":false,"type":"customDocumentProperty"},{"propertyName":"IsPresentation","propertyValue":"{{Form.TemplateType.IsPresentation}}","disableUpdates":false,"type":"customDocumentProperty"},{"propertyName":"company","propertyValue":"Ericsson","disableUpdates":false,"type":"documentProperty"},{"propertyName":"PageNumberVisible","propertyValue":"{{Form.TotalPageNo.TotalPageNo_value}}","disableUpdates":false,"type":"customDocumentProperty"},{"propertyName":"Revision","propertyValue":"{{Form.Revision}}","disableUpdates":false,"type":"customDocumentProperty"},{"propertyName":"DocType","propertyValue":"{{Form.DocTypePresentation}}","disableUpdates":false,"type":"customDocumentProperty"},{"propertyName":"TemplateVersion","propertyValue":"R2A","disableUpdates":false,"type":"customDocumentProperty"},{"propertyName":"PackageNo","propertyValue":"LXA 119 603","disableUpdates":false,"type":"customDocumentProperty"},{"propertyName":"PackageVersion","propertyValue":"R6B","disableUpdates":false,"type":"customDocumentProperty"},{"propertyName":"TemplateName","propertyValue":"CXC 173 2731/1","disableUpdates":false,"type":"customDocumentProperty"},{"propertyName":"DocName","propertyValue":" ","disableUpdates":false,"type":"customDocumentProperty"},{"propertyName":"description","propertyValue":"{{Form.DocumentNumber}} {{Form.LanguageCode.LanguageCode}}\nRev {{Form.Revision}}","disableUpdates":false,"type":"documentProperty"}],"templateName":"New presentation (Standard landscape)","templateDescription":"","enableDocumentContentUpdater":true,"version":"1.9"}]]></TemplafyTemplateConfiguration>
 </file>
 
-<file path=customXml/item12.xml><?xml version="1.0" encoding="utf-8"?>
-<p:properties xmlns:p="http://schemas.microsoft.com/office/2006/metadata/properties" xmlns:xsi="http://www.w3.org/2001/XMLSchema-instance" xmlns:pc="http://schemas.microsoft.com/office/infopath/2007/PartnerControls">
-  <documentManagement/>
-</p:properties>
-</file>
-
-<file path=customXml/item13.xml><?xml version="1.0" encoding="utf-8"?>
+<file path=customXml/item14.xml><?xml version="1.0" encoding="utf-8"?>
 <TemplafySlideFormConfiguration><![CDATA[{"formFields":[],"formDataEntries":[]}]]></TemplafySlideFormConfiguration>
 </file>
 
-<file path=customXml/item14.xml><?xml version="1.0" encoding="utf-8"?>
+<file path=customXml/item15.xml><?xml version="1.0" encoding="utf-8"?>
+<TemplafySlideTemplateConfiguration><![CDATA[{"documentContentValidatorConfiguration":{"enableDocumentContentValidator":false,"documentContentValidatorVersion":0},"elementsMetadata":[],"slideId":"637037983905678162","enableDocumentContentUpdater":true,"version":"1.9"}]]></TemplafySlideTemplateConfiguration>
+</file>
+
+<file path=customXml/item16.xml><?xml version="1.0" encoding="utf-8"?>
 <?mso-contentType ?>
 <FormTemplates xmlns="http://schemas.microsoft.com/sharepoint/v3/contenttype/forms">
   <Display>DocumentLibraryForm</Display>
@@ -27388,16 +27388,8 @@
 </FormTemplates>
 </file>
 
-<file path=customXml/item15.xml><?xml version="1.0" encoding="utf-8"?>
-<TemplafySlideTemplateConfiguration><![CDATA[{"elementsMetadata":[],"documentContentValidatorConfiguration":{"enableDocumentContentValidator":false,"documentContentValidatorVersion":0},"slideId":"637027476704980324","enableDocumentContentUpdater":true,"version":"1.9"}]]></TemplafySlideTemplateConfiguration>
-</file>
-
-<file path=customXml/item16.xml><?xml version="1.0" encoding="utf-8"?>
+<file path=customXml/item17.xml><?xml version="1.0" encoding="utf-8"?>
 <TemplafySlideFormConfiguration><![CDATA[{"formFields":[],"formDataEntries":[]}]]></TemplafySlideFormConfiguration>
-</file>
-
-<file path=customXml/item17.xml><?xml version="1.0" encoding="utf-8"?>
-<TemplafySlideTemplateConfiguration><![CDATA[{"documentContentValidatorConfiguration":{"enableDocumentContentValidator":false,"documentContentValidatorVersion":0},"elementsMetadata":[],"slideId":"637037983905221557","enableDocumentContentUpdater":true,"version":"1.9"}]]></TemplafySlideTemplateConfiguration>
 </file>
 
 <file path=customXml/item18.xml><?xml version="1.0" encoding="utf-8"?>
@@ -27405,30 +27397,10 @@
 </file>
 
 <file path=customXml/item19.xml><?xml version="1.0" encoding="utf-8"?>
-<TemplafyTemplateConfiguration><![CDATA[{"elementsMetadata":[{"type":"shape","id":"5d67e717-74bf-41a6-8dce-47082e2c1da1","elementConfiguration":{"inheritDimensions":"inheritNone","height":"1.34 cm","binding":"Form.LogoInsertion.Pplogoname","disableUpdates":false,"type":"image"}}],"transformationConfigurations":[{"language":"{{DocumentLanguage}}","disableUpdates":false,"type":"proofingLanguage"},{"propertyName":"FooterText","propertyValue":"true","disableUpdates":false,"type":"customDocumentProperty"},{"propertyName":"SecurityClass","propertyValue":"{{Form.ConfidentialityClass.Confidentiality}}","disableUpdates":false,"type":"customDocumentProperty"},{"propertyName":"ExtConf","propertyValue":"{{Form.ExternalConfidentialityLabel.ExternalConfidentiality}}","disableUpdates":false,"type":"customDocumentProperty"},{"propertyName":"Prepared","propertyValue":"{{Form.Prepared}}","disableUpdates":false,"type":"customDocumentProperty"},{"propertyName":"ApprovedBy","propertyValue":"{{Form.ApprovedBy}}","disableUpdates":false,"type":"customDocumentProperty"},{"propertyName":"DocNo","propertyValue":"{{Form.DocumentNumber}} {{Form.LanguageCode.LanguageCode}}","disableUpdates":false,"type":"customDocumentProperty"},{"propertyName":"Checked","propertyValue":"{{Form.Checked}}","disableUpdates":false,"type":"customDocumentProperty"},{"propertyName":"Date","propertyValue":"{{Form.Date}}","disableUpdates":false,"type":"customDocumentProperty"},{"propertyName":"Reference","propertyValue":"{{Form.Reference}}","disableUpdates":false,"type":"customDocumentProperty"},{"propertyName":"Title","propertyValue":"{{Form.DocumentTitle}}","disableUpdates":false,"type":"customDocumentProperty"},{"propertyName":"Keyword","propertyValue":"{{Form.Keywords}}","disableUpdates":false,"type":"customDocumentProperty"},{"propertyName":"DocumentType","propertyValue":"Presentation2011","disableUpdates":false,"type":"customDocumentProperty"},{"propertyName":"Language","propertyValue":"EnglishUS","disableUpdates":false,"type":"customDocumentProperty"},{"propertyName":"TemplateID","propertyValue":"FALSE","disableUpdates":false,"type":"customDocumentProperty"},{"propertyName":"ConfCtrl","propertyValue":"FALSE","disableUpdates":false,"type":"customDocumentProperty"},{"propertyName":"title","propertyValue":"{{Form.DocumentTitle}}","disableUpdates":false,"type":"documentProperty"},{"propertyName":"keywords","propertyValue":"{{Form.Keywords}}","disableUpdates":false,"type":"documentProperty"},{"propertyName":"creator","propertyValue":"{{Form.Prepared}}","disableUpdates":false,"type":"documentProperty"},{"propertyName":"DocTitle","propertyValue":"{{Form.DocTitle.DocTitle}}","disableUpdates":false,"type":"customDocumentProperty"},{"propertyName":"IsDocument","propertyValue":"{{Form.TemplateType.IsDocument}}","disableUpdates":false,"type":"customDocumentProperty"},{"propertyName":"IsPresentation","propertyValue":"{{Form.TemplateType.IsPresentation}}","disableUpdates":false,"type":"customDocumentProperty"},{"propertyName":"company","propertyValue":"Ericsson","disableUpdates":false,"type":"documentProperty"},{"propertyName":"PageNumberVisible","propertyValue":"{{Form.TotalPageNo.TotalPageNo_value}}","disableUpdates":false,"type":"customDocumentProperty"},{"propertyName":"Revision","propertyValue":"{{Form.Revision}}","disableUpdates":false,"type":"customDocumentProperty"},{"propertyName":"DocType","propertyValue":"{{Form.DocTypePresentation}}","disableUpdates":false,"type":"customDocumentProperty"},{"propertyName":"TemplateVersion","propertyValue":"R2A","disableUpdates":false,"type":"customDocumentProperty"},{"propertyName":"PackageNo","propertyValue":"LXA 119 603","disableUpdates":false,"type":"customDocumentProperty"},{"propertyName":"PackageVersion","propertyValue":"R6B","disableUpdates":false,"type":"customDocumentProperty"},{"propertyName":"TemplateName","propertyValue":"CXC 173 2731/1","disableUpdates":false,"type":"customDocumentProperty"},{"propertyName":"DocName","propertyValue":" ","disableUpdates":false,"type":"customDocumentProperty"},{"propertyName":"description","propertyValue":"{{Form.DocumentNumber}} {{Form.LanguageCode.LanguageCode}}\nRev {{Form.Revision}}","disableUpdates":false,"type":"documentProperty"}],"templateName":"New presentation (Standard landscape)","templateDescription":"","enableDocumentContentUpdater":true,"version":"1.9"}]]></TemplafyTemplateConfiguration>
+<TemplafySlideFormConfiguration><![CDATA[{"formFields":[],"formDataEntries":[]}]]></TemplafySlideFormConfiguration>
 </file>
 
 <file path=customXml/item2.xml><?xml version="1.0" encoding="utf-8"?>
-<TemplafySlideTemplateConfiguration><![CDATA[{"documentContentValidatorConfiguration":{"enableDocumentContentValidator":false,"documentContentValidatorVersion":0},"elementsMetadata":[],"slideId":"637037983905221558","enableDocumentContentUpdater":true,"version":"1.9"}]]></TemplafySlideTemplateConfiguration>
-</file>
-
-<file path=customXml/item3.xml><?xml version="1.0" encoding="utf-8"?>
-<TemplafySlideTemplateConfiguration><![CDATA[{"documentContentValidatorConfiguration":{"enableDocumentContentValidator":false,"documentContentValidatorVersion":0},"elementsMetadata":[],"slideId":"637050925554934895","enableDocumentContentUpdater":true,"version":"1.9"}]]></TemplafySlideTemplateConfiguration>
-</file>
-
-<file path=customXml/item4.xml><?xml version="1.0" encoding="utf-8"?>
-<TemplafySlideFormConfiguration><![CDATA[{"formFields":[],"formDataEntries":[]}]]></TemplafySlideFormConfiguration>
-</file>
-
-<file path=customXml/item5.xml><?xml version="1.0" encoding="utf-8"?>
-<TemplafySlideFormConfiguration><![CDATA[{"formFields":[],"formDataEntries":[]}]]></TemplafySlideFormConfiguration>
-</file>
-
-<file path=customXml/item6.xml><?xml version="1.0" encoding="utf-8"?>
-<TemplafySlideTemplateConfiguration><![CDATA[{"documentContentValidatorConfiguration":{"enableDocumentContentValidator":false,"documentContentValidatorVersion":0},"elementsMetadata":[],"slideId":"637171128435180813","enableDocumentContentUpdater":true,"version":"1.9"}]]></TemplafySlideTemplateConfiguration>
-</file>
-
-<file path=customXml/item7.xml><?xml version="1.0" encoding="utf-8"?>
 <ct:contentTypeSchema xmlns:ct="http://schemas.microsoft.com/office/2006/metadata/contentType" xmlns:ma="http://schemas.microsoft.com/office/2006/metadata/properties/metaAttributes" ct:_="" ma:_="" ma:contentTypeName="Document" ma:contentTypeID="0x0101002C8661F604A9A64C9627B875CBEE0D49" ma:contentTypeVersion="13" ma:contentTypeDescription="Create a new document." ma:contentTypeScope="" ma:versionID="efb89547655977800231d60c8e2388d5">
   <xsd:schema xmlns:xsd="http://www.w3.org/2001/XMLSchema" xmlns:xs="http://www.w3.org/2001/XMLSchema" xmlns:p="http://schemas.microsoft.com/office/2006/metadata/properties" xmlns:ns3="92e1255f-bb7b-4dc9-b051-584cc104eb44" xmlns:ns4="a6550eff-0fc9-443f-8e77-72cbcf778382" targetNamespace="http://schemas.microsoft.com/office/2006/metadata/properties" ma:root="true" ma:fieldsID="5147822fdb6803771ba7305cbc438486" ns3:_="" ns4:_="">
     <xsd:import namespace="92e1255f-bb7b-4dc9-b051-584cc104eb44"/>
@@ -27651,56 +27623,79 @@
 </ct:contentTypeSchema>
 </file>
 
-<file path=customXml/item8.xml><?xml version="1.0" encoding="utf-8"?>
+<file path=customXml/item3.xml><?xml version="1.0" encoding="utf-8"?>
+<p:properties xmlns:p="http://schemas.microsoft.com/office/2006/metadata/properties" xmlns:xsi="http://www.w3.org/2001/XMLSchema-instance" xmlns:pc="http://schemas.microsoft.com/office/infopath/2007/PartnerControls">
+  <documentManagement/>
+</p:properties>
+</file>
+
+<file path=customXml/item4.xml><?xml version="1.0" encoding="utf-8"?>
+<TemplafySlideTemplateConfiguration><![CDATA[{"documentContentValidatorConfiguration":{"enableDocumentContentValidator":false,"documentContentValidatorVersion":0},"elementsMetadata":[],"slideId":"637037983905221557","enableDocumentContentUpdater":true,"version":"1.9"}]]></TemplafySlideTemplateConfiguration>
+</file>
+
+<file path=customXml/item5.xml><?xml version="1.0" encoding="utf-8"?>
+<TemplafySlideTemplateConfiguration><![CDATA[{"documentContentValidatorConfiguration":{"enableDocumentContentValidator":false,"documentContentValidatorVersion":0},"elementsMetadata":[],"slideId":"637037983905221558","enableDocumentContentUpdater":true,"version":"1.9"}]]></TemplafySlideTemplateConfiguration>
+</file>
+
+<file path=customXml/item6.xml><?xml version="1.0" encoding="utf-8"?>
 <TemplafySlideFormConfiguration><![CDATA[{"formFields":[],"formDataEntries":[]}]]></TemplafySlideFormConfiguration>
 </file>
 
+<file path=customXml/item7.xml><?xml version="1.0" encoding="utf-8"?>
+<TemplafySlideFormConfiguration><![CDATA[{"formFields":[],"formDataEntries":[]}]]></TemplafySlideFormConfiguration>
+</file>
+
+<file path=customXml/item8.xml><?xml version="1.0" encoding="utf-8"?>
+<TemplafySlideTemplateConfiguration><![CDATA[{"documentContentValidatorConfiguration":{"enableDocumentContentValidator":false,"documentContentValidatorVersion":0},"elementsMetadata":[],"slideId":"637171128435180813","enableDocumentContentUpdater":true,"version":"1.9"}]]></TemplafySlideTemplateConfiguration>
+</file>
+
 <file path=customXml/item9.xml><?xml version="1.0" encoding="utf-8"?>
-<TemplafySlideTemplateConfiguration><![CDATA[{"documentContentValidatorConfiguration":{"enableDocumentContentValidator":false,"documentContentValidatorVersion":0},"elementsMetadata":[],"slideId":"637037983905678162","enableDocumentContentUpdater":true,"version":"1.9"}]]></TemplafySlideTemplateConfiguration>
+<TemplafySlideTemplateConfiguration><![CDATA[{"documentContentValidatorConfiguration":{"enableDocumentContentValidator":false,"documentContentValidatorVersion":0},"elementsMetadata":[],"slideId":"637171128435648944","enableDocumentContentUpdater":true,"version":"1.9"}]]></TemplafySlideTemplateConfiguration>
 </file>
 
 <file path=customXml/itemProps1.xml><?xml version="1.0" encoding="utf-8"?>
-<ds:datastoreItem xmlns:ds="http://schemas.openxmlformats.org/officeDocument/2006/customXml" ds:itemID="{58CC0B31-82B9-497A-9A2E-F3F72D0BBDAD}">
+<ds:datastoreItem xmlns:ds="http://schemas.openxmlformats.org/officeDocument/2006/customXml" ds:itemID="{03AF3FDC-ACD1-46F3-A43E-782322DF9816}">
   <ds:schemaRefs/>
 </ds:datastoreItem>
 </file>
 
 <file path=customXml/itemProps10.xml><?xml version="1.0" encoding="utf-8"?>
+<ds:datastoreItem xmlns:ds="http://schemas.openxmlformats.org/officeDocument/2006/customXml" ds:itemID="{822D38AD-8010-4CD3-BD6B-117CB8DF70A4}">
+  <ds:schemaRefs/>
+</ds:datastoreItem>
+</file>
+
+<file path=customXml/itemProps11.xml><?xml version="1.0" encoding="utf-8"?>
+<ds:datastoreItem xmlns:ds="http://schemas.openxmlformats.org/officeDocument/2006/customXml" ds:itemID="{C09F197C-6A49-47D0-B877-F88807989676}">
+  <ds:schemaRefs/>
+</ds:datastoreItem>
+</file>
+
+<file path=customXml/itemProps12.xml><?xml version="1.0" encoding="utf-8"?>
 <ds:datastoreItem xmlns:ds="http://schemas.openxmlformats.org/officeDocument/2006/customXml" ds:itemID="{D92C3DF5-A179-4E2D-BD20-07044B39171F}">
   <ds:schemaRefs/>
 </ds:datastoreItem>
 </file>
 
-<file path=customXml/itemProps11.xml><?xml version="1.0" encoding="utf-8"?>
-<ds:datastoreItem xmlns:ds="http://schemas.openxmlformats.org/officeDocument/2006/customXml" ds:itemID="{C750C5DC-043F-4BD3-940C-EB6F7625E286}">
-  <ds:schemaRefs/>
-</ds:datastoreItem>
-</file>
-
-<file path=customXml/itemProps12.xml><?xml version="1.0" encoding="utf-8"?>
-<ds:datastoreItem xmlns:ds="http://schemas.openxmlformats.org/officeDocument/2006/customXml" ds:itemID="{56F2EE69-0CCA-4F48-BE22-EC4A886C57A7}">
-  <ds:schemaRefs>
-    <ds:schemaRef ds:uri="http://schemas.microsoft.com/office/infopath/2007/PartnerControls"/>
-    <ds:schemaRef ds:uri="http://purl.org/dc/elements/1.1/"/>
-    <ds:schemaRef ds:uri="http://schemas.microsoft.com/office/2006/metadata/properties"/>
-    <ds:schemaRef ds:uri="http://purl.org/dc/terms/"/>
-    <ds:schemaRef ds:uri="92e1255f-bb7b-4dc9-b051-584cc104eb44"/>
-    <ds:schemaRef ds:uri="http://schemas.openxmlformats.org/package/2006/metadata/core-properties"/>
-    <ds:schemaRef ds:uri="http://schemas.microsoft.com/office/2006/documentManagement/types"/>
-    <ds:schemaRef ds:uri="a6550eff-0fc9-443f-8e77-72cbcf778382"/>
-    <ds:schemaRef ds:uri="http://www.w3.org/XML/1998/namespace"/>
-    <ds:schemaRef ds:uri="http://purl.org/dc/dcmitype/"/>
-  </ds:schemaRefs>
-</ds:datastoreItem>
-</file>
-
 <file path=customXml/itemProps13.xml><?xml version="1.0" encoding="utf-8"?>
-<ds:datastoreItem xmlns:ds="http://schemas.openxmlformats.org/officeDocument/2006/customXml" ds:itemID="{B9AEDDE3-EA02-4A8F-B8F8-0606A0AA45FC}">
+<ds:datastoreItem xmlns:ds="http://schemas.openxmlformats.org/officeDocument/2006/customXml" ds:itemID="{07958A4E-FAB1-42E4-B6B5-29B01F63F87B}">
   <ds:schemaRefs/>
 </ds:datastoreItem>
 </file>
 
 <file path=customXml/itemProps14.xml><?xml version="1.0" encoding="utf-8"?>
+<ds:datastoreItem xmlns:ds="http://schemas.openxmlformats.org/officeDocument/2006/customXml" ds:itemID="{847502A6-7CBE-43AF-BDF6-4D4423521D8C}">
+  <ds:schemaRefs/>
+</ds:datastoreItem>
+</file>
+
+<file path=customXml/itemProps15.xml><?xml version="1.0" encoding="utf-8"?>
+<ds:datastoreItem xmlns:ds="http://schemas.openxmlformats.org/officeDocument/2006/customXml" ds:itemID="{1CE36EA9-2186-4EB1-871A-8AE59C2A13BB}">
+  <ds:schemaRefs/>
+</ds:datastoreItem>
+</file>
+
+<file path=customXml/itemProps16.xml><?xml version="1.0" encoding="utf-8"?>
 <ds:datastoreItem xmlns:ds="http://schemas.openxmlformats.org/officeDocument/2006/customXml" ds:itemID="{F5A7E41D-6E7F-4B05-AFAB-F540BD4C068B}">
   <ds:schemaRefs>
     <ds:schemaRef ds:uri="http://schemas.microsoft.com/sharepoint/v3/contenttype/forms"/>
@@ -27708,67 +27703,25 @@
 </ds:datastoreItem>
 </file>
 
-<file path=customXml/itemProps15.xml><?xml version="1.0" encoding="utf-8"?>
-<ds:datastoreItem xmlns:ds="http://schemas.openxmlformats.org/officeDocument/2006/customXml" ds:itemID="{C09F197C-6A49-47D0-B877-F88807989676}">
-  <ds:schemaRefs/>
-</ds:datastoreItem>
-</file>
-
-<file path=customXml/itemProps16.xml><?xml version="1.0" encoding="utf-8"?>
-<ds:datastoreItem xmlns:ds="http://schemas.openxmlformats.org/officeDocument/2006/customXml" ds:itemID="{32BA7684-6BE4-4F73-B22E-30934AB379B8}">
-  <ds:schemaRefs/>
-</ds:datastoreItem>
-</file>
-
 <file path=customXml/itemProps17.xml><?xml version="1.0" encoding="utf-8"?>
-<ds:datastoreItem xmlns:ds="http://schemas.openxmlformats.org/officeDocument/2006/customXml" ds:itemID="{72516535-7702-46AF-9B1F-8623A67A824E}">
+<ds:datastoreItem xmlns:ds="http://schemas.openxmlformats.org/officeDocument/2006/customXml" ds:itemID="{D72A95EB-8536-47FD-944A-8DD76726FC96}">
   <ds:schemaRefs/>
 </ds:datastoreItem>
 </file>
 
 <file path=customXml/itemProps18.xml><?xml version="1.0" encoding="utf-8"?>
+<ds:datastoreItem xmlns:ds="http://schemas.openxmlformats.org/officeDocument/2006/customXml" ds:itemID="{B9AEDDE3-EA02-4A8F-B8F8-0606A0AA45FC}">
+  <ds:schemaRefs/>
+</ds:datastoreItem>
+</file>
+
+<file path=customXml/itemProps19.xml><?xml version="1.0" encoding="utf-8"?>
 <ds:datastoreItem xmlns:ds="http://schemas.openxmlformats.org/officeDocument/2006/customXml" ds:itemID="{C99E78A0-C9D4-446F-B674-4DD3E2B46C5D}">
   <ds:schemaRefs/>
 </ds:datastoreItem>
 </file>
 
-<file path=customXml/itemProps19.xml><?xml version="1.0" encoding="utf-8"?>
-<ds:datastoreItem xmlns:ds="http://schemas.openxmlformats.org/officeDocument/2006/customXml" ds:itemID="{07958A4E-FAB1-42E4-B6B5-29B01F63F87B}">
-  <ds:schemaRefs/>
-</ds:datastoreItem>
-</file>
-
 <file path=customXml/itemProps2.xml><?xml version="1.0" encoding="utf-8"?>
-<ds:datastoreItem xmlns:ds="http://schemas.openxmlformats.org/officeDocument/2006/customXml" ds:itemID="{683FEB75-8CFA-449C-A6B1-B1E4A86A58A1}">
-  <ds:schemaRefs/>
-</ds:datastoreItem>
-</file>
-
-<file path=customXml/itemProps3.xml><?xml version="1.0" encoding="utf-8"?>
-<ds:datastoreItem xmlns:ds="http://schemas.openxmlformats.org/officeDocument/2006/customXml" ds:itemID="{03AF3FDC-ACD1-46F3-A43E-782322DF9816}">
-  <ds:schemaRefs/>
-</ds:datastoreItem>
-</file>
-
-<file path=customXml/itemProps4.xml><?xml version="1.0" encoding="utf-8"?>
-<ds:datastoreItem xmlns:ds="http://schemas.openxmlformats.org/officeDocument/2006/customXml" ds:itemID="{847502A6-7CBE-43AF-BDF6-4D4423521D8C}">
-  <ds:schemaRefs/>
-</ds:datastoreItem>
-</file>
-
-<file path=customXml/itemProps5.xml><?xml version="1.0" encoding="utf-8"?>
-<ds:datastoreItem xmlns:ds="http://schemas.openxmlformats.org/officeDocument/2006/customXml" ds:itemID="{822D38AD-8010-4CD3-BD6B-117CB8DF70A4}">
-  <ds:schemaRefs/>
-</ds:datastoreItem>
-</file>
-
-<file path=customXml/itemProps6.xml><?xml version="1.0" encoding="utf-8"?>
-<ds:datastoreItem xmlns:ds="http://schemas.openxmlformats.org/officeDocument/2006/customXml" ds:itemID="{AB2F4486-6448-49E3-8249-BB9C7492711D}">
-  <ds:schemaRefs/>
-</ds:datastoreItem>
-</file>
-
-<file path=customXml/itemProps7.xml><?xml version="1.0" encoding="utf-8"?>
 <ds:datastoreItem xmlns:ds="http://schemas.openxmlformats.org/officeDocument/2006/customXml" ds:itemID="{058EED06-94C4-4781-888F-0A8BB816BC9F}">
   <ds:schemaRefs>
     <ds:schemaRef ds:uri="http://schemas.microsoft.com/office/2006/metadata/contentType"/>
@@ -27787,14 +27740,55 @@
 </ds:datastoreItem>
 </file>
 
+<file path=customXml/itemProps3.xml><?xml version="1.0" encoding="utf-8"?>
+<ds:datastoreItem xmlns:ds="http://schemas.openxmlformats.org/officeDocument/2006/customXml" ds:itemID="{56F2EE69-0CCA-4F48-BE22-EC4A886C57A7}">
+  <ds:schemaRefs>
+    <ds:schemaRef ds:uri="http://schemas.microsoft.com/office/infopath/2007/PartnerControls"/>
+    <ds:schemaRef ds:uri="http://purl.org/dc/elements/1.1/"/>
+    <ds:schemaRef ds:uri="http://schemas.microsoft.com/office/2006/metadata/properties"/>
+    <ds:schemaRef ds:uri="http://purl.org/dc/terms/"/>
+    <ds:schemaRef ds:uri="92e1255f-bb7b-4dc9-b051-584cc104eb44"/>
+    <ds:schemaRef ds:uri="http://schemas.openxmlformats.org/package/2006/metadata/core-properties"/>
+    <ds:schemaRef ds:uri="http://schemas.microsoft.com/office/2006/documentManagement/types"/>
+    <ds:schemaRef ds:uri="a6550eff-0fc9-443f-8e77-72cbcf778382"/>
+    <ds:schemaRef ds:uri="http://www.w3.org/XML/1998/namespace"/>
+    <ds:schemaRef ds:uri="http://purl.org/dc/dcmitype/"/>
+  </ds:schemaRefs>
+</ds:datastoreItem>
+</file>
+
+<file path=customXml/itemProps4.xml><?xml version="1.0" encoding="utf-8"?>
+<ds:datastoreItem xmlns:ds="http://schemas.openxmlformats.org/officeDocument/2006/customXml" ds:itemID="{72516535-7702-46AF-9B1F-8623A67A824E}">
+  <ds:schemaRefs/>
+</ds:datastoreItem>
+</file>
+
+<file path=customXml/itemProps5.xml><?xml version="1.0" encoding="utf-8"?>
+<ds:datastoreItem xmlns:ds="http://schemas.openxmlformats.org/officeDocument/2006/customXml" ds:itemID="{683FEB75-8CFA-449C-A6B1-B1E4A86A58A1}">
+  <ds:schemaRefs/>
+</ds:datastoreItem>
+</file>
+
+<file path=customXml/itemProps6.xml><?xml version="1.0" encoding="utf-8"?>
+<ds:datastoreItem xmlns:ds="http://schemas.openxmlformats.org/officeDocument/2006/customXml" ds:itemID="{32BA7684-6BE4-4F73-B22E-30934AB379B8}">
+  <ds:schemaRefs/>
+</ds:datastoreItem>
+</file>
+
+<file path=customXml/itemProps7.xml><?xml version="1.0" encoding="utf-8"?>
+<ds:datastoreItem xmlns:ds="http://schemas.openxmlformats.org/officeDocument/2006/customXml" ds:itemID="{58CC0B31-82B9-497A-9A2E-F3F72D0BBDAD}">
+  <ds:schemaRefs/>
+</ds:datastoreItem>
+</file>
+
 <file path=customXml/itemProps8.xml><?xml version="1.0" encoding="utf-8"?>
-<ds:datastoreItem xmlns:ds="http://schemas.openxmlformats.org/officeDocument/2006/customXml" ds:itemID="{D72A95EB-8536-47FD-944A-8DD76726FC96}">
+<ds:datastoreItem xmlns:ds="http://schemas.openxmlformats.org/officeDocument/2006/customXml" ds:itemID="{AB2F4486-6448-49E3-8249-BB9C7492711D}">
   <ds:schemaRefs/>
 </ds:datastoreItem>
 </file>
 
 <file path=customXml/itemProps9.xml><?xml version="1.0" encoding="utf-8"?>
-<ds:datastoreItem xmlns:ds="http://schemas.openxmlformats.org/officeDocument/2006/customXml" ds:itemID="{1CE36EA9-2186-4EB1-871A-8AE59C2A13BB}">
+<ds:datastoreItem xmlns:ds="http://schemas.openxmlformats.org/officeDocument/2006/customXml" ds:itemID="{C750C5DC-043F-4BD3-940C-EB6F7625E286}">
   <ds:schemaRefs/>
 </ds:datastoreItem>
 </file>
</xml_diff>

<commit_message>
Needed to revert to old (sorry @mirabilos), it seemed like the recent commits did not work properly. Pacing rate computation hopefully better, result should be better link utilization with L4S
</commit_message>
<xml_diff>
--- a/code/bw-test-tool/SCReAM-BW-test-tool.pptx
+++ b/code/bw-test-tool/SCReAM-BW-test-tool.pptx
@@ -2662,7 +2662,7 @@
               </a:rPr>
               <a:t>  |  2020-03-20  |  Public  |  Page </a:t>
             </a:r>
-            <a:fld id="{162D2535-6665-4802-84AE-74D7EBA1669A}" type="slidenum">
+            <a:fld id="{59E319C9-70DD-43F7-AB89-A21D1AB17029}" type="slidenum">
               <a:rPr lang="en-US" sz="800" b="0" i="0" u="none" smtClean="0">
                 <a:solidFill>
                   <a:srgbClr val="1A1816"/>
@@ -3167,7 +3167,7 @@
               </a:rPr>
               <a:t>  |  2020-03-20  |  Public  |  Page </a:t>
             </a:r>
-            <a:fld id="{716E7308-F5B2-415C-9E55-A52F249EAD6F}" type="slidenum">
+            <a:fld id="{92CC8A64-8A3D-44D1-AE15-4EAD3DF9C808}" type="slidenum">
               <a:rPr lang="en-US" sz="800" b="0" i="0" u="none" smtClean="0">
                 <a:solidFill>
                   <a:schemeClr val="bg1"/>
@@ -3480,7 +3480,7 @@
               </a:rPr>
               <a:t>  |  2020-03-20  |  Public  |  Page </a:t>
             </a:r>
-            <a:fld id="{8823537E-391E-4E4D-8765-9AEFE738880E}" type="slidenum">
+            <a:fld id="{53948D0D-7C63-41ED-9544-D8BFBDACA8F5}" type="slidenum">
               <a:rPr lang="en-US" sz="800" b="0" i="0" u="none" smtClean="0">
                 <a:solidFill>
                   <a:srgbClr val="1A1816"/>
@@ -3713,7 +3713,7 @@
               </a:rPr>
               <a:t>  |  2020-03-20  |  Public  |  Page </a:t>
             </a:r>
-            <a:fld id="{98049AC5-FC58-42B0-9488-BED2432A9FB7}" type="slidenum">
+            <a:fld id="{9C729B41-1BAB-4A9E-AFCA-FC6D9C42347B}" type="slidenum">
               <a:rPr lang="en-US" sz="800" b="0" i="0" u="none" smtClean="0">
                 <a:solidFill>
                   <a:srgbClr val="1A1816"/>
@@ -3873,7 +3873,7 @@
               </a:rPr>
               <a:t>  |  2020-03-20  |  Public  |  Page </a:t>
             </a:r>
-            <a:fld id="{D5CC6DB4-C460-491E-BDA5-EFD676F848D6}" type="slidenum">
+            <a:fld id="{FD87DEDA-D1F6-47E6-8918-0CF8BEC71AA8}" type="slidenum">
               <a:rPr lang="en-US" sz="800" b="0" i="0" u="none" smtClean="0">
                 <a:solidFill>
                   <a:srgbClr val="1A1816"/>
@@ -4079,7 +4079,7 @@
               </a:rPr>
               <a:t>  |  2020-03-20  |  Public  |  Page </a:t>
             </a:r>
-            <a:fld id="{412FB58F-AACF-403A-ABBB-7E8D17F8A2D9}" type="slidenum">
+            <a:fld id="{D9F4B2F3-4CFE-40A0-8FA4-73B610D4B2A4}" type="slidenum">
               <a:rPr lang="en-US" sz="800" b="0" i="0" u="none" smtClean="0">
                 <a:solidFill>
                   <a:srgbClr val="1A1816"/>
@@ -4377,7 +4377,7 @@
               </a:rPr>
               <a:t>  |  2020-03-20  |  Public  |  Page </a:t>
             </a:r>
-            <a:fld id="{105F4D16-988D-4270-80BF-DFACB75C2CCC}" type="slidenum">
+            <a:fld id="{7B715924-2E22-4573-B96E-5A432F8D5666}" type="slidenum">
               <a:rPr lang="en-US" sz="800" b="0" i="0" u="none" smtClean="0">
                 <a:solidFill>
                   <a:schemeClr val="bg1"/>
@@ -4675,7 +4675,7 @@
               </a:rPr>
               <a:t>  |  2020-03-20  |  Public  |  Page </a:t>
             </a:r>
-            <a:fld id="{57FA43E7-F9AC-4569-B756-82A47BE355AB}" type="slidenum">
+            <a:fld id="{99B36FAA-BC93-421A-A479-C7363C8BE186}" type="slidenum">
               <a:rPr lang="en-US" sz="800" b="0" i="0" u="none" smtClean="0">
                 <a:solidFill>
                   <a:schemeClr val="bg1"/>
@@ -4973,7 +4973,7 @@
               </a:rPr>
               <a:t>  |  2020-03-20  |  Public  |  Page </a:t>
             </a:r>
-            <a:fld id="{CBEA399E-25B6-4158-B66F-74B986D0703D}" type="slidenum">
+            <a:fld id="{391803F6-7477-469C-9F65-8B089EEAD2AB}" type="slidenum">
               <a:rPr lang="en-US" sz="800" b="0" i="0" u="none" smtClean="0">
                 <a:solidFill>
                   <a:schemeClr val="bg1"/>
@@ -5271,7 +5271,7 @@
               </a:rPr>
               <a:t>  |  2020-03-20  |  Public  |  Page </a:t>
             </a:r>
-            <a:fld id="{D6296F93-1C02-424F-8288-3392D414F2D5}" type="slidenum">
+            <a:fld id="{F8B34639-3BF6-4CDB-822D-A4D438957793}" type="slidenum">
               <a:rPr lang="en-US" sz="800" b="0" i="0" u="none" smtClean="0">
                 <a:solidFill>
                   <a:schemeClr val="bg1"/>
@@ -5569,7 +5569,7 @@
               </a:rPr>
               <a:t>  |  2020-03-20  |  Public  |  Page </a:t>
             </a:r>
-            <a:fld id="{DCDC8725-FDC9-48F4-8D74-A2505479465C}" type="slidenum">
+            <a:fld id="{D58B6655-2EEF-4A40-B253-BDA0ECA7C5C0}" type="slidenum">
               <a:rPr lang="en-US" sz="800" b="0" i="0" u="none" smtClean="0">
                 <a:solidFill>
                   <a:schemeClr val="bg1"/>
@@ -6083,7 +6083,7 @@
               </a:rPr>
               <a:t>  |  2020-03-20  |  Public  |  Page </a:t>
             </a:r>
-            <a:fld id="{50F98E73-649E-415F-800F-E1475477B47A}" type="slidenum">
+            <a:fld id="{0AE8BE08-BD3C-4201-8C12-15D2BCF50D01}" type="slidenum">
               <a:rPr lang="en-US" sz="800" b="0" i="0" u="none" smtClean="0">
                 <a:solidFill>
                   <a:schemeClr val="bg1"/>
@@ -6387,7 +6387,7 @@
               </a:rPr>
               <a:t>  |  2020-03-20  |  Public  |  Page </a:t>
             </a:r>
-            <a:fld id="{DBA5A759-EB0B-4642-9D1A-6C1895047DB0}" type="slidenum">
+            <a:fld id="{D061E57E-0744-4A2A-834E-DF35E1DB3746}" type="slidenum">
               <a:rPr lang="en-US" sz="800" b="0" i="0" u="none" smtClean="0">
                 <a:solidFill>
                   <a:schemeClr val="bg1"/>
@@ -6685,7 +6685,7 @@
               </a:rPr>
               <a:t>  |  2020-03-20  |  Public  |  Page </a:t>
             </a:r>
-            <a:fld id="{2F1648DC-6301-4857-9DDC-134B88974D3B}" type="slidenum">
+            <a:fld id="{3875BBB0-0AE1-4E59-BBB6-32DFDB5BB51D}" type="slidenum">
               <a:rPr lang="en-US" sz="800" b="0" i="0" u="none" smtClean="0">
                 <a:solidFill>
                   <a:schemeClr val="bg1"/>
@@ -6972,7 +6972,7 @@
               </a:rPr>
               <a:t>  |  2020-03-20  |  Public  |  Page </a:t>
             </a:r>
-            <a:fld id="{77716C36-567F-40EB-A99C-71498D8245DB}" type="slidenum">
+            <a:fld id="{46F4D724-0898-48BD-9F46-500C0E332C0A}" type="slidenum">
               <a:rPr lang="en-US" sz="800" b="0" i="0" u="none" smtClean="0">
                 <a:solidFill>
                   <a:srgbClr val="1A1816"/>
@@ -7259,7 +7259,7 @@
               </a:rPr>
               <a:t>  |  2020-03-20  |  Public  |  Page </a:t>
             </a:r>
-            <a:fld id="{A6DBDA91-6235-41FA-8454-00C23BB5DE04}" type="slidenum">
+            <a:fld id="{D5628C4A-E587-4550-A03E-404E61B062B2}" type="slidenum">
               <a:rPr lang="en-US" sz="800" b="0" i="0" u="none" smtClean="0">
                 <a:solidFill>
                   <a:srgbClr val="1A1816"/>
@@ -7552,7 +7552,7 @@
               </a:rPr>
               <a:t>  |  2020-03-20  |  Public  |  Page </a:t>
             </a:r>
-            <a:fld id="{0989F935-D1F1-49CF-B0EA-AFD65A54D7E4}" type="slidenum">
+            <a:fld id="{2DEDC885-85E7-440C-9C41-5ABBFE2FE6B0}" type="slidenum">
               <a:rPr lang="en-US" sz="800" b="0" i="0" u="none" smtClean="0">
                 <a:solidFill>
                   <a:srgbClr val="1A1816"/>
@@ -7839,7 +7839,7 @@
               </a:rPr>
               <a:t>  |  2020-03-20  |  Public  |  Page </a:t>
             </a:r>
-            <a:fld id="{D4C784A2-5957-4DA5-A2E8-4D1087135DCC}" type="slidenum">
+            <a:fld id="{AF69268F-BB42-4FE2-8698-D0A31B04E0A4}" type="slidenum">
               <a:rPr lang="en-US" sz="800" b="0" i="0" u="none" smtClean="0">
                 <a:solidFill>
                   <a:srgbClr val="1A1816"/>
@@ -8161,7 +8161,7 @@
               </a:rPr>
               <a:t>  |  2020-03-20  |  Public  |  Page </a:t>
             </a:r>
-            <a:fld id="{16DFB972-C3D4-4FE1-AD61-FAA3C6CB2830}" type="slidenum">
+            <a:fld id="{C7ED2209-9322-4D59-B4AE-75BC075E6B1C}" type="slidenum">
               <a:rPr lang="en-US" sz="800" b="0" i="0" u="none" smtClean="0">
                 <a:solidFill>
                   <a:srgbClr val="1A1816"/>
@@ -8448,7 +8448,7 @@
               </a:rPr>
               <a:t>  |  2020-03-20  |  Public  |  Page </a:t>
             </a:r>
-            <a:fld id="{888B4F1D-CF2C-4E25-9068-1AF6E438DE87}" type="slidenum">
+            <a:fld id="{59185149-34E8-4CFB-B9CC-41AD539965F7}" type="slidenum">
               <a:rPr lang="en-US" sz="800" b="0" i="0" u="none" smtClean="0">
                 <a:solidFill>
                   <a:srgbClr val="1A1816"/>
@@ -8770,7 +8770,7 @@
               </a:rPr>
               <a:t>  |  2020-03-20  |  Public  |  Page </a:t>
             </a:r>
-            <a:fld id="{2573A8FC-525F-4EAE-ADAD-F2AAD124609A}" type="slidenum">
+            <a:fld id="{E0DB0CA0-EA05-4B55-910A-142789E111CB}" type="slidenum">
               <a:rPr lang="en-US" sz="800" b="0" i="0" u="none" smtClean="0">
                 <a:solidFill>
                   <a:srgbClr val="1A1816"/>
@@ -9132,7 +9132,7 @@
               </a:rPr>
               <a:t>  |  2020-03-20  |  Public  |  Page </a:t>
             </a:r>
-            <a:fld id="{FF352563-A4C5-4205-B2B9-B7540F117541}" type="slidenum">
+            <a:fld id="{EC7B2A69-B9E9-4E35-9DD6-E2C5C33ADF48}" type="slidenum">
               <a:rPr lang="en-US" sz="800" b="0" i="0" u="none" smtClean="0">
                 <a:solidFill>
                   <a:srgbClr val="1A1816"/>
@@ -9474,7 +9474,7 @@
               </a:rPr>
               <a:t>  |  2020-03-20  |  Public  |  Page </a:t>
             </a:r>
-            <a:fld id="{B4AE421F-75B4-4E34-ADB1-A07DAB916DB5}" type="slidenum">
+            <a:fld id="{26F8E415-8015-4C38-8FC8-0591F16DEAE2}" type="slidenum">
               <a:rPr lang="en-US" sz="800" b="0" i="0" u="none" smtClean="0">
                 <a:solidFill>
                   <a:srgbClr val="1A1816"/>
@@ -9823,7 +9823,7 @@
               </a:rPr>
               <a:t>  |  2020-03-20  |  Public  |  Page </a:t>
             </a:r>
-            <a:fld id="{7138514E-A377-4969-B371-D398842854C1}" type="slidenum">
+            <a:fld id="{779B8B2B-C39D-45B0-A3B9-7A138CBC3748}" type="slidenum">
               <a:rPr lang="en-US" sz="800" b="0" i="0" u="none" smtClean="0">
                 <a:solidFill>
                   <a:srgbClr val="1A1816"/>
@@ -10185,7 +10185,7 @@
               </a:rPr>
               <a:t>  |  2020-03-20  |  Public  |  Page </a:t>
             </a:r>
-            <a:fld id="{B2E8ED26-B8DC-48A4-B68B-4814C7353A39}" type="slidenum">
+            <a:fld id="{2F345A06-E5E0-4808-BC44-4896F63AA4B4}" type="slidenum">
               <a:rPr lang="en-US" sz="800" b="0" i="0" u="none" smtClean="0">
                 <a:solidFill>
                   <a:srgbClr val="1A1816"/>
@@ -10547,7 +10547,7 @@
               </a:rPr>
               <a:t>  |  2020-03-20  |  Public  |  Page </a:t>
             </a:r>
-            <a:fld id="{7F05DB7E-68CD-45AC-A979-022B0E055963}" type="slidenum">
+            <a:fld id="{31F00298-4E8C-4AF4-A07D-A51047C8AE42}" type="slidenum">
               <a:rPr lang="en-US" sz="800" b="0" i="0" u="none" smtClean="0">
                 <a:solidFill>
                   <a:srgbClr val="1A1816"/>
@@ -10909,7 +10909,7 @@
               </a:rPr>
               <a:t>  |  2020-03-20  |  Public  |  Page </a:t>
             </a:r>
-            <a:fld id="{B6C31DD3-174A-472C-9360-472CC7B56DC1}" type="slidenum">
+            <a:fld id="{4F4E185F-DC8C-48AF-BEAC-5102F5698F8C}" type="slidenum">
               <a:rPr lang="en-US" sz="800" b="0" i="0" u="none" smtClean="0">
                 <a:solidFill>
                   <a:srgbClr val="1A1816"/>
@@ -11271,7 +11271,7 @@
               </a:rPr>
               <a:t>  |  2020-03-20  |  Public  |  Page </a:t>
             </a:r>
-            <a:fld id="{5841F6C6-88A6-44A1-8717-882CFB51EF6F}" type="slidenum">
+            <a:fld id="{04A1CEDE-7DCE-45EE-A0F6-2C66EE2D8AC8}" type="slidenum">
               <a:rPr lang="en-US" sz="800" b="0" i="0" u="none" smtClean="0">
                 <a:solidFill>
                   <a:srgbClr val="1A1816"/>
@@ -11693,7 +11693,7 @@
               </a:rPr>
               <a:t>  |  2020-03-20  |  Public  |  Page </a:t>
             </a:r>
-            <a:fld id="{7279D8CF-093D-4654-BF69-AFFAC2DD0BC3}" type="slidenum">
+            <a:fld id="{C81C181F-33AD-4FF4-84DA-F51370375B46}" type="slidenum">
               <a:rPr lang="en-US" sz="800" b="0" i="0" u="none" smtClean="0">
                 <a:solidFill>
                   <a:srgbClr val="1A1816"/>
@@ -12109,7 +12109,7 @@
               </a:rPr>
               <a:t>  |  2020-03-20  |  Public  |  Page </a:t>
             </a:r>
-            <a:fld id="{0F83655A-579B-40A8-99CB-2A68DAB5728E}" type="slidenum">
+            <a:fld id="{4E8168CE-AECC-4C56-9471-895A8BD07657}" type="slidenum">
               <a:rPr lang="en-US" sz="800" b="0" i="0" u="none" smtClean="0">
                 <a:solidFill>
                   <a:srgbClr val="1A1816"/>
@@ -12584,7 +12584,7 @@
               </a:rPr>
               <a:t>  |  2020-03-20  |  Public  |  Page </a:t>
             </a:r>
-            <a:fld id="{A9997036-37EA-4B9F-A14D-DF041E5316BC}" type="slidenum">
+            <a:fld id="{FAB19D3E-563D-44F1-92DE-E3F2D2187988}" type="slidenum">
               <a:rPr lang="en-US" sz="800" b="0" i="0" u="none" smtClean="0">
                 <a:solidFill>
                   <a:srgbClr val="1A1816"/>
@@ -13079,7 +13079,7 @@
               </a:rPr>
               <a:t>  |  2020-03-20  |  Public  |  Page </a:t>
             </a:r>
-            <a:fld id="{2E656380-4DFF-4D60-A0A1-82EFC29FBB82}" type="slidenum">
+            <a:fld id="{EBE4C479-C258-4E99-86D2-BBC42195E13E}" type="slidenum">
               <a:rPr lang="en-US" sz="800" b="0" i="0" u="none" smtClean="0">
                 <a:solidFill>
                   <a:srgbClr val="1A1816"/>
@@ -13535,7 +13535,7 @@
               </a:rPr>
               <a:t>  |  2020-03-20  |  Public  |  Page </a:t>
             </a:r>
-            <a:fld id="{24D9AC68-C182-485C-A980-09E523B7F591}" type="slidenum">
+            <a:fld id="{53053FB8-8F9A-4B98-9D84-431212DA677C}" type="slidenum">
               <a:rPr lang="en-US" sz="800" b="0" i="0" u="none" smtClean="0">
                 <a:solidFill>
                   <a:srgbClr val="1A1816"/>
@@ -13923,7 +13923,7 @@
               </a:rPr>
               <a:t>  |  2020-03-20  |  Public  |  Page </a:t>
             </a:r>
-            <a:fld id="{566CFE76-7659-4598-9AF3-91E39A0F1DE9}" type="slidenum">
+            <a:fld id="{65DB74F9-4D40-45F0-BA9B-960F4D880EFC}" type="slidenum">
               <a:rPr lang="en-US" sz="800" b="0" i="0" u="none" smtClean="0">
                 <a:solidFill>
                   <a:schemeClr val="bg1"/>
@@ -14442,7 +14442,7 @@
               </a:rPr>
               <a:t>  |  2020-03-20  |  Public  |  Page </a:t>
             </a:r>
-            <a:fld id="{780E78B2-CC35-4A3B-88EB-50A0732FBE8C}" type="slidenum">
+            <a:fld id="{CCA6B94A-5E1E-420F-9EBB-1722FBB1EAA9}" type="slidenum">
               <a:rPr lang="en-US" sz="800" b="0" i="0" u="none" smtClean="0">
                 <a:solidFill>
                   <a:srgbClr val="1A1816"/>
@@ -15151,7 +15151,7 @@
               </a:rPr>
               <a:t>  |  2020-03-20  |  Public  |  Page </a:t>
             </a:r>
-            <a:fld id="{69E0A78D-14D5-4136-8338-E54F5F9A31D3}" type="slidenum">
+            <a:fld id="{2515B8BC-5C28-4F12-BFB2-2411671D12E6}" type="slidenum">
               <a:rPr lang="en-US" sz="800" b="0" i="0" u="none" smtClean="0">
                 <a:solidFill>
                   <a:srgbClr val="1A1816"/>
@@ -16630,7 +16630,7 @@
               </a:rPr>
               <a:t>  |  2020-03-20  |  Public  |  Page </a:t>
             </a:r>
-            <a:fld id="{6A084469-1BED-48E5-BD61-0B63C7E8FCB8}" type="slidenum">
+            <a:fld id="{FFE649F0-7470-406E-8647-27155E870F41}" type="slidenum">
               <a:rPr lang="en-US" sz="800" b="0" i="0" u="none" smtClean="0">
                 <a:solidFill>
                   <a:schemeClr val="bg1"/>
@@ -17142,7 +17142,7 @@
               </a:rPr>
               <a:t>  |  2020-03-20  |  Public  |  Page </a:t>
             </a:r>
-            <a:fld id="{1934B01C-7E43-489C-972F-38F321151719}" type="slidenum">
+            <a:fld id="{A90CD43A-E6E3-450C-9C7F-E785A9AF711E}" type="slidenum">
               <a:rPr lang="en-US" sz="800" b="0" i="0" u="none" smtClean="0">
                 <a:solidFill>
                   <a:schemeClr val="bg1"/>
@@ -17537,7 +17537,7 @@
               </a:rPr>
               <a:t>  |  2020-03-20  |  Public  |  Page </a:t>
             </a:r>
-            <a:fld id="{436895CA-37FA-478C-AC4E-E9942B1914ED}" type="slidenum">
+            <a:fld id="{4FB33B4B-E03E-4E49-9AEF-F519A8518653}" type="slidenum">
               <a:rPr lang="en-US" sz="800" b="0" i="0" u="none" smtClean="0">
                 <a:solidFill>
                   <a:schemeClr val="bg1"/>
@@ -18037,7 +18037,7 @@
               </a:rPr>
               <a:t>  |  2020-03-20  |  Public  |  Page </a:t>
             </a:r>
-            <a:fld id="{EDED6123-9200-4225-AA0D-55A167E443B5}" type="slidenum">
+            <a:fld id="{20270C89-385E-4EAC-93FE-894BE1494F45}" type="slidenum">
               <a:rPr lang="en-US" sz="800" b="0" i="0" u="none" smtClean="0">
                 <a:solidFill>
                   <a:schemeClr val="bg1"/>
@@ -18537,7 +18537,7 @@
               </a:rPr>
               <a:t>  |  2020-03-20  |  Public  |  Page </a:t>
             </a:r>
-            <a:fld id="{19181C8B-6529-4D5B-8264-8F7EDBA46D58}" type="slidenum">
+            <a:fld id="{FC94CCE9-F65C-4F37-A015-BE6D1086C337}" type="slidenum">
               <a:rPr lang="en-US" sz="800" b="0" i="0" u="none" smtClean="0">
                 <a:solidFill>
                   <a:schemeClr val="bg1"/>
@@ -19546,7 +19546,7 @@
             </a:br>
             <a:r>
               <a:rPr lang="en-US" sz="5400" dirty="0"/>
-              <a:t>2020-06-09</a:t>
+              <a:t>2020-06-24</a:t>
             </a:r>
           </a:p>
         </p:txBody>
@@ -21421,7 +21421,7 @@
             </a:r>
             <a:r>
               <a:rPr lang="en-US" dirty="0"/>
-              <a:t> nice -- 10 ./bin/scream-</a:t>
+              <a:t> nice -n - 10 ./bin/scream-</a:t>
             </a:r>
             <a:r>
               <a:rPr lang="en-US" dirty="0" err="1"/>
@@ -21452,7 +21452,7 @@
             </a:r>
             <a:r>
               <a:rPr lang="en-US" dirty="0"/>
-              <a:t> nice -- 10 ./bin/scream-</a:t>
+              <a:t> nice -n - 10 ./bin/scream-</a:t>
             </a:r>
             <a:r>
               <a:rPr lang="en-US" dirty="0" err="1"/>
@@ -21472,16 +21472,13 @@
             </a:r>
           </a:p>
           <a:p>
-            <a:pPr lvl="1"/>
-            <a:r>
-              <a:rPr lang="en-US" dirty="0"/>
-              <a:t>Note .. Two minus (-) characters !</a:t>
-            </a:r>
-          </a:p>
-          <a:p>
+            <a:r>
+              <a:rPr lang="en-US" sz="2400"/>
+              <a:t>UDP </a:t>
+            </a:r>
             <a:r>
               <a:rPr lang="en-US" sz="2400" dirty="0"/>
-              <a:t>UDP sockets may need more memory at high bitrates to avoid packet loss </a:t>
+              <a:t>sockets may need more memory at high bitrates to avoid packet loss </a:t>
             </a:r>
           </a:p>
           <a:p>
@@ -23178,7 +23175,7 @@
           <a:graphicData uri="http://schemas.openxmlformats.org/presentationml/2006/ole">
             <mc:AlternateContent xmlns:mc="http://schemas.openxmlformats.org/markup-compatibility/2006">
               <mc:Choice xmlns:v="urn:schemas-microsoft-com:vml" Requires="v">
-                <p:oleObj spid="_x0000_s1053" name="Visio" r:id="rId5" imgW="2533577" imgH="3257685" progId="Visio.Drawing.11">
+                <p:oleObj spid="_x0000_s1055" name="Visio" r:id="rId5" imgW="2533577" imgH="3257685" progId="Visio.Drawing.11">
                   <p:embed/>
                 </p:oleObj>
               </mc:Choice>
@@ -27352,48 +27349,45 @@
 </file>
 
 <file path=customXml/item1.xml><?xml version="1.0" encoding="utf-8"?>
-<TemplafySlideTemplateConfiguration><![CDATA[{"documentContentValidatorConfiguration":{"enableDocumentContentValidator":false,"documentContentValidatorVersion":0},"elementsMetadata":[],"slideId":"637050925554934895","enableDocumentContentUpdater":true,"version":"1.9"}]]></TemplafySlideTemplateConfiguration>
+<p:properties xmlns:p="http://schemas.microsoft.com/office/2006/metadata/properties" xmlns:xsi="http://www.w3.org/2001/XMLSchema-instance" xmlns:pc="http://schemas.microsoft.com/office/infopath/2007/PartnerControls">
+  <documentManagement/>
+</p:properties>
 </file>
 
 <file path=customXml/item10.xml><?xml version="1.0" encoding="utf-8"?>
+<TemplafySlideTemplateConfiguration><![CDATA[{"documentContentValidatorConfiguration":{"enableDocumentContentValidator":false,"documentContentValidatorVersion":0},"elementsMetadata":[],"slideId":"637037983905221558","enableDocumentContentUpdater":true,"version":"1.9"}]]></TemplafySlideTemplateConfiguration>
+</file>
+
+<file path=customXml/item11.xml><?xml version="1.0" encoding="utf-8"?>
+<TemplafySlideTemplateConfiguration><![CDATA[{"documentContentValidatorConfiguration":{"enableDocumentContentValidator":false,"documentContentValidatorVersion":0},"elementsMetadata":[],"slideId":"637037983905678162","enableDocumentContentUpdater":true,"version":"1.9"}]]></TemplafySlideTemplateConfiguration>
+</file>
+
+<file path=customXml/item12.xml><?xml version="1.0" encoding="utf-8"?>
 <TemplafySlideFormConfiguration><![CDATA[{"formFields":[],"formDataEntries":[]}]]></TemplafySlideFormConfiguration>
 </file>
 
-<file path=customXml/item11.xml><?xml version="1.0" encoding="utf-8"?>
-<TemplafySlideTemplateConfiguration><![CDATA[{"elementsMetadata":[],"documentContentValidatorConfiguration":{"enableDocumentContentValidator":false,"documentContentValidatorVersion":0},"slideId":"637027476704980324","enableDocumentContentUpdater":true,"version":"1.9"}]]></TemplafySlideTemplateConfiguration>
-</file>
-
-<file path=customXml/item12.xml><?xml version="1.0" encoding="utf-8"?>
-<TemplafyFormConfiguration><![CDATA[{"formFields":[{"required":true,"placeholder":"","lines":0,"type":"textBox","name":"DocumentTitle","label":"Document Title","helpTexts":{"prefix":"","postfix":""},"spacing":{},"fullyQualifiedName":"DocumentTitle"},{"dataSource":"Confidentiality","displayColumn":"confidentiality","hideIfNoUserInteractionRequired":false,"distinct":true,"required":true,"autoSelectFirstOption":false,"type":"dropDown","name":"ConfidentialityClass","label":"Confidentiality Class","helpTexts":{"prefix":"","postfix":""},"spacing":{},"fullyQualifiedName":"ConfidentialityClass"},{"dataSource":"External Confidentiality label","displayColumn":"externalConfidentiality","hideIfNoUserInteractionRequired":false,"distinct":true,"required":false,"autoSelectFirstOption":false,"defaultValue":"1","type":"dropDown","name":"ExternalConfidentialityLabel","label":"External Confidentiality label","helpTexts":{"prefix":"","postfix":"If no external confidentiality class then please choose the blank value"},"spacing":{},"fullyQualifiedName":"ExternalConfidentialityLabel"},{"dataSource":"PowerPoint Document Type","column":"documentType","required":false,"placeholder":"","autoSelectFirstOption":false,"type":"comboBox","name":"DocTypePresentation","label":"Document Type Presentation","helpTexts":{"prefix":"","postfix":"If the document type differs from the default value, click on the X to delete and type/choose another type."},"spacing":{},"fullyQualifiedName":"DocTypePresentation"},{"required":false,"placeholder":"","lines":0,"type":"textBox","name":"DocumentNumber","label":"Document Number","helpTexts":{"prefix":"","postfix":""},"spacing":{},"fullyQualifiedName":"DocumentNumber"},{"dataSource":"Language code","displayColumn":"showName","hideIfNoUserInteractionRequired":false,"distinct":true,"required":false,"autoSelectFirstOption":false,"defaultValue":"1","type":"dropDown","name":"LanguageCode","label":"Language Code","helpTexts":{"prefix":"","postfix":"The language code will be appended to the Document No."},"spacing":{},"fullyQualifiedName":"LanguageCode"},{"dataSource":"Revision","column":"revision","required":false,"placeholder":"","autoSelectFirstOption":false,"type":"comboBox","name":"Revision","label":"Revision","helpTexts":{"prefix":"","postfix":""},"spacing":{},"fullyQualifiedName":"Revision"},{"required":false,"type":"datePicker","name":"Date","label":"Date","helpTexts":{"prefix":"","postfix":""},"spacing":{},"fullyQualifiedName":"Date"},{"type":"heading","name":"FooterVisibilityOptions","label":"Footer Visibility Options","helpTexts":{"prefix":"","postfix":""},"spacing":{},"fullyQualifiedName":"FooterVisibilityOptions"},{"dataSource":"PPT FooterVisibility","displayColumn":"templateType","hideIfNoUserInteractionRequired":false,"distinct":true,"required":true,"autoSelectFirstOption":false,"defaultValue":"1","type":"dropDown","name":"TemplateType","label":"Is this a document or presentation?","helpTexts":{"prefix":"","postfix":""},"spacing":{},"fullyQualifiedName":"TemplateType"},{"dataSource":"PPT FooterVisibility","displayColumn":"docTitle_label","hideIfNoUserInteractionRequired":false,"distinct":true,"required":false,"autoSelectFirstOption":true,"filter":{"column":"templateType","otherFieldName":"TemplateType","fullyQualifiedOtherFieldName":"TemplateType","otherFieldColumn":"TemplateType","formReference":"none","operator":"equals"},"type":"dropDown","name":"DocTitle","label":"Show document title in footer?","helpTexts":{"prefix":"","postfix":""},"spacing":{},"fullyQualifiedName":"DocTitle"},{"dataSource":"PPT FooterVisibility","displayColumn":"totalPageNo_text","hideIfNoUserInteractionRequired":false,"distinct":true,"required":false,"autoSelectFirstOption":true,"filter":{"column":"templateType","otherFieldName":"TemplateType","fullyQualifiedOtherFieldName":"TemplateType","otherFieldColumn":"TemplateType","formReference":"none","operator":"equals"},"type":"dropDown","name":"TotalPageNo","label":"Page numbering","helpTexts":{"prefix":"","postfix":""},"spacing":{},"fullyQualifiedName":"TotalPageNo"},{"required":false,"placeholder":"","lines":0,"defaultValue":"{{UserProfile.Prepared}}","type":"textBox","name":"Prepared","label":"Prepared By (Subject Responsible)","helpTexts":{"prefix":"","postfix":""},"spacing":{},"fullyQualifiedName":"Prepared"},{"required":false,"placeholder":"","lines":0,"type":"textBox","name":"ApprovedBy","label":"Approved By (Document Responsible)","helpTexts":{"prefix":"","postfix":""},"spacing":{},"fullyQualifiedName":"ApprovedBy"},{"required":false,"placeholder":"","lines":0,"type":"textBox","name":"Checked","label":"Checked","helpTexts":{"prefix":"","postfix":""},"spacing":{},"fullyQualifiedName":"Checked"},{"required":false,"placeholder":"","lines":0,"type":"textBox","name":"Reference","label":"Reference","helpTexts":{"prefix":"","postfix":""},"spacing":{},"fullyQualifiedName":"Reference"},{"required":false,"placeholder":"","lines":0,"type":"textBox","name":"Keywords","label":"Keywords","helpTexts":{"prefix":"","postfix":""},"spacing":{},"fullyQualifiedName":"Keywords"}],"formDataEntries":[{"name":"DocumentTitle","value":"HfKMJ7wB7KPEWJpFWibMqg=="},{"name":"ConfidentialityClass","value":"cT/FOwTWaPknrhRlNMh4SQ=="},{"name":"ExternalConfidentialityLabel","value":"u2D/MG3wyuAQhkGvE2fPaA=="},{"name":"LanguageCode","value":"5wlu7ZdPxHQj1W0w+yTNSg=="},{"name":"Date","value":"vb48xUhp/+BouvbbBJesXw=="},{"name":"TemplateType","value":"PxVEvJY8nE7m/hY9622Sng=="},{"name":"DocTitle","value":"PxVEvJY8nE7m/hY9622Sng=="},{"name":"TotalPageNo","value":"PxVEvJY8nE7m/hY9622Sng=="},{"name":"Prepared","value":"PqdHBiLjqdpOMxfLUK9Tonaq9XwuinzCFKYJ7RK3+SI="}]}]]></TemplafyFormConfiguration>
-</file>
-
 <file path=customXml/item13.xml><?xml version="1.0" encoding="utf-8"?>
-<TemplafyTemplateConfiguration><![CDATA[{"elementsMetadata":[{"type":"shape","id":"5d67e717-74bf-41a6-8dce-47082e2c1da1","elementConfiguration":{"inheritDimensions":"inheritNone","height":"1.34 cm","binding":"Form.LogoInsertion.Pplogoname","disableUpdates":false,"type":"image"}}],"transformationConfigurations":[{"language":"{{DocumentLanguage}}","disableUpdates":false,"type":"proofingLanguage"},{"propertyName":"FooterText","propertyValue":"true","disableUpdates":false,"type":"customDocumentProperty"},{"propertyName":"SecurityClass","propertyValue":"{{Form.ConfidentialityClass.Confidentiality}}","disableUpdates":false,"type":"customDocumentProperty"},{"propertyName":"ExtConf","propertyValue":"{{Form.ExternalConfidentialityLabel.ExternalConfidentiality}}","disableUpdates":false,"type":"customDocumentProperty"},{"propertyName":"Prepared","propertyValue":"{{Form.Prepared}}","disableUpdates":false,"type":"customDocumentProperty"},{"propertyName":"ApprovedBy","propertyValue":"{{Form.ApprovedBy}}","disableUpdates":false,"type":"customDocumentProperty"},{"propertyName":"DocNo","propertyValue":"{{Form.DocumentNumber}} {{Form.LanguageCode.LanguageCode}}","disableUpdates":false,"type":"customDocumentProperty"},{"propertyName":"Checked","propertyValue":"{{Form.Checked}}","disableUpdates":false,"type":"customDocumentProperty"},{"propertyName":"Date","propertyValue":"{{Form.Date}}","disableUpdates":false,"type":"customDocumentProperty"},{"propertyName":"Reference","propertyValue":"{{Form.Reference}}","disableUpdates":false,"type":"customDocumentProperty"},{"propertyName":"Title","propertyValue":"{{Form.DocumentTitle}}","disableUpdates":false,"type":"customDocumentProperty"},{"propertyName":"Keyword","propertyValue":"{{Form.Keywords}}","disableUpdates":false,"type":"customDocumentProperty"},{"propertyName":"DocumentType","propertyValue":"Presentation2011","disableUpdates":false,"type":"customDocumentProperty"},{"propertyName":"Language","propertyValue":"EnglishUS","disableUpdates":false,"type":"customDocumentProperty"},{"propertyName":"TemplateID","propertyValue":"FALSE","disableUpdates":false,"type":"customDocumentProperty"},{"propertyName":"ConfCtrl","propertyValue":"FALSE","disableUpdates":false,"type":"customDocumentProperty"},{"propertyName":"title","propertyValue":"{{Form.DocumentTitle}}","disableUpdates":false,"type":"documentProperty"},{"propertyName":"keywords","propertyValue":"{{Form.Keywords}}","disableUpdates":false,"type":"documentProperty"},{"propertyName":"creator","propertyValue":"{{Form.Prepared}}","disableUpdates":false,"type":"documentProperty"},{"propertyName":"DocTitle","propertyValue":"{{Form.DocTitle.DocTitle}}","disableUpdates":false,"type":"customDocumentProperty"},{"propertyName":"IsDocument","propertyValue":"{{Form.TemplateType.IsDocument}}","disableUpdates":false,"type":"customDocumentProperty"},{"propertyName":"IsPresentation","propertyValue":"{{Form.TemplateType.IsPresentation}}","disableUpdates":false,"type":"customDocumentProperty"},{"propertyName":"company","propertyValue":"Ericsson","disableUpdates":false,"type":"documentProperty"},{"propertyName":"PageNumberVisible","propertyValue":"{{Form.TotalPageNo.TotalPageNo_value}}","disableUpdates":false,"type":"customDocumentProperty"},{"propertyName":"Revision","propertyValue":"{{Form.Revision}}","disableUpdates":false,"type":"customDocumentProperty"},{"propertyName":"DocType","propertyValue":"{{Form.DocTypePresentation}}","disableUpdates":false,"type":"customDocumentProperty"},{"propertyName":"TemplateVersion","propertyValue":"R2A","disableUpdates":false,"type":"customDocumentProperty"},{"propertyName":"PackageNo","propertyValue":"LXA 119 603","disableUpdates":false,"type":"customDocumentProperty"},{"propertyName":"PackageVersion","propertyValue":"R6B","disableUpdates":false,"type":"customDocumentProperty"},{"propertyName":"TemplateName","propertyValue":"CXC 173 2731/1","disableUpdates":false,"type":"customDocumentProperty"},{"propertyName":"DocName","propertyValue":" ","disableUpdates":false,"type":"customDocumentProperty"},{"propertyName":"description","propertyValue":"{{Form.DocumentNumber}} {{Form.LanguageCode.LanguageCode}}\nRev {{Form.Revision}}","disableUpdates":false,"type":"documentProperty"}],"templateName":"New presentation (Standard landscape)","templateDescription":"","enableDocumentContentUpdater":true,"version":"1.9"}]]></TemplafyTemplateConfiguration>
+<TemplafySlideFormConfiguration><![CDATA[{"formFields":[],"formDataEntries":[]}]]></TemplafySlideFormConfiguration>
 </file>
 
 <file path=customXml/item14.xml><?xml version="1.0" encoding="utf-8"?>
+<TemplafySlideTemplateConfiguration><![CDATA[{"documentContentValidatorConfiguration":{"enableDocumentContentValidator":false,"documentContentValidatorVersion":0},"elementsMetadata":[],"slideId":"637037983905221557","enableDocumentContentUpdater":true,"version":"1.9"}]]></TemplafySlideTemplateConfiguration>
+</file>
+
+<file path=customXml/item15.xml><?xml version="1.0" encoding="utf-8"?>
+<TemplafySlideTemplateConfiguration><![CDATA[{"documentContentValidatorConfiguration":{"enableDocumentContentValidator":false,"documentContentValidatorVersion":0},"elementsMetadata":[],"slideId":"637171128435648944","enableDocumentContentUpdater":true,"version":"1.9"}]]></TemplafySlideTemplateConfiguration>
+</file>
+
+<file path=customXml/item16.xml><?xml version="1.0" encoding="utf-8"?>
 <TemplafySlideFormConfiguration><![CDATA[{"formFields":[],"formDataEntries":[]}]]></TemplafySlideFormConfiguration>
 </file>
 
-<file path=customXml/item15.xml><?xml version="1.0" encoding="utf-8"?>
-<TemplafySlideTemplateConfiguration><![CDATA[{"documentContentValidatorConfiguration":{"enableDocumentContentValidator":false,"documentContentValidatorVersion":0},"elementsMetadata":[],"slideId":"637037983905678162","enableDocumentContentUpdater":true,"version":"1.9"}]]></TemplafySlideTemplateConfiguration>
-</file>
-
-<file path=customXml/item16.xml><?xml version="1.0" encoding="utf-8"?>
-<?mso-contentType ?>
-<FormTemplates xmlns="http://schemas.microsoft.com/sharepoint/v3/contenttype/forms">
-  <Display>DocumentLibraryForm</Display>
-  <Edit>DocumentLibraryForm</Edit>
-  <New>DocumentLibraryForm</New>
-</FormTemplates>
-</file>
-
 <file path=customXml/item17.xml><?xml version="1.0" encoding="utf-8"?>
-<TemplafySlideFormConfiguration><![CDATA[{"formFields":[],"formDataEntries":[]}]]></TemplafySlideFormConfiguration>
+<TemplafySlideTemplateConfiguration><![CDATA[{"documentContentValidatorConfiguration":{"enableDocumentContentValidator":false,"documentContentValidatorVersion":0},"elementsMetadata":[],"slideId":"637171128435180813","enableDocumentContentUpdater":true,"version":"1.9"}]]></TemplafySlideTemplateConfiguration>
 </file>
 
 <file path=customXml/item18.xml><?xml version="1.0" encoding="utf-8"?>
-<TemplafySlideFormConfiguration><![CDATA[{"formFields":[],"formDataEntries":[]}]]></TemplafySlideFormConfiguration>
+<TemplafyTemplateConfiguration><![CDATA[{"elementsMetadata":[{"type":"shape","id":"5d67e717-74bf-41a6-8dce-47082e2c1da1","elementConfiguration":{"inheritDimensions":"inheritNone","height":"1.34 cm","binding":"Form.LogoInsertion.Pplogoname","disableUpdates":false,"type":"image"}}],"transformationConfigurations":[{"language":"{{DocumentLanguage}}","disableUpdates":false,"type":"proofingLanguage"},{"propertyName":"FooterText","propertyValue":"true","disableUpdates":false,"type":"customDocumentProperty"},{"propertyName":"SecurityClass","propertyValue":"{{Form.ConfidentialityClass.Confidentiality}}","disableUpdates":false,"type":"customDocumentProperty"},{"propertyName":"ExtConf","propertyValue":"{{Form.ExternalConfidentialityLabel.ExternalConfidentiality}}","disableUpdates":false,"type":"customDocumentProperty"},{"propertyName":"Prepared","propertyValue":"{{Form.Prepared}}","disableUpdates":false,"type":"customDocumentProperty"},{"propertyName":"ApprovedBy","propertyValue":"{{Form.ApprovedBy}}","disableUpdates":false,"type":"customDocumentProperty"},{"propertyName":"DocNo","propertyValue":"{{Form.DocumentNumber}} {{Form.LanguageCode.LanguageCode}}","disableUpdates":false,"type":"customDocumentProperty"},{"propertyName":"Checked","propertyValue":"{{Form.Checked}}","disableUpdates":false,"type":"customDocumentProperty"},{"propertyName":"Date","propertyValue":"{{Form.Date}}","disableUpdates":false,"type":"customDocumentProperty"},{"propertyName":"Reference","propertyValue":"{{Form.Reference}}","disableUpdates":false,"type":"customDocumentProperty"},{"propertyName":"Title","propertyValue":"{{Form.DocumentTitle}}","disableUpdates":false,"type":"customDocumentProperty"},{"propertyName":"Keyword","propertyValue":"{{Form.Keywords}}","disableUpdates":false,"type":"customDocumentProperty"},{"propertyName":"DocumentType","propertyValue":"Presentation2011","disableUpdates":false,"type":"customDocumentProperty"},{"propertyName":"Language","propertyValue":"EnglishUS","disableUpdates":false,"type":"customDocumentProperty"},{"propertyName":"TemplateID","propertyValue":"FALSE","disableUpdates":false,"type":"customDocumentProperty"},{"propertyName":"ConfCtrl","propertyValue":"FALSE","disableUpdates":false,"type":"customDocumentProperty"},{"propertyName":"title","propertyValue":"{{Form.DocumentTitle}}","disableUpdates":false,"type":"documentProperty"},{"propertyName":"keywords","propertyValue":"{{Form.Keywords}}","disableUpdates":false,"type":"documentProperty"},{"propertyName":"creator","propertyValue":"{{Form.Prepared}}","disableUpdates":false,"type":"documentProperty"},{"propertyName":"DocTitle","propertyValue":"{{Form.DocTitle.DocTitle}}","disableUpdates":false,"type":"customDocumentProperty"},{"propertyName":"IsDocument","propertyValue":"{{Form.TemplateType.IsDocument}}","disableUpdates":false,"type":"customDocumentProperty"},{"propertyName":"IsPresentation","propertyValue":"{{Form.TemplateType.IsPresentation}}","disableUpdates":false,"type":"customDocumentProperty"},{"propertyName":"company","propertyValue":"Ericsson","disableUpdates":false,"type":"documentProperty"},{"propertyName":"PageNumberVisible","propertyValue":"{{Form.TotalPageNo.TotalPageNo_value}}","disableUpdates":false,"type":"customDocumentProperty"},{"propertyName":"Revision","propertyValue":"{{Form.Revision}}","disableUpdates":false,"type":"customDocumentProperty"},{"propertyName":"DocType","propertyValue":"{{Form.DocTypePresentation}}","disableUpdates":false,"type":"customDocumentProperty"},{"propertyName":"TemplateVersion","propertyValue":"R2A","disableUpdates":false,"type":"customDocumentProperty"},{"propertyName":"PackageNo","propertyValue":"LXA 119 603","disableUpdates":false,"type":"customDocumentProperty"},{"propertyName":"PackageVersion","propertyValue":"R6B","disableUpdates":false,"type":"customDocumentProperty"},{"propertyName":"TemplateName","propertyValue":"CXC 173 2731/1","disableUpdates":false,"type":"customDocumentProperty"},{"propertyName":"DocName","propertyValue":" ","disableUpdates":false,"type":"customDocumentProperty"},{"propertyName":"description","propertyValue":"{{Form.DocumentNumber}} {{Form.LanguageCode.LanguageCode}}\nRev {{Form.Revision}}","disableUpdates":false,"type":"documentProperty"}],"templateName":"New presentation (Standard landscape)","templateDescription":"","enableDocumentContentUpdater":true,"version":"1.9"}]]></TemplafyTemplateConfiguration>
 </file>
 
 <file path=customXml/item19.xml><?xml version="1.0" encoding="utf-8"?>
@@ -27401,6 +27395,18 @@
 </file>
 
 <file path=customXml/item2.xml><?xml version="1.0" encoding="utf-8"?>
+<TemplafySlideFormConfiguration><![CDATA[{"formFields":[],"formDataEntries":[]}]]></TemplafySlideFormConfiguration>
+</file>
+
+<file path=customXml/item3.xml><?xml version="1.0" encoding="utf-8"?>
+<TemplafyFormConfiguration><![CDATA[{"formFields":[{"required":true,"placeholder":"","lines":0,"type":"textBox","name":"DocumentTitle","label":"Document Title","helpTexts":{"prefix":"","postfix":""},"spacing":{},"fullyQualifiedName":"DocumentTitle"},{"dataSource":"Confidentiality","displayColumn":"confidentiality","hideIfNoUserInteractionRequired":false,"distinct":true,"required":true,"autoSelectFirstOption":false,"type":"dropDown","name":"ConfidentialityClass","label":"Confidentiality Class","helpTexts":{"prefix":"","postfix":""},"spacing":{},"fullyQualifiedName":"ConfidentialityClass"},{"dataSource":"External Confidentiality label","displayColumn":"externalConfidentiality","hideIfNoUserInteractionRequired":false,"distinct":true,"required":false,"autoSelectFirstOption":false,"defaultValue":"1","type":"dropDown","name":"ExternalConfidentialityLabel","label":"External Confidentiality label","helpTexts":{"prefix":"","postfix":"If no external confidentiality class then please choose the blank value"},"spacing":{},"fullyQualifiedName":"ExternalConfidentialityLabel"},{"dataSource":"PowerPoint Document Type","column":"documentType","required":false,"placeholder":"","autoSelectFirstOption":false,"type":"comboBox","name":"DocTypePresentation","label":"Document Type Presentation","helpTexts":{"prefix":"","postfix":"If the document type differs from the default value, click on the X to delete and type/choose another type."},"spacing":{},"fullyQualifiedName":"DocTypePresentation"},{"required":false,"placeholder":"","lines":0,"type":"textBox","name":"DocumentNumber","label":"Document Number","helpTexts":{"prefix":"","postfix":""},"spacing":{},"fullyQualifiedName":"DocumentNumber"},{"dataSource":"Language code","displayColumn":"showName","hideIfNoUserInteractionRequired":false,"distinct":true,"required":false,"autoSelectFirstOption":false,"defaultValue":"1","type":"dropDown","name":"LanguageCode","label":"Language Code","helpTexts":{"prefix":"","postfix":"The language code will be appended to the Document No."},"spacing":{},"fullyQualifiedName":"LanguageCode"},{"dataSource":"Revision","column":"revision","required":false,"placeholder":"","autoSelectFirstOption":false,"type":"comboBox","name":"Revision","label":"Revision","helpTexts":{"prefix":"","postfix":""},"spacing":{},"fullyQualifiedName":"Revision"},{"required":false,"type":"datePicker","name":"Date","label":"Date","helpTexts":{"prefix":"","postfix":""},"spacing":{},"fullyQualifiedName":"Date"},{"type":"heading","name":"FooterVisibilityOptions","label":"Footer Visibility Options","helpTexts":{"prefix":"","postfix":""},"spacing":{},"fullyQualifiedName":"FooterVisibilityOptions"},{"dataSource":"PPT FooterVisibility","displayColumn":"templateType","hideIfNoUserInteractionRequired":false,"distinct":true,"required":true,"autoSelectFirstOption":false,"defaultValue":"1","type":"dropDown","name":"TemplateType","label":"Is this a document or presentation?","helpTexts":{"prefix":"","postfix":""},"spacing":{},"fullyQualifiedName":"TemplateType"},{"dataSource":"PPT FooterVisibility","displayColumn":"docTitle_label","hideIfNoUserInteractionRequired":false,"distinct":true,"required":false,"autoSelectFirstOption":true,"filter":{"column":"templateType","otherFieldName":"TemplateType","fullyQualifiedOtherFieldName":"TemplateType","otherFieldColumn":"TemplateType","formReference":"none","operator":"equals"},"type":"dropDown","name":"DocTitle","label":"Show document title in footer?","helpTexts":{"prefix":"","postfix":""},"spacing":{},"fullyQualifiedName":"DocTitle"},{"dataSource":"PPT FooterVisibility","displayColumn":"totalPageNo_text","hideIfNoUserInteractionRequired":false,"distinct":true,"required":false,"autoSelectFirstOption":true,"filter":{"column":"templateType","otherFieldName":"TemplateType","fullyQualifiedOtherFieldName":"TemplateType","otherFieldColumn":"TemplateType","formReference":"none","operator":"equals"},"type":"dropDown","name":"TotalPageNo","label":"Page numbering","helpTexts":{"prefix":"","postfix":""},"spacing":{},"fullyQualifiedName":"TotalPageNo"},{"required":false,"placeholder":"","lines":0,"defaultValue":"{{UserProfile.Prepared}}","type":"textBox","name":"Prepared","label":"Prepared By (Subject Responsible)","helpTexts":{"prefix":"","postfix":""},"spacing":{},"fullyQualifiedName":"Prepared"},{"required":false,"placeholder":"","lines":0,"type":"textBox","name":"ApprovedBy","label":"Approved By (Document Responsible)","helpTexts":{"prefix":"","postfix":""},"spacing":{},"fullyQualifiedName":"ApprovedBy"},{"required":false,"placeholder":"","lines":0,"type":"textBox","name":"Checked","label":"Checked","helpTexts":{"prefix":"","postfix":""},"spacing":{},"fullyQualifiedName":"Checked"},{"required":false,"placeholder":"","lines":0,"type":"textBox","name":"Reference","label":"Reference","helpTexts":{"prefix":"","postfix":""},"spacing":{},"fullyQualifiedName":"Reference"},{"required":false,"placeholder":"","lines":0,"type":"textBox","name":"Keywords","label":"Keywords","helpTexts":{"prefix":"","postfix":""},"spacing":{},"fullyQualifiedName":"Keywords"}],"formDataEntries":[{"name":"DocumentTitle","value":"HfKMJ7wB7KPEWJpFWibMqg=="},{"name":"ConfidentialityClass","value":"cT/FOwTWaPknrhRlNMh4SQ=="},{"name":"ExternalConfidentialityLabel","value":"u2D/MG3wyuAQhkGvE2fPaA=="},{"name":"LanguageCode","value":"5wlu7ZdPxHQj1W0w+yTNSg=="},{"name":"Date","value":"vb48xUhp/+BouvbbBJesXw=="},{"name":"TemplateType","value":"PxVEvJY8nE7m/hY9622Sng=="},{"name":"DocTitle","value":"PxVEvJY8nE7m/hY9622Sng=="},{"name":"TotalPageNo","value":"PxVEvJY8nE7m/hY9622Sng=="},{"name":"Prepared","value":"PqdHBiLjqdpOMxfLUK9Tonaq9XwuinzCFKYJ7RK3+SI="}]}]]></TemplafyFormConfiguration>
+</file>
+
+<file path=customXml/item4.xml><?xml version="1.0" encoding="utf-8"?>
+<TemplafySlideFormConfiguration><![CDATA[{"formFields":[],"formDataEntries":[]}]]></TemplafySlideFormConfiguration>
+</file>
+
+<file path=customXml/item5.xml><?xml version="1.0" encoding="utf-8"?>
 <ct:contentTypeSchema xmlns:ct="http://schemas.microsoft.com/office/2006/metadata/contentType" xmlns:ma="http://schemas.microsoft.com/office/2006/metadata/properties/metaAttributes" ct:_="" ma:_="" ma:contentTypeName="Document" ma:contentTypeID="0x0101002C8661F604A9A64C9627B875CBEE0D49" ma:contentTypeVersion="13" ma:contentTypeDescription="Create a new document." ma:contentTypeScope="" ma:versionID="efb89547655977800231d60c8e2388d5">
   <xsd:schema xmlns:xsd="http://www.w3.org/2001/XMLSchema" xmlns:xs="http://www.w3.org/2001/XMLSchema" xmlns:p="http://schemas.microsoft.com/office/2006/metadata/properties" xmlns:ns3="92e1255f-bb7b-4dc9-b051-584cc104eb44" xmlns:ns4="a6550eff-0fc9-443f-8e77-72cbcf778382" targetNamespace="http://schemas.microsoft.com/office/2006/metadata/properties" ma:root="true" ma:fieldsID="5147822fdb6803771ba7305cbc438486" ns3:_="" ns4:_="">
     <xsd:import namespace="92e1255f-bb7b-4dc9-b051-584cc104eb44"/>
@@ -27623,105 +27629,123 @@
 </ct:contentTypeSchema>
 </file>
 
-<file path=customXml/item3.xml><?xml version="1.0" encoding="utf-8"?>
-<p:properties xmlns:p="http://schemas.microsoft.com/office/2006/metadata/properties" xmlns:xsi="http://www.w3.org/2001/XMLSchema-instance" xmlns:pc="http://schemas.microsoft.com/office/infopath/2007/PartnerControls">
-  <documentManagement/>
-</p:properties>
+<file path=customXml/item6.xml><?xml version="1.0" encoding="utf-8"?>
+<?mso-contentType ?>
+<FormTemplates xmlns="http://schemas.microsoft.com/sharepoint/v3/contenttype/forms">
+  <Display>DocumentLibraryForm</Display>
+  <Edit>DocumentLibraryForm</Edit>
+  <New>DocumentLibraryForm</New>
+</FormTemplates>
 </file>
 
-<file path=customXml/item4.xml><?xml version="1.0" encoding="utf-8"?>
-<TemplafySlideTemplateConfiguration><![CDATA[{"documentContentValidatorConfiguration":{"enableDocumentContentValidator":false,"documentContentValidatorVersion":0},"elementsMetadata":[],"slideId":"637037983905221557","enableDocumentContentUpdater":true,"version":"1.9"}]]></TemplafySlideTemplateConfiguration>
+<file path=customXml/item7.xml><?xml version="1.0" encoding="utf-8"?>
+<TemplafySlideTemplateConfiguration><![CDATA[{"documentContentValidatorConfiguration":{"enableDocumentContentValidator":false,"documentContentValidatorVersion":0},"elementsMetadata":[],"slideId":"637050925554934895","enableDocumentContentUpdater":true,"version":"1.9"}]]></TemplafySlideTemplateConfiguration>
 </file>
 
-<file path=customXml/item5.xml><?xml version="1.0" encoding="utf-8"?>
-<TemplafySlideTemplateConfiguration><![CDATA[{"documentContentValidatorConfiguration":{"enableDocumentContentValidator":false,"documentContentValidatorVersion":0},"elementsMetadata":[],"slideId":"637037983905221558","enableDocumentContentUpdater":true,"version":"1.9"}]]></TemplafySlideTemplateConfiguration>
-</file>
-
-<file path=customXml/item6.xml><?xml version="1.0" encoding="utf-8"?>
+<file path=customXml/item8.xml><?xml version="1.0" encoding="utf-8"?>
 <TemplafySlideFormConfiguration><![CDATA[{"formFields":[],"formDataEntries":[]}]]></TemplafySlideFormConfiguration>
 </file>
 
-<file path=customXml/item7.xml><?xml version="1.0" encoding="utf-8"?>
-<TemplafySlideFormConfiguration><![CDATA[{"formFields":[],"formDataEntries":[]}]]></TemplafySlideFormConfiguration>
-</file>
-
-<file path=customXml/item8.xml><?xml version="1.0" encoding="utf-8"?>
-<TemplafySlideTemplateConfiguration><![CDATA[{"documentContentValidatorConfiguration":{"enableDocumentContentValidator":false,"documentContentValidatorVersion":0},"elementsMetadata":[],"slideId":"637171128435180813","enableDocumentContentUpdater":true,"version":"1.9"}]]></TemplafySlideTemplateConfiguration>
-</file>
-
 <file path=customXml/item9.xml><?xml version="1.0" encoding="utf-8"?>
-<TemplafySlideTemplateConfiguration><![CDATA[{"documentContentValidatorConfiguration":{"enableDocumentContentValidator":false,"documentContentValidatorVersion":0},"elementsMetadata":[],"slideId":"637171128435648944","enableDocumentContentUpdater":true,"version":"1.9"}]]></TemplafySlideTemplateConfiguration>
+<TemplafySlideTemplateConfiguration><![CDATA[{"elementsMetadata":[],"documentContentValidatorConfiguration":{"enableDocumentContentValidator":false,"documentContentValidatorVersion":0},"slideId":"637027476704980324","enableDocumentContentUpdater":true,"version":"1.9"}]]></TemplafySlideTemplateConfiguration>
 </file>
 
 <file path=customXml/itemProps1.xml><?xml version="1.0" encoding="utf-8"?>
-<ds:datastoreItem xmlns:ds="http://schemas.openxmlformats.org/officeDocument/2006/customXml" ds:itemID="{03AF3FDC-ACD1-46F3-A43E-782322DF9816}">
+<ds:datastoreItem xmlns:ds="http://schemas.openxmlformats.org/officeDocument/2006/customXml" ds:itemID="{56F2EE69-0CCA-4F48-BE22-EC4A886C57A7}">
+  <ds:schemaRefs>
+    <ds:schemaRef ds:uri="http://schemas.microsoft.com/office/infopath/2007/PartnerControls"/>
+    <ds:schemaRef ds:uri="http://purl.org/dc/elements/1.1/"/>
+    <ds:schemaRef ds:uri="http://schemas.microsoft.com/office/2006/metadata/properties"/>
+    <ds:schemaRef ds:uri="http://purl.org/dc/terms/"/>
+    <ds:schemaRef ds:uri="92e1255f-bb7b-4dc9-b051-584cc104eb44"/>
+    <ds:schemaRef ds:uri="http://schemas.openxmlformats.org/package/2006/metadata/core-properties"/>
+    <ds:schemaRef ds:uri="http://schemas.microsoft.com/office/2006/documentManagement/types"/>
+    <ds:schemaRef ds:uri="a6550eff-0fc9-443f-8e77-72cbcf778382"/>
+    <ds:schemaRef ds:uri="http://www.w3.org/XML/1998/namespace"/>
+    <ds:schemaRef ds:uri="http://purl.org/dc/dcmitype/"/>
+  </ds:schemaRefs>
+</ds:datastoreItem>
+</file>
+
+<file path=customXml/itemProps10.xml><?xml version="1.0" encoding="utf-8"?>
+<ds:datastoreItem xmlns:ds="http://schemas.openxmlformats.org/officeDocument/2006/customXml" ds:itemID="{683FEB75-8CFA-449C-A6B1-B1E4A86A58A1}">
   <ds:schemaRefs/>
 </ds:datastoreItem>
 </file>
 
-<file path=customXml/itemProps10.xml><?xml version="1.0" encoding="utf-8"?>
+<file path=customXml/itemProps11.xml><?xml version="1.0" encoding="utf-8"?>
+<ds:datastoreItem xmlns:ds="http://schemas.openxmlformats.org/officeDocument/2006/customXml" ds:itemID="{1CE36EA9-2186-4EB1-871A-8AE59C2A13BB}">
+  <ds:schemaRefs/>
+</ds:datastoreItem>
+</file>
+
+<file path=customXml/itemProps12.xml><?xml version="1.0" encoding="utf-8"?>
 <ds:datastoreItem xmlns:ds="http://schemas.openxmlformats.org/officeDocument/2006/customXml" ds:itemID="{822D38AD-8010-4CD3-BD6B-117CB8DF70A4}">
   <ds:schemaRefs/>
 </ds:datastoreItem>
 </file>
 
-<file path=customXml/itemProps11.xml><?xml version="1.0" encoding="utf-8"?>
-<ds:datastoreItem xmlns:ds="http://schemas.openxmlformats.org/officeDocument/2006/customXml" ds:itemID="{C09F197C-6A49-47D0-B877-F88807989676}">
+<file path=customXml/itemProps13.xml><?xml version="1.0" encoding="utf-8"?>
+<ds:datastoreItem xmlns:ds="http://schemas.openxmlformats.org/officeDocument/2006/customXml" ds:itemID="{C99E78A0-C9D4-446F-B674-4DD3E2B46C5D}">
   <ds:schemaRefs/>
 </ds:datastoreItem>
 </file>
 
-<file path=customXml/itemProps12.xml><?xml version="1.0" encoding="utf-8"?>
+<file path=customXml/itemProps14.xml><?xml version="1.0" encoding="utf-8"?>
+<ds:datastoreItem xmlns:ds="http://schemas.openxmlformats.org/officeDocument/2006/customXml" ds:itemID="{72516535-7702-46AF-9B1F-8623A67A824E}">
+  <ds:schemaRefs/>
+</ds:datastoreItem>
+</file>
+
+<file path=customXml/itemProps15.xml><?xml version="1.0" encoding="utf-8"?>
+<ds:datastoreItem xmlns:ds="http://schemas.openxmlformats.org/officeDocument/2006/customXml" ds:itemID="{C750C5DC-043F-4BD3-940C-EB6F7625E286}">
+  <ds:schemaRefs/>
+</ds:datastoreItem>
+</file>
+
+<file path=customXml/itemProps16.xml><?xml version="1.0" encoding="utf-8"?>
+<ds:datastoreItem xmlns:ds="http://schemas.openxmlformats.org/officeDocument/2006/customXml" ds:itemID="{847502A6-7CBE-43AF-BDF6-4D4423521D8C}">
+  <ds:schemaRefs/>
+</ds:datastoreItem>
+</file>
+
+<file path=customXml/itemProps17.xml><?xml version="1.0" encoding="utf-8"?>
+<ds:datastoreItem xmlns:ds="http://schemas.openxmlformats.org/officeDocument/2006/customXml" ds:itemID="{AB2F4486-6448-49E3-8249-BB9C7492711D}">
+  <ds:schemaRefs/>
+</ds:datastoreItem>
+</file>
+
+<file path=customXml/itemProps18.xml><?xml version="1.0" encoding="utf-8"?>
+<ds:datastoreItem xmlns:ds="http://schemas.openxmlformats.org/officeDocument/2006/customXml" ds:itemID="{07958A4E-FAB1-42E4-B6B5-29B01F63F87B}">
+  <ds:schemaRefs/>
+</ds:datastoreItem>
+</file>
+
+<file path=customXml/itemProps19.xml><?xml version="1.0" encoding="utf-8"?>
+<ds:datastoreItem xmlns:ds="http://schemas.openxmlformats.org/officeDocument/2006/customXml" ds:itemID="{B9AEDDE3-EA02-4A8F-B8F8-0606A0AA45FC}">
+  <ds:schemaRefs/>
+</ds:datastoreItem>
+</file>
+
+<file path=customXml/itemProps2.xml><?xml version="1.0" encoding="utf-8"?>
+<ds:datastoreItem xmlns:ds="http://schemas.openxmlformats.org/officeDocument/2006/customXml" ds:itemID="{58CC0B31-82B9-497A-9A2E-F3F72D0BBDAD}">
+  <ds:schemaRefs/>
+</ds:datastoreItem>
+</file>
+
+<file path=customXml/itemProps3.xml><?xml version="1.0" encoding="utf-8"?>
 <ds:datastoreItem xmlns:ds="http://schemas.openxmlformats.org/officeDocument/2006/customXml" ds:itemID="{D92C3DF5-A179-4E2D-BD20-07044B39171F}">
   <ds:schemaRefs/>
 </ds:datastoreItem>
 </file>
 
-<file path=customXml/itemProps13.xml><?xml version="1.0" encoding="utf-8"?>
-<ds:datastoreItem xmlns:ds="http://schemas.openxmlformats.org/officeDocument/2006/customXml" ds:itemID="{07958A4E-FAB1-42E4-B6B5-29B01F63F87B}">
-  <ds:schemaRefs/>
-</ds:datastoreItem>
-</file>
-
-<file path=customXml/itemProps14.xml><?xml version="1.0" encoding="utf-8"?>
-<ds:datastoreItem xmlns:ds="http://schemas.openxmlformats.org/officeDocument/2006/customXml" ds:itemID="{847502A6-7CBE-43AF-BDF6-4D4423521D8C}">
-  <ds:schemaRefs/>
-</ds:datastoreItem>
-</file>
-
-<file path=customXml/itemProps15.xml><?xml version="1.0" encoding="utf-8"?>
-<ds:datastoreItem xmlns:ds="http://schemas.openxmlformats.org/officeDocument/2006/customXml" ds:itemID="{1CE36EA9-2186-4EB1-871A-8AE59C2A13BB}">
-  <ds:schemaRefs/>
-</ds:datastoreItem>
-</file>
-
-<file path=customXml/itemProps16.xml><?xml version="1.0" encoding="utf-8"?>
-<ds:datastoreItem xmlns:ds="http://schemas.openxmlformats.org/officeDocument/2006/customXml" ds:itemID="{F5A7E41D-6E7F-4B05-AFAB-F540BD4C068B}">
-  <ds:schemaRefs>
-    <ds:schemaRef ds:uri="http://schemas.microsoft.com/sharepoint/v3/contenttype/forms"/>
-  </ds:schemaRefs>
-</ds:datastoreItem>
-</file>
-
-<file path=customXml/itemProps17.xml><?xml version="1.0" encoding="utf-8"?>
+<file path=customXml/itemProps4.xml><?xml version="1.0" encoding="utf-8"?>
 <ds:datastoreItem xmlns:ds="http://schemas.openxmlformats.org/officeDocument/2006/customXml" ds:itemID="{D72A95EB-8536-47FD-944A-8DD76726FC96}">
   <ds:schemaRefs/>
 </ds:datastoreItem>
 </file>
 
-<file path=customXml/itemProps18.xml><?xml version="1.0" encoding="utf-8"?>
-<ds:datastoreItem xmlns:ds="http://schemas.openxmlformats.org/officeDocument/2006/customXml" ds:itemID="{B9AEDDE3-EA02-4A8F-B8F8-0606A0AA45FC}">
-  <ds:schemaRefs/>
-</ds:datastoreItem>
-</file>
-
-<file path=customXml/itemProps19.xml><?xml version="1.0" encoding="utf-8"?>
-<ds:datastoreItem xmlns:ds="http://schemas.openxmlformats.org/officeDocument/2006/customXml" ds:itemID="{C99E78A0-C9D4-446F-B674-4DD3E2B46C5D}">
-  <ds:schemaRefs/>
-</ds:datastoreItem>
-</file>
-
-<file path=customXml/itemProps2.xml><?xml version="1.0" encoding="utf-8"?>
+<file path=customXml/itemProps5.xml><?xml version="1.0" encoding="utf-8"?>
 <ds:datastoreItem xmlns:ds="http://schemas.openxmlformats.org/officeDocument/2006/customXml" ds:itemID="{058EED06-94C4-4781-888F-0A8BB816BC9F}">
   <ds:schemaRefs>
     <ds:schemaRef ds:uri="http://schemas.microsoft.com/office/2006/metadata/contentType"/>
@@ -27740,55 +27764,28 @@
 </ds:datastoreItem>
 </file>
 
-<file path=customXml/itemProps3.xml><?xml version="1.0" encoding="utf-8"?>
-<ds:datastoreItem xmlns:ds="http://schemas.openxmlformats.org/officeDocument/2006/customXml" ds:itemID="{56F2EE69-0CCA-4F48-BE22-EC4A886C57A7}">
+<file path=customXml/itemProps6.xml><?xml version="1.0" encoding="utf-8"?>
+<ds:datastoreItem xmlns:ds="http://schemas.openxmlformats.org/officeDocument/2006/customXml" ds:itemID="{F5A7E41D-6E7F-4B05-AFAB-F540BD4C068B}">
   <ds:schemaRefs>
-    <ds:schemaRef ds:uri="http://schemas.microsoft.com/office/infopath/2007/PartnerControls"/>
-    <ds:schemaRef ds:uri="http://purl.org/dc/elements/1.1/"/>
-    <ds:schemaRef ds:uri="http://schemas.microsoft.com/office/2006/metadata/properties"/>
-    <ds:schemaRef ds:uri="http://purl.org/dc/terms/"/>
-    <ds:schemaRef ds:uri="92e1255f-bb7b-4dc9-b051-584cc104eb44"/>
-    <ds:schemaRef ds:uri="http://schemas.openxmlformats.org/package/2006/metadata/core-properties"/>
-    <ds:schemaRef ds:uri="http://schemas.microsoft.com/office/2006/documentManagement/types"/>
-    <ds:schemaRef ds:uri="a6550eff-0fc9-443f-8e77-72cbcf778382"/>
-    <ds:schemaRef ds:uri="http://www.w3.org/XML/1998/namespace"/>
-    <ds:schemaRef ds:uri="http://purl.org/dc/dcmitype/"/>
+    <ds:schemaRef ds:uri="http://schemas.microsoft.com/sharepoint/v3/contenttype/forms"/>
   </ds:schemaRefs>
 </ds:datastoreItem>
 </file>
 
-<file path=customXml/itemProps4.xml><?xml version="1.0" encoding="utf-8"?>
-<ds:datastoreItem xmlns:ds="http://schemas.openxmlformats.org/officeDocument/2006/customXml" ds:itemID="{72516535-7702-46AF-9B1F-8623A67A824E}">
+<file path=customXml/itemProps7.xml><?xml version="1.0" encoding="utf-8"?>
+<ds:datastoreItem xmlns:ds="http://schemas.openxmlformats.org/officeDocument/2006/customXml" ds:itemID="{03AF3FDC-ACD1-46F3-A43E-782322DF9816}">
   <ds:schemaRefs/>
 </ds:datastoreItem>
 </file>
 
-<file path=customXml/itemProps5.xml><?xml version="1.0" encoding="utf-8"?>
-<ds:datastoreItem xmlns:ds="http://schemas.openxmlformats.org/officeDocument/2006/customXml" ds:itemID="{683FEB75-8CFA-449C-A6B1-B1E4A86A58A1}">
-  <ds:schemaRefs/>
-</ds:datastoreItem>
-</file>
-
-<file path=customXml/itemProps6.xml><?xml version="1.0" encoding="utf-8"?>
+<file path=customXml/itemProps8.xml><?xml version="1.0" encoding="utf-8"?>
 <ds:datastoreItem xmlns:ds="http://schemas.openxmlformats.org/officeDocument/2006/customXml" ds:itemID="{32BA7684-6BE4-4F73-B22E-30934AB379B8}">
   <ds:schemaRefs/>
 </ds:datastoreItem>
 </file>
 
-<file path=customXml/itemProps7.xml><?xml version="1.0" encoding="utf-8"?>
-<ds:datastoreItem xmlns:ds="http://schemas.openxmlformats.org/officeDocument/2006/customXml" ds:itemID="{58CC0B31-82B9-497A-9A2E-F3F72D0BBDAD}">
-  <ds:schemaRefs/>
-</ds:datastoreItem>
-</file>
-
-<file path=customXml/itemProps8.xml><?xml version="1.0" encoding="utf-8"?>
-<ds:datastoreItem xmlns:ds="http://schemas.openxmlformats.org/officeDocument/2006/customXml" ds:itemID="{AB2F4486-6448-49E3-8249-BB9C7492711D}">
-  <ds:schemaRefs/>
-</ds:datastoreItem>
-</file>
-
 <file path=customXml/itemProps9.xml><?xml version="1.0" encoding="utf-8"?>
-<ds:datastoreItem xmlns:ds="http://schemas.openxmlformats.org/officeDocument/2006/customXml" ds:itemID="{C750C5DC-043F-4BD3-940C-EB6F7625E286}">
+<ds:datastoreItem xmlns:ds="http://schemas.openxmlformats.org/officeDocument/2006/customXml" ds:itemID="{C09F197C-6A49-47D0-B877-F88807989676}">
   <ds:schemaRefs/>
 </ds:datastoreItem>
 </file>
</xml_diff>

<commit_message>
Fixed bug in realization of packet pacing in scream_sender.cpp Added option to set the packet pacing overhead
</commit_message>
<xml_diff>
--- a/code/bw-test-tool/SCReAM-BW-test-tool.pptx
+++ b/code/bw-test-tool/SCReAM-BW-test-tool.pptx
@@ -2662,7 +2662,7 @@
               </a:rPr>
               <a:t>  |  2020-03-20  |  Public  |  Page </a:t>
             </a:r>
-            <a:fld id="{59E319C9-70DD-43F7-AB89-A21D1AB17029}" type="slidenum">
+            <a:fld id="{93A976C2-68B9-4E03-B98F-32FE7E7336E2}" type="slidenum">
               <a:rPr lang="en-US" sz="800" b="0" i="0" u="none" smtClean="0">
                 <a:solidFill>
                   <a:srgbClr val="1A1816"/>
@@ -3167,7 +3167,7 @@
               </a:rPr>
               <a:t>  |  2020-03-20  |  Public  |  Page </a:t>
             </a:r>
-            <a:fld id="{92CC8A64-8A3D-44D1-AE15-4EAD3DF9C808}" type="slidenum">
+            <a:fld id="{6FEBC5E3-754B-4924-AFE6-05F207B05342}" type="slidenum">
               <a:rPr lang="en-US" sz="800" b="0" i="0" u="none" smtClean="0">
                 <a:solidFill>
                   <a:schemeClr val="bg1"/>
@@ -3480,7 +3480,7 @@
               </a:rPr>
               <a:t>  |  2020-03-20  |  Public  |  Page </a:t>
             </a:r>
-            <a:fld id="{53948D0D-7C63-41ED-9544-D8BFBDACA8F5}" type="slidenum">
+            <a:fld id="{BB5A701F-BA32-4A90-9FB8-57072253961C}" type="slidenum">
               <a:rPr lang="en-US" sz="800" b="0" i="0" u="none" smtClean="0">
                 <a:solidFill>
                   <a:srgbClr val="1A1816"/>
@@ -3713,7 +3713,7 @@
               </a:rPr>
               <a:t>  |  2020-03-20  |  Public  |  Page </a:t>
             </a:r>
-            <a:fld id="{9C729B41-1BAB-4A9E-AFCA-FC6D9C42347B}" type="slidenum">
+            <a:fld id="{8C848BBE-9EF6-466B-9162-421630EA19AC}" type="slidenum">
               <a:rPr lang="en-US" sz="800" b="0" i="0" u="none" smtClean="0">
                 <a:solidFill>
                   <a:srgbClr val="1A1816"/>
@@ -3873,7 +3873,7 @@
               </a:rPr>
               <a:t>  |  2020-03-20  |  Public  |  Page </a:t>
             </a:r>
-            <a:fld id="{FD87DEDA-D1F6-47E6-8918-0CF8BEC71AA8}" type="slidenum">
+            <a:fld id="{A7155596-B371-4E0F-8155-12F3EE7616C0}" type="slidenum">
               <a:rPr lang="en-US" sz="800" b="0" i="0" u="none" smtClean="0">
                 <a:solidFill>
                   <a:srgbClr val="1A1816"/>
@@ -4079,7 +4079,7 @@
               </a:rPr>
               <a:t>  |  2020-03-20  |  Public  |  Page </a:t>
             </a:r>
-            <a:fld id="{D9F4B2F3-4CFE-40A0-8FA4-73B610D4B2A4}" type="slidenum">
+            <a:fld id="{220F0A1E-68E9-4F7A-B18E-B2BDD365EA67}" type="slidenum">
               <a:rPr lang="en-US" sz="800" b="0" i="0" u="none" smtClean="0">
                 <a:solidFill>
                   <a:srgbClr val="1A1816"/>
@@ -4377,7 +4377,7 @@
               </a:rPr>
               <a:t>  |  2020-03-20  |  Public  |  Page </a:t>
             </a:r>
-            <a:fld id="{7B715924-2E22-4573-B96E-5A432F8D5666}" type="slidenum">
+            <a:fld id="{16EF87F7-EDFA-4E75-8B82-6C14EBC0C129}" type="slidenum">
               <a:rPr lang="en-US" sz="800" b="0" i="0" u="none" smtClean="0">
                 <a:solidFill>
                   <a:schemeClr val="bg1"/>
@@ -4675,7 +4675,7 @@
               </a:rPr>
               <a:t>  |  2020-03-20  |  Public  |  Page </a:t>
             </a:r>
-            <a:fld id="{99B36FAA-BC93-421A-A479-C7363C8BE186}" type="slidenum">
+            <a:fld id="{D32D34BB-6E7B-455C-A05B-EBD679AF53C6}" type="slidenum">
               <a:rPr lang="en-US" sz="800" b="0" i="0" u="none" smtClean="0">
                 <a:solidFill>
                   <a:schemeClr val="bg1"/>
@@ -4973,7 +4973,7 @@
               </a:rPr>
               <a:t>  |  2020-03-20  |  Public  |  Page </a:t>
             </a:r>
-            <a:fld id="{391803F6-7477-469C-9F65-8B089EEAD2AB}" type="slidenum">
+            <a:fld id="{2CC723C2-24D2-4D7A-BDBB-B94E67E7CB70}" type="slidenum">
               <a:rPr lang="en-US" sz="800" b="0" i="0" u="none" smtClean="0">
                 <a:solidFill>
                   <a:schemeClr val="bg1"/>
@@ -5271,7 +5271,7 @@
               </a:rPr>
               <a:t>  |  2020-03-20  |  Public  |  Page </a:t>
             </a:r>
-            <a:fld id="{F8B34639-3BF6-4CDB-822D-A4D438957793}" type="slidenum">
+            <a:fld id="{013CF3C3-033D-4C5A-AB84-E7C9DD964DD7}" type="slidenum">
               <a:rPr lang="en-US" sz="800" b="0" i="0" u="none" smtClean="0">
                 <a:solidFill>
                   <a:schemeClr val="bg1"/>
@@ -5569,7 +5569,7 @@
               </a:rPr>
               <a:t>  |  2020-03-20  |  Public  |  Page </a:t>
             </a:r>
-            <a:fld id="{D58B6655-2EEF-4A40-B253-BDA0ECA7C5C0}" type="slidenum">
+            <a:fld id="{31BD8FB7-3349-4A89-8635-128F48613FDB}" type="slidenum">
               <a:rPr lang="en-US" sz="800" b="0" i="0" u="none" smtClean="0">
                 <a:solidFill>
                   <a:schemeClr val="bg1"/>
@@ -6083,7 +6083,7 @@
               </a:rPr>
               <a:t>  |  2020-03-20  |  Public  |  Page </a:t>
             </a:r>
-            <a:fld id="{0AE8BE08-BD3C-4201-8C12-15D2BCF50D01}" type="slidenum">
+            <a:fld id="{F1B0602B-D3DE-4B6B-A758-37549524B3B2}" type="slidenum">
               <a:rPr lang="en-US" sz="800" b="0" i="0" u="none" smtClean="0">
                 <a:solidFill>
                   <a:schemeClr val="bg1"/>
@@ -6387,7 +6387,7 @@
               </a:rPr>
               <a:t>  |  2020-03-20  |  Public  |  Page </a:t>
             </a:r>
-            <a:fld id="{D061E57E-0744-4A2A-834E-DF35E1DB3746}" type="slidenum">
+            <a:fld id="{DCC99C9F-FD59-430B-90FC-69CDFC23204D}" type="slidenum">
               <a:rPr lang="en-US" sz="800" b="0" i="0" u="none" smtClean="0">
                 <a:solidFill>
                   <a:schemeClr val="bg1"/>
@@ -6685,7 +6685,7 @@
               </a:rPr>
               <a:t>  |  2020-03-20  |  Public  |  Page </a:t>
             </a:r>
-            <a:fld id="{3875BBB0-0AE1-4E59-BBB6-32DFDB5BB51D}" type="slidenum">
+            <a:fld id="{44E1A52B-8C6E-44F8-B413-0FB5C6537438}" type="slidenum">
               <a:rPr lang="en-US" sz="800" b="0" i="0" u="none" smtClean="0">
                 <a:solidFill>
                   <a:schemeClr val="bg1"/>
@@ -6972,7 +6972,7 @@
               </a:rPr>
               <a:t>  |  2020-03-20  |  Public  |  Page </a:t>
             </a:r>
-            <a:fld id="{46F4D724-0898-48BD-9F46-500C0E332C0A}" type="slidenum">
+            <a:fld id="{518AA979-339A-43D5-9F95-0C31CCE8E79A}" type="slidenum">
               <a:rPr lang="en-US" sz="800" b="0" i="0" u="none" smtClean="0">
                 <a:solidFill>
                   <a:srgbClr val="1A1816"/>
@@ -7259,7 +7259,7 @@
               </a:rPr>
               <a:t>  |  2020-03-20  |  Public  |  Page </a:t>
             </a:r>
-            <a:fld id="{D5628C4A-E587-4550-A03E-404E61B062B2}" type="slidenum">
+            <a:fld id="{095648FC-EC08-4E32-9880-D134EB76D408}" type="slidenum">
               <a:rPr lang="en-US" sz="800" b="0" i="0" u="none" smtClean="0">
                 <a:solidFill>
                   <a:srgbClr val="1A1816"/>
@@ -7552,7 +7552,7 @@
               </a:rPr>
               <a:t>  |  2020-03-20  |  Public  |  Page </a:t>
             </a:r>
-            <a:fld id="{2DEDC885-85E7-440C-9C41-5ABBFE2FE6B0}" type="slidenum">
+            <a:fld id="{16478756-113A-4412-B85D-017F39896EA6}" type="slidenum">
               <a:rPr lang="en-US" sz="800" b="0" i="0" u="none" smtClean="0">
                 <a:solidFill>
                   <a:srgbClr val="1A1816"/>
@@ -7839,7 +7839,7 @@
               </a:rPr>
               <a:t>  |  2020-03-20  |  Public  |  Page </a:t>
             </a:r>
-            <a:fld id="{AF69268F-BB42-4FE2-8698-D0A31B04E0A4}" type="slidenum">
+            <a:fld id="{9D4DF839-D999-4312-A62F-3D0EDFCA8708}" type="slidenum">
               <a:rPr lang="en-US" sz="800" b="0" i="0" u="none" smtClean="0">
                 <a:solidFill>
                   <a:srgbClr val="1A1816"/>
@@ -8161,7 +8161,7 @@
               </a:rPr>
               <a:t>  |  2020-03-20  |  Public  |  Page </a:t>
             </a:r>
-            <a:fld id="{C7ED2209-9322-4D59-B4AE-75BC075E6B1C}" type="slidenum">
+            <a:fld id="{74D2E6DC-3BC0-4720-B5F8-49D5C85A891D}" type="slidenum">
               <a:rPr lang="en-US" sz="800" b="0" i="0" u="none" smtClean="0">
                 <a:solidFill>
                   <a:srgbClr val="1A1816"/>
@@ -8448,7 +8448,7 @@
               </a:rPr>
               <a:t>  |  2020-03-20  |  Public  |  Page </a:t>
             </a:r>
-            <a:fld id="{59185149-34E8-4CFB-B9CC-41AD539965F7}" type="slidenum">
+            <a:fld id="{4014188B-5817-4D95-AF86-E652111A53D5}" type="slidenum">
               <a:rPr lang="en-US" sz="800" b="0" i="0" u="none" smtClean="0">
                 <a:solidFill>
                   <a:srgbClr val="1A1816"/>
@@ -8770,7 +8770,7 @@
               </a:rPr>
               <a:t>  |  2020-03-20  |  Public  |  Page </a:t>
             </a:r>
-            <a:fld id="{E0DB0CA0-EA05-4B55-910A-142789E111CB}" type="slidenum">
+            <a:fld id="{72DB256C-78AF-4012-A243-1A848EA80FFF}" type="slidenum">
               <a:rPr lang="en-US" sz="800" b="0" i="0" u="none" smtClean="0">
                 <a:solidFill>
                   <a:srgbClr val="1A1816"/>
@@ -9132,7 +9132,7 @@
               </a:rPr>
               <a:t>  |  2020-03-20  |  Public  |  Page </a:t>
             </a:r>
-            <a:fld id="{EC7B2A69-B9E9-4E35-9DD6-E2C5C33ADF48}" type="slidenum">
+            <a:fld id="{013C2E00-263A-4036-8E41-B44AFD6DE070}" type="slidenum">
               <a:rPr lang="en-US" sz="800" b="0" i="0" u="none" smtClean="0">
                 <a:solidFill>
                   <a:srgbClr val="1A1816"/>
@@ -9474,7 +9474,7 @@
               </a:rPr>
               <a:t>  |  2020-03-20  |  Public  |  Page </a:t>
             </a:r>
-            <a:fld id="{26F8E415-8015-4C38-8FC8-0591F16DEAE2}" type="slidenum">
+            <a:fld id="{524A8A03-9B2D-46A6-8B30-7A946FE0F7CF}" type="slidenum">
               <a:rPr lang="en-US" sz="800" b="0" i="0" u="none" smtClean="0">
                 <a:solidFill>
                   <a:srgbClr val="1A1816"/>
@@ -9823,7 +9823,7 @@
               </a:rPr>
               <a:t>  |  2020-03-20  |  Public  |  Page </a:t>
             </a:r>
-            <a:fld id="{779B8B2B-C39D-45B0-A3B9-7A138CBC3748}" type="slidenum">
+            <a:fld id="{101EA80E-6C5B-4785-9218-22CAF260C032}" type="slidenum">
               <a:rPr lang="en-US" sz="800" b="0" i="0" u="none" smtClean="0">
                 <a:solidFill>
                   <a:srgbClr val="1A1816"/>
@@ -10185,7 +10185,7 @@
               </a:rPr>
               <a:t>  |  2020-03-20  |  Public  |  Page </a:t>
             </a:r>
-            <a:fld id="{2F345A06-E5E0-4808-BC44-4896F63AA4B4}" type="slidenum">
+            <a:fld id="{B9F699AC-D438-4647-A5B0-0F64FF047309}" type="slidenum">
               <a:rPr lang="en-US" sz="800" b="0" i="0" u="none" smtClean="0">
                 <a:solidFill>
                   <a:srgbClr val="1A1816"/>
@@ -10547,7 +10547,7 @@
               </a:rPr>
               <a:t>  |  2020-03-20  |  Public  |  Page </a:t>
             </a:r>
-            <a:fld id="{31F00298-4E8C-4AF4-A07D-A51047C8AE42}" type="slidenum">
+            <a:fld id="{BEE87B68-D69C-49E7-A0CA-7F2384F15F9A}" type="slidenum">
               <a:rPr lang="en-US" sz="800" b="0" i="0" u="none" smtClean="0">
                 <a:solidFill>
                   <a:srgbClr val="1A1816"/>
@@ -10909,7 +10909,7 @@
               </a:rPr>
               <a:t>  |  2020-03-20  |  Public  |  Page </a:t>
             </a:r>
-            <a:fld id="{4F4E185F-DC8C-48AF-BEAC-5102F5698F8C}" type="slidenum">
+            <a:fld id="{6250B935-A7B1-4569-AB65-040AB88A9A05}" type="slidenum">
               <a:rPr lang="en-US" sz="800" b="0" i="0" u="none" smtClean="0">
                 <a:solidFill>
                   <a:srgbClr val="1A1816"/>
@@ -11271,7 +11271,7 @@
               </a:rPr>
               <a:t>  |  2020-03-20  |  Public  |  Page </a:t>
             </a:r>
-            <a:fld id="{04A1CEDE-7DCE-45EE-A0F6-2C66EE2D8AC8}" type="slidenum">
+            <a:fld id="{C8481C84-9DE6-4A79-B2E3-F7F76A1B0745}" type="slidenum">
               <a:rPr lang="en-US" sz="800" b="0" i="0" u="none" smtClean="0">
                 <a:solidFill>
                   <a:srgbClr val="1A1816"/>
@@ -11693,7 +11693,7 @@
               </a:rPr>
               <a:t>  |  2020-03-20  |  Public  |  Page </a:t>
             </a:r>
-            <a:fld id="{C81C181F-33AD-4FF4-84DA-F51370375B46}" type="slidenum">
+            <a:fld id="{40B0A48A-2D1E-45F4-87F5-7764B9CE1CCA}" type="slidenum">
               <a:rPr lang="en-US" sz="800" b="0" i="0" u="none" smtClean="0">
                 <a:solidFill>
                   <a:srgbClr val="1A1816"/>
@@ -12109,7 +12109,7 @@
               </a:rPr>
               <a:t>  |  2020-03-20  |  Public  |  Page </a:t>
             </a:r>
-            <a:fld id="{4E8168CE-AECC-4C56-9471-895A8BD07657}" type="slidenum">
+            <a:fld id="{26BAC0FA-FE2D-448B-86B6-1614A4E2574F}" type="slidenum">
               <a:rPr lang="en-US" sz="800" b="0" i="0" u="none" smtClean="0">
                 <a:solidFill>
                   <a:srgbClr val="1A1816"/>
@@ -12584,7 +12584,7 @@
               </a:rPr>
               <a:t>  |  2020-03-20  |  Public  |  Page </a:t>
             </a:r>
-            <a:fld id="{FAB19D3E-563D-44F1-92DE-E3F2D2187988}" type="slidenum">
+            <a:fld id="{5F29BF83-2E54-4C39-8A7A-A386F9BCDBA9}" type="slidenum">
               <a:rPr lang="en-US" sz="800" b="0" i="0" u="none" smtClean="0">
                 <a:solidFill>
                   <a:srgbClr val="1A1816"/>
@@ -13079,7 +13079,7 @@
               </a:rPr>
               <a:t>  |  2020-03-20  |  Public  |  Page </a:t>
             </a:r>
-            <a:fld id="{EBE4C479-C258-4E99-86D2-BBC42195E13E}" type="slidenum">
+            <a:fld id="{F12E475D-DDD8-48A1-A39A-2350CC0E5DF5}" type="slidenum">
               <a:rPr lang="en-US" sz="800" b="0" i="0" u="none" smtClean="0">
                 <a:solidFill>
                   <a:srgbClr val="1A1816"/>
@@ -13535,7 +13535,7 @@
               </a:rPr>
               <a:t>  |  2020-03-20  |  Public  |  Page </a:t>
             </a:r>
-            <a:fld id="{53053FB8-8F9A-4B98-9D84-431212DA677C}" type="slidenum">
+            <a:fld id="{538EF37F-E7AC-4346-8AE1-2AF25A982090}" type="slidenum">
               <a:rPr lang="en-US" sz="800" b="0" i="0" u="none" smtClean="0">
                 <a:solidFill>
                   <a:srgbClr val="1A1816"/>
@@ -13923,7 +13923,7 @@
               </a:rPr>
               <a:t>  |  2020-03-20  |  Public  |  Page </a:t>
             </a:r>
-            <a:fld id="{65DB74F9-4D40-45F0-BA9B-960F4D880EFC}" type="slidenum">
+            <a:fld id="{14D73CBF-1DB9-45A4-ABC5-F94CDE045F7C}" type="slidenum">
               <a:rPr lang="en-US" sz="800" b="0" i="0" u="none" smtClean="0">
                 <a:solidFill>
                   <a:schemeClr val="bg1"/>
@@ -14442,7 +14442,7 @@
               </a:rPr>
               <a:t>  |  2020-03-20  |  Public  |  Page </a:t>
             </a:r>
-            <a:fld id="{CCA6B94A-5E1E-420F-9EBB-1722FBB1EAA9}" type="slidenum">
+            <a:fld id="{465E82EE-086D-4BE1-982D-9A5149876B09}" type="slidenum">
               <a:rPr lang="en-US" sz="800" b="0" i="0" u="none" smtClean="0">
                 <a:solidFill>
                   <a:srgbClr val="1A1816"/>
@@ -15151,7 +15151,7 @@
               </a:rPr>
               <a:t>  |  2020-03-20  |  Public  |  Page </a:t>
             </a:r>
-            <a:fld id="{2515B8BC-5C28-4F12-BFB2-2411671D12E6}" type="slidenum">
+            <a:fld id="{0B924549-DEE7-453A-9CAE-C3C4C40BB056}" type="slidenum">
               <a:rPr lang="en-US" sz="800" b="0" i="0" u="none" smtClean="0">
                 <a:solidFill>
                   <a:srgbClr val="1A1816"/>
@@ -16630,7 +16630,7 @@
               </a:rPr>
               <a:t>  |  2020-03-20  |  Public  |  Page </a:t>
             </a:r>
-            <a:fld id="{FFE649F0-7470-406E-8647-27155E870F41}" type="slidenum">
+            <a:fld id="{8361465D-C9BF-49D3-BF02-29708BF463F8}" type="slidenum">
               <a:rPr lang="en-US" sz="800" b="0" i="0" u="none" smtClean="0">
                 <a:solidFill>
                   <a:schemeClr val="bg1"/>
@@ -17142,7 +17142,7 @@
               </a:rPr>
               <a:t>  |  2020-03-20  |  Public  |  Page </a:t>
             </a:r>
-            <a:fld id="{A90CD43A-E6E3-450C-9C7F-E785A9AF711E}" type="slidenum">
+            <a:fld id="{F4179AF7-165F-4EE5-9D6F-070F399679D3}" type="slidenum">
               <a:rPr lang="en-US" sz="800" b="0" i="0" u="none" smtClean="0">
                 <a:solidFill>
                   <a:schemeClr val="bg1"/>
@@ -17537,7 +17537,7 @@
               </a:rPr>
               <a:t>  |  2020-03-20  |  Public  |  Page </a:t>
             </a:r>
-            <a:fld id="{4FB33B4B-E03E-4E49-9AEF-F519A8518653}" type="slidenum">
+            <a:fld id="{5ABFF242-CA7F-4F62-B758-6848D004AFE0}" type="slidenum">
               <a:rPr lang="en-US" sz="800" b="0" i="0" u="none" smtClean="0">
                 <a:solidFill>
                   <a:schemeClr val="bg1"/>
@@ -18037,7 +18037,7 @@
               </a:rPr>
               <a:t>  |  2020-03-20  |  Public  |  Page </a:t>
             </a:r>
-            <a:fld id="{20270C89-385E-4EAC-93FE-894BE1494F45}" type="slidenum">
+            <a:fld id="{5350E911-A6AF-4B4F-9DFC-51AD57EF76CA}" type="slidenum">
               <a:rPr lang="en-US" sz="800" b="0" i="0" u="none" smtClean="0">
                 <a:solidFill>
                   <a:schemeClr val="bg1"/>
@@ -18537,7 +18537,7 @@
               </a:rPr>
               <a:t>  |  2020-03-20  |  Public  |  Page </a:t>
             </a:r>
-            <a:fld id="{FC94CCE9-F65C-4F37-A015-BE6D1086C337}" type="slidenum">
+            <a:fld id="{083A4796-3AD7-49F3-A86A-C04412CC197B}" type="slidenum">
               <a:rPr lang="en-US" sz="800" b="0" i="0" u="none" smtClean="0">
                 <a:solidFill>
                   <a:schemeClr val="bg1"/>
@@ -19546,7 +19546,7 @@
             </a:br>
             <a:r>
               <a:rPr lang="en-US" sz="5400" dirty="0"/>
-              <a:t>2020-06-24</a:t>
+              <a:t>2020-06-25</a:t>
             </a:r>
           </a:p>
         </p:txBody>
@@ -23175,7 +23175,7 @@
           <a:graphicData uri="http://schemas.openxmlformats.org/presentationml/2006/ole">
             <mc:AlternateContent xmlns:mc="http://schemas.openxmlformats.org/markup-compatibility/2006">
               <mc:Choice xmlns:v="urn:schemas-microsoft-com:vml" Requires="v">
-                <p:oleObj spid="_x0000_s1055" name="Visio" r:id="rId5" imgW="2533577" imgH="3257685" progId="Visio.Drawing.11">
+                <p:oleObj spid="_x0000_s1057" name="Visio" r:id="rId5" imgW="2533577" imgH="3257685" progId="Visio.Drawing.11">
                   <p:embed/>
                 </p:oleObj>
               </mc:Choice>
@@ -25488,10 +25488,10 @@
       </p:sp>
       <p:pic>
         <p:nvPicPr>
-          <p:cNvPr id="4" name="Picture 3" descr="A close up of text on a black background&#10;&#10;Description automatically generated">
+          <p:cNvPr id="3" name="Picture 2" descr="A close up of text on a black background&#10;&#10;Description automatically generated">
             <a:extLst>
               <a:ext uri="{FF2B5EF4-FFF2-40B4-BE49-F238E27FC236}">
-                <a16:creationId xmlns:a16="http://schemas.microsoft.com/office/drawing/2014/main" id="{B2D0B2C3-F3E0-4C29-BEE5-8DC734A2C3A5}"/>
+                <a16:creationId xmlns:a16="http://schemas.microsoft.com/office/drawing/2014/main" id="{1261FD9A-4F6A-4A66-9306-E040F308C6F4}"/>
               </a:ext>
             </a:extLst>
           </p:cNvPr>
@@ -25514,8 +25514,8 @@
         </p:blipFill>
         <p:spPr>
           <a:xfrm>
-            <a:off x="5277721" y="0"/>
-            <a:ext cx="6914279" cy="6858000"/>
+            <a:off x="5562338" y="0"/>
+            <a:ext cx="6629662" cy="6858000"/>
           </a:xfrm>
           <a:prstGeom prst="rect">
             <a:avLst/>
@@ -27349,64 +27349,10 @@
 </file>
 
 <file path=customXml/item1.xml><?xml version="1.0" encoding="utf-8"?>
-<p:properties xmlns:p="http://schemas.microsoft.com/office/2006/metadata/properties" xmlns:xsi="http://www.w3.org/2001/XMLSchema-instance" xmlns:pc="http://schemas.microsoft.com/office/infopath/2007/PartnerControls">
-  <documentManagement/>
-</p:properties>
+<TemplafyFormConfiguration><![CDATA[{"formFields":[{"required":true,"placeholder":"","lines":0,"type":"textBox","name":"DocumentTitle","label":"Document Title","helpTexts":{"prefix":"","postfix":""},"spacing":{},"fullyQualifiedName":"DocumentTitle"},{"dataSource":"Confidentiality","displayColumn":"confidentiality","hideIfNoUserInteractionRequired":false,"distinct":true,"required":true,"autoSelectFirstOption":false,"type":"dropDown","name":"ConfidentialityClass","label":"Confidentiality Class","helpTexts":{"prefix":"","postfix":""},"spacing":{},"fullyQualifiedName":"ConfidentialityClass"},{"dataSource":"External Confidentiality label","displayColumn":"externalConfidentiality","hideIfNoUserInteractionRequired":false,"distinct":true,"required":false,"autoSelectFirstOption":false,"defaultValue":"1","type":"dropDown","name":"ExternalConfidentialityLabel","label":"External Confidentiality label","helpTexts":{"prefix":"","postfix":"If no external confidentiality class then please choose the blank value"},"spacing":{},"fullyQualifiedName":"ExternalConfidentialityLabel"},{"dataSource":"PowerPoint Document Type","column":"documentType","required":false,"placeholder":"","autoSelectFirstOption":false,"type":"comboBox","name":"DocTypePresentation","label":"Document Type Presentation","helpTexts":{"prefix":"","postfix":"If the document type differs from the default value, click on the X to delete and type/choose another type."},"spacing":{},"fullyQualifiedName":"DocTypePresentation"},{"required":false,"placeholder":"","lines":0,"type":"textBox","name":"DocumentNumber","label":"Document Number","helpTexts":{"prefix":"","postfix":""},"spacing":{},"fullyQualifiedName":"DocumentNumber"},{"dataSource":"Language code","displayColumn":"showName","hideIfNoUserInteractionRequired":false,"distinct":true,"required":false,"autoSelectFirstOption":false,"defaultValue":"1","type":"dropDown","name":"LanguageCode","label":"Language Code","helpTexts":{"prefix":"","postfix":"The language code will be appended to the Document No."},"spacing":{},"fullyQualifiedName":"LanguageCode"},{"dataSource":"Revision","column":"revision","required":false,"placeholder":"","autoSelectFirstOption":false,"type":"comboBox","name":"Revision","label":"Revision","helpTexts":{"prefix":"","postfix":""},"spacing":{},"fullyQualifiedName":"Revision"},{"required":false,"type":"datePicker","name":"Date","label":"Date","helpTexts":{"prefix":"","postfix":""},"spacing":{},"fullyQualifiedName":"Date"},{"type":"heading","name":"FooterVisibilityOptions","label":"Footer Visibility Options","helpTexts":{"prefix":"","postfix":""},"spacing":{},"fullyQualifiedName":"FooterVisibilityOptions"},{"dataSource":"PPT FooterVisibility","displayColumn":"templateType","hideIfNoUserInteractionRequired":false,"distinct":true,"required":true,"autoSelectFirstOption":false,"defaultValue":"1","type":"dropDown","name":"TemplateType","label":"Is this a document or presentation?","helpTexts":{"prefix":"","postfix":""},"spacing":{},"fullyQualifiedName":"TemplateType"},{"dataSource":"PPT FooterVisibility","displayColumn":"docTitle_label","hideIfNoUserInteractionRequired":false,"distinct":true,"required":false,"autoSelectFirstOption":true,"filter":{"column":"templateType","otherFieldName":"TemplateType","fullyQualifiedOtherFieldName":"TemplateType","otherFieldColumn":"TemplateType","formReference":"none","operator":"equals"},"type":"dropDown","name":"DocTitle","label":"Show document title in footer?","helpTexts":{"prefix":"","postfix":""},"spacing":{},"fullyQualifiedName":"DocTitle"},{"dataSource":"PPT FooterVisibility","displayColumn":"totalPageNo_text","hideIfNoUserInteractionRequired":false,"distinct":true,"required":false,"autoSelectFirstOption":true,"filter":{"column":"templateType","otherFieldName":"TemplateType","fullyQualifiedOtherFieldName":"TemplateType","otherFieldColumn":"TemplateType","formReference":"none","operator":"equals"},"type":"dropDown","name":"TotalPageNo","label":"Page numbering","helpTexts":{"prefix":"","postfix":""},"spacing":{},"fullyQualifiedName":"TotalPageNo"},{"required":false,"placeholder":"","lines":0,"defaultValue":"{{UserProfile.Prepared}}","type":"textBox","name":"Prepared","label":"Prepared By (Subject Responsible)","helpTexts":{"prefix":"","postfix":""},"spacing":{},"fullyQualifiedName":"Prepared"},{"required":false,"placeholder":"","lines":0,"type":"textBox","name":"ApprovedBy","label":"Approved By (Document Responsible)","helpTexts":{"prefix":"","postfix":""},"spacing":{},"fullyQualifiedName":"ApprovedBy"},{"required":false,"placeholder":"","lines":0,"type":"textBox","name":"Checked","label":"Checked","helpTexts":{"prefix":"","postfix":""},"spacing":{},"fullyQualifiedName":"Checked"},{"required":false,"placeholder":"","lines":0,"type":"textBox","name":"Reference","label":"Reference","helpTexts":{"prefix":"","postfix":""},"spacing":{},"fullyQualifiedName":"Reference"},{"required":false,"placeholder":"","lines":0,"type":"textBox","name":"Keywords","label":"Keywords","helpTexts":{"prefix":"","postfix":""},"spacing":{},"fullyQualifiedName":"Keywords"}],"formDataEntries":[{"name":"DocumentTitle","value":"HfKMJ7wB7KPEWJpFWibMqg=="},{"name":"ConfidentialityClass","value":"cT/FOwTWaPknrhRlNMh4SQ=="},{"name":"ExternalConfidentialityLabel","value":"u2D/MG3wyuAQhkGvE2fPaA=="},{"name":"LanguageCode","value":"5wlu7ZdPxHQj1W0w+yTNSg=="},{"name":"Date","value":"vb48xUhp/+BouvbbBJesXw=="},{"name":"TemplateType","value":"PxVEvJY8nE7m/hY9622Sng=="},{"name":"DocTitle","value":"PxVEvJY8nE7m/hY9622Sng=="},{"name":"TotalPageNo","value":"PxVEvJY8nE7m/hY9622Sng=="},{"name":"Prepared","value":"PqdHBiLjqdpOMxfLUK9Tonaq9XwuinzCFKYJ7RK3+SI="}]}]]></TemplafyFormConfiguration>
 </file>
 
 <file path=customXml/item10.xml><?xml version="1.0" encoding="utf-8"?>
-<TemplafySlideTemplateConfiguration><![CDATA[{"documentContentValidatorConfiguration":{"enableDocumentContentValidator":false,"documentContentValidatorVersion":0},"elementsMetadata":[],"slideId":"637037983905221558","enableDocumentContentUpdater":true,"version":"1.9"}]]></TemplafySlideTemplateConfiguration>
-</file>
-
-<file path=customXml/item11.xml><?xml version="1.0" encoding="utf-8"?>
-<TemplafySlideTemplateConfiguration><![CDATA[{"documentContentValidatorConfiguration":{"enableDocumentContentValidator":false,"documentContentValidatorVersion":0},"elementsMetadata":[],"slideId":"637037983905678162","enableDocumentContentUpdater":true,"version":"1.9"}]]></TemplafySlideTemplateConfiguration>
-</file>
-
-<file path=customXml/item12.xml><?xml version="1.0" encoding="utf-8"?>
-<TemplafySlideFormConfiguration><![CDATA[{"formFields":[],"formDataEntries":[]}]]></TemplafySlideFormConfiguration>
-</file>
-
-<file path=customXml/item13.xml><?xml version="1.0" encoding="utf-8"?>
-<TemplafySlideFormConfiguration><![CDATA[{"formFields":[],"formDataEntries":[]}]]></TemplafySlideFormConfiguration>
-</file>
-
-<file path=customXml/item14.xml><?xml version="1.0" encoding="utf-8"?>
-<TemplafySlideTemplateConfiguration><![CDATA[{"documentContentValidatorConfiguration":{"enableDocumentContentValidator":false,"documentContentValidatorVersion":0},"elementsMetadata":[],"slideId":"637037983905221557","enableDocumentContentUpdater":true,"version":"1.9"}]]></TemplafySlideTemplateConfiguration>
-</file>
-
-<file path=customXml/item15.xml><?xml version="1.0" encoding="utf-8"?>
-<TemplafySlideTemplateConfiguration><![CDATA[{"documentContentValidatorConfiguration":{"enableDocumentContentValidator":false,"documentContentValidatorVersion":0},"elementsMetadata":[],"slideId":"637171128435648944","enableDocumentContentUpdater":true,"version":"1.9"}]]></TemplafySlideTemplateConfiguration>
-</file>
-
-<file path=customXml/item16.xml><?xml version="1.0" encoding="utf-8"?>
-<TemplafySlideFormConfiguration><![CDATA[{"formFields":[],"formDataEntries":[]}]]></TemplafySlideFormConfiguration>
-</file>
-
-<file path=customXml/item17.xml><?xml version="1.0" encoding="utf-8"?>
-<TemplafySlideTemplateConfiguration><![CDATA[{"documentContentValidatorConfiguration":{"enableDocumentContentValidator":false,"documentContentValidatorVersion":0},"elementsMetadata":[],"slideId":"637171128435180813","enableDocumentContentUpdater":true,"version":"1.9"}]]></TemplafySlideTemplateConfiguration>
-</file>
-
-<file path=customXml/item18.xml><?xml version="1.0" encoding="utf-8"?>
-<TemplafyTemplateConfiguration><![CDATA[{"elementsMetadata":[{"type":"shape","id":"5d67e717-74bf-41a6-8dce-47082e2c1da1","elementConfiguration":{"inheritDimensions":"inheritNone","height":"1.34 cm","binding":"Form.LogoInsertion.Pplogoname","disableUpdates":false,"type":"image"}}],"transformationConfigurations":[{"language":"{{DocumentLanguage}}","disableUpdates":false,"type":"proofingLanguage"},{"propertyName":"FooterText","propertyValue":"true","disableUpdates":false,"type":"customDocumentProperty"},{"propertyName":"SecurityClass","propertyValue":"{{Form.ConfidentialityClass.Confidentiality}}","disableUpdates":false,"type":"customDocumentProperty"},{"propertyName":"ExtConf","propertyValue":"{{Form.ExternalConfidentialityLabel.ExternalConfidentiality}}","disableUpdates":false,"type":"customDocumentProperty"},{"propertyName":"Prepared","propertyValue":"{{Form.Prepared}}","disableUpdates":false,"type":"customDocumentProperty"},{"propertyName":"ApprovedBy","propertyValue":"{{Form.ApprovedBy}}","disableUpdates":false,"type":"customDocumentProperty"},{"propertyName":"DocNo","propertyValue":"{{Form.DocumentNumber}} {{Form.LanguageCode.LanguageCode}}","disableUpdates":false,"type":"customDocumentProperty"},{"propertyName":"Checked","propertyValue":"{{Form.Checked}}","disableUpdates":false,"type":"customDocumentProperty"},{"propertyName":"Date","propertyValue":"{{Form.Date}}","disableUpdates":false,"type":"customDocumentProperty"},{"propertyName":"Reference","propertyValue":"{{Form.Reference}}","disableUpdates":false,"type":"customDocumentProperty"},{"propertyName":"Title","propertyValue":"{{Form.DocumentTitle}}","disableUpdates":false,"type":"customDocumentProperty"},{"propertyName":"Keyword","propertyValue":"{{Form.Keywords}}","disableUpdates":false,"type":"customDocumentProperty"},{"propertyName":"DocumentType","propertyValue":"Presentation2011","disableUpdates":false,"type":"customDocumentProperty"},{"propertyName":"Language","propertyValue":"EnglishUS","disableUpdates":false,"type":"customDocumentProperty"},{"propertyName":"TemplateID","propertyValue":"FALSE","disableUpdates":false,"type":"customDocumentProperty"},{"propertyName":"ConfCtrl","propertyValue":"FALSE","disableUpdates":false,"type":"customDocumentProperty"},{"propertyName":"title","propertyValue":"{{Form.DocumentTitle}}","disableUpdates":false,"type":"documentProperty"},{"propertyName":"keywords","propertyValue":"{{Form.Keywords}}","disableUpdates":false,"type":"documentProperty"},{"propertyName":"creator","propertyValue":"{{Form.Prepared}}","disableUpdates":false,"type":"documentProperty"},{"propertyName":"DocTitle","propertyValue":"{{Form.DocTitle.DocTitle}}","disableUpdates":false,"type":"customDocumentProperty"},{"propertyName":"IsDocument","propertyValue":"{{Form.TemplateType.IsDocument}}","disableUpdates":false,"type":"customDocumentProperty"},{"propertyName":"IsPresentation","propertyValue":"{{Form.TemplateType.IsPresentation}}","disableUpdates":false,"type":"customDocumentProperty"},{"propertyName":"company","propertyValue":"Ericsson","disableUpdates":false,"type":"documentProperty"},{"propertyName":"PageNumberVisible","propertyValue":"{{Form.TotalPageNo.TotalPageNo_value}}","disableUpdates":false,"type":"customDocumentProperty"},{"propertyName":"Revision","propertyValue":"{{Form.Revision}}","disableUpdates":false,"type":"customDocumentProperty"},{"propertyName":"DocType","propertyValue":"{{Form.DocTypePresentation}}","disableUpdates":false,"type":"customDocumentProperty"},{"propertyName":"TemplateVersion","propertyValue":"R2A","disableUpdates":false,"type":"customDocumentProperty"},{"propertyName":"PackageNo","propertyValue":"LXA 119 603","disableUpdates":false,"type":"customDocumentProperty"},{"propertyName":"PackageVersion","propertyValue":"R6B","disableUpdates":false,"type":"customDocumentProperty"},{"propertyName":"TemplateName","propertyValue":"CXC 173 2731/1","disableUpdates":false,"type":"customDocumentProperty"},{"propertyName":"DocName","propertyValue":" ","disableUpdates":false,"type":"customDocumentProperty"},{"propertyName":"description","propertyValue":"{{Form.DocumentNumber}} {{Form.LanguageCode.LanguageCode}}\nRev {{Form.Revision}}","disableUpdates":false,"type":"documentProperty"}],"templateName":"New presentation (Standard landscape)","templateDescription":"","enableDocumentContentUpdater":true,"version":"1.9"}]]></TemplafyTemplateConfiguration>
-</file>
-
-<file path=customXml/item19.xml><?xml version="1.0" encoding="utf-8"?>
-<TemplafySlideFormConfiguration><![CDATA[{"formFields":[],"formDataEntries":[]}]]></TemplafySlideFormConfiguration>
-</file>
-
-<file path=customXml/item2.xml><?xml version="1.0" encoding="utf-8"?>
-<TemplafySlideFormConfiguration><![CDATA[{"formFields":[],"formDataEntries":[]}]]></TemplafySlideFormConfiguration>
-</file>
-
-<file path=customXml/item3.xml><?xml version="1.0" encoding="utf-8"?>
-<TemplafyFormConfiguration><![CDATA[{"formFields":[{"required":true,"placeholder":"","lines":0,"type":"textBox","name":"DocumentTitle","label":"Document Title","helpTexts":{"prefix":"","postfix":""},"spacing":{},"fullyQualifiedName":"DocumentTitle"},{"dataSource":"Confidentiality","displayColumn":"confidentiality","hideIfNoUserInteractionRequired":false,"distinct":true,"required":true,"autoSelectFirstOption":false,"type":"dropDown","name":"ConfidentialityClass","label":"Confidentiality Class","helpTexts":{"prefix":"","postfix":""},"spacing":{},"fullyQualifiedName":"ConfidentialityClass"},{"dataSource":"External Confidentiality label","displayColumn":"externalConfidentiality","hideIfNoUserInteractionRequired":false,"distinct":true,"required":false,"autoSelectFirstOption":false,"defaultValue":"1","type":"dropDown","name":"ExternalConfidentialityLabel","label":"External Confidentiality label","helpTexts":{"prefix":"","postfix":"If no external confidentiality class then please choose the blank value"},"spacing":{},"fullyQualifiedName":"ExternalConfidentialityLabel"},{"dataSource":"PowerPoint Document Type","column":"documentType","required":false,"placeholder":"","autoSelectFirstOption":false,"type":"comboBox","name":"DocTypePresentation","label":"Document Type Presentation","helpTexts":{"prefix":"","postfix":"If the document type differs from the default value, click on the X to delete and type/choose another type."},"spacing":{},"fullyQualifiedName":"DocTypePresentation"},{"required":false,"placeholder":"","lines":0,"type":"textBox","name":"DocumentNumber","label":"Document Number","helpTexts":{"prefix":"","postfix":""},"spacing":{},"fullyQualifiedName":"DocumentNumber"},{"dataSource":"Language code","displayColumn":"showName","hideIfNoUserInteractionRequired":false,"distinct":true,"required":false,"autoSelectFirstOption":false,"defaultValue":"1","type":"dropDown","name":"LanguageCode","label":"Language Code","helpTexts":{"prefix":"","postfix":"The language code will be appended to the Document No."},"spacing":{},"fullyQualifiedName":"LanguageCode"},{"dataSource":"Revision","column":"revision","required":false,"placeholder":"","autoSelectFirstOption":false,"type":"comboBox","name":"Revision","label":"Revision","helpTexts":{"prefix":"","postfix":""},"spacing":{},"fullyQualifiedName":"Revision"},{"required":false,"type":"datePicker","name":"Date","label":"Date","helpTexts":{"prefix":"","postfix":""},"spacing":{},"fullyQualifiedName":"Date"},{"type":"heading","name":"FooterVisibilityOptions","label":"Footer Visibility Options","helpTexts":{"prefix":"","postfix":""},"spacing":{},"fullyQualifiedName":"FooterVisibilityOptions"},{"dataSource":"PPT FooterVisibility","displayColumn":"templateType","hideIfNoUserInteractionRequired":false,"distinct":true,"required":true,"autoSelectFirstOption":false,"defaultValue":"1","type":"dropDown","name":"TemplateType","label":"Is this a document or presentation?","helpTexts":{"prefix":"","postfix":""},"spacing":{},"fullyQualifiedName":"TemplateType"},{"dataSource":"PPT FooterVisibility","displayColumn":"docTitle_label","hideIfNoUserInteractionRequired":false,"distinct":true,"required":false,"autoSelectFirstOption":true,"filter":{"column":"templateType","otherFieldName":"TemplateType","fullyQualifiedOtherFieldName":"TemplateType","otherFieldColumn":"TemplateType","formReference":"none","operator":"equals"},"type":"dropDown","name":"DocTitle","label":"Show document title in footer?","helpTexts":{"prefix":"","postfix":""},"spacing":{},"fullyQualifiedName":"DocTitle"},{"dataSource":"PPT FooterVisibility","displayColumn":"totalPageNo_text","hideIfNoUserInteractionRequired":false,"distinct":true,"required":false,"autoSelectFirstOption":true,"filter":{"column":"templateType","otherFieldName":"TemplateType","fullyQualifiedOtherFieldName":"TemplateType","otherFieldColumn":"TemplateType","formReference":"none","operator":"equals"},"type":"dropDown","name":"TotalPageNo","label":"Page numbering","helpTexts":{"prefix":"","postfix":""},"spacing":{},"fullyQualifiedName":"TotalPageNo"},{"required":false,"placeholder":"","lines":0,"defaultValue":"{{UserProfile.Prepared}}","type":"textBox","name":"Prepared","label":"Prepared By (Subject Responsible)","helpTexts":{"prefix":"","postfix":""},"spacing":{},"fullyQualifiedName":"Prepared"},{"required":false,"placeholder":"","lines":0,"type":"textBox","name":"ApprovedBy","label":"Approved By (Document Responsible)","helpTexts":{"prefix":"","postfix":""},"spacing":{},"fullyQualifiedName":"ApprovedBy"},{"required":false,"placeholder":"","lines":0,"type":"textBox","name":"Checked","label":"Checked","helpTexts":{"prefix":"","postfix":""},"spacing":{},"fullyQualifiedName":"Checked"},{"required":false,"placeholder":"","lines":0,"type":"textBox","name":"Reference","label":"Reference","helpTexts":{"prefix":"","postfix":""},"spacing":{},"fullyQualifiedName":"Reference"},{"required":false,"placeholder":"","lines":0,"type":"textBox","name":"Keywords","label":"Keywords","helpTexts":{"prefix":"","postfix":""},"spacing":{},"fullyQualifiedName":"Keywords"}],"formDataEntries":[{"name":"DocumentTitle","value":"HfKMJ7wB7KPEWJpFWibMqg=="},{"name":"ConfidentialityClass","value":"cT/FOwTWaPknrhRlNMh4SQ=="},{"name":"ExternalConfidentialityLabel","value":"u2D/MG3wyuAQhkGvE2fPaA=="},{"name":"LanguageCode","value":"5wlu7ZdPxHQj1W0w+yTNSg=="},{"name":"Date","value":"vb48xUhp/+BouvbbBJesXw=="},{"name":"TemplateType","value":"PxVEvJY8nE7m/hY9622Sng=="},{"name":"DocTitle","value":"PxVEvJY8nE7m/hY9622Sng=="},{"name":"TotalPageNo","value":"PxVEvJY8nE7m/hY9622Sng=="},{"name":"Prepared","value":"PqdHBiLjqdpOMxfLUK9Tonaq9XwuinzCFKYJ7RK3+SI="}]}]]></TemplafyFormConfiguration>
-</file>
-
-<file path=customXml/item4.xml><?xml version="1.0" encoding="utf-8"?>
-<TemplafySlideFormConfiguration><![CDATA[{"formFields":[],"formDataEntries":[]}]]></TemplafySlideFormConfiguration>
-</file>
-
-<file path=customXml/item5.xml><?xml version="1.0" encoding="utf-8"?>
 <ct:contentTypeSchema xmlns:ct="http://schemas.microsoft.com/office/2006/metadata/contentType" xmlns:ma="http://schemas.microsoft.com/office/2006/metadata/properties/metaAttributes" ct:_="" ma:_="" ma:contentTypeName="Document" ma:contentTypeID="0x0101002C8661F604A9A64C9627B875CBEE0D49" ma:contentTypeVersion="13" ma:contentTypeDescription="Create a new document." ma:contentTypeScope="" ma:versionID="efb89547655977800231d60c8e2388d5">
   <xsd:schema xmlns:xsd="http://www.w3.org/2001/XMLSchema" xmlns:xs="http://www.w3.org/2001/XMLSchema" xmlns:p="http://schemas.microsoft.com/office/2006/metadata/properties" xmlns:ns3="92e1255f-bb7b-4dc9-b051-584cc104eb44" xmlns:ns4="a6550eff-0fc9-443f-8e77-72cbcf778382" targetNamespace="http://schemas.microsoft.com/office/2006/metadata/properties" ma:root="true" ma:fieldsID="5147822fdb6803771ba7305cbc438486" ns3:_="" ns4:_="">
     <xsd:import namespace="92e1255f-bb7b-4dc9-b051-584cc104eb44"/>
@@ -27629,7 +27575,69 @@
 </ct:contentTypeSchema>
 </file>
 
+<file path=customXml/item11.xml><?xml version="1.0" encoding="utf-8"?>
+<TemplafySlideTemplateConfiguration><![CDATA[{"documentContentValidatorConfiguration":{"enableDocumentContentValidator":false,"documentContentValidatorVersion":0},"elementsMetadata":[],"slideId":"637171128435648944","enableDocumentContentUpdater":true,"version":"1.9"}]]></TemplafySlideTemplateConfiguration>
+</file>
+
+<file path=customXml/item12.xml><?xml version="1.0" encoding="utf-8"?>
+<TemplafySlideTemplateConfiguration><![CDATA[{"documentContentValidatorConfiguration":{"enableDocumentContentValidator":false,"documentContentValidatorVersion":0},"elementsMetadata":[],"slideId":"637037983905221558","enableDocumentContentUpdater":true,"version":"1.9"}]]></TemplafySlideTemplateConfiguration>
+</file>
+
+<file path=customXml/item13.xml><?xml version="1.0" encoding="utf-8"?>
+<TemplafySlideFormConfiguration><![CDATA[{"formFields":[],"formDataEntries":[]}]]></TemplafySlideFormConfiguration>
+</file>
+
+<file path=customXml/item14.xml><?xml version="1.0" encoding="utf-8"?>
+<TemplafySlideFormConfiguration><![CDATA[{"formFields":[],"formDataEntries":[]}]]></TemplafySlideFormConfiguration>
+</file>
+
+<file path=customXml/item15.xml><?xml version="1.0" encoding="utf-8"?>
+<TemplafySlideTemplateConfiguration><![CDATA[{"elementsMetadata":[],"documentContentValidatorConfiguration":{"enableDocumentContentValidator":false,"documentContentValidatorVersion":0},"slideId":"637027476704980324","enableDocumentContentUpdater":true,"version":"1.9"}]]></TemplafySlideTemplateConfiguration>
+</file>
+
+<file path=customXml/item16.xml><?xml version="1.0" encoding="utf-8"?>
+<TemplafySlideTemplateConfiguration><![CDATA[{"documentContentValidatorConfiguration":{"enableDocumentContentValidator":false,"documentContentValidatorVersion":0},"elementsMetadata":[],"slideId":"637037983905221557","enableDocumentContentUpdater":true,"version":"1.9"}]]></TemplafySlideTemplateConfiguration>
+</file>
+
+<file path=customXml/item17.xml><?xml version="1.0" encoding="utf-8"?>
+<TemplafySlideFormConfiguration><![CDATA[{"formFields":[],"formDataEntries":[]}]]></TemplafySlideFormConfiguration>
+</file>
+
+<file path=customXml/item18.xml><?xml version="1.0" encoding="utf-8"?>
+<TemplafySlideFormConfiguration><![CDATA[{"formFields":[],"formDataEntries":[]}]]></TemplafySlideFormConfiguration>
+</file>
+
+<file path=customXml/item19.xml><?xml version="1.0" encoding="utf-8"?>
+<TemplafyTemplateConfiguration><![CDATA[{"elementsMetadata":[{"type":"shape","id":"5d67e717-74bf-41a6-8dce-47082e2c1da1","elementConfiguration":{"inheritDimensions":"inheritNone","height":"1.34 cm","binding":"Form.LogoInsertion.Pplogoname","disableUpdates":false,"type":"image"}}],"transformationConfigurations":[{"language":"{{DocumentLanguage}}","disableUpdates":false,"type":"proofingLanguage"},{"propertyName":"FooterText","propertyValue":"true","disableUpdates":false,"type":"customDocumentProperty"},{"propertyName":"SecurityClass","propertyValue":"{{Form.ConfidentialityClass.Confidentiality}}","disableUpdates":false,"type":"customDocumentProperty"},{"propertyName":"ExtConf","propertyValue":"{{Form.ExternalConfidentialityLabel.ExternalConfidentiality}}","disableUpdates":false,"type":"customDocumentProperty"},{"propertyName":"Prepared","propertyValue":"{{Form.Prepared}}","disableUpdates":false,"type":"customDocumentProperty"},{"propertyName":"ApprovedBy","propertyValue":"{{Form.ApprovedBy}}","disableUpdates":false,"type":"customDocumentProperty"},{"propertyName":"DocNo","propertyValue":"{{Form.DocumentNumber}} {{Form.LanguageCode.LanguageCode}}","disableUpdates":false,"type":"customDocumentProperty"},{"propertyName":"Checked","propertyValue":"{{Form.Checked}}","disableUpdates":false,"type":"customDocumentProperty"},{"propertyName":"Date","propertyValue":"{{Form.Date}}","disableUpdates":false,"type":"customDocumentProperty"},{"propertyName":"Reference","propertyValue":"{{Form.Reference}}","disableUpdates":false,"type":"customDocumentProperty"},{"propertyName":"Title","propertyValue":"{{Form.DocumentTitle}}","disableUpdates":false,"type":"customDocumentProperty"},{"propertyName":"Keyword","propertyValue":"{{Form.Keywords}}","disableUpdates":false,"type":"customDocumentProperty"},{"propertyName":"DocumentType","propertyValue":"Presentation2011","disableUpdates":false,"type":"customDocumentProperty"},{"propertyName":"Language","propertyValue":"EnglishUS","disableUpdates":false,"type":"customDocumentProperty"},{"propertyName":"TemplateID","propertyValue":"FALSE","disableUpdates":false,"type":"customDocumentProperty"},{"propertyName":"ConfCtrl","propertyValue":"FALSE","disableUpdates":false,"type":"customDocumentProperty"},{"propertyName":"title","propertyValue":"{{Form.DocumentTitle}}","disableUpdates":false,"type":"documentProperty"},{"propertyName":"keywords","propertyValue":"{{Form.Keywords}}","disableUpdates":false,"type":"documentProperty"},{"propertyName":"creator","propertyValue":"{{Form.Prepared}}","disableUpdates":false,"type":"documentProperty"},{"propertyName":"DocTitle","propertyValue":"{{Form.DocTitle.DocTitle}}","disableUpdates":false,"type":"customDocumentProperty"},{"propertyName":"IsDocument","propertyValue":"{{Form.TemplateType.IsDocument}}","disableUpdates":false,"type":"customDocumentProperty"},{"propertyName":"IsPresentation","propertyValue":"{{Form.TemplateType.IsPresentation}}","disableUpdates":false,"type":"customDocumentProperty"},{"propertyName":"company","propertyValue":"Ericsson","disableUpdates":false,"type":"documentProperty"},{"propertyName":"PageNumberVisible","propertyValue":"{{Form.TotalPageNo.TotalPageNo_value}}","disableUpdates":false,"type":"customDocumentProperty"},{"propertyName":"Revision","propertyValue":"{{Form.Revision}}","disableUpdates":false,"type":"customDocumentProperty"},{"propertyName":"DocType","propertyValue":"{{Form.DocTypePresentation}}","disableUpdates":false,"type":"customDocumentProperty"},{"propertyName":"TemplateVersion","propertyValue":"R2A","disableUpdates":false,"type":"customDocumentProperty"},{"propertyName":"PackageNo","propertyValue":"LXA 119 603","disableUpdates":false,"type":"customDocumentProperty"},{"propertyName":"PackageVersion","propertyValue":"R6B","disableUpdates":false,"type":"customDocumentProperty"},{"propertyName":"TemplateName","propertyValue":"CXC 173 2731/1","disableUpdates":false,"type":"customDocumentProperty"},{"propertyName":"DocName","propertyValue":" ","disableUpdates":false,"type":"customDocumentProperty"},{"propertyName":"description","propertyValue":"{{Form.DocumentNumber}} {{Form.LanguageCode.LanguageCode}}\nRev {{Form.Revision}}","disableUpdates":false,"type":"documentProperty"}],"templateName":"New presentation (Standard landscape)","templateDescription":"","enableDocumentContentUpdater":true,"version":"1.9"}]]></TemplafyTemplateConfiguration>
+</file>
+
+<file path=customXml/item2.xml><?xml version="1.0" encoding="utf-8"?>
+<TemplafySlideTemplateConfiguration><![CDATA[{"documentContentValidatorConfiguration":{"enableDocumentContentValidator":false,"documentContentValidatorVersion":0},"elementsMetadata":[],"slideId":"637050925554934895","enableDocumentContentUpdater":true,"version":"1.9"}]]></TemplafySlideTemplateConfiguration>
+</file>
+
+<file path=customXml/item3.xml><?xml version="1.0" encoding="utf-8"?>
+<TemplafySlideFormConfiguration><![CDATA[{"formFields":[],"formDataEntries":[]}]]></TemplafySlideFormConfiguration>
+</file>
+
+<file path=customXml/item4.xml><?xml version="1.0" encoding="utf-8"?>
+<TemplafySlideTemplateConfiguration><![CDATA[{"documentContentValidatorConfiguration":{"enableDocumentContentValidator":false,"documentContentValidatorVersion":0},"elementsMetadata":[],"slideId":"637171128435180813","enableDocumentContentUpdater":true,"version":"1.9"}]]></TemplafySlideTemplateConfiguration>
+</file>
+
+<file path=customXml/item5.xml><?xml version="1.0" encoding="utf-8"?>
+<TemplafySlideFormConfiguration><![CDATA[{"formFields":[],"formDataEntries":[]}]]></TemplafySlideFormConfiguration>
+</file>
+
 <file path=customXml/item6.xml><?xml version="1.0" encoding="utf-8"?>
+<TemplafySlideFormConfiguration><![CDATA[{"formFields":[],"formDataEntries":[]}]]></TemplafySlideFormConfiguration>
+</file>
+
+<file path=customXml/item7.xml><?xml version="1.0" encoding="utf-8"?>
+<p:properties xmlns:p="http://schemas.microsoft.com/office/2006/metadata/properties" xmlns:xsi="http://www.w3.org/2001/XMLSchema-instance" xmlns:pc="http://schemas.microsoft.com/office/infopath/2007/PartnerControls">
+  <documentManagement/>
+</p:properties>
+</file>
+
+<file path=customXml/item8.xml><?xml version="1.0" encoding="utf-8"?>
 <?mso-contentType ?>
 <FormTemplates xmlns="http://schemas.microsoft.com/sharepoint/v3/contenttype/forms">
   <Display>DocumentLibraryForm</Display>
@@ -27638,114 +27646,17 @@
 </FormTemplates>
 </file>
 
-<file path=customXml/item7.xml><?xml version="1.0" encoding="utf-8"?>
-<TemplafySlideTemplateConfiguration><![CDATA[{"documentContentValidatorConfiguration":{"enableDocumentContentValidator":false,"documentContentValidatorVersion":0},"elementsMetadata":[],"slideId":"637050925554934895","enableDocumentContentUpdater":true,"version":"1.9"}]]></TemplafySlideTemplateConfiguration>
-</file>
-
-<file path=customXml/item8.xml><?xml version="1.0" encoding="utf-8"?>
-<TemplafySlideFormConfiguration><![CDATA[{"formFields":[],"formDataEntries":[]}]]></TemplafySlideFormConfiguration>
-</file>
-
 <file path=customXml/item9.xml><?xml version="1.0" encoding="utf-8"?>
-<TemplafySlideTemplateConfiguration><![CDATA[{"elementsMetadata":[],"documentContentValidatorConfiguration":{"enableDocumentContentValidator":false,"documentContentValidatorVersion":0},"slideId":"637027476704980324","enableDocumentContentUpdater":true,"version":"1.9"}]]></TemplafySlideTemplateConfiguration>
+<TemplafySlideTemplateConfiguration><![CDATA[{"documentContentValidatorConfiguration":{"enableDocumentContentValidator":false,"documentContentValidatorVersion":0},"elementsMetadata":[],"slideId":"637037983905678162","enableDocumentContentUpdater":true,"version":"1.9"}]]></TemplafySlideTemplateConfiguration>
 </file>
 
 <file path=customXml/itemProps1.xml><?xml version="1.0" encoding="utf-8"?>
-<ds:datastoreItem xmlns:ds="http://schemas.openxmlformats.org/officeDocument/2006/customXml" ds:itemID="{56F2EE69-0CCA-4F48-BE22-EC4A886C57A7}">
-  <ds:schemaRefs>
-    <ds:schemaRef ds:uri="http://schemas.microsoft.com/office/infopath/2007/PartnerControls"/>
-    <ds:schemaRef ds:uri="http://purl.org/dc/elements/1.1/"/>
-    <ds:schemaRef ds:uri="http://schemas.microsoft.com/office/2006/metadata/properties"/>
-    <ds:schemaRef ds:uri="http://purl.org/dc/terms/"/>
-    <ds:schemaRef ds:uri="92e1255f-bb7b-4dc9-b051-584cc104eb44"/>
-    <ds:schemaRef ds:uri="http://schemas.openxmlformats.org/package/2006/metadata/core-properties"/>
-    <ds:schemaRef ds:uri="http://schemas.microsoft.com/office/2006/documentManagement/types"/>
-    <ds:schemaRef ds:uri="a6550eff-0fc9-443f-8e77-72cbcf778382"/>
-    <ds:schemaRef ds:uri="http://www.w3.org/XML/1998/namespace"/>
-    <ds:schemaRef ds:uri="http://purl.org/dc/dcmitype/"/>
-  </ds:schemaRefs>
-</ds:datastoreItem>
-</file>
-
-<file path=customXml/itemProps10.xml><?xml version="1.0" encoding="utf-8"?>
-<ds:datastoreItem xmlns:ds="http://schemas.openxmlformats.org/officeDocument/2006/customXml" ds:itemID="{683FEB75-8CFA-449C-A6B1-B1E4A86A58A1}">
-  <ds:schemaRefs/>
-</ds:datastoreItem>
-</file>
-
-<file path=customXml/itemProps11.xml><?xml version="1.0" encoding="utf-8"?>
-<ds:datastoreItem xmlns:ds="http://schemas.openxmlformats.org/officeDocument/2006/customXml" ds:itemID="{1CE36EA9-2186-4EB1-871A-8AE59C2A13BB}">
-  <ds:schemaRefs/>
-</ds:datastoreItem>
-</file>
-
-<file path=customXml/itemProps12.xml><?xml version="1.0" encoding="utf-8"?>
-<ds:datastoreItem xmlns:ds="http://schemas.openxmlformats.org/officeDocument/2006/customXml" ds:itemID="{822D38AD-8010-4CD3-BD6B-117CB8DF70A4}">
-  <ds:schemaRefs/>
-</ds:datastoreItem>
-</file>
-
-<file path=customXml/itemProps13.xml><?xml version="1.0" encoding="utf-8"?>
-<ds:datastoreItem xmlns:ds="http://schemas.openxmlformats.org/officeDocument/2006/customXml" ds:itemID="{C99E78A0-C9D4-446F-B674-4DD3E2B46C5D}">
-  <ds:schemaRefs/>
-</ds:datastoreItem>
-</file>
-
-<file path=customXml/itemProps14.xml><?xml version="1.0" encoding="utf-8"?>
-<ds:datastoreItem xmlns:ds="http://schemas.openxmlformats.org/officeDocument/2006/customXml" ds:itemID="{72516535-7702-46AF-9B1F-8623A67A824E}">
-  <ds:schemaRefs/>
-</ds:datastoreItem>
-</file>
-
-<file path=customXml/itemProps15.xml><?xml version="1.0" encoding="utf-8"?>
-<ds:datastoreItem xmlns:ds="http://schemas.openxmlformats.org/officeDocument/2006/customXml" ds:itemID="{C750C5DC-043F-4BD3-940C-EB6F7625E286}">
-  <ds:schemaRefs/>
-</ds:datastoreItem>
-</file>
-
-<file path=customXml/itemProps16.xml><?xml version="1.0" encoding="utf-8"?>
-<ds:datastoreItem xmlns:ds="http://schemas.openxmlformats.org/officeDocument/2006/customXml" ds:itemID="{847502A6-7CBE-43AF-BDF6-4D4423521D8C}">
-  <ds:schemaRefs/>
-</ds:datastoreItem>
-</file>
-
-<file path=customXml/itemProps17.xml><?xml version="1.0" encoding="utf-8"?>
-<ds:datastoreItem xmlns:ds="http://schemas.openxmlformats.org/officeDocument/2006/customXml" ds:itemID="{AB2F4486-6448-49E3-8249-BB9C7492711D}">
-  <ds:schemaRefs/>
-</ds:datastoreItem>
-</file>
-
-<file path=customXml/itemProps18.xml><?xml version="1.0" encoding="utf-8"?>
-<ds:datastoreItem xmlns:ds="http://schemas.openxmlformats.org/officeDocument/2006/customXml" ds:itemID="{07958A4E-FAB1-42E4-B6B5-29B01F63F87B}">
-  <ds:schemaRefs/>
-</ds:datastoreItem>
-</file>
-
-<file path=customXml/itemProps19.xml><?xml version="1.0" encoding="utf-8"?>
-<ds:datastoreItem xmlns:ds="http://schemas.openxmlformats.org/officeDocument/2006/customXml" ds:itemID="{B9AEDDE3-EA02-4A8F-B8F8-0606A0AA45FC}">
-  <ds:schemaRefs/>
-</ds:datastoreItem>
-</file>
-
-<file path=customXml/itemProps2.xml><?xml version="1.0" encoding="utf-8"?>
-<ds:datastoreItem xmlns:ds="http://schemas.openxmlformats.org/officeDocument/2006/customXml" ds:itemID="{58CC0B31-82B9-497A-9A2E-F3F72D0BBDAD}">
-  <ds:schemaRefs/>
-</ds:datastoreItem>
-</file>
-
-<file path=customXml/itemProps3.xml><?xml version="1.0" encoding="utf-8"?>
 <ds:datastoreItem xmlns:ds="http://schemas.openxmlformats.org/officeDocument/2006/customXml" ds:itemID="{D92C3DF5-A179-4E2D-BD20-07044B39171F}">
   <ds:schemaRefs/>
 </ds:datastoreItem>
 </file>
 
-<file path=customXml/itemProps4.xml><?xml version="1.0" encoding="utf-8"?>
-<ds:datastoreItem xmlns:ds="http://schemas.openxmlformats.org/officeDocument/2006/customXml" ds:itemID="{D72A95EB-8536-47FD-944A-8DD76726FC96}">
-  <ds:schemaRefs/>
-</ds:datastoreItem>
-</file>
-
-<file path=customXml/itemProps5.xml><?xml version="1.0" encoding="utf-8"?>
+<file path=customXml/itemProps10.xml><?xml version="1.0" encoding="utf-8"?>
 <ds:datastoreItem xmlns:ds="http://schemas.openxmlformats.org/officeDocument/2006/customXml" ds:itemID="{058EED06-94C4-4781-888F-0A8BB816BC9F}">
   <ds:schemaRefs>
     <ds:schemaRef ds:uri="http://schemas.microsoft.com/office/2006/metadata/contentType"/>
@@ -27764,7 +27675,108 @@
 </ds:datastoreItem>
 </file>
 
+<file path=customXml/itemProps11.xml><?xml version="1.0" encoding="utf-8"?>
+<ds:datastoreItem xmlns:ds="http://schemas.openxmlformats.org/officeDocument/2006/customXml" ds:itemID="{C750C5DC-043F-4BD3-940C-EB6F7625E286}">
+  <ds:schemaRefs/>
+</ds:datastoreItem>
+</file>
+
+<file path=customXml/itemProps12.xml><?xml version="1.0" encoding="utf-8"?>
+<ds:datastoreItem xmlns:ds="http://schemas.openxmlformats.org/officeDocument/2006/customXml" ds:itemID="{683FEB75-8CFA-449C-A6B1-B1E4A86A58A1}">
+  <ds:schemaRefs/>
+</ds:datastoreItem>
+</file>
+
+<file path=customXml/itemProps13.xml><?xml version="1.0" encoding="utf-8"?>
+<ds:datastoreItem xmlns:ds="http://schemas.openxmlformats.org/officeDocument/2006/customXml" ds:itemID="{B9AEDDE3-EA02-4A8F-B8F8-0606A0AA45FC}">
+  <ds:schemaRefs/>
+</ds:datastoreItem>
+</file>
+
+<file path=customXml/itemProps14.xml><?xml version="1.0" encoding="utf-8"?>
+<ds:datastoreItem xmlns:ds="http://schemas.openxmlformats.org/officeDocument/2006/customXml" ds:itemID="{D72A95EB-8536-47FD-944A-8DD76726FC96}">
+  <ds:schemaRefs/>
+</ds:datastoreItem>
+</file>
+
+<file path=customXml/itemProps15.xml><?xml version="1.0" encoding="utf-8"?>
+<ds:datastoreItem xmlns:ds="http://schemas.openxmlformats.org/officeDocument/2006/customXml" ds:itemID="{C09F197C-6A49-47D0-B877-F88807989676}">
+  <ds:schemaRefs/>
+</ds:datastoreItem>
+</file>
+
+<file path=customXml/itemProps16.xml><?xml version="1.0" encoding="utf-8"?>
+<ds:datastoreItem xmlns:ds="http://schemas.openxmlformats.org/officeDocument/2006/customXml" ds:itemID="{72516535-7702-46AF-9B1F-8623A67A824E}">
+  <ds:schemaRefs/>
+</ds:datastoreItem>
+</file>
+
+<file path=customXml/itemProps17.xml><?xml version="1.0" encoding="utf-8"?>
+<ds:datastoreItem xmlns:ds="http://schemas.openxmlformats.org/officeDocument/2006/customXml" ds:itemID="{32BA7684-6BE4-4F73-B22E-30934AB379B8}">
+  <ds:schemaRefs/>
+</ds:datastoreItem>
+</file>
+
+<file path=customXml/itemProps18.xml><?xml version="1.0" encoding="utf-8"?>
+<ds:datastoreItem xmlns:ds="http://schemas.openxmlformats.org/officeDocument/2006/customXml" ds:itemID="{C99E78A0-C9D4-446F-B674-4DD3E2B46C5D}">
+  <ds:schemaRefs/>
+</ds:datastoreItem>
+</file>
+
+<file path=customXml/itemProps19.xml><?xml version="1.0" encoding="utf-8"?>
+<ds:datastoreItem xmlns:ds="http://schemas.openxmlformats.org/officeDocument/2006/customXml" ds:itemID="{07958A4E-FAB1-42E4-B6B5-29B01F63F87B}">
+  <ds:schemaRefs/>
+</ds:datastoreItem>
+</file>
+
+<file path=customXml/itemProps2.xml><?xml version="1.0" encoding="utf-8"?>
+<ds:datastoreItem xmlns:ds="http://schemas.openxmlformats.org/officeDocument/2006/customXml" ds:itemID="{03AF3FDC-ACD1-46F3-A43E-782322DF9816}">
+  <ds:schemaRefs/>
+</ds:datastoreItem>
+</file>
+
+<file path=customXml/itemProps3.xml><?xml version="1.0" encoding="utf-8"?>
+<ds:datastoreItem xmlns:ds="http://schemas.openxmlformats.org/officeDocument/2006/customXml" ds:itemID="{822D38AD-8010-4CD3-BD6B-117CB8DF70A4}">
+  <ds:schemaRefs/>
+</ds:datastoreItem>
+</file>
+
+<file path=customXml/itemProps4.xml><?xml version="1.0" encoding="utf-8"?>
+<ds:datastoreItem xmlns:ds="http://schemas.openxmlformats.org/officeDocument/2006/customXml" ds:itemID="{AB2F4486-6448-49E3-8249-BB9C7492711D}">
+  <ds:schemaRefs/>
+</ds:datastoreItem>
+</file>
+
+<file path=customXml/itemProps5.xml><?xml version="1.0" encoding="utf-8"?>
+<ds:datastoreItem xmlns:ds="http://schemas.openxmlformats.org/officeDocument/2006/customXml" ds:itemID="{58CC0B31-82B9-497A-9A2E-F3F72D0BBDAD}">
+  <ds:schemaRefs/>
+</ds:datastoreItem>
+</file>
+
 <file path=customXml/itemProps6.xml><?xml version="1.0" encoding="utf-8"?>
+<ds:datastoreItem xmlns:ds="http://schemas.openxmlformats.org/officeDocument/2006/customXml" ds:itemID="{847502A6-7CBE-43AF-BDF6-4D4423521D8C}">
+  <ds:schemaRefs/>
+</ds:datastoreItem>
+</file>
+
+<file path=customXml/itemProps7.xml><?xml version="1.0" encoding="utf-8"?>
+<ds:datastoreItem xmlns:ds="http://schemas.openxmlformats.org/officeDocument/2006/customXml" ds:itemID="{56F2EE69-0CCA-4F48-BE22-EC4A886C57A7}">
+  <ds:schemaRefs>
+    <ds:schemaRef ds:uri="http://schemas.microsoft.com/office/infopath/2007/PartnerControls"/>
+    <ds:schemaRef ds:uri="http://purl.org/dc/elements/1.1/"/>
+    <ds:schemaRef ds:uri="http://schemas.microsoft.com/office/2006/metadata/properties"/>
+    <ds:schemaRef ds:uri="http://purl.org/dc/terms/"/>
+    <ds:schemaRef ds:uri="92e1255f-bb7b-4dc9-b051-584cc104eb44"/>
+    <ds:schemaRef ds:uri="http://schemas.openxmlformats.org/package/2006/metadata/core-properties"/>
+    <ds:schemaRef ds:uri="http://schemas.microsoft.com/office/2006/documentManagement/types"/>
+    <ds:schemaRef ds:uri="a6550eff-0fc9-443f-8e77-72cbcf778382"/>
+    <ds:schemaRef ds:uri="http://www.w3.org/XML/1998/namespace"/>
+    <ds:schemaRef ds:uri="http://purl.org/dc/dcmitype/"/>
+  </ds:schemaRefs>
+</ds:datastoreItem>
+</file>
+
+<file path=customXml/itemProps8.xml><?xml version="1.0" encoding="utf-8"?>
 <ds:datastoreItem xmlns:ds="http://schemas.openxmlformats.org/officeDocument/2006/customXml" ds:itemID="{F5A7E41D-6E7F-4B05-AFAB-F540BD4C068B}">
   <ds:schemaRefs>
     <ds:schemaRef ds:uri="http://schemas.microsoft.com/sharepoint/v3/contenttype/forms"/>
@@ -27772,20 +27784,8 @@
 </ds:datastoreItem>
 </file>
 
-<file path=customXml/itemProps7.xml><?xml version="1.0" encoding="utf-8"?>
-<ds:datastoreItem xmlns:ds="http://schemas.openxmlformats.org/officeDocument/2006/customXml" ds:itemID="{03AF3FDC-ACD1-46F3-A43E-782322DF9816}">
-  <ds:schemaRefs/>
-</ds:datastoreItem>
-</file>
-
-<file path=customXml/itemProps8.xml><?xml version="1.0" encoding="utf-8"?>
-<ds:datastoreItem xmlns:ds="http://schemas.openxmlformats.org/officeDocument/2006/customXml" ds:itemID="{32BA7684-6BE4-4F73-B22E-30934AB379B8}">
-  <ds:schemaRefs/>
-</ds:datastoreItem>
-</file>
-
 <file path=customXml/itemProps9.xml><?xml version="1.0" encoding="utf-8"?>
-<ds:datastoreItem xmlns:ds="http://schemas.openxmlformats.org/officeDocument/2006/customXml" ds:itemID="{C09F197C-6A49-47D0-B877-F88807989676}">
+<ds:datastoreItem xmlns:ds="http://schemas.openxmlformats.org/officeDocument/2006/customXml" ds:itemID="{1CE36EA9-2186-4EB1-871A-8AE59C2A13BB}">
   <ds:schemaRefs/>
 </ds:datastoreItem>
 </file>
</xml_diff>